<commit_message>
chore: last content review
</commit_message>
<xml_diff>
--- a/WhyFSharp.pptx
+++ b/WhyFSharp.pptx
@@ -5,7 +5,7 @@
     <p:sldMasterId id="2147483648" r:id="rId1"/>
   </p:sldMasterIdLst>
   <p:notesMasterIdLst>
-    <p:notesMasterId r:id="rId37"/>
+    <p:notesMasterId r:id="rId38"/>
   </p:notesMasterIdLst>
   <p:sldIdLst>
     <p:sldId id="256" r:id="rId2"/>
@@ -25,24 +25,25 @@
     <p:sldId id="268" r:id="rId16"/>
     <p:sldId id="270" r:id="rId17"/>
     <p:sldId id="272" r:id="rId18"/>
-    <p:sldId id="271" r:id="rId19"/>
-    <p:sldId id="273" r:id="rId20"/>
-    <p:sldId id="274" r:id="rId21"/>
-    <p:sldId id="275" r:id="rId22"/>
-    <p:sldId id="276" r:id="rId23"/>
-    <p:sldId id="277" r:id="rId24"/>
-    <p:sldId id="279" r:id="rId25"/>
-    <p:sldId id="278" r:id="rId26"/>
-    <p:sldId id="281" r:id="rId27"/>
-    <p:sldId id="282" r:id="rId28"/>
-    <p:sldId id="286" r:id="rId29"/>
-    <p:sldId id="289" r:id="rId30"/>
-    <p:sldId id="290" r:id="rId31"/>
-    <p:sldId id="291" r:id="rId32"/>
-    <p:sldId id="292" r:id="rId33"/>
-    <p:sldId id="293" r:id="rId34"/>
-    <p:sldId id="284" r:id="rId35"/>
-    <p:sldId id="285" r:id="rId36"/>
+    <p:sldId id="274" r:id="rId19"/>
+    <p:sldId id="271" r:id="rId20"/>
+    <p:sldId id="273" r:id="rId21"/>
+    <p:sldId id="294" r:id="rId22"/>
+    <p:sldId id="275" r:id="rId23"/>
+    <p:sldId id="276" r:id="rId24"/>
+    <p:sldId id="277" r:id="rId25"/>
+    <p:sldId id="279" r:id="rId26"/>
+    <p:sldId id="278" r:id="rId27"/>
+    <p:sldId id="281" r:id="rId28"/>
+    <p:sldId id="282" r:id="rId29"/>
+    <p:sldId id="286" r:id="rId30"/>
+    <p:sldId id="289" r:id="rId31"/>
+    <p:sldId id="290" r:id="rId32"/>
+    <p:sldId id="291" r:id="rId33"/>
+    <p:sldId id="292" r:id="rId34"/>
+    <p:sldId id="293" r:id="rId35"/>
+    <p:sldId id="284" r:id="rId36"/>
+    <p:sldId id="285" r:id="rId37"/>
   </p:sldIdLst>
   <p:sldSz cx="12192000" cy="6858000"/>
   <p:notesSz cx="6858000" cy="9144000"/>
@@ -4289,6 +4290,12 @@
             </a:r>
             <a:endParaRPr lang="fr-FR" dirty="0"/>
           </a:p>
+          <a:p>
+            <a:r>
+              <a:rPr lang="en-US" dirty="0"/>
+              <a:t>November 2021</a:t>
+            </a:r>
+          </a:p>
         </p:txBody>
       </p:sp>
       <p:cxnSp>
@@ -4477,8 +4484,72 @@
                                   </p:childTnLst>
                                 </p:cTn>
                               </p:par>
+                            </p:childTnLst>
+                          </p:cTn>
+                        </p:par>
+                      </p:childTnLst>
+                    </p:cTn>
+                  </p:par>
+                  <p:par>
+                    <p:cTn id="8" fill="hold">
+                      <p:stCondLst>
+                        <p:cond delay="indefinite"/>
+                      </p:stCondLst>
+                      <p:childTnLst>
+                        <p:par>
+                          <p:cTn id="9" fill="hold">
+                            <p:stCondLst>
+                              <p:cond delay="0"/>
+                            </p:stCondLst>
+                            <p:childTnLst>
                               <p:par>
-                                <p:cTn id="8" presetID="10" presetClass="entr" presetSubtype="0" fill="hold" grpId="0" nodeType="withEffect">
+                                <p:cTn id="10" presetID="10" presetClass="entr" presetSubtype="0" fill="hold" grpId="0" nodeType="clickEffect">
+                                  <p:stCondLst>
+                                    <p:cond delay="1000"/>
+                                  </p:stCondLst>
+                                  <p:iterate type="wd">
+                                    <p:tmPct val="15000"/>
+                                  </p:iterate>
+                                  <p:childTnLst>
+                                    <p:set>
+                                      <p:cBhvr>
+                                        <p:cTn id="11" dur="1" fill="hold">
+                                          <p:stCondLst>
+                                            <p:cond delay="0"/>
+                                          </p:stCondLst>
+                                        </p:cTn>
+                                        <p:tgtEl>
+                                          <p:spTgt spid="3">
+                                            <p:txEl>
+                                              <p:pRg st="1" end="1"/>
+                                            </p:txEl>
+                                          </p:spTgt>
+                                        </p:tgtEl>
+                                        <p:attrNameLst>
+                                          <p:attrName>style.visibility</p:attrName>
+                                        </p:attrNameLst>
+                                      </p:cBhvr>
+                                      <p:to>
+                                        <p:strVal val="visible"/>
+                                      </p:to>
+                                    </p:set>
+                                    <p:animEffect transition="in" filter="fade">
+                                      <p:cBhvr>
+                                        <p:cTn id="12" dur="1000"/>
+                                        <p:tgtEl>
+                                          <p:spTgt spid="3">
+                                            <p:txEl>
+                                              <p:pRg st="1" end="1"/>
+                                            </p:txEl>
+                                          </p:spTgt>
+                                        </p:tgtEl>
+                                      </p:cBhvr>
+                                    </p:animEffect>
+                                  </p:childTnLst>
+                                </p:cTn>
+                              </p:par>
+                              <p:par>
+                                <p:cTn id="13" presetID="10" presetClass="entr" presetSubtype="0" fill="hold" grpId="0" nodeType="withEffect">
                                   <p:stCondLst>
                                     <p:cond delay="500"/>
                                   </p:stCondLst>
@@ -4488,7 +4559,7 @@
                                   <p:childTnLst>
                                     <p:set>
                                       <p:cBhvr>
-                                        <p:cTn id="9" dur="1" fill="hold">
+                                        <p:cTn id="14" dur="1" fill="hold">
                                           <p:stCondLst>
                                             <p:cond delay="0"/>
                                           </p:stCondLst>
@@ -4506,7 +4577,7 @@
                                     </p:set>
                                     <p:animEffect transition="in" filter="fade">
                                       <p:cBhvr>
-                                        <p:cTn id="10" dur="1000"/>
+                                        <p:cTn id="15" dur="1000"/>
                                         <p:tgtEl>
                                           <p:spTgt spid="2"/>
                                         </p:tgtEl>
@@ -5291,33 +5362,7 @@
                 <a:ea typeface="+mn-ea"/>
                 <a:cs typeface="+mn-cs"/>
               </a:rPr>
-              <a:t>F# in my C# and F# in my C#... #</a:t>
-            </a:r>
-            <a:r>
-              <a:rPr lang="en-US" i="1" kern="1200" dirty="0" err="1">
-                <a:solidFill>
-                  <a:schemeClr val="bg2">
-                    <a:lumMod val="75000"/>
-                  </a:schemeClr>
-                </a:solidFill>
-                <a:latin typeface="+mn-lt"/>
-                <a:ea typeface="+mn-ea"/>
-                <a:cs typeface="+mn-cs"/>
-              </a:rPr>
-              <a:t>ception</a:t>
-            </a:r>
-            <a:r>
-              <a:rPr lang="en-US" i="1" kern="1200" dirty="0">
-                <a:solidFill>
-                  <a:schemeClr val="bg2">
-                    <a:lumMod val="75000"/>
-                  </a:schemeClr>
-                </a:solidFill>
-                <a:latin typeface="+mn-lt"/>
-                <a:ea typeface="+mn-ea"/>
-                <a:cs typeface="+mn-cs"/>
-              </a:rPr>
-              <a:t> :p</a:t>
+              <a:t>F# in my C# and C# in my F#...</a:t>
             </a:r>
           </a:p>
         </p:txBody>
@@ -5614,8 +5659,8 @@
         </p:nvSpPr>
         <p:spPr>
           <a:xfrm>
-            <a:off x="3964057" y="3672811"/>
-            <a:ext cx="7376491" cy="2121701"/>
+            <a:off x="3964057" y="3672812"/>
+            <a:ext cx="7376491" cy="1568492"/>
           </a:xfrm>
         </p:spPr>
         <p:txBody>
@@ -5626,25 +5671,27 @@
           <a:p>
             <a:r>
               <a:rPr lang="en-US" sz="2200" dirty="0"/>
-              <a:t>Anything written in C# can be used in F# </a:t>
+              <a:t>In short, same constraints as VB.NET</a:t>
+            </a:r>
+          </a:p>
+          <a:p>
+            <a:pPr lvl="1"/>
+            <a:r>
+              <a:rPr lang="en-US" sz="1800" dirty="0"/>
+              <a:t>Anything written in C# can be used in F#</a:t>
+            </a:r>
+          </a:p>
+          <a:p>
+            <a:pPr lvl="1"/>
+            <a:r>
+              <a:rPr lang="en-US" sz="1800" dirty="0"/>
+              <a:t>The reverse is true for all F# features not depending on the compiler </a:t>
             </a:r>
           </a:p>
           <a:p>
             <a:r>
               <a:rPr lang="en-US" sz="2200" dirty="0"/>
-              <a:t>The reverse is true for all F# features not depending on the compiler</a:t>
-            </a:r>
-          </a:p>
-          <a:p>
-            <a:r>
-              <a:rPr lang="en-US" sz="2200" dirty="0"/>
-              <a:t>In short, same constraints as VB.NET</a:t>
-            </a:r>
-          </a:p>
-          <a:p>
-            <a:r>
-              <a:rPr lang="en-US" sz="2200" dirty="0"/>
-              <a:t>Let’s have </a:t>
+              <a:t>Let’s have a look deeper look </a:t>
             </a:r>
             <a:r>
               <a:rPr lang="en-US" sz="2200" dirty="0">
@@ -5687,7 +5734,7 @@
                             </p:stCondLst>
                             <p:childTnLst>
                               <p:par>
-                                <p:cTn id="5" presetID="42" presetClass="entr" presetSubtype="0" fill="hold" grpId="0" nodeType="clickEffect">
+                                <p:cTn id="5" presetID="1" presetClass="entr" presetSubtype="0" fill="hold" grpId="0" nodeType="clickEffect">
                                   <p:stCondLst>
                                     <p:cond delay="0"/>
                                   </p:stCondLst>
@@ -5714,102 +5761,18 @@
                                         <p:strVal val="visible"/>
                                       </p:to>
                                     </p:set>
-                                    <p:animEffect transition="in" filter="fade">
-                                      <p:cBhvr>
-                                        <p:cTn id="7" dur="1000"/>
-                                        <p:tgtEl>
-                                          <p:spTgt spid="6">
-                                            <p:txEl>
-                                              <p:pRg st="0" end="0"/>
-                                            </p:txEl>
-                                          </p:spTgt>
-                                        </p:tgtEl>
-                                      </p:cBhvr>
-                                    </p:animEffect>
-                                    <p:anim calcmode="lin" valueType="num">
-                                      <p:cBhvr>
-                                        <p:cTn id="8" dur="1000" fill="hold"/>
-                                        <p:tgtEl>
-                                          <p:spTgt spid="6">
-                                            <p:txEl>
-                                              <p:pRg st="0" end="0"/>
-                                            </p:txEl>
-                                          </p:spTgt>
-                                        </p:tgtEl>
-                                        <p:attrNameLst>
-                                          <p:attrName>ppt_x</p:attrName>
-                                        </p:attrNameLst>
-                                      </p:cBhvr>
-                                      <p:tavLst>
-                                        <p:tav tm="0">
-                                          <p:val>
-                                            <p:strVal val="#ppt_x"/>
-                                          </p:val>
-                                        </p:tav>
-                                        <p:tav tm="100000">
-                                          <p:val>
-                                            <p:strVal val="#ppt_x"/>
-                                          </p:val>
-                                        </p:tav>
-                                      </p:tavLst>
-                                    </p:anim>
-                                    <p:anim calcmode="lin" valueType="num">
-                                      <p:cBhvr>
-                                        <p:cTn id="9" dur="1000" fill="hold"/>
-                                        <p:tgtEl>
-                                          <p:spTgt spid="6">
-                                            <p:txEl>
-                                              <p:pRg st="0" end="0"/>
-                                            </p:txEl>
-                                          </p:spTgt>
-                                        </p:tgtEl>
-                                        <p:attrNameLst>
-                                          <p:attrName>ppt_y</p:attrName>
-                                        </p:attrNameLst>
-                                      </p:cBhvr>
-                                      <p:tavLst>
-                                        <p:tav tm="0">
-                                          <p:val>
-                                            <p:strVal val="#ppt_y+.1"/>
-                                          </p:val>
-                                        </p:tav>
-                                        <p:tav tm="100000">
-                                          <p:val>
-                                            <p:strVal val="#ppt_y"/>
-                                          </p:val>
-                                        </p:tav>
-                                      </p:tavLst>
-                                    </p:anim>
                                   </p:childTnLst>
                                 </p:cTn>
                               </p:par>
-                            </p:childTnLst>
-                          </p:cTn>
-                        </p:par>
-                      </p:childTnLst>
-                    </p:cTn>
-                  </p:par>
-                  <p:par>
-                    <p:cTn id="10" fill="hold">
-                      <p:stCondLst>
-                        <p:cond delay="indefinite"/>
-                      </p:stCondLst>
-                      <p:childTnLst>
-                        <p:par>
-                          <p:cTn id="11" fill="hold">
-                            <p:stCondLst>
-                              <p:cond delay="0"/>
-                            </p:stCondLst>
-                            <p:childTnLst>
                               <p:par>
-                                <p:cTn id="12" presetID="42" presetClass="entr" presetSubtype="0" fill="hold" grpId="0" nodeType="clickEffect">
+                                <p:cTn id="7" presetID="1" presetClass="entr" presetSubtype="0" fill="hold" grpId="0" nodeType="withEffect">
                                   <p:stCondLst>
                                     <p:cond delay="0"/>
                                   </p:stCondLst>
                                   <p:childTnLst>
                                     <p:set>
                                       <p:cBhvr>
-                                        <p:cTn id="13" dur="1" fill="hold">
+                                        <p:cTn id="8" dur="1" fill="hold">
                                           <p:stCondLst>
                                             <p:cond delay="0"/>
                                           </p:stCondLst>
@@ -5829,102 +5792,18 @@
                                         <p:strVal val="visible"/>
                                       </p:to>
                                     </p:set>
-                                    <p:animEffect transition="in" filter="fade">
-                                      <p:cBhvr>
-                                        <p:cTn id="14" dur="1000"/>
-                                        <p:tgtEl>
-                                          <p:spTgt spid="6">
-                                            <p:txEl>
-                                              <p:pRg st="1" end="1"/>
-                                            </p:txEl>
-                                          </p:spTgt>
-                                        </p:tgtEl>
-                                      </p:cBhvr>
-                                    </p:animEffect>
-                                    <p:anim calcmode="lin" valueType="num">
-                                      <p:cBhvr>
-                                        <p:cTn id="15" dur="1000" fill="hold"/>
-                                        <p:tgtEl>
-                                          <p:spTgt spid="6">
-                                            <p:txEl>
-                                              <p:pRg st="1" end="1"/>
-                                            </p:txEl>
-                                          </p:spTgt>
-                                        </p:tgtEl>
-                                        <p:attrNameLst>
-                                          <p:attrName>ppt_x</p:attrName>
-                                        </p:attrNameLst>
-                                      </p:cBhvr>
-                                      <p:tavLst>
-                                        <p:tav tm="0">
-                                          <p:val>
-                                            <p:strVal val="#ppt_x"/>
-                                          </p:val>
-                                        </p:tav>
-                                        <p:tav tm="100000">
-                                          <p:val>
-                                            <p:strVal val="#ppt_x"/>
-                                          </p:val>
-                                        </p:tav>
-                                      </p:tavLst>
-                                    </p:anim>
-                                    <p:anim calcmode="lin" valueType="num">
-                                      <p:cBhvr>
-                                        <p:cTn id="16" dur="1000" fill="hold"/>
-                                        <p:tgtEl>
-                                          <p:spTgt spid="6">
-                                            <p:txEl>
-                                              <p:pRg st="1" end="1"/>
-                                            </p:txEl>
-                                          </p:spTgt>
-                                        </p:tgtEl>
-                                        <p:attrNameLst>
-                                          <p:attrName>ppt_y</p:attrName>
-                                        </p:attrNameLst>
-                                      </p:cBhvr>
-                                      <p:tavLst>
-                                        <p:tav tm="0">
-                                          <p:val>
-                                            <p:strVal val="#ppt_y+.1"/>
-                                          </p:val>
-                                        </p:tav>
-                                        <p:tav tm="100000">
-                                          <p:val>
-                                            <p:strVal val="#ppt_y"/>
-                                          </p:val>
-                                        </p:tav>
-                                      </p:tavLst>
-                                    </p:anim>
                                   </p:childTnLst>
                                 </p:cTn>
                               </p:par>
-                            </p:childTnLst>
-                          </p:cTn>
-                        </p:par>
-                      </p:childTnLst>
-                    </p:cTn>
-                  </p:par>
-                  <p:par>
-                    <p:cTn id="17" fill="hold">
-                      <p:stCondLst>
-                        <p:cond delay="indefinite"/>
-                      </p:stCondLst>
-                      <p:childTnLst>
-                        <p:par>
-                          <p:cTn id="18" fill="hold">
-                            <p:stCondLst>
-                              <p:cond delay="0"/>
-                            </p:stCondLst>
-                            <p:childTnLst>
                               <p:par>
-                                <p:cTn id="19" presetID="42" presetClass="entr" presetSubtype="0" fill="hold" grpId="0" nodeType="clickEffect">
+                                <p:cTn id="9" presetID="1" presetClass="entr" presetSubtype="0" fill="hold" grpId="0" nodeType="withEffect">
                                   <p:stCondLst>
                                     <p:cond delay="0"/>
                                   </p:stCondLst>
                                   <p:childTnLst>
                                     <p:set>
                                       <p:cBhvr>
-                                        <p:cTn id="20" dur="1" fill="hold">
+                                        <p:cTn id="10" dur="1" fill="hold">
                                           <p:stCondLst>
                                             <p:cond delay="0"/>
                                           </p:stCondLst>
@@ -5944,72 +5823,6 @@
                                         <p:strVal val="visible"/>
                                       </p:to>
                                     </p:set>
-                                    <p:animEffect transition="in" filter="fade">
-                                      <p:cBhvr>
-                                        <p:cTn id="21" dur="1000"/>
-                                        <p:tgtEl>
-                                          <p:spTgt spid="6">
-                                            <p:txEl>
-                                              <p:pRg st="2" end="2"/>
-                                            </p:txEl>
-                                          </p:spTgt>
-                                        </p:tgtEl>
-                                      </p:cBhvr>
-                                    </p:animEffect>
-                                    <p:anim calcmode="lin" valueType="num">
-                                      <p:cBhvr>
-                                        <p:cTn id="22" dur="1000" fill="hold"/>
-                                        <p:tgtEl>
-                                          <p:spTgt spid="6">
-                                            <p:txEl>
-                                              <p:pRg st="2" end="2"/>
-                                            </p:txEl>
-                                          </p:spTgt>
-                                        </p:tgtEl>
-                                        <p:attrNameLst>
-                                          <p:attrName>ppt_x</p:attrName>
-                                        </p:attrNameLst>
-                                      </p:cBhvr>
-                                      <p:tavLst>
-                                        <p:tav tm="0">
-                                          <p:val>
-                                            <p:strVal val="#ppt_x"/>
-                                          </p:val>
-                                        </p:tav>
-                                        <p:tav tm="100000">
-                                          <p:val>
-                                            <p:strVal val="#ppt_x"/>
-                                          </p:val>
-                                        </p:tav>
-                                      </p:tavLst>
-                                    </p:anim>
-                                    <p:anim calcmode="lin" valueType="num">
-                                      <p:cBhvr>
-                                        <p:cTn id="23" dur="1000" fill="hold"/>
-                                        <p:tgtEl>
-                                          <p:spTgt spid="6">
-                                            <p:txEl>
-                                              <p:pRg st="2" end="2"/>
-                                            </p:txEl>
-                                          </p:spTgt>
-                                        </p:tgtEl>
-                                        <p:attrNameLst>
-                                          <p:attrName>ppt_y</p:attrName>
-                                        </p:attrNameLst>
-                                      </p:cBhvr>
-                                      <p:tavLst>
-                                        <p:tav tm="0">
-                                          <p:val>
-                                            <p:strVal val="#ppt_y+.1"/>
-                                          </p:val>
-                                        </p:tav>
-                                        <p:tav tm="100000">
-                                          <p:val>
-                                            <p:strVal val="#ppt_y"/>
-                                          </p:val>
-                                        </p:tav>
-                                      </p:tavLst>
-                                    </p:anim>
                                   </p:childTnLst>
                                 </p:cTn>
                               </p:par>
@@ -6020,26 +5833,26 @@
                     </p:cTn>
                   </p:par>
                   <p:par>
-                    <p:cTn id="24" fill="hold">
+                    <p:cTn id="11" fill="hold">
                       <p:stCondLst>
                         <p:cond delay="indefinite"/>
                       </p:stCondLst>
                       <p:childTnLst>
                         <p:par>
-                          <p:cTn id="25" fill="hold">
+                          <p:cTn id="12" fill="hold">
                             <p:stCondLst>
                               <p:cond delay="0"/>
                             </p:stCondLst>
                             <p:childTnLst>
                               <p:par>
-                                <p:cTn id="26" presetID="42" presetClass="entr" presetSubtype="0" fill="hold" grpId="0" nodeType="clickEffect">
+                                <p:cTn id="13" presetID="1" presetClass="entr" presetSubtype="0" fill="hold" grpId="0" nodeType="clickEffect">
                                   <p:stCondLst>
                                     <p:cond delay="0"/>
                                   </p:stCondLst>
                                   <p:childTnLst>
                                     <p:set>
                                       <p:cBhvr>
-                                        <p:cTn id="27" dur="1" fill="hold">
+                                        <p:cTn id="14" dur="1" fill="hold">
                                           <p:stCondLst>
                                             <p:cond delay="0"/>
                                           </p:stCondLst>
@@ -6059,72 +5872,6 @@
                                         <p:strVal val="visible"/>
                                       </p:to>
                                     </p:set>
-                                    <p:animEffect transition="in" filter="fade">
-                                      <p:cBhvr>
-                                        <p:cTn id="28" dur="1000"/>
-                                        <p:tgtEl>
-                                          <p:spTgt spid="6">
-                                            <p:txEl>
-                                              <p:pRg st="3" end="3"/>
-                                            </p:txEl>
-                                          </p:spTgt>
-                                        </p:tgtEl>
-                                      </p:cBhvr>
-                                    </p:animEffect>
-                                    <p:anim calcmode="lin" valueType="num">
-                                      <p:cBhvr>
-                                        <p:cTn id="29" dur="1000" fill="hold"/>
-                                        <p:tgtEl>
-                                          <p:spTgt spid="6">
-                                            <p:txEl>
-                                              <p:pRg st="3" end="3"/>
-                                            </p:txEl>
-                                          </p:spTgt>
-                                        </p:tgtEl>
-                                        <p:attrNameLst>
-                                          <p:attrName>ppt_x</p:attrName>
-                                        </p:attrNameLst>
-                                      </p:cBhvr>
-                                      <p:tavLst>
-                                        <p:tav tm="0">
-                                          <p:val>
-                                            <p:strVal val="#ppt_x"/>
-                                          </p:val>
-                                        </p:tav>
-                                        <p:tav tm="100000">
-                                          <p:val>
-                                            <p:strVal val="#ppt_x"/>
-                                          </p:val>
-                                        </p:tav>
-                                      </p:tavLst>
-                                    </p:anim>
-                                    <p:anim calcmode="lin" valueType="num">
-                                      <p:cBhvr>
-                                        <p:cTn id="30" dur="1000" fill="hold"/>
-                                        <p:tgtEl>
-                                          <p:spTgt spid="6">
-                                            <p:txEl>
-                                              <p:pRg st="3" end="3"/>
-                                            </p:txEl>
-                                          </p:spTgt>
-                                        </p:tgtEl>
-                                        <p:attrNameLst>
-                                          <p:attrName>ppt_y</p:attrName>
-                                        </p:attrNameLst>
-                                      </p:cBhvr>
-                                      <p:tavLst>
-                                        <p:tav tm="0">
-                                          <p:val>
-                                            <p:strVal val="#ppt_y+.1"/>
-                                          </p:val>
-                                        </p:tav>
-                                        <p:tav tm="100000">
-                                          <p:val>
-                                            <p:strVal val="#ppt_y"/>
-                                          </p:val>
-                                        </p:tav>
-                                      </p:tavLst>
-                                    </p:anim>
                                   </p:childTnLst>
                                 </p:cTn>
                               </p:par>
@@ -6763,7 +6510,15 @@
             <a:pPr marL="285750"/>
             <a:r>
               <a:rPr lang="en-US" sz="2000" dirty="0"/>
-              <a:t>Any value of </a:t>
+              <a:t>An object of class </a:t>
+            </a:r>
+            <a:r>
+              <a:rPr lang="en-US" sz="2000" b="1" dirty="0"/>
+              <a:t>Something</a:t>
+            </a:r>
+            <a:r>
+              <a:rPr lang="en-US" sz="2000" dirty="0"/>
+              <a:t>, can have any combination of </a:t>
             </a:r>
             <a:r>
               <a:rPr lang="en-US" sz="2000" b="1" dirty="0"/>
@@ -6771,39 +6526,22 @@
             </a:r>
             <a:r>
               <a:rPr lang="en-US" sz="2000" dirty="0"/>
-              <a:t> can be affected into </a:t>
-            </a:r>
-            <a:r>
-              <a:rPr lang="en-US" sz="2000" b="1" dirty="0" err="1"/>
-              <a:t>SomeNumber</a:t>
-            </a:r>
-            <a:endParaRPr lang="en-US" sz="2000" dirty="0"/>
+              <a:t> AND </a:t>
+            </a:r>
+            <a:r>
+              <a:rPr lang="en-US" sz="2000" b="1" dirty="0"/>
+              <a:t>string</a:t>
+            </a:r>
+            <a:r>
+              <a:rPr lang="en-US" sz="2000" dirty="0"/>
+              <a:t> values</a:t>
+            </a:r>
           </a:p>
           <a:p>
             <a:pPr marL="285750"/>
             <a:r>
               <a:rPr lang="en-US" sz="2000" dirty="0"/>
-              <a:t>Any value of </a:t>
-            </a:r>
-            <a:r>
-              <a:rPr lang="en-US" sz="2000" b="1" dirty="0"/>
-              <a:t>string </a:t>
-            </a:r>
-            <a:r>
-              <a:rPr lang="en-US" sz="2000" dirty="0"/>
-              <a:t>can be affected to </a:t>
-            </a:r>
-            <a:r>
-              <a:rPr lang="en-US" sz="2000" b="1" dirty="0" err="1"/>
-              <a:t>SomeSentence</a:t>
-            </a:r>
-            <a:endParaRPr lang="en-US" sz="2000" b="1" dirty="0"/>
-          </a:p>
-          <a:p>
-            <a:pPr marL="285750"/>
-            <a:r>
-              <a:rPr lang="en-US" sz="2000" dirty="0"/>
-              <a:t>An object of class </a:t>
+              <a:t>We say that </a:t>
             </a:r>
             <a:r>
               <a:rPr lang="en-US" sz="2000" b="1" dirty="0"/>
@@ -6811,7 +6549,7 @@
             </a:r>
             <a:r>
               <a:rPr lang="en-US" sz="2000" dirty="0"/>
-              <a:t>, can have any combination of </a:t>
+              <a:t> is a product type of </a:t>
             </a:r>
             <a:r>
               <a:rPr lang="en-US" sz="2000" b="1" dirty="0"/>
@@ -6819,7 +6557,7 @@
             </a:r>
             <a:r>
               <a:rPr lang="en-US" sz="2000" dirty="0"/>
-              <a:t> AND </a:t>
+              <a:t> and </a:t>
             </a:r>
             <a:r>
               <a:rPr lang="en-US" sz="2000" b="1" dirty="0"/>
@@ -6827,34 +6565,11 @@
             </a:r>
             <a:r>
               <a:rPr lang="en-US" sz="2000" dirty="0"/>
-              <a:t> values</a:t>
-            </a:r>
-          </a:p>
-          <a:p>
-            <a:pPr marL="285750"/>
-            <a:r>
-              <a:rPr lang="en-US" sz="2000" dirty="0"/>
-              <a:t>We say that </a:t>
+              <a:t>, like</a:t>
             </a:r>
             <a:r>
               <a:rPr lang="en-US" sz="2000" b="1" dirty="0"/>
-              <a:t>Something</a:t>
-            </a:r>
-            <a:r>
-              <a:rPr lang="en-US" sz="2000" dirty="0"/>
-              <a:t> is a product type of </a:t>
-            </a:r>
-            <a:r>
-              <a:rPr lang="en-US" sz="2000" b="1" dirty="0"/>
-              <a:t>int</a:t>
-            </a:r>
-            <a:r>
-              <a:rPr lang="en-US" sz="2000" dirty="0"/>
-              <a:t> and </a:t>
-            </a:r>
-            <a:r>
-              <a:rPr lang="en-US" sz="2000" b="1" dirty="0"/>
-              <a:t>string </a:t>
+              <a:t> </a:t>
             </a:r>
             <a:r>
               <a:rPr lang="en-US" sz="2000" dirty="0"/>
@@ -6866,14 +6581,7 @@
             </a:r>
             <a:r>
               <a:rPr lang="en-US" sz="2000" dirty="0"/>
-              <a:t>)</a:t>
-            </a:r>
-          </a:p>
-          <a:p>
-            <a:pPr marL="285750"/>
-            <a:r>
-              <a:rPr lang="en-US" sz="2000" dirty="0"/>
-              <a:t>The same is true for </a:t>
+              <a:t>) or </a:t>
             </a:r>
             <a:r>
               <a:rPr lang="en-US" sz="2000" b="1" dirty="0"/>
@@ -6921,7 +6629,7 @@
                             </p:stCondLst>
                             <p:childTnLst>
                               <p:par>
-                                <p:cTn id="5" presetID="42" presetClass="entr" presetSubtype="0" fill="hold" grpId="0" nodeType="clickEffect">
+                                <p:cTn id="5" presetID="1" presetClass="entr" presetSubtype="0" fill="hold" grpId="0" nodeType="clickEffect">
                                   <p:stCondLst>
                                     <p:cond delay="0"/>
                                   </p:stCondLst>
@@ -6948,72 +6656,6 @@
                                         <p:strVal val="visible"/>
                                       </p:to>
                                     </p:set>
-                                    <p:animEffect transition="in" filter="fade">
-                                      <p:cBhvr>
-                                        <p:cTn id="7" dur="1000"/>
-                                        <p:tgtEl>
-                                          <p:spTgt spid="4">
-                                            <p:txEl>
-                                              <p:pRg st="0" end="0"/>
-                                            </p:txEl>
-                                          </p:spTgt>
-                                        </p:tgtEl>
-                                      </p:cBhvr>
-                                    </p:animEffect>
-                                    <p:anim calcmode="lin" valueType="num">
-                                      <p:cBhvr>
-                                        <p:cTn id="8" dur="1000" fill="hold"/>
-                                        <p:tgtEl>
-                                          <p:spTgt spid="4">
-                                            <p:txEl>
-                                              <p:pRg st="0" end="0"/>
-                                            </p:txEl>
-                                          </p:spTgt>
-                                        </p:tgtEl>
-                                        <p:attrNameLst>
-                                          <p:attrName>ppt_x</p:attrName>
-                                        </p:attrNameLst>
-                                      </p:cBhvr>
-                                      <p:tavLst>
-                                        <p:tav tm="0">
-                                          <p:val>
-                                            <p:strVal val="#ppt_x"/>
-                                          </p:val>
-                                        </p:tav>
-                                        <p:tav tm="100000">
-                                          <p:val>
-                                            <p:strVal val="#ppt_x"/>
-                                          </p:val>
-                                        </p:tav>
-                                      </p:tavLst>
-                                    </p:anim>
-                                    <p:anim calcmode="lin" valueType="num">
-                                      <p:cBhvr>
-                                        <p:cTn id="9" dur="1000" fill="hold"/>
-                                        <p:tgtEl>
-                                          <p:spTgt spid="4">
-                                            <p:txEl>
-                                              <p:pRg st="0" end="0"/>
-                                            </p:txEl>
-                                          </p:spTgt>
-                                        </p:tgtEl>
-                                        <p:attrNameLst>
-                                          <p:attrName>ppt_y</p:attrName>
-                                        </p:attrNameLst>
-                                      </p:cBhvr>
-                                      <p:tavLst>
-                                        <p:tav tm="0">
-                                          <p:val>
-                                            <p:strVal val="#ppt_y+.1"/>
-                                          </p:val>
-                                        </p:tav>
-                                        <p:tav tm="100000">
-                                          <p:val>
-                                            <p:strVal val="#ppt_y"/>
-                                          </p:val>
-                                        </p:tav>
-                                      </p:tavLst>
-                                    </p:anim>
                                   </p:childTnLst>
                                 </p:cTn>
                               </p:par>
@@ -7024,26 +6666,26 @@
                     </p:cTn>
                   </p:par>
                   <p:par>
-                    <p:cTn id="10" fill="hold">
+                    <p:cTn id="7" fill="hold">
                       <p:stCondLst>
                         <p:cond delay="indefinite"/>
                       </p:stCondLst>
                       <p:childTnLst>
                         <p:par>
-                          <p:cTn id="11" fill="hold">
+                          <p:cTn id="8" fill="hold">
                             <p:stCondLst>
                               <p:cond delay="0"/>
                             </p:stCondLst>
                             <p:childTnLst>
                               <p:par>
-                                <p:cTn id="12" presetID="42" presetClass="entr" presetSubtype="0" fill="hold" grpId="0" nodeType="clickEffect">
+                                <p:cTn id="9" presetID="1" presetClass="entr" presetSubtype="0" fill="hold" grpId="0" nodeType="clickEffect">
                                   <p:stCondLst>
                                     <p:cond delay="0"/>
                                   </p:stCondLst>
                                   <p:childTnLst>
                                     <p:set>
                                       <p:cBhvr>
-                                        <p:cTn id="13" dur="1" fill="hold">
+                                        <p:cTn id="10" dur="1" fill="hold">
                                           <p:stCondLst>
                                             <p:cond delay="0"/>
                                           </p:stCondLst>
@@ -7063,417 +6705,6 @@
                                         <p:strVal val="visible"/>
                                       </p:to>
                                     </p:set>
-                                    <p:animEffect transition="in" filter="fade">
-                                      <p:cBhvr>
-                                        <p:cTn id="14" dur="1000"/>
-                                        <p:tgtEl>
-                                          <p:spTgt spid="4">
-                                            <p:txEl>
-                                              <p:pRg st="1" end="1"/>
-                                            </p:txEl>
-                                          </p:spTgt>
-                                        </p:tgtEl>
-                                      </p:cBhvr>
-                                    </p:animEffect>
-                                    <p:anim calcmode="lin" valueType="num">
-                                      <p:cBhvr>
-                                        <p:cTn id="15" dur="1000" fill="hold"/>
-                                        <p:tgtEl>
-                                          <p:spTgt spid="4">
-                                            <p:txEl>
-                                              <p:pRg st="1" end="1"/>
-                                            </p:txEl>
-                                          </p:spTgt>
-                                        </p:tgtEl>
-                                        <p:attrNameLst>
-                                          <p:attrName>ppt_x</p:attrName>
-                                        </p:attrNameLst>
-                                      </p:cBhvr>
-                                      <p:tavLst>
-                                        <p:tav tm="0">
-                                          <p:val>
-                                            <p:strVal val="#ppt_x"/>
-                                          </p:val>
-                                        </p:tav>
-                                        <p:tav tm="100000">
-                                          <p:val>
-                                            <p:strVal val="#ppt_x"/>
-                                          </p:val>
-                                        </p:tav>
-                                      </p:tavLst>
-                                    </p:anim>
-                                    <p:anim calcmode="lin" valueType="num">
-                                      <p:cBhvr>
-                                        <p:cTn id="16" dur="1000" fill="hold"/>
-                                        <p:tgtEl>
-                                          <p:spTgt spid="4">
-                                            <p:txEl>
-                                              <p:pRg st="1" end="1"/>
-                                            </p:txEl>
-                                          </p:spTgt>
-                                        </p:tgtEl>
-                                        <p:attrNameLst>
-                                          <p:attrName>ppt_y</p:attrName>
-                                        </p:attrNameLst>
-                                      </p:cBhvr>
-                                      <p:tavLst>
-                                        <p:tav tm="0">
-                                          <p:val>
-                                            <p:strVal val="#ppt_y+.1"/>
-                                          </p:val>
-                                        </p:tav>
-                                        <p:tav tm="100000">
-                                          <p:val>
-                                            <p:strVal val="#ppt_y"/>
-                                          </p:val>
-                                        </p:tav>
-                                      </p:tavLst>
-                                    </p:anim>
-                                  </p:childTnLst>
-                                </p:cTn>
-                              </p:par>
-                            </p:childTnLst>
-                          </p:cTn>
-                        </p:par>
-                      </p:childTnLst>
-                    </p:cTn>
-                  </p:par>
-                  <p:par>
-                    <p:cTn id="17" fill="hold">
-                      <p:stCondLst>
-                        <p:cond delay="indefinite"/>
-                      </p:stCondLst>
-                      <p:childTnLst>
-                        <p:par>
-                          <p:cTn id="18" fill="hold">
-                            <p:stCondLst>
-                              <p:cond delay="0"/>
-                            </p:stCondLst>
-                            <p:childTnLst>
-                              <p:par>
-                                <p:cTn id="19" presetID="42" presetClass="entr" presetSubtype="0" fill="hold" grpId="0" nodeType="clickEffect">
-                                  <p:stCondLst>
-                                    <p:cond delay="0"/>
-                                  </p:stCondLst>
-                                  <p:childTnLst>
-                                    <p:set>
-                                      <p:cBhvr>
-                                        <p:cTn id="20" dur="1" fill="hold">
-                                          <p:stCondLst>
-                                            <p:cond delay="0"/>
-                                          </p:stCondLst>
-                                        </p:cTn>
-                                        <p:tgtEl>
-                                          <p:spTgt spid="4">
-                                            <p:txEl>
-                                              <p:pRg st="2" end="2"/>
-                                            </p:txEl>
-                                          </p:spTgt>
-                                        </p:tgtEl>
-                                        <p:attrNameLst>
-                                          <p:attrName>style.visibility</p:attrName>
-                                        </p:attrNameLst>
-                                      </p:cBhvr>
-                                      <p:to>
-                                        <p:strVal val="visible"/>
-                                      </p:to>
-                                    </p:set>
-                                    <p:animEffect transition="in" filter="fade">
-                                      <p:cBhvr>
-                                        <p:cTn id="21" dur="1000"/>
-                                        <p:tgtEl>
-                                          <p:spTgt spid="4">
-                                            <p:txEl>
-                                              <p:pRg st="2" end="2"/>
-                                            </p:txEl>
-                                          </p:spTgt>
-                                        </p:tgtEl>
-                                      </p:cBhvr>
-                                    </p:animEffect>
-                                    <p:anim calcmode="lin" valueType="num">
-                                      <p:cBhvr>
-                                        <p:cTn id="22" dur="1000" fill="hold"/>
-                                        <p:tgtEl>
-                                          <p:spTgt spid="4">
-                                            <p:txEl>
-                                              <p:pRg st="2" end="2"/>
-                                            </p:txEl>
-                                          </p:spTgt>
-                                        </p:tgtEl>
-                                        <p:attrNameLst>
-                                          <p:attrName>ppt_x</p:attrName>
-                                        </p:attrNameLst>
-                                      </p:cBhvr>
-                                      <p:tavLst>
-                                        <p:tav tm="0">
-                                          <p:val>
-                                            <p:strVal val="#ppt_x"/>
-                                          </p:val>
-                                        </p:tav>
-                                        <p:tav tm="100000">
-                                          <p:val>
-                                            <p:strVal val="#ppt_x"/>
-                                          </p:val>
-                                        </p:tav>
-                                      </p:tavLst>
-                                    </p:anim>
-                                    <p:anim calcmode="lin" valueType="num">
-                                      <p:cBhvr>
-                                        <p:cTn id="23" dur="1000" fill="hold"/>
-                                        <p:tgtEl>
-                                          <p:spTgt spid="4">
-                                            <p:txEl>
-                                              <p:pRg st="2" end="2"/>
-                                            </p:txEl>
-                                          </p:spTgt>
-                                        </p:tgtEl>
-                                        <p:attrNameLst>
-                                          <p:attrName>ppt_y</p:attrName>
-                                        </p:attrNameLst>
-                                      </p:cBhvr>
-                                      <p:tavLst>
-                                        <p:tav tm="0">
-                                          <p:val>
-                                            <p:strVal val="#ppt_y+.1"/>
-                                          </p:val>
-                                        </p:tav>
-                                        <p:tav tm="100000">
-                                          <p:val>
-                                            <p:strVal val="#ppt_y"/>
-                                          </p:val>
-                                        </p:tav>
-                                      </p:tavLst>
-                                    </p:anim>
-                                  </p:childTnLst>
-                                </p:cTn>
-                              </p:par>
-                            </p:childTnLst>
-                          </p:cTn>
-                        </p:par>
-                      </p:childTnLst>
-                    </p:cTn>
-                  </p:par>
-                  <p:par>
-                    <p:cTn id="24" fill="hold">
-                      <p:stCondLst>
-                        <p:cond delay="indefinite"/>
-                      </p:stCondLst>
-                      <p:childTnLst>
-                        <p:par>
-                          <p:cTn id="25" fill="hold">
-                            <p:stCondLst>
-                              <p:cond delay="0"/>
-                            </p:stCondLst>
-                            <p:childTnLst>
-                              <p:par>
-                                <p:cTn id="26" presetID="42" presetClass="entr" presetSubtype="0" fill="hold" grpId="0" nodeType="clickEffect">
-                                  <p:stCondLst>
-                                    <p:cond delay="0"/>
-                                  </p:stCondLst>
-                                  <p:childTnLst>
-                                    <p:set>
-                                      <p:cBhvr>
-                                        <p:cTn id="27" dur="1" fill="hold">
-                                          <p:stCondLst>
-                                            <p:cond delay="0"/>
-                                          </p:stCondLst>
-                                        </p:cTn>
-                                        <p:tgtEl>
-                                          <p:spTgt spid="4">
-                                            <p:txEl>
-                                              <p:pRg st="3" end="3"/>
-                                            </p:txEl>
-                                          </p:spTgt>
-                                        </p:tgtEl>
-                                        <p:attrNameLst>
-                                          <p:attrName>style.visibility</p:attrName>
-                                        </p:attrNameLst>
-                                      </p:cBhvr>
-                                      <p:to>
-                                        <p:strVal val="visible"/>
-                                      </p:to>
-                                    </p:set>
-                                    <p:animEffect transition="in" filter="fade">
-                                      <p:cBhvr>
-                                        <p:cTn id="28" dur="1000"/>
-                                        <p:tgtEl>
-                                          <p:spTgt spid="4">
-                                            <p:txEl>
-                                              <p:pRg st="3" end="3"/>
-                                            </p:txEl>
-                                          </p:spTgt>
-                                        </p:tgtEl>
-                                      </p:cBhvr>
-                                    </p:animEffect>
-                                    <p:anim calcmode="lin" valueType="num">
-                                      <p:cBhvr>
-                                        <p:cTn id="29" dur="1000" fill="hold"/>
-                                        <p:tgtEl>
-                                          <p:spTgt spid="4">
-                                            <p:txEl>
-                                              <p:pRg st="3" end="3"/>
-                                            </p:txEl>
-                                          </p:spTgt>
-                                        </p:tgtEl>
-                                        <p:attrNameLst>
-                                          <p:attrName>ppt_x</p:attrName>
-                                        </p:attrNameLst>
-                                      </p:cBhvr>
-                                      <p:tavLst>
-                                        <p:tav tm="0">
-                                          <p:val>
-                                            <p:strVal val="#ppt_x"/>
-                                          </p:val>
-                                        </p:tav>
-                                        <p:tav tm="100000">
-                                          <p:val>
-                                            <p:strVal val="#ppt_x"/>
-                                          </p:val>
-                                        </p:tav>
-                                      </p:tavLst>
-                                    </p:anim>
-                                    <p:anim calcmode="lin" valueType="num">
-                                      <p:cBhvr>
-                                        <p:cTn id="30" dur="1000" fill="hold"/>
-                                        <p:tgtEl>
-                                          <p:spTgt spid="4">
-                                            <p:txEl>
-                                              <p:pRg st="3" end="3"/>
-                                            </p:txEl>
-                                          </p:spTgt>
-                                        </p:tgtEl>
-                                        <p:attrNameLst>
-                                          <p:attrName>ppt_y</p:attrName>
-                                        </p:attrNameLst>
-                                      </p:cBhvr>
-                                      <p:tavLst>
-                                        <p:tav tm="0">
-                                          <p:val>
-                                            <p:strVal val="#ppt_y+.1"/>
-                                          </p:val>
-                                        </p:tav>
-                                        <p:tav tm="100000">
-                                          <p:val>
-                                            <p:strVal val="#ppt_y"/>
-                                          </p:val>
-                                        </p:tav>
-                                      </p:tavLst>
-                                    </p:anim>
-                                  </p:childTnLst>
-                                </p:cTn>
-                              </p:par>
-                            </p:childTnLst>
-                          </p:cTn>
-                        </p:par>
-                      </p:childTnLst>
-                    </p:cTn>
-                  </p:par>
-                  <p:par>
-                    <p:cTn id="31" fill="hold">
-                      <p:stCondLst>
-                        <p:cond delay="indefinite"/>
-                      </p:stCondLst>
-                      <p:childTnLst>
-                        <p:par>
-                          <p:cTn id="32" fill="hold">
-                            <p:stCondLst>
-                              <p:cond delay="0"/>
-                            </p:stCondLst>
-                            <p:childTnLst>
-                              <p:par>
-                                <p:cTn id="33" presetID="42" presetClass="entr" presetSubtype="0" fill="hold" grpId="0" nodeType="clickEffect">
-                                  <p:stCondLst>
-                                    <p:cond delay="0"/>
-                                  </p:stCondLst>
-                                  <p:childTnLst>
-                                    <p:set>
-                                      <p:cBhvr>
-                                        <p:cTn id="34" dur="1" fill="hold">
-                                          <p:stCondLst>
-                                            <p:cond delay="0"/>
-                                          </p:stCondLst>
-                                        </p:cTn>
-                                        <p:tgtEl>
-                                          <p:spTgt spid="4">
-                                            <p:txEl>
-                                              <p:pRg st="4" end="4"/>
-                                            </p:txEl>
-                                          </p:spTgt>
-                                        </p:tgtEl>
-                                        <p:attrNameLst>
-                                          <p:attrName>style.visibility</p:attrName>
-                                        </p:attrNameLst>
-                                      </p:cBhvr>
-                                      <p:to>
-                                        <p:strVal val="visible"/>
-                                      </p:to>
-                                    </p:set>
-                                    <p:animEffect transition="in" filter="fade">
-                                      <p:cBhvr>
-                                        <p:cTn id="35" dur="1000"/>
-                                        <p:tgtEl>
-                                          <p:spTgt spid="4">
-                                            <p:txEl>
-                                              <p:pRg st="4" end="4"/>
-                                            </p:txEl>
-                                          </p:spTgt>
-                                        </p:tgtEl>
-                                      </p:cBhvr>
-                                    </p:animEffect>
-                                    <p:anim calcmode="lin" valueType="num">
-                                      <p:cBhvr>
-                                        <p:cTn id="36" dur="1000" fill="hold"/>
-                                        <p:tgtEl>
-                                          <p:spTgt spid="4">
-                                            <p:txEl>
-                                              <p:pRg st="4" end="4"/>
-                                            </p:txEl>
-                                          </p:spTgt>
-                                        </p:tgtEl>
-                                        <p:attrNameLst>
-                                          <p:attrName>ppt_x</p:attrName>
-                                        </p:attrNameLst>
-                                      </p:cBhvr>
-                                      <p:tavLst>
-                                        <p:tav tm="0">
-                                          <p:val>
-                                            <p:strVal val="#ppt_x"/>
-                                          </p:val>
-                                        </p:tav>
-                                        <p:tav tm="100000">
-                                          <p:val>
-                                            <p:strVal val="#ppt_x"/>
-                                          </p:val>
-                                        </p:tav>
-                                      </p:tavLst>
-                                    </p:anim>
-                                    <p:anim calcmode="lin" valueType="num">
-                                      <p:cBhvr>
-                                        <p:cTn id="37" dur="1000" fill="hold"/>
-                                        <p:tgtEl>
-                                          <p:spTgt spid="4">
-                                            <p:txEl>
-                                              <p:pRg st="4" end="4"/>
-                                            </p:txEl>
-                                          </p:spTgt>
-                                        </p:tgtEl>
-                                        <p:attrNameLst>
-                                          <p:attrName>ppt_y</p:attrName>
-                                        </p:attrNameLst>
-                                      </p:cBhvr>
-                                      <p:tavLst>
-                                        <p:tav tm="0">
-                                          <p:val>
-                                            <p:strVal val="#ppt_y+.1"/>
-                                          </p:val>
-                                        </p:tav>
-                                        <p:tav tm="100000">
-                                          <p:val>
-                                            <p:strVal val="#ppt_y"/>
-                                          </p:val>
-                                        </p:tav>
-                                      </p:tavLst>
-                                    </p:anim>
                                   </p:childTnLst>
                                 </p:cTn>
                               </p:par>
@@ -8214,81 +7445,312 @@
         </p:blipFill>
         <p:spPr>
           <a:xfrm>
-            <a:off x="4544217" y="279990"/>
-            <a:ext cx="5627305" cy="4706789"/>
+            <a:off x="4544217" y="809182"/>
+            <a:ext cx="6438010" cy="5384879"/>
           </a:xfrm>
           <a:prstGeom prst="rect">
             <a:avLst/>
           </a:prstGeom>
         </p:spPr>
       </p:pic>
-      <p:sp>
-        <p:nvSpPr>
-          <p:cNvPr id="3" name="Content Placeholder 2">
-            <a:extLst>
-              <a:ext uri="{FF2B5EF4-FFF2-40B4-BE49-F238E27FC236}">
-                <a16:creationId xmlns:a16="http://schemas.microsoft.com/office/drawing/2014/main" id="{C14C573E-3A8E-7846-AF8B-48742ACDBCB8}"/>
-              </a:ext>
-            </a:extLst>
-          </p:cNvPr>
-          <p:cNvSpPr>
-            <a:spLocks noGrp="1"/>
-          </p:cNvSpPr>
-          <p:nvPr>
-            <p:ph sz="half" idx="1"/>
-          </p:nvPr>
-        </p:nvSpPr>
-        <p:spPr>
-          <a:xfrm>
-            <a:off x="4544217" y="5285920"/>
-            <a:ext cx="7188199" cy="1292090"/>
-          </a:xfrm>
-        </p:spPr>
-        <p:txBody>
-          <a:bodyPr vert="horz" lIns="91440" tIns="45720" rIns="91440" bIns="45720" rtlCol="0">
-            <a:normAutofit/>
-          </a:bodyPr>
-          <a:lstStyle/>
-          <a:p>
-            <a:r>
-              <a:rPr lang="en-US" sz="2000" dirty="0"/>
-              <a:t>In short, a sum type is a type with multiple representations</a:t>
-            </a:r>
-          </a:p>
-          <a:p>
-            <a:r>
-              <a:rPr lang="en-US" sz="2000" dirty="0"/>
-              <a:t>They are called </a:t>
-            </a:r>
-            <a:r>
-              <a:rPr lang="en-US" sz="2000" b="1" dirty="0"/>
-              <a:t>Discriminated Union</a:t>
-            </a:r>
-            <a:r>
-              <a:rPr lang="en-US" sz="2000" dirty="0"/>
-              <a:t> in </a:t>
-            </a:r>
-            <a:r>
-              <a:rPr lang="en-US" sz="2000" b="1" dirty="0"/>
-              <a:t>F#</a:t>
-            </a:r>
-          </a:p>
-          <a:p>
-            <a:r>
-              <a:rPr lang="en-US" sz="2000" dirty="0"/>
-              <a:t>Not a new concept, you’ll find them in TypeScript, Rust, Kotlin…</a:t>
-            </a:r>
-          </a:p>
-          <a:p>
-            <a:pPr marL="0"/>
-            <a:endParaRPr lang="en-US" sz="1800" dirty="0"/>
-          </a:p>
-        </p:txBody>
-      </p:sp>
     </p:spTree>
     <p:extLst>
       <p:ext uri="{BB962C8B-B14F-4D97-AF65-F5344CB8AC3E}">
         <p14:creationId xmlns:p14="http://schemas.microsoft.com/office/powerpoint/2010/main" val="3880520586"/>
+      </p:ext>
+    </p:extLst>
+  </p:cSld>
+  <p:clrMapOvr>
+    <a:masterClrMapping/>
+  </p:clrMapOvr>
+</p:sld>
+</file>
+
+<file path=ppt/slides/slide18.xml><?xml version="1.0" encoding="utf-8"?>
+<p:sld xmlns:a="http://schemas.openxmlformats.org/drawingml/2006/main" xmlns:r="http://schemas.openxmlformats.org/officeDocument/2006/relationships" xmlns:p="http://schemas.openxmlformats.org/presentationml/2006/main">
+  <p:cSld>
+    <p:bg>
+      <p:bgPr>
+        <a:solidFill>
+          <a:schemeClr val="bg1"/>
+        </a:solidFill>
+        <a:effectLst/>
+      </p:bgPr>
+    </p:bg>
+    <p:spTree>
+      <p:nvGrpSpPr>
+        <p:cNvPr id="1" name=""/>
+        <p:cNvGrpSpPr/>
+        <p:nvPr/>
+      </p:nvGrpSpPr>
+      <p:grpSpPr>
+        <a:xfrm>
+          <a:off x="0" y="0"/>
+          <a:ext cx="0" cy="0"/>
+          <a:chOff x="0" y="0"/>
+          <a:chExt cx="0" cy="0"/>
+        </a:xfrm>
+      </p:grpSpPr>
+      <p:sp>
+        <p:nvSpPr>
+          <p:cNvPr id="12" name="Rectangle 11">
+            <a:extLst>
+              <a:ext uri="{FF2B5EF4-FFF2-40B4-BE49-F238E27FC236}">
+                <a16:creationId xmlns:a16="http://schemas.microsoft.com/office/drawing/2014/main" id="{F98ED85F-DCEE-4B50-802E-71A6E3E12B04}"/>
+              </a:ext>
+              <a:ext uri="{C183D7F6-B498-43B3-948B-1728B52AA6E4}">
+                <adec:decorative xmlns:adec="http://schemas.microsoft.com/office/drawing/2017/decorative" val="1"/>
+              </a:ext>
+            </a:extLst>
+          </p:cNvPr>
+          <p:cNvSpPr>
+            <a:spLocks noGrp="1" noRot="1" noChangeAspect="1" noMove="1" noResize="1" noEditPoints="1" noAdjustHandles="1" noChangeArrowheads="1" noChangeShapeType="1" noTextEdit="1"/>
+          </p:cNvSpPr>
+          <p:nvPr>
+            <p:extLst>
+              <p:ext uri="{386F3935-93C4-4BCD-93E2-E3B085C9AB24}">
+                <p16:designElem xmlns:p16="http://schemas.microsoft.com/office/powerpoint/2015/main" val="1"/>
+              </p:ext>
+            </p:extLst>
+          </p:nvPr>
+        </p:nvSpPr>
+        <p:spPr bwMode="ltGray">
+          <a:xfrm>
+            <a:off x="321564" y="320040"/>
+            <a:ext cx="11548872" cy="6217920"/>
+          </a:xfrm>
+          <a:prstGeom prst="rect">
+            <a:avLst/>
+          </a:prstGeom>
+          <a:solidFill>
+            <a:schemeClr val="tx1">
+              <a:lumMod val="75000"/>
+              <a:lumOff val="25000"/>
+            </a:schemeClr>
+          </a:solidFill>
+          <a:ln w="127000" cap="sq" cmpd="thinThick">
+            <a:solidFill>
+              <a:schemeClr val="tx1">
+                <a:lumMod val="75000"/>
+                <a:lumOff val="25000"/>
+              </a:schemeClr>
+            </a:solidFill>
+          </a:ln>
+        </p:spPr>
+        <p:style>
+          <a:lnRef idx="2">
+            <a:schemeClr val="accent1">
+              <a:shade val="50000"/>
+            </a:schemeClr>
+          </a:lnRef>
+          <a:fillRef idx="1">
+            <a:schemeClr val="accent1"/>
+          </a:fillRef>
+          <a:effectRef idx="0">
+            <a:schemeClr val="accent1"/>
+          </a:effectRef>
+          <a:fontRef idx="minor">
+            <a:schemeClr val="lt1"/>
+          </a:fontRef>
+        </p:style>
+        <p:txBody>
+          <a:bodyPr rtlCol="0" anchor="ctr"/>
+          <a:lstStyle/>
+          <a:p>
+            <a:pPr algn="ctr"/>
+            <a:endParaRPr lang="en-US"/>
+          </a:p>
+        </p:txBody>
+      </p:sp>
+      <p:sp>
+        <p:nvSpPr>
+          <p:cNvPr id="2" name="Title 1">
+            <a:extLst>
+              <a:ext uri="{FF2B5EF4-FFF2-40B4-BE49-F238E27FC236}">
+                <a16:creationId xmlns:a16="http://schemas.microsoft.com/office/drawing/2014/main" id="{179B0B2E-FC83-9949-A534-87EF6DE79877}"/>
+              </a:ext>
+            </a:extLst>
+          </p:cNvPr>
+          <p:cNvSpPr>
+            <a:spLocks noGrp="1"/>
+          </p:cNvSpPr>
+          <p:nvPr>
+            <p:ph type="title"/>
+          </p:nvPr>
+        </p:nvSpPr>
+        <p:spPr>
+          <a:xfrm>
+            <a:off x="838200" y="631825"/>
+            <a:ext cx="10515600" cy="1325563"/>
+          </a:xfrm>
+        </p:spPr>
+        <p:txBody>
+          <a:bodyPr>
+            <a:normAutofit/>
+          </a:bodyPr>
+          <a:lstStyle/>
+          <a:p>
+            <a:r>
+              <a:rPr lang="en-GB" dirty="0">
+                <a:solidFill>
+                  <a:schemeClr val="bg1"/>
+                </a:solidFill>
+              </a:rPr>
+              <a:t>#2 – Sum type</a:t>
+            </a:r>
+          </a:p>
+        </p:txBody>
+      </p:sp>
+      <p:cxnSp>
+        <p:nvCxnSpPr>
+          <p:cNvPr id="14" name="Straight Connector 13">
+            <a:extLst>
+              <a:ext uri="{FF2B5EF4-FFF2-40B4-BE49-F238E27FC236}">
+                <a16:creationId xmlns:a16="http://schemas.microsoft.com/office/drawing/2014/main" id="{E8E35B83-1EC3-4F87-9D54-D863463351B9}"/>
+              </a:ext>
+              <a:ext uri="{C183D7F6-B498-43B3-948B-1728B52AA6E4}">
+                <adec:decorative xmlns:adec="http://schemas.microsoft.com/office/drawing/2017/decorative" val="1"/>
+              </a:ext>
+            </a:extLst>
+          </p:cNvPr>
+          <p:cNvCxnSpPr>
+            <a:cxnSpLocks noGrp="1" noRot="1" noChangeAspect="1" noMove="1" noResize="1" noEditPoints="1" noAdjustHandles="1" noChangeArrowheads="1" noChangeShapeType="1"/>
+          </p:cNvCxnSpPr>
+          <p:nvPr>
+            <p:extLst>
+              <p:ext uri="{386F3935-93C4-4BCD-93E2-E3B085C9AB24}">
+                <p16:designElem xmlns:p16="http://schemas.microsoft.com/office/powerpoint/2015/main" val="1"/>
+              </p:ext>
+            </p:extLst>
+          </p:nvPr>
+        </p:nvCxnSpPr>
+        <p:spPr>
+          <a:xfrm>
+            <a:off x="897636" y="1957388"/>
+            <a:ext cx="10396728" cy="0"/>
+          </a:xfrm>
+          <a:prstGeom prst="line">
+            <a:avLst/>
+          </a:prstGeom>
+          <a:ln w="22225">
+            <a:solidFill>
+              <a:schemeClr val="bg1"/>
+            </a:solidFill>
+          </a:ln>
+        </p:spPr>
+        <p:style>
+          <a:lnRef idx="1">
+            <a:schemeClr val="accent1"/>
+          </a:lnRef>
+          <a:fillRef idx="0">
+            <a:schemeClr val="accent1"/>
+          </a:fillRef>
+          <a:effectRef idx="0">
+            <a:schemeClr val="accent1"/>
+          </a:effectRef>
+          <a:fontRef idx="minor">
+            <a:schemeClr val="tx1"/>
+          </a:fontRef>
+        </p:style>
+      </p:cxnSp>
+      <p:sp>
+        <p:nvSpPr>
+          <p:cNvPr id="7" name="Text Placeholder 6">
+            <a:extLst>
+              <a:ext uri="{FF2B5EF4-FFF2-40B4-BE49-F238E27FC236}">
+                <a16:creationId xmlns:a16="http://schemas.microsoft.com/office/drawing/2014/main" id="{BFDC00CF-BE0D-A44A-8325-A4ED88A91A95}"/>
+              </a:ext>
+            </a:extLst>
+          </p:cNvPr>
+          <p:cNvSpPr>
+            <a:spLocks noGrp="1"/>
+          </p:cNvSpPr>
+          <p:nvPr>
+            <p:ph idx="1"/>
+          </p:nvPr>
+        </p:nvSpPr>
+        <p:spPr>
+          <a:xfrm>
+            <a:off x="838200" y="2269173"/>
+            <a:ext cx="10515600" cy="3659988"/>
+          </a:xfrm>
+        </p:spPr>
+        <p:txBody>
+          <a:bodyPr>
+            <a:normAutofit/>
+          </a:bodyPr>
+          <a:lstStyle/>
+          <a:p>
+            <a:r>
+              <a:rPr lang="en-US" dirty="0">
+                <a:solidFill>
+                  <a:schemeClr val="bg1"/>
+                </a:solidFill>
+              </a:rPr>
+              <a:t>In short, a sum type is a type with multiple representations</a:t>
+            </a:r>
+          </a:p>
+          <a:p>
+            <a:r>
+              <a:rPr lang="en-US" dirty="0">
+                <a:solidFill>
+                  <a:schemeClr val="bg1"/>
+                </a:solidFill>
+              </a:rPr>
+              <a:t>They are called </a:t>
+            </a:r>
+            <a:r>
+              <a:rPr lang="en-US" b="1" dirty="0">
+                <a:solidFill>
+                  <a:schemeClr val="bg1"/>
+                </a:solidFill>
+              </a:rPr>
+              <a:t>Discriminated Union </a:t>
+            </a:r>
+            <a:r>
+              <a:rPr lang="en-US" dirty="0">
+                <a:solidFill>
+                  <a:schemeClr val="bg1"/>
+                </a:solidFill>
+              </a:rPr>
+              <a:t>in F#</a:t>
+            </a:r>
+          </a:p>
+          <a:p>
+            <a:r>
+              <a:rPr lang="en-US" dirty="0">
+                <a:solidFill>
+                  <a:schemeClr val="bg1"/>
+                </a:solidFill>
+              </a:rPr>
+              <a:t>Not a new concept, you’ll find them in TypeScript, Rust, Kotlin…</a:t>
+            </a:r>
+            <a:endParaRPr lang="en-GB" dirty="0">
+              <a:solidFill>
+                <a:schemeClr val="bg1"/>
+              </a:solidFill>
+            </a:endParaRPr>
+          </a:p>
+          <a:p>
+            <a:endParaRPr lang="en-GB" sz="2400" dirty="0">
+              <a:solidFill>
+                <a:schemeClr val="bg1"/>
+              </a:solidFill>
+            </a:endParaRPr>
+          </a:p>
+          <a:p>
+            <a:endParaRPr lang="en-GB" sz="2400" dirty="0">
+              <a:solidFill>
+                <a:schemeClr val="bg1"/>
+              </a:solidFill>
+            </a:endParaRPr>
+          </a:p>
+        </p:txBody>
+      </p:sp>
+    </p:spTree>
+    <p:extLst>
+      <p:ext uri="{BB962C8B-B14F-4D97-AF65-F5344CB8AC3E}">
+        <p14:creationId xmlns:p14="http://schemas.microsoft.com/office/powerpoint/2010/main" val="1781817358"/>
       </p:ext>
     </p:extLst>
   </p:cSld>
@@ -8316,7 +7778,7 @@
                             </p:stCondLst>
                             <p:childTnLst>
                               <p:par>
-                                <p:cTn id="5" presetID="42" presetClass="entr" presetSubtype="0" fill="hold" grpId="0" nodeType="clickEffect">
+                                <p:cTn id="5" presetID="1" presetClass="entr" presetSubtype="0" fill="hold" grpId="0" nodeType="clickEffect">
                                   <p:stCondLst>
                                     <p:cond delay="0"/>
                                   </p:stCondLst>
@@ -8329,7 +7791,7 @@
                                           </p:stCondLst>
                                         </p:cTn>
                                         <p:tgtEl>
-                                          <p:spTgt spid="3">
+                                          <p:spTgt spid="7">
                                             <p:txEl>
                                               <p:pRg st="0" end="0"/>
                                             </p:txEl>
@@ -8343,72 +7805,6 @@
                                         <p:strVal val="visible"/>
                                       </p:to>
                                     </p:set>
-                                    <p:animEffect transition="in" filter="fade">
-                                      <p:cBhvr>
-                                        <p:cTn id="7" dur="1000"/>
-                                        <p:tgtEl>
-                                          <p:spTgt spid="3">
-                                            <p:txEl>
-                                              <p:pRg st="0" end="0"/>
-                                            </p:txEl>
-                                          </p:spTgt>
-                                        </p:tgtEl>
-                                      </p:cBhvr>
-                                    </p:animEffect>
-                                    <p:anim calcmode="lin" valueType="num">
-                                      <p:cBhvr>
-                                        <p:cTn id="8" dur="1000" fill="hold"/>
-                                        <p:tgtEl>
-                                          <p:spTgt spid="3">
-                                            <p:txEl>
-                                              <p:pRg st="0" end="0"/>
-                                            </p:txEl>
-                                          </p:spTgt>
-                                        </p:tgtEl>
-                                        <p:attrNameLst>
-                                          <p:attrName>ppt_x</p:attrName>
-                                        </p:attrNameLst>
-                                      </p:cBhvr>
-                                      <p:tavLst>
-                                        <p:tav tm="0">
-                                          <p:val>
-                                            <p:strVal val="#ppt_x"/>
-                                          </p:val>
-                                        </p:tav>
-                                        <p:tav tm="100000">
-                                          <p:val>
-                                            <p:strVal val="#ppt_x"/>
-                                          </p:val>
-                                        </p:tav>
-                                      </p:tavLst>
-                                    </p:anim>
-                                    <p:anim calcmode="lin" valueType="num">
-                                      <p:cBhvr>
-                                        <p:cTn id="9" dur="1000" fill="hold"/>
-                                        <p:tgtEl>
-                                          <p:spTgt spid="3">
-                                            <p:txEl>
-                                              <p:pRg st="0" end="0"/>
-                                            </p:txEl>
-                                          </p:spTgt>
-                                        </p:tgtEl>
-                                        <p:attrNameLst>
-                                          <p:attrName>ppt_y</p:attrName>
-                                        </p:attrNameLst>
-                                      </p:cBhvr>
-                                      <p:tavLst>
-                                        <p:tav tm="0">
-                                          <p:val>
-                                            <p:strVal val="#ppt_y+.1"/>
-                                          </p:val>
-                                        </p:tav>
-                                        <p:tav tm="100000">
-                                          <p:val>
-                                            <p:strVal val="#ppt_y"/>
-                                          </p:val>
-                                        </p:tav>
-                                      </p:tavLst>
-                                    </p:anim>
                                   </p:childTnLst>
                                 </p:cTn>
                               </p:par>
@@ -8419,32 +7815,32 @@
                     </p:cTn>
                   </p:par>
                   <p:par>
-                    <p:cTn id="10" fill="hold">
+                    <p:cTn id="7" fill="hold">
                       <p:stCondLst>
                         <p:cond delay="indefinite"/>
                       </p:stCondLst>
                       <p:childTnLst>
                         <p:par>
-                          <p:cTn id="11" fill="hold">
+                          <p:cTn id="8" fill="hold">
                             <p:stCondLst>
                               <p:cond delay="0"/>
                             </p:stCondLst>
                             <p:childTnLst>
                               <p:par>
-                                <p:cTn id="12" presetID="42" presetClass="entr" presetSubtype="0" fill="hold" grpId="0" nodeType="clickEffect">
+                                <p:cTn id="9" presetID="1" presetClass="entr" presetSubtype="0" fill="hold" grpId="0" nodeType="clickEffect">
                                   <p:stCondLst>
                                     <p:cond delay="0"/>
                                   </p:stCondLst>
                                   <p:childTnLst>
                                     <p:set>
                                       <p:cBhvr>
-                                        <p:cTn id="13" dur="1" fill="hold">
+                                        <p:cTn id="10" dur="1" fill="hold">
                                           <p:stCondLst>
                                             <p:cond delay="0"/>
                                           </p:stCondLst>
                                         </p:cTn>
                                         <p:tgtEl>
-                                          <p:spTgt spid="3">
+                                          <p:spTgt spid="7">
                                             <p:txEl>
                                               <p:pRg st="1" end="1"/>
                                             </p:txEl>
@@ -8458,72 +7854,6 @@
                                         <p:strVal val="visible"/>
                                       </p:to>
                                     </p:set>
-                                    <p:animEffect transition="in" filter="fade">
-                                      <p:cBhvr>
-                                        <p:cTn id="14" dur="1000"/>
-                                        <p:tgtEl>
-                                          <p:spTgt spid="3">
-                                            <p:txEl>
-                                              <p:pRg st="1" end="1"/>
-                                            </p:txEl>
-                                          </p:spTgt>
-                                        </p:tgtEl>
-                                      </p:cBhvr>
-                                    </p:animEffect>
-                                    <p:anim calcmode="lin" valueType="num">
-                                      <p:cBhvr>
-                                        <p:cTn id="15" dur="1000" fill="hold"/>
-                                        <p:tgtEl>
-                                          <p:spTgt spid="3">
-                                            <p:txEl>
-                                              <p:pRg st="1" end="1"/>
-                                            </p:txEl>
-                                          </p:spTgt>
-                                        </p:tgtEl>
-                                        <p:attrNameLst>
-                                          <p:attrName>ppt_x</p:attrName>
-                                        </p:attrNameLst>
-                                      </p:cBhvr>
-                                      <p:tavLst>
-                                        <p:tav tm="0">
-                                          <p:val>
-                                            <p:strVal val="#ppt_x"/>
-                                          </p:val>
-                                        </p:tav>
-                                        <p:tav tm="100000">
-                                          <p:val>
-                                            <p:strVal val="#ppt_x"/>
-                                          </p:val>
-                                        </p:tav>
-                                      </p:tavLst>
-                                    </p:anim>
-                                    <p:anim calcmode="lin" valueType="num">
-                                      <p:cBhvr>
-                                        <p:cTn id="16" dur="1000" fill="hold"/>
-                                        <p:tgtEl>
-                                          <p:spTgt spid="3">
-                                            <p:txEl>
-                                              <p:pRg st="1" end="1"/>
-                                            </p:txEl>
-                                          </p:spTgt>
-                                        </p:tgtEl>
-                                        <p:attrNameLst>
-                                          <p:attrName>ppt_y</p:attrName>
-                                        </p:attrNameLst>
-                                      </p:cBhvr>
-                                      <p:tavLst>
-                                        <p:tav tm="0">
-                                          <p:val>
-                                            <p:strVal val="#ppt_y+.1"/>
-                                          </p:val>
-                                        </p:tav>
-                                        <p:tav tm="100000">
-                                          <p:val>
-                                            <p:strVal val="#ppt_y"/>
-                                          </p:val>
-                                        </p:tav>
-                                      </p:tavLst>
-                                    </p:anim>
                                   </p:childTnLst>
                                 </p:cTn>
                               </p:par>
@@ -8534,32 +7864,32 @@
                     </p:cTn>
                   </p:par>
                   <p:par>
-                    <p:cTn id="17" fill="hold">
+                    <p:cTn id="11" fill="hold">
                       <p:stCondLst>
                         <p:cond delay="indefinite"/>
                       </p:stCondLst>
                       <p:childTnLst>
                         <p:par>
-                          <p:cTn id="18" fill="hold">
+                          <p:cTn id="12" fill="hold">
                             <p:stCondLst>
                               <p:cond delay="0"/>
                             </p:stCondLst>
                             <p:childTnLst>
                               <p:par>
-                                <p:cTn id="19" presetID="42" presetClass="entr" presetSubtype="0" fill="hold" grpId="0" nodeType="clickEffect">
+                                <p:cTn id="13" presetID="1" presetClass="entr" presetSubtype="0" fill="hold" grpId="0" nodeType="clickEffect">
                                   <p:stCondLst>
                                     <p:cond delay="0"/>
                                   </p:stCondLst>
                                   <p:childTnLst>
                                     <p:set>
                                       <p:cBhvr>
-                                        <p:cTn id="20" dur="1" fill="hold">
+                                        <p:cTn id="14" dur="1" fill="hold">
                                           <p:stCondLst>
                                             <p:cond delay="0"/>
                                           </p:stCondLst>
                                         </p:cTn>
                                         <p:tgtEl>
-                                          <p:spTgt spid="3">
+                                          <p:spTgt spid="7">
                                             <p:txEl>
                                               <p:pRg st="2" end="2"/>
                                             </p:txEl>
@@ -8573,72 +7903,6 @@
                                         <p:strVal val="visible"/>
                                       </p:to>
                                     </p:set>
-                                    <p:animEffect transition="in" filter="fade">
-                                      <p:cBhvr>
-                                        <p:cTn id="21" dur="1000"/>
-                                        <p:tgtEl>
-                                          <p:spTgt spid="3">
-                                            <p:txEl>
-                                              <p:pRg st="2" end="2"/>
-                                            </p:txEl>
-                                          </p:spTgt>
-                                        </p:tgtEl>
-                                      </p:cBhvr>
-                                    </p:animEffect>
-                                    <p:anim calcmode="lin" valueType="num">
-                                      <p:cBhvr>
-                                        <p:cTn id="22" dur="1000" fill="hold"/>
-                                        <p:tgtEl>
-                                          <p:spTgt spid="3">
-                                            <p:txEl>
-                                              <p:pRg st="2" end="2"/>
-                                            </p:txEl>
-                                          </p:spTgt>
-                                        </p:tgtEl>
-                                        <p:attrNameLst>
-                                          <p:attrName>ppt_x</p:attrName>
-                                        </p:attrNameLst>
-                                      </p:cBhvr>
-                                      <p:tavLst>
-                                        <p:tav tm="0">
-                                          <p:val>
-                                            <p:strVal val="#ppt_x"/>
-                                          </p:val>
-                                        </p:tav>
-                                        <p:tav tm="100000">
-                                          <p:val>
-                                            <p:strVal val="#ppt_x"/>
-                                          </p:val>
-                                        </p:tav>
-                                      </p:tavLst>
-                                    </p:anim>
-                                    <p:anim calcmode="lin" valueType="num">
-                                      <p:cBhvr>
-                                        <p:cTn id="23" dur="1000" fill="hold"/>
-                                        <p:tgtEl>
-                                          <p:spTgt spid="3">
-                                            <p:txEl>
-                                              <p:pRg st="2" end="2"/>
-                                            </p:txEl>
-                                          </p:spTgt>
-                                        </p:tgtEl>
-                                        <p:attrNameLst>
-                                          <p:attrName>ppt_y</p:attrName>
-                                        </p:attrNameLst>
-                                      </p:cBhvr>
-                                      <p:tavLst>
-                                        <p:tav tm="0">
-                                          <p:val>
-                                            <p:strVal val="#ppt_y+.1"/>
-                                          </p:val>
-                                        </p:tav>
-                                        <p:tav tm="100000">
-                                          <p:val>
-                                            <p:strVal val="#ppt_y"/>
-                                          </p:val>
-                                        </p:tav>
-                                      </p:tavLst>
-                                    </p:anim>
                                   </p:childTnLst>
                                 </p:cTn>
                               </p:par>
@@ -8670,13 +7934,13 @@
       </p:par>
     </p:tnLst>
     <p:bldLst>
-      <p:bldP spid="3" grpId="0" build="p"/>
+      <p:bldP spid="7" grpId="0" build="p"/>
     </p:bldLst>
   </p:timing>
 </p:sld>
 </file>
 
-<file path=ppt/slides/slide18.xml><?xml version="1.0" encoding="utf-8"?>
+<file path=ppt/slides/slide19.xml><?xml version="1.0" encoding="utf-8"?>
 <p:sld xmlns:a="http://schemas.openxmlformats.org/drawingml/2006/main" xmlns:r="http://schemas.openxmlformats.org/officeDocument/2006/relationships" xmlns:p="http://schemas.openxmlformats.org/presentationml/2006/main">
   <p:cSld>
     <p:bg>
@@ -8949,406 +8213,6 @@
   </p:cSld>
   <p:clrMapOvr>
     <a:masterClrMapping/>
-  </p:clrMapOvr>
-</p:sld>
-</file>
-
-<file path=ppt/slides/slide19.xml><?xml version="1.0" encoding="utf-8"?>
-<p:sld xmlns:a="http://schemas.openxmlformats.org/drawingml/2006/main" xmlns:r="http://schemas.openxmlformats.org/officeDocument/2006/relationships" xmlns:p="http://schemas.openxmlformats.org/presentationml/2006/main">
-  <p:cSld>
-    <p:bg>
-      <p:bgPr>
-        <a:solidFill>
-          <a:schemeClr val="bg1"/>
-        </a:solidFill>
-        <a:effectLst/>
-      </p:bgPr>
-    </p:bg>
-    <p:spTree>
-      <p:nvGrpSpPr>
-        <p:cNvPr id="1" name=""/>
-        <p:cNvGrpSpPr/>
-        <p:nvPr/>
-      </p:nvGrpSpPr>
-      <p:grpSpPr>
-        <a:xfrm>
-          <a:off x="0" y="0"/>
-          <a:ext cx="0" cy="0"/>
-          <a:chOff x="0" y="0"/>
-          <a:chExt cx="0" cy="0"/>
-        </a:xfrm>
-      </p:grpSpPr>
-      <p:sp>
-        <p:nvSpPr>
-          <p:cNvPr id="12" name="Rectangle 11">
-            <a:extLst>
-              <a:ext uri="{FF2B5EF4-FFF2-40B4-BE49-F238E27FC236}">
-                <a16:creationId xmlns:a16="http://schemas.microsoft.com/office/drawing/2014/main" id="{5FB946D7-1CA4-446E-8795-007CACFDEB88}"/>
-              </a:ext>
-              <a:ext uri="{C183D7F6-B498-43B3-948B-1728B52AA6E4}">
-                <adec:decorative xmlns:adec="http://schemas.microsoft.com/office/drawing/2017/decorative" val="1"/>
-              </a:ext>
-            </a:extLst>
-          </p:cNvPr>
-          <p:cNvSpPr>
-            <a:spLocks noGrp="1" noRot="1" noChangeAspect="1" noMove="1" noResize="1" noEditPoints="1" noAdjustHandles="1" noChangeArrowheads="1" noChangeShapeType="1" noTextEdit="1"/>
-          </p:cNvSpPr>
-          <p:nvPr>
-            <p:extLst>
-              <p:ext uri="{386F3935-93C4-4BCD-93E2-E3B085C9AB24}">
-                <p16:designElem xmlns:p16="http://schemas.microsoft.com/office/powerpoint/2015/main" val="1"/>
-              </p:ext>
-            </p:extLst>
-          </p:nvPr>
-        </p:nvSpPr>
-        <p:spPr>
-          <a:xfrm>
-            <a:off x="0" y="-3324"/>
-            <a:ext cx="12192000" cy="6861324"/>
-          </a:xfrm>
-          <a:prstGeom prst="rect">
-            <a:avLst/>
-          </a:prstGeom>
-          <a:solidFill>
-            <a:schemeClr val="tx1">
-              <a:lumMod val="75000"/>
-              <a:lumOff val="25000"/>
-            </a:schemeClr>
-          </a:solidFill>
-          <a:ln>
-            <a:noFill/>
-          </a:ln>
-        </p:spPr>
-        <p:style>
-          <a:lnRef idx="2">
-            <a:schemeClr val="accent1">
-              <a:shade val="50000"/>
-            </a:schemeClr>
-          </a:lnRef>
-          <a:fillRef idx="1">
-            <a:schemeClr val="accent1"/>
-          </a:fillRef>
-          <a:effectRef idx="0">
-            <a:schemeClr val="accent1"/>
-          </a:effectRef>
-          <a:fontRef idx="minor">
-            <a:schemeClr val="lt1"/>
-          </a:fontRef>
-        </p:style>
-        <p:txBody>
-          <a:bodyPr rtlCol="0" anchor="ctr"/>
-          <a:lstStyle/>
-          <a:p>
-            <a:pPr marL="0" marR="0" lvl="0" indent="0" algn="ctr" defTabSz="914400" rtl="0" eaLnBrk="1" fontAlgn="auto" latinLnBrk="0" hangingPunct="1">
-              <a:lnSpc>
-                <a:spcPct val="100000"/>
-              </a:lnSpc>
-              <a:spcBef>
-                <a:spcPts val="0"/>
-              </a:spcBef>
-              <a:spcAft>
-                <a:spcPts val="0"/>
-              </a:spcAft>
-              <a:buClrTx/>
-              <a:buSzTx/>
-              <a:buFontTx/>
-              <a:buNone/>
-              <a:tabLst/>
-              <a:defRPr/>
-            </a:pPr>
-            <a:endParaRPr kumimoji="0" lang="en-US" sz="1800" b="0" i="0" u="none" strike="noStrike" kern="1200" cap="none" spc="0" normalizeH="0" baseline="0" noProof="0">
-              <a:ln>
-                <a:noFill/>
-              </a:ln>
-              <a:solidFill>
-                <a:prstClr val="white"/>
-              </a:solidFill>
-              <a:effectLst/>
-              <a:uLnTx/>
-              <a:uFillTx/>
-              <a:latin typeface="Calibri" panose="020F0502020204030204"/>
-              <a:ea typeface="+mn-ea"/>
-              <a:cs typeface="+mn-cs"/>
-            </a:endParaRPr>
-          </a:p>
-        </p:txBody>
-      </p:sp>
-      <p:sp>
-        <p:nvSpPr>
-          <p:cNvPr id="14" name="Rectangle 13">
-            <a:extLst>
-              <a:ext uri="{FF2B5EF4-FFF2-40B4-BE49-F238E27FC236}">
-                <a16:creationId xmlns:a16="http://schemas.microsoft.com/office/drawing/2014/main" id="{192416F2-BC84-4D7C-80C6-6296C10C3819}"/>
-              </a:ext>
-              <a:ext uri="{C183D7F6-B498-43B3-948B-1728B52AA6E4}">
-                <adec:decorative xmlns:adec="http://schemas.microsoft.com/office/drawing/2017/decorative" val="1"/>
-              </a:ext>
-            </a:extLst>
-          </p:cNvPr>
-          <p:cNvSpPr>
-            <a:spLocks noGrp="1" noRot="1" noChangeAspect="1" noMove="1" noResize="1" noEditPoints="1" noAdjustHandles="1" noChangeArrowheads="1" noChangeShapeType="1" noTextEdit="1"/>
-          </p:cNvSpPr>
-          <p:nvPr>
-            <p:extLst>
-              <p:ext uri="{386F3935-93C4-4BCD-93E2-E3B085C9AB24}">
-                <p16:designElem xmlns:p16="http://schemas.microsoft.com/office/powerpoint/2015/main" val="1"/>
-              </p:ext>
-            </p:extLst>
-          </p:nvPr>
-        </p:nvSpPr>
-        <p:spPr bwMode="ltGray">
-          <a:xfrm>
-            <a:off x="795338" y="981075"/>
-            <a:ext cx="10601325" cy="4552949"/>
-          </a:xfrm>
-          <a:prstGeom prst="rect">
-            <a:avLst/>
-          </a:prstGeom>
-          <a:solidFill>
-            <a:schemeClr val="bg1"/>
-          </a:solidFill>
-          <a:ln w="127000" cap="sq" cmpd="thinThick">
-            <a:solidFill>
-              <a:schemeClr val="bg1"/>
-            </a:solidFill>
-          </a:ln>
-        </p:spPr>
-        <p:style>
-          <a:lnRef idx="2">
-            <a:schemeClr val="accent1">
-              <a:shade val="50000"/>
-            </a:schemeClr>
-          </a:lnRef>
-          <a:fillRef idx="1">
-            <a:schemeClr val="accent1"/>
-          </a:fillRef>
-          <a:effectRef idx="0">
-            <a:schemeClr val="accent1"/>
-          </a:effectRef>
-          <a:fontRef idx="minor">
-            <a:schemeClr val="lt1"/>
-          </a:fontRef>
-        </p:style>
-        <p:txBody>
-          <a:bodyPr rtlCol="0" anchor="ctr"/>
-          <a:lstStyle/>
-          <a:p>
-            <a:pPr marL="0" marR="0" lvl="0" indent="0" algn="ctr" defTabSz="914400" rtl="0" eaLnBrk="1" fontAlgn="auto" latinLnBrk="0" hangingPunct="1">
-              <a:lnSpc>
-                <a:spcPct val="100000"/>
-              </a:lnSpc>
-              <a:spcBef>
-                <a:spcPts val="0"/>
-              </a:spcBef>
-              <a:spcAft>
-                <a:spcPts val="0"/>
-              </a:spcAft>
-              <a:buClrTx/>
-              <a:buSzTx/>
-              <a:buFontTx/>
-              <a:buNone/>
-              <a:tabLst/>
-              <a:defRPr/>
-            </a:pPr>
-            <a:endParaRPr kumimoji="0" lang="en-US" sz="1800" b="0" i="0" u="none" strike="noStrike" kern="1200" cap="none" spc="0" normalizeH="0" baseline="0" noProof="0" dirty="0">
-              <a:ln>
-                <a:noFill/>
-              </a:ln>
-              <a:solidFill>
-                <a:prstClr val="white"/>
-              </a:solidFill>
-              <a:effectLst/>
-              <a:uLnTx/>
-              <a:uFillTx/>
-              <a:latin typeface="Calibri" panose="020F0502020204030204"/>
-              <a:ea typeface="+mn-ea"/>
-              <a:cs typeface="+mn-cs"/>
-            </a:endParaRPr>
-          </a:p>
-        </p:txBody>
-      </p:sp>
-      <p:sp>
-        <p:nvSpPr>
-          <p:cNvPr id="2" name="Title 1">
-            <a:extLst>
-              <a:ext uri="{FF2B5EF4-FFF2-40B4-BE49-F238E27FC236}">
-                <a16:creationId xmlns:a16="http://schemas.microsoft.com/office/drawing/2014/main" id="{179B0B2E-FC83-9949-A534-87EF6DE79877}"/>
-              </a:ext>
-            </a:extLst>
-          </p:cNvPr>
-          <p:cNvSpPr>
-            <a:spLocks noGrp="1"/>
-          </p:cNvSpPr>
-          <p:nvPr>
-            <p:ph type="title"/>
-          </p:nvPr>
-        </p:nvSpPr>
-        <p:spPr>
-          <a:xfrm>
-            <a:off x="1537097" y="1428750"/>
-            <a:ext cx="9117807" cy="2105026"/>
-          </a:xfrm>
-        </p:spPr>
-        <p:txBody>
-          <a:bodyPr vert="horz" lIns="91440" tIns="45720" rIns="91440" bIns="45720" rtlCol="0" anchor="b">
-            <a:normAutofit/>
-          </a:bodyPr>
-          <a:lstStyle/>
-          <a:p>
-            <a:pPr algn="ctr"/>
-            <a:r>
-              <a:rPr lang="en-US" kern="1200" dirty="0">
-                <a:solidFill>
-                  <a:schemeClr val="tx1"/>
-                </a:solidFill>
-                <a:latin typeface="+mj-lt"/>
-                <a:ea typeface="+mj-ea"/>
-                <a:cs typeface="+mj-cs"/>
-              </a:rPr>
-              <a:t>#3 - F# is immutable by default</a:t>
-            </a:r>
-          </a:p>
-        </p:txBody>
-      </p:sp>
-      <p:sp>
-        <p:nvSpPr>
-          <p:cNvPr id="7" name="Text Placeholder 6">
-            <a:extLst>
-              <a:ext uri="{FF2B5EF4-FFF2-40B4-BE49-F238E27FC236}">
-                <a16:creationId xmlns:a16="http://schemas.microsoft.com/office/drawing/2014/main" id="{BFDC00CF-BE0D-A44A-8325-A4ED88A91A95}"/>
-              </a:ext>
-            </a:extLst>
-          </p:cNvPr>
-          <p:cNvSpPr>
-            <a:spLocks noGrp="1"/>
-          </p:cNvSpPr>
-          <p:nvPr>
-            <p:ph type="body" idx="1"/>
-          </p:nvPr>
-        </p:nvSpPr>
-        <p:spPr>
-          <a:xfrm>
-            <a:off x="1537097" y="3960557"/>
-            <a:ext cx="9117807" cy="1097215"/>
-          </a:xfrm>
-        </p:spPr>
-        <p:txBody>
-          <a:bodyPr vert="horz" lIns="91440" tIns="45720" rIns="91440" bIns="45720" rtlCol="0">
-            <a:normAutofit fontScale="92500" lnSpcReduction="10000"/>
-          </a:bodyPr>
-          <a:lstStyle/>
-          <a:p>
-            <a:pPr algn="ctr"/>
-            <a:r>
-              <a:rPr lang="en-US" i="1" dirty="0">
-                <a:solidFill>
-                  <a:schemeClr val="bg2">
-                    <a:lumMod val="75000"/>
-                  </a:schemeClr>
-                </a:solidFill>
-              </a:rPr>
-              <a:t>Or why declaring fields / properties as </a:t>
-            </a:r>
-            <a:r>
-              <a:rPr lang="en-US" b="1" i="1" dirty="0" err="1">
-                <a:solidFill>
-                  <a:schemeClr val="bg2">
-                    <a:lumMod val="75000"/>
-                  </a:schemeClr>
-                </a:solidFill>
-              </a:rPr>
-              <a:t>readonly</a:t>
-            </a:r>
-            <a:r>
-              <a:rPr lang="en-US" i="1" dirty="0">
-                <a:solidFill>
-                  <a:schemeClr val="bg2">
-                    <a:lumMod val="75000"/>
-                  </a:schemeClr>
-                </a:solidFill>
-              </a:rPr>
-              <a:t> is not enough.</a:t>
-            </a:r>
-          </a:p>
-          <a:p>
-            <a:pPr algn="ctr"/>
-            <a:r>
-              <a:rPr lang="en-US" i="1" dirty="0">
-                <a:solidFill>
-                  <a:schemeClr val="bg2">
-                    <a:lumMod val="75000"/>
-                  </a:schemeClr>
-                </a:solidFill>
-              </a:rPr>
-              <a:t>…yes, it’s a very big deal, go have a look at C# 9 records or Immutable collections… </a:t>
-            </a:r>
-          </a:p>
-        </p:txBody>
-      </p:sp>
-      <p:cxnSp>
-        <p:nvCxnSpPr>
-          <p:cNvPr id="16" name="Straight Connector 15">
-            <a:extLst>
-              <a:ext uri="{FF2B5EF4-FFF2-40B4-BE49-F238E27FC236}">
-                <a16:creationId xmlns:a16="http://schemas.microsoft.com/office/drawing/2014/main" id="{2330623A-AB89-4E04-AC9A-2BAFBF85AE3A}"/>
-              </a:ext>
-              <a:ext uri="{C183D7F6-B498-43B3-948B-1728B52AA6E4}">
-                <adec:decorative xmlns:adec="http://schemas.microsoft.com/office/drawing/2017/decorative" val="1"/>
-              </a:ext>
-            </a:extLst>
-          </p:cNvPr>
-          <p:cNvCxnSpPr>
-            <a:cxnSpLocks noGrp="1" noRot="1" noChangeAspect="1" noMove="1" noResize="1" noEditPoints="1" noAdjustHandles="1" noChangeArrowheads="1" noChangeShapeType="1"/>
-          </p:cNvCxnSpPr>
-          <p:nvPr>
-            <p:extLst>
-              <p:ext uri="{386F3935-93C4-4BCD-93E2-E3B085C9AB24}">
-                <p16:designElem xmlns:p16="http://schemas.microsoft.com/office/powerpoint/2015/main" val="1"/>
-              </p:ext>
-            </p:extLst>
-          </p:nvPr>
-        </p:nvCxnSpPr>
-        <p:spPr>
-          <a:xfrm>
-            <a:off x="3352800" y="3771366"/>
-            <a:ext cx="5486400" cy="0"/>
-          </a:xfrm>
-          <a:prstGeom prst="line">
-            <a:avLst/>
-          </a:prstGeom>
-          <a:ln w="22225">
-            <a:solidFill>
-              <a:schemeClr val="tx1">
-                <a:lumMod val="50000"/>
-                <a:lumOff val="50000"/>
-              </a:schemeClr>
-            </a:solidFill>
-          </a:ln>
-        </p:spPr>
-        <p:style>
-          <a:lnRef idx="1">
-            <a:schemeClr val="accent1"/>
-          </a:lnRef>
-          <a:fillRef idx="0">
-            <a:schemeClr val="accent1"/>
-          </a:fillRef>
-          <a:effectRef idx="0">
-            <a:schemeClr val="accent1"/>
-          </a:effectRef>
-          <a:fontRef idx="minor">
-            <a:schemeClr val="tx1"/>
-          </a:fontRef>
-        </p:style>
-      </p:cxnSp>
-    </p:spTree>
-    <p:extLst>
-      <p:ext uri="{BB962C8B-B14F-4D97-AF65-F5344CB8AC3E}">
-        <p14:creationId xmlns:p14="http://schemas.microsoft.com/office/powerpoint/2010/main" val="1878057460"/>
-      </p:ext>
-    </p:extLst>
-  </p:cSld>
-  <p:clrMapOvr>
-    <a:overrideClrMapping bg1="lt1" tx1="dk1" bg2="lt2" tx2="dk2" accent1="accent1" accent2="accent2" accent3="accent3" accent4="accent4" accent5="accent5" accent6="accent6" hlink="hlink" folHlink="folHlink"/>
   </p:clrMapOvr>
 </p:sld>
 </file>
@@ -9824,6 +8688,373 @@
           <p:cNvPr id="12" name="Rectangle 11">
             <a:extLst>
               <a:ext uri="{FF2B5EF4-FFF2-40B4-BE49-F238E27FC236}">
+                <a16:creationId xmlns:a16="http://schemas.microsoft.com/office/drawing/2014/main" id="{5FB946D7-1CA4-446E-8795-007CACFDEB88}"/>
+              </a:ext>
+              <a:ext uri="{C183D7F6-B498-43B3-948B-1728B52AA6E4}">
+                <adec:decorative xmlns:adec="http://schemas.microsoft.com/office/drawing/2017/decorative" val="1"/>
+              </a:ext>
+            </a:extLst>
+          </p:cNvPr>
+          <p:cNvSpPr>
+            <a:spLocks noGrp="1" noRot="1" noChangeAspect="1" noMove="1" noResize="1" noEditPoints="1" noAdjustHandles="1" noChangeArrowheads="1" noChangeShapeType="1" noTextEdit="1"/>
+          </p:cNvSpPr>
+          <p:nvPr>
+            <p:extLst>
+              <p:ext uri="{386F3935-93C4-4BCD-93E2-E3B085C9AB24}">
+                <p16:designElem xmlns:p16="http://schemas.microsoft.com/office/powerpoint/2015/main" val="1"/>
+              </p:ext>
+            </p:extLst>
+          </p:nvPr>
+        </p:nvSpPr>
+        <p:spPr>
+          <a:xfrm>
+            <a:off x="0" y="-3324"/>
+            <a:ext cx="12192000" cy="6861324"/>
+          </a:xfrm>
+          <a:prstGeom prst="rect">
+            <a:avLst/>
+          </a:prstGeom>
+          <a:solidFill>
+            <a:schemeClr val="tx1">
+              <a:lumMod val="75000"/>
+              <a:lumOff val="25000"/>
+            </a:schemeClr>
+          </a:solidFill>
+          <a:ln>
+            <a:noFill/>
+          </a:ln>
+        </p:spPr>
+        <p:style>
+          <a:lnRef idx="2">
+            <a:schemeClr val="accent1">
+              <a:shade val="50000"/>
+            </a:schemeClr>
+          </a:lnRef>
+          <a:fillRef idx="1">
+            <a:schemeClr val="accent1"/>
+          </a:fillRef>
+          <a:effectRef idx="0">
+            <a:schemeClr val="accent1"/>
+          </a:effectRef>
+          <a:fontRef idx="minor">
+            <a:schemeClr val="lt1"/>
+          </a:fontRef>
+        </p:style>
+        <p:txBody>
+          <a:bodyPr rtlCol="0" anchor="ctr"/>
+          <a:lstStyle/>
+          <a:p>
+            <a:pPr marL="0" marR="0" lvl="0" indent="0" algn="ctr" defTabSz="914400" rtl="0" eaLnBrk="1" fontAlgn="auto" latinLnBrk="0" hangingPunct="1">
+              <a:lnSpc>
+                <a:spcPct val="100000"/>
+              </a:lnSpc>
+              <a:spcBef>
+                <a:spcPts val="0"/>
+              </a:spcBef>
+              <a:spcAft>
+                <a:spcPts val="0"/>
+              </a:spcAft>
+              <a:buClrTx/>
+              <a:buSzTx/>
+              <a:buFontTx/>
+              <a:buNone/>
+              <a:tabLst/>
+              <a:defRPr/>
+            </a:pPr>
+            <a:endParaRPr kumimoji="0" lang="en-US" sz="1800" b="0" i="0" u="none" strike="noStrike" kern="1200" cap="none" spc="0" normalizeH="0" baseline="0" noProof="0">
+              <a:ln>
+                <a:noFill/>
+              </a:ln>
+              <a:solidFill>
+                <a:prstClr val="white"/>
+              </a:solidFill>
+              <a:effectLst/>
+              <a:uLnTx/>
+              <a:uFillTx/>
+              <a:latin typeface="Calibri" panose="020F0502020204030204"/>
+              <a:ea typeface="+mn-ea"/>
+              <a:cs typeface="+mn-cs"/>
+            </a:endParaRPr>
+          </a:p>
+        </p:txBody>
+      </p:sp>
+      <p:sp>
+        <p:nvSpPr>
+          <p:cNvPr id="14" name="Rectangle 13">
+            <a:extLst>
+              <a:ext uri="{FF2B5EF4-FFF2-40B4-BE49-F238E27FC236}">
+                <a16:creationId xmlns:a16="http://schemas.microsoft.com/office/drawing/2014/main" id="{192416F2-BC84-4D7C-80C6-6296C10C3819}"/>
+              </a:ext>
+              <a:ext uri="{C183D7F6-B498-43B3-948B-1728B52AA6E4}">
+                <adec:decorative xmlns:adec="http://schemas.microsoft.com/office/drawing/2017/decorative" val="1"/>
+              </a:ext>
+            </a:extLst>
+          </p:cNvPr>
+          <p:cNvSpPr>
+            <a:spLocks noGrp="1" noRot="1" noChangeAspect="1" noMove="1" noResize="1" noEditPoints="1" noAdjustHandles="1" noChangeArrowheads="1" noChangeShapeType="1" noTextEdit="1"/>
+          </p:cNvSpPr>
+          <p:nvPr>
+            <p:extLst>
+              <p:ext uri="{386F3935-93C4-4BCD-93E2-E3B085C9AB24}">
+                <p16:designElem xmlns:p16="http://schemas.microsoft.com/office/powerpoint/2015/main" val="1"/>
+              </p:ext>
+            </p:extLst>
+          </p:nvPr>
+        </p:nvSpPr>
+        <p:spPr bwMode="ltGray">
+          <a:xfrm>
+            <a:off x="795338" y="981075"/>
+            <a:ext cx="10601325" cy="4552949"/>
+          </a:xfrm>
+          <a:prstGeom prst="rect">
+            <a:avLst/>
+          </a:prstGeom>
+          <a:solidFill>
+            <a:schemeClr val="bg1"/>
+          </a:solidFill>
+          <a:ln w="127000" cap="sq" cmpd="thinThick">
+            <a:solidFill>
+              <a:schemeClr val="bg1"/>
+            </a:solidFill>
+          </a:ln>
+        </p:spPr>
+        <p:style>
+          <a:lnRef idx="2">
+            <a:schemeClr val="accent1">
+              <a:shade val="50000"/>
+            </a:schemeClr>
+          </a:lnRef>
+          <a:fillRef idx="1">
+            <a:schemeClr val="accent1"/>
+          </a:fillRef>
+          <a:effectRef idx="0">
+            <a:schemeClr val="accent1"/>
+          </a:effectRef>
+          <a:fontRef idx="minor">
+            <a:schemeClr val="lt1"/>
+          </a:fontRef>
+        </p:style>
+        <p:txBody>
+          <a:bodyPr rtlCol="0" anchor="ctr"/>
+          <a:lstStyle/>
+          <a:p>
+            <a:pPr marL="0" marR="0" lvl="0" indent="0" algn="ctr" defTabSz="914400" rtl="0" eaLnBrk="1" fontAlgn="auto" latinLnBrk="0" hangingPunct="1">
+              <a:lnSpc>
+                <a:spcPct val="100000"/>
+              </a:lnSpc>
+              <a:spcBef>
+                <a:spcPts val="0"/>
+              </a:spcBef>
+              <a:spcAft>
+                <a:spcPts val="0"/>
+              </a:spcAft>
+              <a:buClrTx/>
+              <a:buSzTx/>
+              <a:buFontTx/>
+              <a:buNone/>
+              <a:tabLst/>
+              <a:defRPr/>
+            </a:pPr>
+            <a:endParaRPr kumimoji="0" lang="en-US" sz="1800" b="0" i="0" u="none" strike="noStrike" kern="1200" cap="none" spc="0" normalizeH="0" baseline="0" noProof="0" dirty="0">
+              <a:ln>
+                <a:noFill/>
+              </a:ln>
+              <a:solidFill>
+                <a:prstClr val="white"/>
+              </a:solidFill>
+              <a:effectLst/>
+              <a:uLnTx/>
+              <a:uFillTx/>
+              <a:latin typeface="Calibri" panose="020F0502020204030204"/>
+              <a:ea typeface="+mn-ea"/>
+              <a:cs typeface="+mn-cs"/>
+            </a:endParaRPr>
+          </a:p>
+        </p:txBody>
+      </p:sp>
+      <p:sp>
+        <p:nvSpPr>
+          <p:cNvPr id="2" name="Title 1">
+            <a:extLst>
+              <a:ext uri="{FF2B5EF4-FFF2-40B4-BE49-F238E27FC236}">
+                <a16:creationId xmlns:a16="http://schemas.microsoft.com/office/drawing/2014/main" id="{179B0B2E-FC83-9949-A534-87EF6DE79877}"/>
+              </a:ext>
+            </a:extLst>
+          </p:cNvPr>
+          <p:cNvSpPr>
+            <a:spLocks noGrp="1"/>
+          </p:cNvSpPr>
+          <p:nvPr>
+            <p:ph type="title"/>
+          </p:nvPr>
+        </p:nvSpPr>
+        <p:spPr>
+          <a:xfrm>
+            <a:off x="1537097" y="1428750"/>
+            <a:ext cx="9117807" cy="2105026"/>
+          </a:xfrm>
+        </p:spPr>
+        <p:txBody>
+          <a:bodyPr vert="horz" lIns="91440" tIns="45720" rIns="91440" bIns="45720" rtlCol="0" anchor="b">
+            <a:normAutofit/>
+          </a:bodyPr>
+          <a:lstStyle/>
+          <a:p>
+            <a:pPr algn="ctr"/>
+            <a:r>
+              <a:rPr lang="en-US" kern="1200" dirty="0">
+                <a:solidFill>
+                  <a:schemeClr val="tx1"/>
+                </a:solidFill>
+                <a:latin typeface="+mj-lt"/>
+                <a:ea typeface="+mj-ea"/>
+                <a:cs typeface="+mj-cs"/>
+              </a:rPr>
+              <a:t>#3 - F# is immutable by default</a:t>
+            </a:r>
+          </a:p>
+        </p:txBody>
+      </p:sp>
+      <p:sp>
+        <p:nvSpPr>
+          <p:cNvPr id="7" name="Text Placeholder 6">
+            <a:extLst>
+              <a:ext uri="{FF2B5EF4-FFF2-40B4-BE49-F238E27FC236}">
+                <a16:creationId xmlns:a16="http://schemas.microsoft.com/office/drawing/2014/main" id="{BFDC00CF-BE0D-A44A-8325-A4ED88A91A95}"/>
+              </a:ext>
+            </a:extLst>
+          </p:cNvPr>
+          <p:cNvSpPr>
+            <a:spLocks noGrp="1"/>
+          </p:cNvSpPr>
+          <p:nvPr>
+            <p:ph type="body" idx="1"/>
+          </p:nvPr>
+        </p:nvSpPr>
+        <p:spPr>
+          <a:xfrm>
+            <a:off x="1537097" y="3960557"/>
+            <a:ext cx="9117807" cy="1097215"/>
+          </a:xfrm>
+        </p:spPr>
+        <p:txBody>
+          <a:bodyPr vert="horz" lIns="91440" tIns="45720" rIns="91440" bIns="45720" rtlCol="0">
+            <a:normAutofit/>
+          </a:bodyPr>
+          <a:lstStyle/>
+          <a:p>
+            <a:pPr algn="ctr"/>
+            <a:r>
+              <a:rPr lang="en-US" i="1" dirty="0">
+                <a:solidFill>
+                  <a:schemeClr val="bg2">
+                    <a:lumMod val="75000"/>
+                  </a:schemeClr>
+                </a:solidFill>
+              </a:rPr>
+              <a:t>…yes, it’s a very big deal, have a look at C# 9 records or Immutable collections… </a:t>
+            </a:r>
+          </a:p>
+        </p:txBody>
+      </p:sp>
+      <p:cxnSp>
+        <p:nvCxnSpPr>
+          <p:cNvPr id="16" name="Straight Connector 15">
+            <a:extLst>
+              <a:ext uri="{FF2B5EF4-FFF2-40B4-BE49-F238E27FC236}">
+                <a16:creationId xmlns:a16="http://schemas.microsoft.com/office/drawing/2014/main" id="{2330623A-AB89-4E04-AC9A-2BAFBF85AE3A}"/>
+              </a:ext>
+              <a:ext uri="{C183D7F6-B498-43B3-948B-1728B52AA6E4}">
+                <adec:decorative xmlns:adec="http://schemas.microsoft.com/office/drawing/2017/decorative" val="1"/>
+              </a:ext>
+            </a:extLst>
+          </p:cNvPr>
+          <p:cNvCxnSpPr>
+            <a:cxnSpLocks noGrp="1" noRot="1" noChangeAspect="1" noMove="1" noResize="1" noEditPoints="1" noAdjustHandles="1" noChangeArrowheads="1" noChangeShapeType="1"/>
+          </p:cNvCxnSpPr>
+          <p:nvPr>
+            <p:extLst>
+              <p:ext uri="{386F3935-93C4-4BCD-93E2-E3B085C9AB24}">
+                <p16:designElem xmlns:p16="http://schemas.microsoft.com/office/powerpoint/2015/main" val="1"/>
+              </p:ext>
+            </p:extLst>
+          </p:nvPr>
+        </p:nvCxnSpPr>
+        <p:spPr>
+          <a:xfrm>
+            <a:off x="3352800" y="3771366"/>
+            <a:ext cx="5486400" cy="0"/>
+          </a:xfrm>
+          <a:prstGeom prst="line">
+            <a:avLst/>
+          </a:prstGeom>
+          <a:ln w="22225">
+            <a:solidFill>
+              <a:schemeClr val="tx1">
+                <a:lumMod val="50000"/>
+                <a:lumOff val="50000"/>
+              </a:schemeClr>
+            </a:solidFill>
+          </a:ln>
+        </p:spPr>
+        <p:style>
+          <a:lnRef idx="1">
+            <a:schemeClr val="accent1"/>
+          </a:lnRef>
+          <a:fillRef idx="0">
+            <a:schemeClr val="accent1"/>
+          </a:fillRef>
+          <a:effectRef idx="0">
+            <a:schemeClr val="accent1"/>
+          </a:effectRef>
+          <a:fontRef idx="minor">
+            <a:schemeClr val="tx1"/>
+          </a:fontRef>
+        </p:style>
+      </p:cxnSp>
+    </p:spTree>
+    <p:extLst>
+      <p:ext uri="{BB962C8B-B14F-4D97-AF65-F5344CB8AC3E}">
+        <p14:creationId xmlns:p14="http://schemas.microsoft.com/office/powerpoint/2010/main" val="1878057460"/>
+      </p:ext>
+    </p:extLst>
+  </p:cSld>
+  <p:clrMapOvr>
+    <a:overrideClrMapping bg1="lt1" tx1="dk1" bg2="lt2" tx2="dk2" accent1="accent1" accent2="accent2" accent3="accent3" accent4="accent4" accent5="accent5" accent6="accent6" hlink="hlink" folHlink="folHlink"/>
+  </p:clrMapOvr>
+</p:sld>
+</file>
+
+<file path=ppt/slides/slide21.xml><?xml version="1.0" encoding="utf-8"?>
+<p:sld xmlns:a="http://schemas.openxmlformats.org/drawingml/2006/main" xmlns:r="http://schemas.openxmlformats.org/officeDocument/2006/relationships" xmlns:p="http://schemas.openxmlformats.org/presentationml/2006/main">
+  <p:cSld>
+    <p:bg>
+      <p:bgPr>
+        <a:solidFill>
+          <a:schemeClr val="bg1"/>
+        </a:solidFill>
+        <a:effectLst/>
+      </p:bgPr>
+    </p:bg>
+    <p:spTree>
+      <p:nvGrpSpPr>
+        <p:cNvPr id="1" name=""/>
+        <p:cNvGrpSpPr/>
+        <p:nvPr/>
+      </p:nvGrpSpPr>
+      <p:grpSpPr>
+        <a:xfrm>
+          <a:off x="0" y="0"/>
+          <a:ext cx="0" cy="0"/>
+          <a:chOff x="0" y="0"/>
+          <a:chExt cx="0" cy="0"/>
+        </a:xfrm>
+      </p:grpSpPr>
+      <p:sp>
+        <p:nvSpPr>
+          <p:cNvPr id="12" name="Rectangle 11">
+            <a:extLst>
+              <a:ext uri="{FF2B5EF4-FFF2-40B4-BE49-F238E27FC236}">
                 <a16:creationId xmlns:a16="http://schemas.microsoft.com/office/drawing/2014/main" id="{F98ED85F-DCEE-4B50-802E-71A6E3E12B04}"/>
               </a:ext>
               <a:ext uri="{C183D7F6-B498-43B3-948B-1728B52AA6E4}">
@@ -10051,7 +9282,7 @@
                   <a:schemeClr val="bg1"/>
                 </a:solidFill>
               </a:rPr>
-              <a:t> for compatibility with C# and the .NET platform</a:t>
+              <a:t> for compatibility with the .NET runtime</a:t>
             </a:r>
           </a:p>
           <a:p>
@@ -10148,7 +9379,7 @@
     </p:spTree>
     <p:extLst>
       <p:ext uri="{BB962C8B-B14F-4D97-AF65-F5344CB8AC3E}">
-        <p14:creationId xmlns:p14="http://schemas.microsoft.com/office/powerpoint/2010/main" val="1781817358"/>
+        <p14:creationId xmlns:p14="http://schemas.microsoft.com/office/powerpoint/2010/main" val="452609271"/>
       </p:ext>
     </p:extLst>
   </p:cSld>
@@ -10730,7 +9961,7 @@
 </p:sld>
 </file>
 
-<file path=ppt/slides/slide21.xml><?xml version="1.0" encoding="utf-8"?>
+<file path=ppt/slides/slide22.xml><?xml version="1.0" encoding="utf-8"?>
 <p:sld xmlns:a="http://schemas.openxmlformats.org/drawingml/2006/main" xmlns:r="http://schemas.openxmlformats.org/officeDocument/2006/relationships" xmlns:p="http://schemas.openxmlformats.org/presentationml/2006/main">
   <p:cSld>
     <p:bg>
@@ -10925,7 +10156,7 @@
         </p:blipFill>
         <p:spPr>
           <a:xfrm>
-            <a:off x="4038600" y="1487272"/>
+            <a:off x="4038600" y="1697440"/>
             <a:ext cx="7188199" cy="1815020"/>
           </a:xfrm>
           <a:prstGeom prst="rect">
@@ -10951,7 +10182,7 @@
         </p:nvSpPr>
         <p:spPr>
           <a:xfrm>
-            <a:off x="4033101" y="3555709"/>
+            <a:off x="4038600" y="3791379"/>
             <a:ext cx="7839173" cy="742914"/>
           </a:xfrm>
         </p:spPr>
@@ -10975,7 +10206,7 @@
                   </a:schemeClr>
                 </a:solidFill>
               </a:rPr>
-              <a:t>Why the 'buzz' on immutability ? Have a look at </a:t>
+              <a:t>Immutability have very nice properties but also some cons, have a look at </a:t>
             </a:r>
             <a:r>
               <a:rPr lang="en-US" sz="2200" i="1" dirty="0">
@@ -10986,7 +10217,7 @@
                 </a:solidFill>
                 <a:hlinkClick r:id="rId4"/>
               </a:rPr>
-              <a:t>@KevlinHenney presentation on </a:t>
+              <a:t>@KevlinHenney presentation at </a:t>
             </a:r>
             <a:r>
               <a:rPr lang="en-US" sz="2200" i="1" dirty="0" err="1">
@@ -11010,13 +10241,16 @@
               </a:rPr>
               <a:t> 2018</a:t>
             </a:r>
-            <a:endParaRPr lang="en-US" sz="2200" i="1" dirty="0">
-              <a:solidFill>
-                <a:schemeClr val="bg2">
-                  <a:lumMod val="75000"/>
-                </a:schemeClr>
-              </a:solidFill>
-            </a:endParaRPr>
+            <a:r>
+              <a:rPr lang="en-US" sz="2200" i="1" dirty="0">
+                <a:solidFill>
+                  <a:schemeClr val="bg2">
+                    <a:lumMod val="75000"/>
+                  </a:schemeClr>
+                </a:solidFill>
+              </a:rPr>
+              <a:t> on the subject…</a:t>
+            </a:r>
           </a:p>
           <a:p>
             <a:endParaRPr lang="en-US" sz="1800" dirty="0"/>
@@ -11037,7 +10271,7 @@
         </p:nvSpPr>
         <p:spPr>
           <a:xfrm>
-            <a:off x="3961615" y="1049189"/>
+            <a:off x="4038600" y="1241119"/>
             <a:ext cx="6094428" cy="369332"/>
           </a:xfrm>
           <a:prstGeom prst="rect">
@@ -11071,7 +10305,7 @@
 </p:sld>
 </file>
 
-<file path=ppt/slides/slide22.xml><?xml version="1.0" encoding="utf-8"?>
+<file path=ppt/slides/slide23.xml><?xml version="1.0" encoding="utf-8"?>
 <p:sld xmlns:a="http://schemas.openxmlformats.org/drawingml/2006/main" xmlns:r="http://schemas.openxmlformats.org/officeDocument/2006/relationships" xmlns:p="http://schemas.openxmlformats.org/presentationml/2006/main">
   <p:cSld>
     <p:bg>
@@ -11365,7 +10599,7 @@
                   </a:schemeClr>
                 </a:solidFill>
               </a:rPr>
-              <a:t>…it’s also a very big deal, that’s why C# 8 introduced it as well. </a:t>
+              <a:t>powerful one… with fundamentals features</a:t>
             </a:r>
           </a:p>
         </p:txBody>
@@ -11438,7 +10672,7 @@
 </p:sld>
 </file>
 
-<file path=ppt/slides/slide23.xml><?xml version="1.0" encoding="utf-8"?>
+<file path=ppt/slides/slide24.xml><?xml version="1.0" encoding="utf-8"?>
 <p:sld xmlns:a="http://schemas.openxmlformats.org/drawingml/2006/main" xmlns:r="http://schemas.openxmlformats.org/officeDocument/2006/relationships" xmlns:p="http://schemas.openxmlformats.org/presentationml/2006/main">
   <p:cSld>
     <p:bg>
@@ -11688,7 +10922,7 @@
 </p:sld>
 </file>
 
-<file path=ppt/slides/slide24.xml><?xml version="1.0" encoding="utf-8"?>
+<file path=ppt/slides/slide25.xml><?xml version="1.0" encoding="utf-8"?>
 <p:sld xmlns:a="http://schemas.openxmlformats.org/drawingml/2006/main" xmlns:r="http://schemas.openxmlformats.org/officeDocument/2006/relationships" xmlns:p="http://schemas.openxmlformats.org/presentationml/2006/main">
   <p:cSld>
     <p:bg>
@@ -11938,7 +11172,7 @@
 </p:sld>
 </file>
 
-<file path=ppt/slides/slide25.xml><?xml version="1.0" encoding="utf-8"?>
+<file path=ppt/slides/slide26.xml><?xml version="1.0" encoding="utf-8"?>
 <p:sld xmlns:a="http://schemas.openxmlformats.org/drawingml/2006/main" xmlns:r="http://schemas.openxmlformats.org/officeDocument/2006/relationships" xmlns:p="http://schemas.openxmlformats.org/presentationml/2006/main">
   <p:cSld>
     <p:bg>
@@ -12190,7 +11424,7 @@
         <p:spPr>
           <a:xfrm>
             <a:off x="4038599" y="4242310"/>
-            <a:ext cx="7188199" cy="911660"/>
+            <a:ext cx="7650638" cy="640816"/>
           </a:xfrm>
           <a:prstGeom prst="rect">
             <a:avLst/>
@@ -12240,7 +11474,7 @@
                   </a:schemeClr>
                 </a:solidFill>
               </a:rPr>
-              <a:t> on this or the excellent site of </a:t>
+              <a:t> or the excellent site of </a:t>
             </a:r>
             <a:r>
               <a:rPr lang="en-GB" sz="2200" b="1" i="1" dirty="0">
@@ -12291,7 +11525,7 @@
                   </a:schemeClr>
                 </a:solidFill>
               </a:rPr>
-              <a:t> on the subject</a:t>
+              <a:t> for more</a:t>
             </a:r>
           </a:p>
         </p:txBody>
@@ -12309,7 +11543,7 @@
 </p:sld>
 </file>
 
-<file path=ppt/slides/slide26.xml><?xml version="1.0" encoding="utf-8"?>
+<file path=ppt/slides/slide27.xml><?xml version="1.0" encoding="utf-8"?>
 <p:sld xmlns:a="http://schemas.openxmlformats.org/drawingml/2006/main" xmlns:r="http://schemas.openxmlformats.org/officeDocument/2006/relationships" xmlns:p="http://schemas.openxmlformats.org/presentationml/2006/main">
   <p:cSld>
     <p:bg>
@@ -12676,7 +11910,7 @@
 </p:sld>
 </file>
 
-<file path=ppt/slides/slide27.xml><?xml version="1.0" encoding="utf-8"?>
+<file path=ppt/slides/slide28.xml><?xml version="1.0" encoding="utf-8"?>
 <p:sld xmlns:a="http://schemas.openxmlformats.org/drawingml/2006/main" xmlns:r="http://schemas.openxmlformats.org/officeDocument/2006/relationships" xmlns:p="http://schemas.openxmlformats.org/presentationml/2006/main">
   <p:cSld>
     <p:bg>
@@ -12887,7 +12121,7 @@
         </p:spPr>
         <p:txBody>
           <a:bodyPr>
-            <a:normAutofit lnSpcReduction="10000"/>
+            <a:normAutofit/>
           </a:bodyPr>
           <a:lstStyle/>
           <a:p>
@@ -12907,32 +12141,8 @@
                   <a:schemeClr val="bg1"/>
                 </a:solidFill>
               </a:rPr>
-              <a:t>FSI has full on all major IDE for a while now</a:t>
-            </a:r>
-          </a:p>
-          <a:p>
-            <a:pPr lvl="1"/>
-            <a:r>
-              <a:rPr lang="en-GB" dirty="0">
-                <a:solidFill>
-                  <a:schemeClr val="bg1"/>
-                </a:solidFill>
-              </a:rPr>
-              <a:t>Visual Studio, Rider, </a:t>
-            </a:r>
-            <a:r>
-              <a:rPr lang="en-GB" dirty="0" err="1">
-                <a:solidFill>
-                  <a:schemeClr val="bg1"/>
-                </a:solidFill>
-              </a:rPr>
-              <a:t>VsCode</a:t>
-            </a:r>
-            <a:endParaRPr lang="en-GB" dirty="0">
-              <a:solidFill>
-                <a:schemeClr val="bg1"/>
-              </a:solidFill>
-            </a:endParaRPr>
+              <a:t>FSI is supported on all major IDE for a while now</a:t>
+            </a:r>
           </a:p>
           <a:p>
             <a:r>
@@ -12941,7 +12151,7 @@
                   <a:schemeClr val="bg1"/>
                 </a:solidFill>
               </a:rPr>
-              <a:t>REPL is useful: ask Python and JavaScript developers or just watch the </a:t>
+              <a:t>REPL is useful: ask Python and JavaScript developers or just dig into the history of the </a:t>
             </a:r>
             <a:r>
               <a:rPr lang="en-GB" sz="2400" dirty="0" err="1">
@@ -12961,16 +12171,6 @@
             </a:r>
           </a:p>
           <a:p>
-            <a:r>
-              <a:rPr lang="en-GB" sz="2400" dirty="0">
-                <a:solidFill>
-                  <a:schemeClr val="bg1"/>
-                </a:solidFill>
-              </a:rPr>
-              <a:t>Useful how ?</a:t>
-            </a:r>
-          </a:p>
-          <a:p>
             <a:pPr lvl="1"/>
             <a:r>
               <a:rPr lang="en-GB" dirty="0">
@@ -12978,18 +12178,24 @@
                   <a:schemeClr val="bg1"/>
                 </a:solidFill>
               </a:rPr>
-              <a:t>You can create scripts</a:t>
-            </a:r>
-          </a:p>
-          <a:p>
-            <a:pPr lvl="1"/>
+              <a:t>You can create scripts (</a:t>
+            </a:r>
+            <a:r>
+              <a:rPr lang="en-GB" dirty="0">
+                <a:solidFill>
+                  <a:schemeClr val="bg1"/>
+                </a:solidFill>
+                <a:hlinkClick r:id="rId3"/>
+              </a:rPr>
+              <a:t>FAKE</a:t>
+            </a:r>
             <a:r>
               <a:rPr lang="en-GB" dirty="0">
                 <a:solidFill>
                   <a:schemeClr val="bg1"/>
                 </a:solidFill>
               </a:rPr>
-              <a:t>You can write code to test some cases and load production DLLs to see exactly what's happening</a:t>
+              <a:t>)</a:t>
             </a:r>
           </a:p>
           <a:p>
@@ -13000,8 +12206,27 @@
                   <a:schemeClr val="bg1"/>
                 </a:solidFill>
               </a:rPr>
-              <a:t>You can write code, load it and try it directly</a:t>
-            </a:r>
+              <a:t>You can write code and try it directly</a:t>
+            </a:r>
+          </a:p>
+          <a:p>
+            <a:pPr lvl="1"/>
+            <a:r>
+              <a:rPr lang="en-GB" dirty="0">
+                <a:solidFill>
+                  <a:schemeClr val="bg1"/>
+                </a:solidFill>
+              </a:rPr>
+              <a:t>You can test use cases with DLLs from production to see what's happening</a:t>
+            </a:r>
+          </a:p>
+          <a:p>
+            <a:pPr lvl="1"/>
+            <a:endParaRPr lang="en-GB" dirty="0">
+              <a:solidFill>
+                <a:schemeClr val="bg1"/>
+              </a:solidFill>
+            </a:endParaRPr>
           </a:p>
           <a:p>
             <a:pPr marL="0" indent="0">
@@ -13053,7 +12278,7 @@
                             </p:stCondLst>
                             <p:childTnLst>
                               <p:par>
-                                <p:cTn id="5" presetID="42" presetClass="entr" presetSubtype="0" fill="hold" grpId="0" nodeType="clickEffect">
+                                <p:cTn id="5" presetID="1" presetClass="entr" presetSubtype="0" fill="hold" grpId="0" nodeType="clickEffect">
                                   <p:stCondLst>
                                     <p:cond delay="0"/>
                                   </p:stCondLst>
@@ -13080,72 +12305,6 @@
                                         <p:strVal val="visible"/>
                                       </p:to>
                                     </p:set>
-                                    <p:animEffect transition="in" filter="fade">
-                                      <p:cBhvr>
-                                        <p:cTn id="7" dur="1000"/>
-                                        <p:tgtEl>
-                                          <p:spTgt spid="7">
-                                            <p:txEl>
-                                              <p:pRg st="0" end="0"/>
-                                            </p:txEl>
-                                          </p:spTgt>
-                                        </p:tgtEl>
-                                      </p:cBhvr>
-                                    </p:animEffect>
-                                    <p:anim calcmode="lin" valueType="num">
-                                      <p:cBhvr>
-                                        <p:cTn id="8" dur="1000" fill="hold"/>
-                                        <p:tgtEl>
-                                          <p:spTgt spid="7">
-                                            <p:txEl>
-                                              <p:pRg st="0" end="0"/>
-                                            </p:txEl>
-                                          </p:spTgt>
-                                        </p:tgtEl>
-                                        <p:attrNameLst>
-                                          <p:attrName>ppt_x</p:attrName>
-                                        </p:attrNameLst>
-                                      </p:cBhvr>
-                                      <p:tavLst>
-                                        <p:tav tm="0">
-                                          <p:val>
-                                            <p:strVal val="#ppt_x"/>
-                                          </p:val>
-                                        </p:tav>
-                                        <p:tav tm="100000">
-                                          <p:val>
-                                            <p:strVal val="#ppt_x"/>
-                                          </p:val>
-                                        </p:tav>
-                                      </p:tavLst>
-                                    </p:anim>
-                                    <p:anim calcmode="lin" valueType="num">
-                                      <p:cBhvr>
-                                        <p:cTn id="9" dur="1000" fill="hold"/>
-                                        <p:tgtEl>
-                                          <p:spTgt spid="7">
-                                            <p:txEl>
-                                              <p:pRg st="0" end="0"/>
-                                            </p:txEl>
-                                          </p:spTgt>
-                                        </p:tgtEl>
-                                        <p:attrNameLst>
-                                          <p:attrName>ppt_y</p:attrName>
-                                        </p:attrNameLst>
-                                      </p:cBhvr>
-                                      <p:tavLst>
-                                        <p:tav tm="0">
-                                          <p:val>
-                                            <p:strVal val="#ppt_y+.1"/>
-                                          </p:val>
-                                        </p:tav>
-                                        <p:tav tm="100000">
-                                          <p:val>
-                                            <p:strVal val="#ppt_y"/>
-                                          </p:val>
-                                        </p:tav>
-                                      </p:tavLst>
-                                    </p:anim>
                                   </p:childTnLst>
                                 </p:cTn>
                               </p:par>
@@ -13156,26 +12315,26 @@
                     </p:cTn>
                   </p:par>
                   <p:par>
-                    <p:cTn id="10" fill="hold">
+                    <p:cTn id="7" fill="hold">
                       <p:stCondLst>
                         <p:cond delay="indefinite"/>
                       </p:stCondLst>
                       <p:childTnLst>
                         <p:par>
-                          <p:cTn id="11" fill="hold">
+                          <p:cTn id="8" fill="hold">
                             <p:stCondLst>
                               <p:cond delay="0"/>
                             </p:stCondLst>
                             <p:childTnLst>
                               <p:par>
-                                <p:cTn id="12" presetID="42" presetClass="entr" presetSubtype="0" fill="hold" grpId="0" nodeType="clickEffect">
+                                <p:cTn id="9" presetID="1" presetClass="entr" presetSubtype="0" fill="hold" grpId="0" nodeType="clickEffect">
                                   <p:stCondLst>
                                     <p:cond delay="0"/>
                                   </p:stCondLst>
                                   <p:childTnLst>
                                     <p:set>
                                       <p:cBhvr>
-                                        <p:cTn id="13" dur="1" fill="hold">
+                                        <p:cTn id="10" dur="1" fill="hold">
                                           <p:stCondLst>
                                             <p:cond delay="0"/>
                                           </p:stCondLst>
@@ -13195,84 +12354,36 @@
                                         <p:strVal val="visible"/>
                                       </p:to>
                                     </p:set>
-                                    <p:animEffect transition="in" filter="fade">
-                                      <p:cBhvr>
-                                        <p:cTn id="14" dur="1000"/>
-                                        <p:tgtEl>
-                                          <p:spTgt spid="7">
-                                            <p:txEl>
-                                              <p:pRg st="1" end="1"/>
-                                            </p:txEl>
-                                          </p:spTgt>
-                                        </p:tgtEl>
-                                      </p:cBhvr>
-                                    </p:animEffect>
-                                    <p:anim calcmode="lin" valueType="num">
-                                      <p:cBhvr>
-                                        <p:cTn id="15" dur="1000" fill="hold"/>
-                                        <p:tgtEl>
-                                          <p:spTgt spid="7">
-                                            <p:txEl>
-                                              <p:pRg st="1" end="1"/>
-                                            </p:txEl>
-                                          </p:spTgt>
-                                        </p:tgtEl>
-                                        <p:attrNameLst>
-                                          <p:attrName>ppt_x</p:attrName>
-                                        </p:attrNameLst>
-                                      </p:cBhvr>
-                                      <p:tavLst>
-                                        <p:tav tm="0">
-                                          <p:val>
-                                            <p:strVal val="#ppt_x"/>
-                                          </p:val>
-                                        </p:tav>
-                                        <p:tav tm="100000">
-                                          <p:val>
-                                            <p:strVal val="#ppt_x"/>
-                                          </p:val>
-                                        </p:tav>
-                                      </p:tavLst>
-                                    </p:anim>
-                                    <p:anim calcmode="lin" valueType="num">
-                                      <p:cBhvr>
-                                        <p:cTn id="16" dur="1000" fill="hold"/>
-                                        <p:tgtEl>
-                                          <p:spTgt spid="7">
-                                            <p:txEl>
-                                              <p:pRg st="1" end="1"/>
-                                            </p:txEl>
-                                          </p:spTgt>
-                                        </p:tgtEl>
-                                        <p:attrNameLst>
-                                          <p:attrName>ppt_y</p:attrName>
-                                        </p:attrNameLst>
-                                      </p:cBhvr>
-                                      <p:tavLst>
-                                        <p:tav tm="0">
-                                          <p:val>
-                                            <p:strVal val="#ppt_y+.1"/>
-                                          </p:val>
-                                        </p:tav>
-                                        <p:tav tm="100000">
-                                          <p:val>
-                                            <p:strVal val="#ppt_y"/>
-                                          </p:val>
-                                        </p:tav>
-                                      </p:tavLst>
-                                    </p:anim>
                                   </p:childTnLst>
                                 </p:cTn>
                               </p:par>
+                            </p:childTnLst>
+                          </p:cTn>
+                        </p:par>
+                      </p:childTnLst>
+                    </p:cTn>
+                  </p:par>
+                  <p:par>
+                    <p:cTn id="11" fill="hold">
+                      <p:stCondLst>
+                        <p:cond delay="indefinite"/>
+                      </p:stCondLst>
+                      <p:childTnLst>
+                        <p:par>
+                          <p:cTn id="12" fill="hold">
+                            <p:stCondLst>
+                              <p:cond delay="0"/>
+                            </p:stCondLst>
+                            <p:childTnLst>
                               <p:par>
-                                <p:cTn id="17" presetID="42" presetClass="entr" presetSubtype="0" fill="hold" grpId="0" nodeType="withEffect">
+                                <p:cTn id="13" presetID="1" presetClass="entr" presetSubtype="0" fill="hold" grpId="0" nodeType="clickEffect">
                                   <p:stCondLst>
                                     <p:cond delay="0"/>
                                   </p:stCondLst>
                                   <p:childTnLst>
                                     <p:set>
                                       <p:cBhvr>
-                                        <p:cTn id="18" dur="1" fill="hold">
+                                        <p:cTn id="14" dur="1" fill="hold">
                                           <p:stCondLst>
                                             <p:cond delay="0"/>
                                           </p:stCondLst>
@@ -13292,72 +12403,6 @@
                                         <p:strVal val="visible"/>
                                       </p:to>
                                     </p:set>
-                                    <p:animEffect transition="in" filter="fade">
-                                      <p:cBhvr>
-                                        <p:cTn id="19" dur="1000"/>
-                                        <p:tgtEl>
-                                          <p:spTgt spid="7">
-                                            <p:txEl>
-                                              <p:pRg st="2" end="2"/>
-                                            </p:txEl>
-                                          </p:spTgt>
-                                        </p:tgtEl>
-                                      </p:cBhvr>
-                                    </p:animEffect>
-                                    <p:anim calcmode="lin" valueType="num">
-                                      <p:cBhvr>
-                                        <p:cTn id="20" dur="1000" fill="hold"/>
-                                        <p:tgtEl>
-                                          <p:spTgt spid="7">
-                                            <p:txEl>
-                                              <p:pRg st="2" end="2"/>
-                                            </p:txEl>
-                                          </p:spTgt>
-                                        </p:tgtEl>
-                                        <p:attrNameLst>
-                                          <p:attrName>ppt_x</p:attrName>
-                                        </p:attrNameLst>
-                                      </p:cBhvr>
-                                      <p:tavLst>
-                                        <p:tav tm="0">
-                                          <p:val>
-                                            <p:strVal val="#ppt_x"/>
-                                          </p:val>
-                                        </p:tav>
-                                        <p:tav tm="100000">
-                                          <p:val>
-                                            <p:strVal val="#ppt_x"/>
-                                          </p:val>
-                                        </p:tav>
-                                      </p:tavLst>
-                                    </p:anim>
-                                    <p:anim calcmode="lin" valueType="num">
-                                      <p:cBhvr>
-                                        <p:cTn id="21" dur="1000" fill="hold"/>
-                                        <p:tgtEl>
-                                          <p:spTgt spid="7">
-                                            <p:txEl>
-                                              <p:pRg st="2" end="2"/>
-                                            </p:txEl>
-                                          </p:spTgt>
-                                        </p:tgtEl>
-                                        <p:attrNameLst>
-                                          <p:attrName>ppt_y</p:attrName>
-                                        </p:attrNameLst>
-                                      </p:cBhvr>
-                                      <p:tavLst>
-                                        <p:tav tm="0">
-                                          <p:val>
-                                            <p:strVal val="#ppt_y+.1"/>
-                                          </p:val>
-                                        </p:tav>
-                                        <p:tav tm="100000">
-                                          <p:val>
-                                            <p:strVal val="#ppt_y"/>
-                                          </p:val>
-                                        </p:tav>
-                                      </p:tavLst>
-                                    </p:anim>
                                   </p:childTnLst>
                                 </p:cTn>
                               </p:par>
@@ -13368,26 +12413,26 @@
                     </p:cTn>
                   </p:par>
                   <p:par>
-                    <p:cTn id="22" fill="hold">
+                    <p:cTn id="15" fill="hold">
                       <p:stCondLst>
                         <p:cond delay="indefinite"/>
                       </p:stCondLst>
                       <p:childTnLst>
                         <p:par>
-                          <p:cTn id="23" fill="hold">
+                          <p:cTn id="16" fill="hold">
                             <p:stCondLst>
                               <p:cond delay="0"/>
                             </p:stCondLst>
                             <p:childTnLst>
                               <p:par>
-                                <p:cTn id="24" presetID="42" presetClass="entr" presetSubtype="0" fill="hold" grpId="0" nodeType="clickEffect">
+                                <p:cTn id="17" presetID="1" presetClass="entr" presetSubtype="0" fill="hold" grpId="0" nodeType="clickEffect">
                                   <p:stCondLst>
                                     <p:cond delay="0"/>
                                   </p:stCondLst>
                                   <p:childTnLst>
                                     <p:set>
                                       <p:cBhvr>
-                                        <p:cTn id="25" dur="1" fill="hold">
+                                        <p:cTn id="18" dur="1" fill="hold">
                                           <p:stCondLst>
                                             <p:cond delay="0"/>
                                           </p:stCondLst>
@@ -13407,72 +12452,6 @@
                                         <p:strVal val="visible"/>
                                       </p:to>
                                     </p:set>
-                                    <p:animEffect transition="in" filter="fade">
-                                      <p:cBhvr>
-                                        <p:cTn id="26" dur="1000"/>
-                                        <p:tgtEl>
-                                          <p:spTgt spid="7">
-                                            <p:txEl>
-                                              <p:pRg st="3" end="3"/>
-                                            </p:txEl>
-                                          </p:spTgt>
-                                        </p:tgtEl>
-                                      </p:cBhvr>
-                                    </p:animEffect>
-                                    <p:anim calcmode="lin" valueType="num">
-                                      <p:cBhvr>
-                                        <p:cTn id="27" dur="1000" fill="hold"/>
-                                        <p:tgtEl>
-                                          <p:spTgt spid="7">
-                                            <p:txEl>
-                                              <p:pRg st="3" end="3"/>
-                                            </p:txEl>
-                                          </p:spTgt>
-                                        </p:tgtEl>
-                                        <p:attrNameLst>
-                                          <p:attrName>ppt_x</p:attrName>
-                                        </p:attrNameLst>
-                                      </p:cBhvr>
-                                      <p:tavLst>
-                                        <p:tav tm="0">
-                                          <p:val>
-                                            <p:strVal val="#ppt_x"/>
-                                          </p:val>
-                                        </p:tav>
-                                        <p:tav tm="100000">
-                                          <p:val>
-                                            <p:strVal val="#ppt_x"/>
-                                          </p:val>
-                                        </p:tav>
-                                      </p:tavLst>
-                                    </p:anim>
-                                    <p:anim calcmode="lin" valueType="num">
-                                      <p:cBhvr>
-                                        <p:cTn id="28" dur="1000" fill="hold"/>
-                                        <p:tgtEl>
-                                          <p:spTgt spid="7">
-                                            <p:txEl>
-                                              <p:pRg st="3" end="3"/>
-                                            </p:txEl>
-                                          </p:spTgt>
-                                        </p:tgtEl>
-                                        <p:attrNameLst>
-                                          <p:attrName>ppt_y</p:attrName>
-                                        </p:attrNameLst>
-                                      </p:cBhvr>
-                                      <p:tavLst>
-                                        <p:tav tm="0">
-                                          <p:val>
-                                            <p:strVal val="#ppt_y+.1"/>
-                                          </p:val>
-                                        </p:tav>
-                                        <p:tav tm="100000">
-                                          <p:val>
-                                            <p:strVal val="#ppt_y"/>
-                                          </p:val>
-                                        </p:tav>
-                                      </p:tavLst>
-                                    </p:anim>
                                   </p:childTnLst>
                                 </p:cTn>
                               </p:par>
@@ -13483,26 +12462,26 @@
                     </p:cTn>
                   </p:par>
                   <p:par>
-                    <p:cTn id="29" fill="hold">
+                    <p:cTn id="19" fill="hold">
                       <p:stCondLst>
                         <p:cond delay="indefinite"/>
                       </p:stCondLst>
                       <p:childTnLst>
                         <p:par>
-                          <p:cTn id="30" fill="hold">
+                          <p:cTn id="20" fill="hold">
                             <p:stCondLst>
                               <p:cond delay="0"/>
                             </p:stCondLst>
                             <p:childTnLst>
                               <p:par>
-                                <p:cTn id="31" presetID="42" presetClass="entr" presetSubtype="0" fill="hold" grpId="0" nodeType="clickEffect">
+                                <p:cTn id="21" presetID="1" presetClass="entr" presetSubtype="0" fill="hold" grpId="0" nodeType="clickEffect">
                                   <p:stCondLst>
                                     <p:cond delay="0"/>
                                   </p:stCondLst>
                                   <p:childTnLst>
                                     <p:set>
                                       <p:cBhvr>
-                                        <p:cTn id="32" dur="1" fill="hold">
+                                        <p:cTn id="22" dur="1" fill="hold">
                                           <p:stCondLst>
                                             <p:cond delay="0"/>
                                           </p:stCondLst>
@@ -13522,84 +12501,36 @@
                                         <p:strVal val="visible"/>
                                       </p:to>
                                     </p:set>
-                                    <p:animEffect transition="in" filter="fade">
-                                      <p:cBhvr>
-                                        <p:cTn id="33" dur="1000"/>
-                                        <p:tgtEl>
-                                          <p:spTgt spid="7">
-                                            <p:txEl>
-                                              <p:pRg st="4" end="4"/>
-                                            </p:txEl>
-                                          </p:spTgt>
-                                        </p:tgtEl>
-                                      </p:cBhvr>
-                                    </p:animEffect>
-                                    <p:anim calcmode="lin" valueType="num">
-                                      <p:cBhvr>
-                                        <p:cTn id="34" dur="1000" fill="hold"/>
-                                        <p:tgtEl>
-                                          <p:spTgt spid="7">
-                                            <p:txEl>
-                                              <p:pRg st="4" end="4"/>
-                                            </p:txEl>
-                                          </p:spTgt>
-                                        </p:tgtEl>
-                                        <p:attrNameLst>
-                                          <p:attrName>ppt_x</p:attrName>
-                                        </p:attrNameLst>
-                                      </p:cBhvr>
-                                      <p:tavLst>
-                                        <p:tav tm="0">
-                                          <p:val>
-                                            <p:strVal val="#ppt_x"/>
-                                          </p:val>
-                                        </p:tav>
-                                        <p:tav tm="100000">
-                                          <p:val>
-                                            <p:strVal val="#ppt_x"/>
-                                          </p:val>
-                                        </p:tav>
-                                      </p:tavLst>
-                                    </p:anim>
-                                    <p:anim calcmode="lin" valueType="num">
-                                      <p:cBhvr>
-                                        <p:cTn id="35" dur="1000" fill="hold"/>
-                                        <p:tgtEl>
-                                          <p:spTgt spid="7">
-                                            <p:txEl>
-                                              <p:pRg st="4" end="4"/>
-                                            </p:txEl>
-                                          </p:spTgt>
-                                        </p:tgtEl>
-                                        <p:attrNameLst>
-                                          <p:attrName>ppt_y</p:attrName>
-                                        </p:attrNameLst>
-                                      </p:cBhvr>
-                                      <p:tavLst>
-                                        <p:tav tm="0">
-                                          <p:val>
-                                            <p:strVal val="#ppt_y+.1"/>
-                                          </p:val>
-                                        </p:tav>
-                                        <p:tav tm="100000">
-                                          <p:val>
-                                            <p:strVal val="#ppt_y"/>
-                                          </p:val>
-                                        </p:tav>
-                                      </p:tavLst>
-                                    </p:anim>
                                   </p:childTnLst>
                                 </p:cTn>
                               </p:par>
+                            </p:childTnLst>
+                          </p:cTn>
+                        </p:par>
+                      </p:childTnLst>
+                    </p:cTn>
+                  </p:par>
+                  <p:par>
+                    <p:cTn id="23" fill="hold">
+                      <p:stCondLst>
+                        <p:cond delay="indefinite"/>
+                      </p:stCondLst>
+                      <p:childTnLst>
+                        <p:par>
+                          <p:cTn id="24" fill="hold">
+                            <p:stCondLst>
+                              <p:cond delay="0"/>
+                            </p:stCondLst>
+                            <p:childTnLst>
                               <p:par>
-                                <p:cTn id="36" presetID="42" presetClass="entr" presetSubtype="0" fill="hold" grpId="0" nodeType="withEffect">
+                                <p:cTn id="25" presetID="1" presetClass="entr" presetSubtype="0" fill="hold" grpId="0" nodeType="clickEffect">
                                   <p:stCondLst>
                                     <p:cond delay="0"/>
                                   </p:stCondLst>
                                   <p:childTnLst>
                                     <p:set>
                                       <p:cBhvr>
-                                        <p:cTn id="37" dur="1" fill="hold">
+                                        <p:cTn id="26" dur="1" fill="hold">
                                           <p:stCondLst>
                                             <p:cond delay="0"/>
                                           </p:stCondLst>
@@ -13619,266 +12550,6 @@
                                         <p:strVal val="visible"/>
                                       </p:to>
                                     </p:set>
-                                    <p:animEffect transition="in" filter="fade">
-                                      <p:cBhvr>
-                                        <p:cTn id="38" dur="1000"/>
-                                        <p:tgtEl>
-                                          <p:spTgt spid="7">
-                                            <p:txEl>
-                                              <p:pRg st="5" end="5"/>
-                                            </p:txEl>
-                                          </p:spTgt>
-                                        </p:tgtEl>
-                                      </p:cBhvr>
-                                    </p:animEffect>
-                                    <p:anim calcmode="lin" valueType="num">
-                                      <p:cBhvr>
-                                        <p:cTn id="39" dur="1000" fill="hold"/>
-                                        <p:tgtEl>
-                                          <p:spTgt spid="7">
-                                            <p:txEl>
-                                              <p:pRg st="5" end="5"/>
-                                            </p:txEl>
-                                          </p:spTgt>
-                                        </p:tgtEl>
-                                        <p:attrNameLst>
-                                          <p:attrName>ppt_x</p:attrName>
-                                        </p:attrNameLst>
-                                      </p:cBhvr>
-                                      <p:tavLst>
-                                        <p:tav tm="0">
-                                          <p:val>
-                                            <p:strVal val="#ppt_x"/>
-                                          </p:val>
-                                        </p:tav>
-                                        <p:tav tm="100000">
-                                          <p:val>
-                                            <p:strVal val="#ppt_x"/>
-                                          </p:val>
-                                        </p:tav>
-                                      </p:tavLst>
-                                    </p:anim>
-                                    <p:anim calcmode="lin" valueType="num">
-                                      <p:cBhvr>
-                                        <p:cTn id="40" dur="1000" fill="hold"/>
-                                        <p:tgtEl>
-                                          <p:spTgt spid="7">
-                                            <p:txEl>
-                                              <p:pRg st="5" end="5"/>
-                                            </p:txEl>
-                                          </p:spTgt>
-                                        </p:tgtEl>
-                                        <p:attrNameLst>
-                                          <p:attrName>ppt_y</p:attrName>
-                                        </p:attrNameLst>
-                                      </p:cBhvr>
-                                      <p:tavLst>
-                                        <p:tav tm="0">
-                                          <p:val>
-                                            <p:strVal val="#ppt_y+.1"/>
-                                          </p:val>
-                                        </p:tav>
-                                        <p:tav tm="100000">
-                                          <p:val>
-                                            <p:strVal val="#ppt_y"/>
-                                          </p:val>
-                                        </p:tav>
-                                      </p:tavLst>
-                                    </p:anim>
-                                  </p:childTnLst>
-                                </p:cTn>
-                              </p:par>
-                              <p:par>
-                                <p:cTn id="41" presetID="42" presetClass="entr" presetSubtype="0" fill="hold" grpId="0" nodeType="withEffect">
-                                  <p:stCondLst>
-                                    <p:cond delay="0"/>
-                                  </p:stCondLst>
-                                  <p:childTnLst>
-                                    <p:set>
-                                      <p:cBhvr>
-                                        <p:cTn id="42" dur="1" fill="hold">
-                                          <p:stCondLst>
-                                            <p:cond delay="0"/>
-                                          </p:stCondLst>
-                                        </p:cTn>
-                                        <p:tgtEl>
-                                          <p:spTgt spid="7">
-                                            <p:txEl>
-                                              <p:pRg st="6" end="6"/>
-                                            </p:txEl>
-                                          </p:spTgt>
-                                        </p:tgtEl>
-                                        <p:attrNameLst>
-                                          <p:attrName>style.visibility</p:attrName>
-                                        </p:attrNameLst>
-                                      </p:cBhvr>
-                                      <p:to>
-                                        <p:strVal val="visible"/>
-                                      </p:to>
-                                    </p:set>
-                                    <p:animEffect transition="in" filter="fade">
-                                      <p:cBhvr>
-                                        <p:cTn id="43" dur="1000"/>
-                                        <p:tgtEl>
-                                          <p:spTgt spid="7">
-                                            <p:txEl>
-                                              <p:pRg st="6" end="6"/>
-                                            </p:txEl>
-                                          </p:spTgt>
-                                        </p:tgtEl>
-                                      </p:cBhvr>
-                                    </p:animEffect>
-                                    <p:anim calcmode="lin" valueType="num">
-                                      <p:cBhvr>
-                                        <p:cTn id="44" dur="1000" fill="hold"/>
-                                        <p:tgtEl>
-                                          <p:spTgt spid="7">
-                                            <p:txEl>
-                                              <p:pRg st="6" end="6"/>
-                                            </p:txEl>
-                                          </p:spTgt>
-                                        </p:tgtEl>
-                                        <p:attrNameLst>
-                                          <p:attrName>ppt_x</p:attrName>
-                                        </p:attrNameLst>
-                                      </p:cBhvr>
-                                      <p:tavLst>
-                                        <p:tav tm="0">
-                                          <p:val>
-                                            <p:strVal val="#ppt_x"/>
-                                          </p:val>
-                                        </p:tav>
-                                        <p:tav tm="100000">
-                                          <p:val>
-                                            <p:strVal val="#ppt_x"/>
-                                          </p:val>
-                                        </p:tav>
-                                      </p:tavLst>
-                                    </p:anim>
-                                    <p:anim calcmode="lin" valueType="num">
-                                      <p:cBhvr>
-                                        <p:cTn id="45" dur="1000" fill="hold"/>
-                                        <p:tgtEl>
-                                          <p:spTgt spid="7">
-                                            <p:txEl>
-                                              <p:pRg st="6" end="6"/>
-                                            </p:txEl>
-                                          </p:spTgt>
-                                        </p:tgtEl>
-                                        <p:attrNameLst>
-                                          <p:attrName>ppt_y</p:attrName>
-                                        </p:attrNameLst>
-                                      </p:cBhvr>
-                                      <p:tavLst>
-                                        <p:tav tm="0">
-                                          <p:val>
-                                            <p:strVal val="#ppt_y+.1"/>
-                                          </p:val>
-                                        </p:tav>
-                                        <p:tav tm="100000">
-                                          <p:val>
-                                            <p:strVal val="#ppt_y"/>
-                                          </p:val>
-                                        </p:tav>
-                                      </p:tavLst>
-                                    </p:anim>
-                                  </p:childTnLst>
-                                </p:cTn>
-                              </p:par>
-                              <p:par>
-                                <p:cTn id="46" presetID="42" presetClass="entr" presetSubtype="0" fill="hold" grpId="0" nodeType="withEffect">
-                                  <p:stCondLst>
-                                    <p:cond delay="0"/>
-                                  </p:stCondLst>
-                                  <p:childTnLst>
-                                    <p:set>
-                                      <p:cBhvr>
-                                        <p:cTn id="47" dur="1" fill="hold">
-                                          <p:stCondLst>
-                                            <p:cond delay="0"/>
-                                          </p:stCondLst>
-                                        </p:cTn>
-                                        <p:tgtEl>
-                                          <p:spTgt spid="7">
-                                            <p:txEl>
-                                              <p:pRg st="7" end="7"/>
-                                            </p:txEl>
-                                          </p:spTgt>
-                                        </p:tgtEl>
-                                        <p:attrNameLst>
-                                          <p:attrName>style.visibility</p:attrName>
-                                        </p:attrNameLst>
-                                      </p:cBhvr>
-                                      <p:to>
-                                        <p:strVal val="visible"/>
-                                      </p:to>
-                                    </p:set>
-                                    <p:animEffect transition="in" filter="fade">
-                                      <p:cBhvr>
-                                        <p:cTn id="48" dur="1000"/>
-                                        <p:tgtEl>
-                                          <p:spTgt spid="7">
-                                            <p:txEl>
-                                              <p:pRg st="7" end="7"/>
-                                            </p:txEl>
-                                          </p:spTgt>
-                                        </p:tgtEl>
-                                      </p:cBhvr>
-                                    </p:animEffect>
-                                    <p:anim calcmode="lin" valueType="num">
-                                      <p:cBhvr>
-                                        <p:cTn id="49" dur="1000" fill="hold"/>
-                                        <p:tgtEl>
-                                          <p:spTgt spid="7">
-                                            <p:txEl>
-                                              <p:pRg st="7" end="7"/>
-                                            </p:txEl>
-                                          </p:spTgt>
-                                        </p:tgtEl>
-                                        <p:attrNameLst>
-                                          <p:attrName>ppt_x</p:attrName>
-                                        </p:attrNameLst>
-                                      </p:cBhvr>
-                                      <p:tavLst>
-                                        <p:tav tm="0">
-                                          <p:val>
-                                            <p:strVal val="#ppt_x"/>
-                                          </p:val>
-                                        </p:tav>
-                                        <p:tav tm="100000">
-                                          <p:val>
-                                            <p:strVal val="#ppt_x"/>
-                                          </p:val>
-                                        </p:tav>
-                                      </p:tavLst>
-                                    </p:anim>
-                                    <p:anim calcmode="lin" valueType="num">
-                                      <p:cBhvr>
-                                        <p:cTn id="50" dur="1000" fill="hold"/>
-                                        <p:tgtEl>
-                                          <p:spTgt spid="7">
-                                            <p:txEl>
-                                              <p:pRg st="7" end="7"/>
-                                            </p:txEl>
-                                          </p:spTgt>
-                                        </p:tgtEl>
-                                        <p:attrNameLst>
-                                          <p:attrName>ppt_y</p:attrName>
-                                        </p:attrNameLst>
-                                      </p:cBhvr>
-                                      <p:tavLst>
-                                        <p:tav tm="0">
-                                          <p:val>
-                                            <p:strVal val="#ppt_y+.1"/>
-                                          </p:val>
-                                        </p:tav>
-                                        <p:tav tm="100000">
-                                          <p:val>
-                                            <p:strVal val="#ppt_y"/>
-                                          </p:val>
-                                        </p:tav>
-                                      </p:tavLst>
-                                    </p:anim>
                                   </p:childTnLst>
                                 </p:cTn>
                               </p:par>
@@ -13910,13 +12581,13 @@
       </p:par>
     </p:tnLst>
     <p:bldLst>
-      <p:bldP spid="7" grpId="0" build="p"/>
+      <p:bldP spid="7" grpId="0" uiExpand="1" build="p"/>
     </p:bldLst>
   </p:timing>
 </p:sld>
 </file>
 
-<file path=ppt/slides/slide28.xml><?xml version="1.0" encoding="utf-8"?>
+<file path=ppt/slides/slide29.xml><?xml version="1.0" encoding="utf-8"?>
 <p:sld xmlns:a="http://schemas.openxmlformats.org/drawingml/2006/main" xmlns:r="http://schemas.openxmlformats.org/officeDocument/2006/relationships" xmlns:p="http://schemas.openxmlformats.org/presentationml/2006/main">
   <p:cSld>
     <p:bg>
@@ -14240,104 +12911,6 @@
 </p:sld>
 </file>
 
-<file path=ppt/slides/slide29.xml><?xml version="1.0" encoding="utf-8"?>
-<p:sld xmlns:a="http://schemas.openxmlformats.org/drawingml/2006/main" xmlns:r="http://schemas.openxmlformats.org/officeDocument/2006/relationships" xmlns:p="http://schemas.openxmlformats.org/presentationml/2006/main">
-  <p:cSld>
-    <p:spTree>
-      <p:nvGrpSpPr>
-        <p:cNvPr id="1" name=""/>
-        <p:cNvGrpSpPr/>
-        <p:nvPr/>
-      </p:nvGrpSpPr>
-      <p:grpSpPr>
-        <a:xfrm>
-          <a:off x="0" y="0"/>
-          <a:ext cx="0" cy="0"/>
-          <a:chOff x="0" y="0"/>
-          <a:chExt cx="0" cy="0"/>
-        </a:xfrm>
-      </p:grpSpPr>
-      <p:sp>
-        <p:nvSpPr>
-          <p:cNvPr id="2" name="Title 1">
-            <a:extLst>
-              <a:ext uri="{FF2B5EF4-FFF2-40B4-BE49-F238E27FC236}">
-                <a16:creationId xmlns:a16="http://schemas.microsoft.com/office/drawing/2014/main" id="{179B0B2E-FC83-9949-A534-87EF6DE79877}"/>
-              </a:ext>
-            </a:extLst>
-          </p:cNvPr>
-          <p:cNvSpPr>
-            <a:spLocks noGrp="1"/>
-          </p:cNvSpPr>
-          <p:nvPr>
-            <p:ph type="title"/>
-          </p:nvPr>
-        </p:nvSpPr>
-        <p:spPr/>
-        <p:txBody>
-          <a:bodyPr vert="horz" lIns="91440" tIns="45720" rIns="91440" bIns="45720" rtlCol="0" anchor="b">
-            <a:normAutofit/>
-          </a:bodyPr>
-          <a:lstStyle/>
-          <a:p>
-            <a:pPr algn="ctr"/>
-            <a:r>
-              <a:rPr lang="en-US" sz="5400" dirty="0"/>
-              <a:t>F# Samples</a:t>
-            </a:r>
-            <a:endParaRPr lang="en-US" sz="5400" kern="1200" dirty="0">
-              <a:solidFill>
-                <a:schemeClr val="tx1"/>
-              </a:solidFill>
-              <a:latin typeface="+mj-lt"/>
-              <a:ea typeface="+mj-ea"/>
-              <a:cs typeface="+mj-cs"/>
-            </a:endParaRPr>
-          </a:p>
-        </p:txBody>
-      </p:sp>
-      <p:pic>
-        <p:nvPicPr>
-          <p:cNvPr id="5" name="Content Placeholder 4" descr="Graphical user interface, text&#10;&#10;Description automatically generated">
-            <a:extLst>
-              <a:ext uri="{FF2B5EF4-FFF2-40B4-BE49-F238E27FC236}">
-                <a16:creationId xmlns:a16="http://schemas.microsoft.com/office/drawing/2014/main" id="{5593FB75-D9A4-B84B-B0A6-F7693BF6E591}"/>
-              </a:ext>
-            </a:extLst>
-          </p:cNvPr>
-          <p:cNvPicPr>
-            <a:picLocks noGrp="1" noChangeAspect="1"/>
-          </p:cNvPicPr>
-          <p:nvPr>
-            <p:ph idx="1"/>
-          </p:nvPr>
-        </p:nvPicPr>
-        <p:blipFill>
-          <a:blip r:embed="rId2"/>
-          <a:stretch>
-            <a:fillRect/>
-          </a:stretch>
-        </p:blipFill>
-        <p:spPr>
-          <a:xfrm>
-            <a:off x="1643063" y="2239693"/>
-            <a:ext cx="8486775" cy="3357405"/>
-          </a:xfrm>
-        </p:spPr>
-      </p:pic>
-    </p:spTree>
-    <p:extLst>
-      <p:ext uri="{BB962C8B-B14F-4D97-AF65-F5344CB8AC3E}">
-        <p14:creationId xmlns:p14="http://schemas.microsoft.com/office/powerpoint/2010/main" val="864006971"/>
-      </p:ext>
-    </p:extLst>
-  </p:cSld>
-  <p:clrMapOvr>
-    <a:masterClrMapping/>
-  </p:clrMapOvr>
-</p:sld>
-</file>
-
 <file path=ppt/slides/slide3.xml><?xml version="1.0" encoding="utf-8"?>
 <p:sld xmlns:a="http://schemas.openxmlformats.org/drawingml/2006/main" xmlns:r="http://schemas.openxmlformats.org/officeDocument/2006/relationships" xmlns:p="http://schemas.openxmlformats.org/presentationml/2006/main">
   <p:cSld>
@@ -14615,8 +13188,8 @@
         </p:nvSpPr>
         <p:spPr>
           <a:xfrm>
-            <a:off x="3999918" y="498558"/>
-            <a:ext cx="7915856" cy="5860883"/>
+            <a:off x="4027114" y="1835712"/>
+            <a:ext cx="7915856" cy="2305915"/>
           </a:xfrm>
         </p:spPr>
         <p:txBody>
@@ -14710,6 +13283,104 @@
       </p:sp>
       <p:pic>
         <p:nvPicPr>
+          <p:cNvPr id="5" name="Content Placeholder 4" descr="Graphical user interface, text&#10;&#10;Description automatically generated">
+            <a:extLst>
+              <a:ext uri="{FF2B5EF4-FFF2-40B4-BE49-F238E27FC236}">
+                <a16:creationId xmlns:a16="http://schemas.microsoft.com/office/drawing/2014/main" id="{5593FB75-D9A4-B84B-B0A6-F7693BF6E591}"/>
+              </a:ext>
+            </a:extLst>
+          </p:cNvPr>
+          <p:cNvPicPr>
+            <a:picLocks noGrp="1" noChangeAspect="1"/>
+          </p:cNvPicPr>
+          <p:nvPr>
+            <p:ph idx="1"/>
+          </p:nvPr>
+        </p:nvPicPr>
+        <p:blipFill>
+          <a:blip r:embed="rId2"/>
+          <a:stretch>
+            <a:fillRect/>
+          </a:stretch>
+        </p:blipFill>
+        <p:spPr>
+          <a:xfrm>
+            <a:off x="1643063" y="2239693"/>
+            <a:ext cx="8486775" cy="3357405"/>
+          </a:xfrm>
+        </p:spPr>
+      </p:pic>
+    </p:spTree>
+    <p:extLst>
+      <p:ext uri="{BB962C8B-B14F-4D97-AF65-F5344CB8AC3E}">
+        <p14:creationId xmlns:p14="http://schemas.microsoft.com/office/powerpoint/2010/main" val="864006971"/>
+      </p:ext>
+    </p:extLst>
+  </p:cSld>
+  <p:clrMapOvr>
+    <a:masterClrMapping/>
+  </p:clrMapOvr>
+</p:sld>
+</file>
+
+<file path=ppt/slides/slide31.xml><?xml version="1.0" encoding="utf-8"?>
+<p:sld xmlns:a="http://schemas.openxmlformats.org/drawingml/2006/main" xmlns:r="http://schemas.openxmlformats.org/officeDocument/2006/relationships" xmlns:p="http://schemas.openxmlformats.org/presentationml/2006/main">
+  <p:cSld>
+    <p:spTree>
+      <p:nvGrpSpPr>
+        <p:cNvPr id="1" name=""/>
+        <p:cNvGrpSpPr/>
+        <p:nvPr/>
+      </p:nvGrpSpPr>
+      <p:grpSpPr>
+        <a:xfrm>
+          <a:off x="0" y="0"/>
+          <a:ext cx="0" cy="0"/>
+          <a:chOff x="0" y="0"/>
+          <a:chExt cx="0" cy="0"/>
+        </a:xfrm>
+      </p:grpSpPr>
+      <p:sp>
+        <p:nvSpPr>
+          <p:cNvPr id="2" name="Title 1">
+            <a:extLst>
+              <a:ext uri="{FF2B5EF4-FFF2-40B4-BE49-F238E27FC236}">
+                <a16:creationId xmlns:a16="http://schemas.microsoft.com/office/drawing/2014/main" id="{179B0B2E-FC83-9949-A534-87EF6DE79877}"/>
+              </a:ext>
+            </a:extLst>
+          </p:cNvPr>
+          <p:cNvSpPr>
+            <a:spLocks noGrp="1"/>
+          </p:cNvSpPr>
+          <p:nvPr>
+            <p:ph type="title"/>
+          </p:nvPr>
+        </p:nvSpPr>
+        <p:spPr/>
+        <p:txBody>
+          <a:bodyPr vert="horz" lIns="91440" tIns="45720" rIns="91440" bIns="45720" rtlCol="0" anchor="b">
+            <a:normAutofit/>
+          </a:bodyPr>
+          <a:lstStyle/>
+          <a:p>
+            <a:pPr algn="ctr"/>
+            <a:r>
+              <a:rPr lang="en-US" sz="5400" dirty="0"/>
+              <a:t>F# Samples</a:t>
+            </a:r>
+            <a:endParaRPr lang="en-US" sz="5400" kern="1200" dirty="0">
+              <a:solidFill>
+                <a:schemeClr val="tx1"/>
+              </a:solidFill>
+              <a:latin typeface="+mj-lt"/>
+              <a:ea typeface="+mj-ea"/>
+              <a:cs typeface="+mj-cs"/>
+            </a:endParaRPr>
+          </a:p>
+        </p:txBody>
+      </p:sp>
+      <p:pic>
+        <p:nvPicPr>
           <p:cNvPr id="11" name="Content Placeholder 10" descr="Text&#10;&#10;Description automatically generated">
             <a:extLst>
               <a:ext uri="{FF2B5EF4-FFF2-40B4-BE49-F238E27FC236}">
@@ -14750,7 +13421,7 @@
 </p:sld>
 </file>
 
-<file path=ppt/slides/slide31.xml><?xml version="1.0" encoding="utf-8"?>
+<file path=ppt/slides/slide32.xml><?xml version="1.0" encoding="utf-8"?>
 <p:sld xmlns:a="http://schemas.openxmlformats.org/drawingml/2006/main" xmlns:r="http://schemas.openxmlformats.org/officeDocument/2006/relationships" xmlns:p="http://schemas.openxmlformats.org/presentationml/2006/main">
   <p:cSld>
     <p:spTree>
@@ -14848,7 +13519,7 @@
 </p:sld>
 </file>
 
-<file path=ppt/slides/slide32.xml><?xml version="1.0" encoding="utf-8"?>
+<file path=ppt/slides/slide33.xml><?xml version="1.0" encoding="utf-8"?>
 <p:sld xmlns:a="http://schemas.openxmlformats.org/drawingml/2006/main" xmlns:r="http://schemas.openxmlformats.org/officeDocument/2006/relationships" xmlns:p="http://schemas.openxmlformats.org/presentationml/2006/main">
   <p:cSld>
     <p:spTree>
@@ -14946,7 +13617,7 @@
 </p:sld>
 </file>
 
-<file path=ppt/slides/slide33.xml><?xml version="1.0" encoding="utf-8"?>
+<file path=ppt/slides/slide34.xml><?xml version="1.0" encoding="utf-8"?>
 <p:sld xmlns:a="http://schemas.openxmlformats.org/drawingml/2006/main" xmlns:r="http://schemas.openxmlformats.org/officeDocument/2006/relationships" xmlns:p="http://schemas.openxmlformats.org/presentationml/2006/main">
   <p:cSld>
     <p:spTree>
@@ -15044,7 +13715,7 @@
 </p:sld>
 </file>
 
-<file path=ppt/slides/slide34.xml><?xml version="1.0" encoding="utf-8"?>
+<file path=ppt/slides/slide35.xml><?xml version="1.0" encoding="utf-8"?>
 <p:sld xmlns:a="http://schemas.openxmlformats.org/drawingml/2006/main" xmlns:r="http://schemas.openxmlformats.org/officeDocument/2006/relationships" xmlns:p="http://schemas.openxmlformats.org/presentationml/2006/main">
   <p:cSld>
     <p:bg>
@@ -15265,7 +13936,15 @@
                   <a:schemeClr val="bg1"/>
                 </a:solidFill>
               </a:rPr>
-              <a:t>Basics of Functional Programming are everywhere, it is not an option to be blind to it anymore</a:t>
+              <a:t>Functional Programming is here to stay, there’s only advantages to understand this </a:t>
+            </a:r>
+            <a:r>
+              <a:rPr lang="en-GB" sz="3000" b="1" dirty="0">
+                <a:solidFill>
+                  <a:schemeClr val="bg1"/>
+                </a:solidFill>
+              </a:rPr>
+              <a:t>point of view</a:t>
             </a:r>
           </a:p>
           <a:p>
@@ -15275,7 +13954,7 @@
                   <a:schemeClr val="bg1"/>
                 </a:solidFill>
               </a:rPr>
-              <a:t>C# is not dead and it continues to evolve… however having another point of view can only make you better at what you do…</a:t>
+              <a:t>C# is not dead and it continues to evolve… F# is just another option on the .NET platform</a:t>
             </a:r>
           </a:p>
           <a:p>
@@ -15285,23 +13964,17 @@
                   <a:schemeClr val="bg1"/>
                 </a:solidFill>
               </a:rPr>
-              <a:t>F# is not that big of a stretch since it is still </a:t>
-            </a:r>
-            <a:r>
-              <a:rPr lang="en-GB" sz="3000" b="1" u="sng" dirty="0">
-                <a:solidFill>
-                  <a:schemeClr val="bg1"/>
-                </a:solidFill>
-              </a:rPr>
-              <a:t>.NET</a:t>
-            </a:r>
+              <a:t>F# is mature, this is not a toy language by any means</a:t>
+            </a:r>
+          </a:p>
+          <a:p>
             <a:r>
               <a:rPr lang="en-GB" sz="3000" dirty="0">
                 <a:solidFill>
                   <a:schemeClr val="bg1"/>
                 </a:solidFill>
               </a:rPr>
-              <a:t> and it is has really mature ecosystem</a:t>
+              <a:t>F# has influenced C# for the last 6 years (at least)</a:t>
             </a:r>
           </a:p>
           <a:p>
@@ -15679,6 +14352,121 @@
                       </p:childTnLst>
                     </p:cTn>
                   </p:par>
+                  <p:par>
+                    <p:cTn id="24" fill="hold">
+                      <p:stCondLst>
+                        <p:cond delay="indefinite"/>
+                      </p:stCondLst>
+                      <p:childTnLst>
+                        <p:par>
+                          <p:cTn id="25" fill="hold">
+                            <p:stCondLst>
+                              <p:cond delay="0"/>
+                            </p:stCondLst>
+                            <p:childTnLst>
+                              <p:par>
+                                <p:cTn id="26" presetID="42" presetClass="entr" presetSubtype="0" fill="hold" grpId="0" nodeType="clickEffect">
+                                  <p:stCondLst>
+                                    <p:cond delay="0"/>
+                                  </p:stCondLst>
+                                  <p:childTnLst>
+                                    <p:set>
+                                      <p:cBhvr>
+                                        <p:cTn id="27" dur="1" fill="hold">
+                                          <p:stCondLst>
+                                            <p:cond delay="0"/>
+                                          </p:stCondLst>
+                                        </p:cTn>
+                                        <p:tgtEl>
+                                          <p:spTgt spid="7">
+                                            <p:txEl>
+                                              <p:pRg st="3" end="3"/>
+                                            </p:txEl>
+                                          </p:spTgt>
+                                        </p:tgtEl>
+                                        <p:attrNameLst>
+                                          <p:attrName>style.visibility</p:attrName>
+                                        </p:attrNameLst>
+                                      </p:cBhvr>
+                                      <p:to>
+                                        <p:strVal val="visible"/>
+                                      </p:to>
+                                    </p:set>
+                                    <p:animEffect transition="in" filter="fade">
+                                      <p:cBhvr>
+                                        <p:cTn id="28" dur="1000"/>
+                                        <p:tgtEl>
+                                          <p:spTgt spid="7">
+                                            <p:txEl>
+                                              <p:pRg st="3" end="3"/>
+                                            </p:txEl>
+                                          </p:spTgt>
+                                        </p:tgtEl>
+                                      </p:cBhvr>
+                                    </p:animEffect>
+                                    <p:anim calcmode="lin" valueType="num">
+                                      <p:cBhvr>
+                                        <p:cTn id="29" dur="1000" fill="hold"/>
+                                        <p:tgtEl>
+                                          <p:spTgt spid="7">
+                                            <p:txEl>
+                                              <p:pRg st="3" end="3"/>
+                                            </p:txEl>
+                                          </p:spTgt>
+                                        </p:tgtEl>
+                                        <p:attrNameLst>
+                                          <p:attrName>ppt_x</p:attrName>
+                                        </p:attrNameLst>
+                                      </p:cBhvr>
+                                      <p:tavLst>
+                                        <p:tav tm="0">
+                                          <p:val>
+                                            <p:strVal val="#ppt_x"/>
+                                          </p:val>
+                                        </p:tav>
+                                        <p:tav tm="100000">
+                                          <p:val>
+                                            <p:strVal val="#ppt_x"/>
+                                          </p:val>
+                                        </p:tav>
+                                      </p:tavLst>
+                                    </p:anim>
+                                    <p:anim calcmode="lin" valueType="num">
+                                      <p:cBhvr>
+                                        <p:cTn id="30" dur="1000" fill="hold"/>
+                                        <p:tgtEl>
+                                          <p:spTgt spid="7">
+                                            <p:txEl>
+                                              <p:pRg st="3" end="3"/>
+                                            </p:txEl>
+                                          </p:spTgt>
+                                        </p:tgtEl>
+                                        <p:attrNameLst>
+                                          <p:attrName>ppt_y</p:attrName>
+                                        </p:attrNameLst>
+                                      </p:cBhvr>
+                                      <p:tavLst>
+                                        <p:tav tm="0">
+                                          <p:val>
+                                            <p:strVal val="#ppt_y+.1"/>
+                                          </p:val>
+                                        </p:tav>
+                                        <p:tav tm="100000">
+                                          <p:val>
+                                            <p:strVal val="#ppt_y"/>
+                                          </p:val>
+                                        </p:tav>
+                                      </p:tavLst>
+                                    </p:anim>
+                                  </p:childTnLst>
+                                </p:cTn>
+                              </p:par>
+                            </p:childTnLst>
+                          </p:cTn>
+                        </p:par>
+                      </p:childTnLst>
+                    </p:cTn>
+                  </p:par>
                 </p:childTnLst>
               </p:cTn>
               <p:prevCondLst>
@@ -15707,7 +14495,7 @@
 </p:sld>
 </file>
 
-<file path=ppt/slides/slide35.xml><?xml version="1.0" encoding="utf-8"?>
+<file path=ppt/slides/slide36.xml><?xml version="1.0" encoding="utf-8"?>
 <p:sld xmlns:a="http://schemas.openxmlformats.org/drawingml/2006/main" xmlns:r="http://schemas.openxmlformats.org/officeDocument/2006/relationships" xmlns:p="http://schemas.openxmlformats.org/presentationml/2006/main">
   <p:cSld>
     <p:bg>
@@ -16468,7 +15256,7 @@
                             </p:stCondLst>
                             <p:childTnLst>
                               <p:par>
-                                <p:cTn id="5" presetID="2" presetClass="entr" presetSubtype="4" fill="hold" grpId="0" nodeType="clickEffect">
+                                <p:cTn id="5" presetID="1" presetClass="entr" presetSubtype="0" fill="hold" grpId="0" nodeType="clickEffect">
                                   <p:stCondLst>
                                     <p:cond delay="0"/>
                                   </p:stCondLst>
@@ -16495,60 +15283,6 @@
                                         <p:strVal val="visible"/>
                                       </p:to>
                                     </p:set>
-                                    <p:anim calcmode="lin" valueType="num">
-                                      <p:cBhvr additive="base">
-                                        <p:cTn id="7" dur="500" fill="hold"/>
-                                        <p:tgtEl>
-                                          <p:spTgt spid="3">
-                                            <p:txEl>
-                                              <p:pRg st="0" end="0"/>
-                                            </p:txEl>
-                                          </p:spTgt>
-                                        </p:tgtEl>
-                                        <p:attrNameLst>
-                                          <p:attrName>ppt_x</p:attrName>
-                                        </p:attrNameLst>
-                                      </p:cBhvr>
-                                      <p:tavLst>
-                                        <p:tav tm="0">
-                                          <p:val>
-                                            <p:strVal val="#ppt_x"/>
-                                          </p:val>
-                                        </p:tav>
-                                        <p:tav tm="100000">
-                                          <p:val>
-                                            <p:strVal val="#ppt_x"/>
-                                          </p:val>
-                                        </p:tav>
-                                      </p:tavLst>
-                                    </p:anim>
-                                    <p:anim calcmode="lin" valueType="num">
-                                      <p:cBhvr additive="base">
-                                        <p:cTn id="8" dur="500" fill="hold"/>
-                                        <p:tgtEl>
-                                          <p:spTgt spid="3">
-                                            <p:txEl>
-                                              <p:pRg st="0" end="0"/>
-                                            </p:txEl>
-                                          </p:spTgt>
-                                        </p:tgtEl>
-                                        <p:attrNameLst>
-                                          <p:attrName>ppt_y</p:attrName>
-                                        </p:attrNameLst>
-                                      </p:cBhvr>
-                                      <p:tavLst>
-                                        <p:tav tm="0">
-                                          <p:val>
-                                            <p:strVal val="1+#ppt_h/2"/>
-                                          </p:val>
-                                        </p:tav>
-                                        <p:tav tm="100000">
-                                          <p:val>
-                                            <p:strVal val="#ppt_y"/>
-                                          </p:val>
-                                        </p:tav>
-                                      </p:tavLst>
-                                    </p:anim>
                                   </p:childTnLst>
                                 </p:cTn>
                               </p:par>
@@ -16559,26 +15293,26 @@
                     </p:cTn>
                   </p:par>
                   <p:par>
-                    <p:cTn id="9" fill="hold">
+                    <p:cTn id="7" fill="hold">
                       <p:stCondLst>
                         <p:cond delay="indefinite"/>
                       </p:stCondLst>
                       <p:childTnLst>
                         <p:par>
-                          <p:cTn id="10" fill="hold">
+                          <p:cTn id="8" fill="hold">
                             <p:stCondLst>
                               <p:cond delay="0"/>
                             </p:stCondLst>
                             <p:childTnLst>
                               <p:par>
-                                <p:cTn id="11" presetID="2" presetClass="entr" presetSubtype="4" fill="hold" grpId="0" nodeType="clickEffect">
+                                <p:cTn id="9" presetID="1" presetClass="entr" presetSubtype="0" fill="hold" grpId="0" nodeType="clickEffect">
                                   <p:stCondLst>
                                     <p:cond delay="0"/>
                                   </p:stCondLst>
                                   <p:childTnLst>
                                     <p:set>
                                       <p:cBhvr>
-                                        <p:cTn id="12" dur="1" fill="hold">
+                                        <p:cTn id="10" dur="1" fill="hold">
                                           <p:stCondLst>
                                             <p:cond delay="0"/>
                                           </p:stCondLst>
@@ -16598,60 +15332,55 @@
                                         <p:strVal val="visible"/>
                                       </p:to>
                                     </p:set>
-                                    <p:anim calcmode="lin" valueType="num">
-                                      <p:cBhvr additive="base">
-                                        <p:cTn id="13" dur="500" fill="hold"/>
+                                  </p:childTnLst>
+                                </p:cTn>
+                              </p:par>
+                            </p:childTnLst>
+                          </p:cTn>
+                        </p:par>
+                      </p:childTnLst>
+                    </p:cTn>
+                  </p:par>
+                  <p:par>
+                    <p:cTn id="11" fill="hold">
+                      <p:stCondLst>
+                        <p:cond delay="indefinite"/>
+                      </p:stCondLst>
+                      <p:childTnLst>
+                        <p:par>
+                          <p:cTn id="12" fill="hold">
+                            <p:stCondLst>
+                              <p:cond delay="0"/>
+                            </p:stCondLst>
+                            <p:childTnLst>
+                              <p:par>
+                                <p:cTn id="13" presetID="1" presetClass="entr" presetSubtype="0" fill="hold" grpId="0" nodeType="clickEffect">
+                                  <p:stCondLst>
+                                    <p:cond delay="0"/>
+                                  </p:stCondLst>
+                                  <p:childTnLst>
+                                    <p:set>
+                                      <p:cBhvr>
+                                        <p:cTn id="14" dur="1" fill="hold">
+                                          <p:stCondLst>
+                                            <p:cond delay="0"/>
+                                          </p:stCondLst>
+                                        </p:cTn>
                                         <p:tgtEl>
                                           <p:spTgt spid="3">
                                             <p:txEl>
-                                              <p:pRg st="1" end="1"/>
+                                              <p:pRg st="2" end="2"/>
                                             </p:txEl>
                                           </p:spTgt>
                                         </p:tgtEl>
                                         <p:attrNameLst>
-                                          <p:attrName>ppt_x</p:attrName>
+                                          <p:attrName>style.visibility</p:attrName>
                                         </p:attrNameLst>
                                       </p:cBhvr>
-                                      <p:tavLst>
-                                        <p:tav tm="0">
-                                          <p:val>
-                                            <p:strVal val="#ppt_x"/>
-                                          </p:val>
-                                        </p:tav>
-                                        <p:tav tm="100000">
-                                          <p:val>
-                                            <p:strVal val="#ppt_x"/>
-                                          </p:val>
-                                        </p:tav>
-                                      </p:tavLst>
-                                    </p:anim>
-                                    <p:anim calcmode="lin" valueType="num">
-                                      <p:cBhvr additive="base">
-                                        <p:cTn id="14" dur="500" fill="hold"/>
-                                        <p:tgtEl>
-                                          <p:spTgt spid="3">
-                                            <p:txEl>
-                                              <p:pRg st="1" end="1"/>
-                                            </p:txEl>
-                                          </p:spTgt>
-                                        </p:tgtEl>
-                                        <p:attrNameLst>
-                                          <p:attrName>ppt_y</p:attrName>
-                                        </p:attrNameLst>
-                                      </p:cBhvr>
-                                      <p:tavLst>
-                                        <p:tav tm="0">
-                                          <p:val>
-                                            <p:strVal val="1+#ppt_h/2"/>
-                                          </p:val>
-                                        </p:tav>
-                                        <p:tav tm="100000">
-                                          <p:val>
-                                            <p:strVal val="#ppt_y"/>
-                                          </p:val>
-                                        </p:tav>
-                                      </p:tavLst>
-                                    </p:anim>
+                                      <p:to>
+                                        <p:strVal val="visible"/>
+                                      </p:to>
+                                    </p:set>
                                   </p:childTnLst>
                                 </p:cTn>
                               </p:par>
@@ -16674,7 +15403,7 @@
                             </p:stCondLst>
                             <p:childTnLst>
                               <p:par>
-                                <p:cTn id="17" presetID="2" presetClass="entr" presetSubtype="4" fill="hold" grpId="0" nodeType="clickEffect">
+                                <p:cTn id="17" presetID="1" presetClass="entr" presetSubtype="0" fill="hold" grpId="0" nodeType="clickEffect">
                                   <p:stCondLst>
                                     <p:cond delay="0"/>
                                   </p:stCondLst>
@@ -16682,109 +15411,6 @@
                                     <p:set>
                                       <p:cBhvr>
                                         <p:cTn id="18" dur="1" fill="hold">
-                                          <p:stCondLst>
-                                            <p:cond delay="0"/>
-                                          </p:stCondLst>
-                                        </p:cTn>
-                                        <p:tgtEl>
-                                          <p:spTgt spid="3">
-                                            <p:txEl>
-                                              <p:pRg st="2" end="2"/>
-                                            </p:txEl>
-                                          </p:spTgt>
-                                        </p:tgtEl>
-                                        <p:attrNameLst>
-                                          <p:attrName>style.visibility</p:attrName>
-                                        </p:attrNameLst>
-                                      </p:cBhvr>
-                                      <p:to>
-                                        <p:strVal val="visible"/>
-                                      </p:to>
-                                    </p:set>
-                                    <p:anim calcmode="lin" valueType="num">
-                                      <p:cBhvr additive="base">
-                                        <p:cTn id="19" dur="500" fill="hold"/>
-                                        <p:tgtEl>
-                                          <p:spTgt spid="3">
-                                            <p:txEl>
-                                              <p:pRg st="2" end="2"/>
-                                            </p:txEl>
-                                          </p:spTgt>
-                                        </p:tgtEl>
-                                        <p:attrNameLst>
-                                          <p:attrName>ppt_x</p:attrName>
-                                        </p:attrNameLst>
-                                      </p:cBhvr>
-                                      <p:tavLst>
-                                        <p:tav tm="0">
-                                          <p:val>
-                                            <p:strVal val="#ppt_x"/>
-                                          </p:val>
-                                        </p:tav>
-                                        <p:tav tm="100000">
-                                          <p:val>
-                                            <p:strVal val="#ppt_x"/>
-                                          </p:val>
-                                        </p:tav>
-                                      </p:tavLst>
-                                    </p:anim>
-                                    <p:anim calcmode="lin" valueType="num">
-                                      <p:cBhvr additive="base">
-                                        <p:cTn id="20" dur="500" fill="hold"/>
-                                        <p:tgtEl>
-                                          <p:spTgt spid="3">
-                                            <p:txEl>
-                                              <p:pRg st="2" end="2"/>
-                                            </p:txEl>
-                                          </p:spTgt>
-                                        </p:tgtEl>
-                                        <p:attrNameLst>
-                                          <p:attrName>ppt_y</p:attrName>
-                                        </p:attrNameLst>
-                                      </p:cBhvr>
-                                      <p:tavLst>
-                                        <p:tav tm="0">
-                                          <p:val>
-                                            <p:strVal val="1+#ppt_h/2"/>
-                                          </p:val>
-                                        </p:tav>
-                                        <p:tav tm="100000">
-                                          <p:val>
-                                            <p:strVal val="#ppt_y"/>
-                                          </p:val>
-                                        </p:tav>
-                                      </p:tavLst>
-                                    </p:anim>
-                                  </p:childTnLst>
-                                </p:cTn>
-                              </p:par>
-                            </p:childTnLst>
-                          </p:cTn>
-                        </p:par>
-                      </p:childTnLst>
-                    </p:cTn>
-                  </p:par>
-                  <p:par>
-                    <p:cTn id="21" fill="hold">
-                      <p:stCondLst>
-                        <p:cond delay="indefinite"/>
-                      </p:stCondLst>
-                      <p:childTnLst>
-                        <p:par>
-                          <p:cTn id="22" fill="hold">
-                            <p:stCondLst>
-                              <p:cond delay="0"/>
-                            </p:stCondLst>
-                            <p:childTnLst>
-                              <p:par>
-                                <p:cTn id="23" presetID="2" presetClass="entr" presetSubtype="4" fill="hold" grpId="0" nodeType="clickEffect">
-                                  <p:stCondLst>
-                                    <p:cond delay="0"/>
-                                  </p:stCondLst>
-                                  <p:childTnLst>
-                                    <p:set>
-                                      <p:cBhvr>
-                                        <p:cTn id="24" dur="1" fill="hold">
                                           <p:stCondLst>
                                             <p:cond delay="0"/>
                                           </p:stCondLst>
@@ -16804,60 +15430,6 @@
                                         <p:strVal val="visible"/>
                                       </p:to>
                                     </p:set>
-                                    <p:anim calcmode="lin" valueType="num">
-                                      <p:cBhvr additive="base">
-                                        <p:cTn id="25" dur="500" fill="hold"/>
-                                        <p:tgtEl>
-                                          <p:spTgt spid="3">
-                                            <p:txEl>
-                                              <p:pRg st="3" end="3"/>
-                                            </p:txEl>
-                                          </p:spTgt>
-                                        </p:tgtEl>
-                                        <p:attrNameLst>
-                                          <p:attrName>ppt_x</p:attrName>
-                                        </p:attrNameLst>
-                                      </p:cBhvr>
-                                      <p:tavLst>
-                                        <p:tav tm="0">
-                                          <p:val>
-                                            <p:strVal val="#ppt_x"/>
-                                          </p:val>
-                                        </p:tav>
-                                        <p:tav tm="100000">
-                                          <p:val>
-                                            <p:strVal val="#ppt_x"/>
-                                          </p:val>
-                                        </p:tav>
-                                      </p:tavLst>
-                                    </p:anim>
-                                    <p:anim calcmode="lin" valueType="num">
-                                      <p:cBhvr additive="base">
-                                        <p:cTn id="26" dur="500" fill="hold"/>
-                                        <p:tgtEl>
-                                          <p:spTgt spid="3">
-                                            <p:txEl>
-                                              <p:pRg st="3" end="3"/>
-                                            </p:txEl>
-                                          </p:spTgt>
-                                        </p:tgtEl>
-                                        <p:attrNameLst>
-                                          <p:attrName>ppt_y</p:attrName>
-                                        </p:attrNameLst>
-                                      </p:cBhvr>
-                                      <p:tavLst>
-                                        <p:tav tm="0">
-                                          <p:val>
-                                            <p:strVal val="1+#ppt_h/2"/>
-                                          </p:val>
-                                        </p:tav>
-                                        <p:tav tm="100000">
-                                          <p:val>
-                                            <p:strVal val="#ppt_y"/>
-                                          </p:val>
-                                        </p:tav>
-                                      </p:tavLst>
-                                    </p:anim>
                                   </p:childTnLst>
                                 </p:cTn>
                               </p:par>
@@ -16868,26 +15440,26 @@
                     </p:cTn>
                   </p:par>
                   <p:par>
-                    <p:cTn id="27" fill="hold">
+                    <p:cTn id="19" fill="hold">
                       <p:stCondLst>
                         <p:cond delay="indefinite"/>
                       </p:stCondLst>
                       <p:childTnLst>
                         <p:par>
-                          <p:cTn id="28" fill="hold">
+                          <p:cTn id="20" fill="hold">
                             <p:stCondLst>
                               <p:cond delay="0"/>
                             </p:stCondLst>
                             <p:childTnLst>
                               <p:par>
-                                <p:cTn id="29" presetID="2" presetClass="entr" presetSubtype="4" fill="hold" grpId="0" nodeType="clickEffect">
+                                <p:cTn id="21" presetID="1" presetClass="entr" presetSubtype="0" fill="hold" grpId="0" nodeType="clickEffect">
                                   <p:stCondLst>
                                     <p:cond delay="0"/>
                                   </p:stCondLst>
                                   <p:childTnLst>
                                     <p:set>
                                       <p:cBhvr>
-                                        <p:cTn id="30" dur="1" fill="hold">
+                                        <p:cTn id="22" dur="1" fill="hold">
                                           <p:stCondLst>
                                             <p:cond delay="0"/>
                                           </p:stCondLst>
@@ -16907,60 +15479,6 @@
                                         <p:strVal val="visible"/>
                                       </p:to>
                                     </p:set>
-                                    <p:anim calcmode="lin" valueType="num">
-                                      <p:cBhvr additive="base">
-                                        <p:cTn id="31" dur="500" fill="hold"/>
-                                        <p:tgtEl>
-                                          <p:spTgt spid="3">
-                                            <p:txEl>
-                                              <p:pRg st="4" end="4"/>
-                                            </p:txEl>
-                                          </p:spTgt>
-                                        </p:tgtEl>
-                                        <p:attrNameLst>
-                                          <p:attrName>ppt_x</p:attrName>
-                                        </p:attrNameLst>
-                                      </p:cBhvr>
-                                      <p:tavLst>
-                                        <p:tav tm="0">
-                                          <p:val>
-                                            <p:strVal val="#ppt_x"/>
-                                          </p:val>
-                                        </p:tav>
-                                        <p:tav tm="100000">
-                                          <p:val>
-                                            <p:strVal val="#ppt_x"/>
-                                          </p:val>
-                                        </p:tav>
-                                      </p:tavLst>
-                                    </p:anim>
-                                    <p:anim calcmode="lin" valueType="num">
-                                      <p:cBhvr additive="base">
-                                        <p:cTn id="32" dur="500" fill="hold"/>
-                                        <p:tgtEl>
-                                          <p:spTgt spid="3">
-                                            <p:txEl>
-                                              <p:pRg st="4" end="4"/>
-                                            </p:txEl>
-                                          </p:spTgt>
-                                        </p:tgtEl>
-                                        <p:attrNameLst>
-                                          <p:attrName>ppt_y</p:attrName>
-                                        </p:attrNameLst>
-                                      </p:cBhvr>
-                                      <p:tavLst>
-                                        <p:tav tm="0">
-                                          <p:val>
-                                            <p:strVal val="1+#ppt_h/2"/>
-                                          </p:val>
-                                        </p:tav>
-                                        <p:tav tm="100000">
-                                          <p:val>
-                                            <p:strVal val="#ppt_y"/>
-                                          </p:val>
-                                        </p:tav>
-                                      </p:tavLst>
-                                    </p:anim>
                                   </p:childTnLst>
                                 </p:cTn>
                               </p:par>
@@ -17298,14 +15816,16 @@
           <a:lstStyle/>
           <a:p>
             <a:pPr algn="ctr"/>
-            <a:endParaRPr lang="en-US" sz="2400" kern="1200">
-              <a:solidFill>
-                <a:schemeClr val="tx1"/>
-              </a:solidFill>
-              <a:latin typeface="+mn-lt"/>
-              <a:ea typeface="+mn-ea"/>
-              <a:cs typeface="+mn-cs"/>
-            </a:endParaRPr>
+            <a:r>
+              <a:rPr lang="en-US" i="1" dirty="0">
+                <a:solidFill>
+                  <a:schemeClr val="bg2">
+                    <a:lumMod val="75000"/>
+                  </a:schemeClr>
+                </a:solidFill>
+              </a:rPr>
+              <a:t>Before going further…</a:t>
+            </a:r>
           </a:p>
         </p:txBody>
       </p:sp>
@@ -18090,7 +16610,7 @@
                   </a:schemeClr>
                 </a:solidFill>
               </a:rPr>
-              <a:t>Theory has been around since 1930’s and first functional language appeared in the 50’s, also functional paradigm been spreading for a while now: C#, Java, Kotlin, Rust …</a:t>
+              <a:t>Theory around since the 30’s and first language appeared in the 50’s.</a:t>
             </a:r>
           </a:p>
         </p:txBody>
@@ -20052,6 +18572,49 @@
 </a:themeOverride>
 </file>
 
+<file path=ppt/theme/themeOverride21.xml><?xml version="1.0" encoding="utf-8"?>
+<a:themeOverride xmlns:a="http://schemas.openxmlformats.org/drawingml/2006/main">
+  <a:clrScheme name="Office">
+    <a:dk1>
+      <a:sysClr val="windowText" lastClr="000000"/>
+    </a:dk1>
+    <a:lt1>
+      <a:sysClr val="window" lastClr="FFFFFF"/>
+    </a:lt1>
+    <a:dk2>
+      <a:srgbClr val="44546A"/>
+    </a:dk2>
+    <a:lt2>
+      <a:srgbClr val="E7E6E6"/>
+    </a:lt2>
+    <a:accent1>
+      <a:srgbClr val="4472C4"/>
+    </a:accent1>
+    <a:accent2>
+      <a:srgbClr val="ED7D31"/>
+    </a:accent2>
+    <a:accent3>
+      <a:srgbClr val="A5A5A5"/>
+    </a:accent3>
+    <a:accent4>
+      <a:srgbClr val="FFC000"/>
+    </a:accent4>
+    <a:accent5>
+      <a:srgbClr val="5B9BD5"/>
+    </a:accent5>
+    <a:accent6>
+      <a:srgbClr val="70AD47"/>
+    </a:accent6>
+    <a:hlink>
+      <a:srgbClr val="0563C1"/>
+    </a:hlink>
+    <a:folHlink>
+      <a:srgbClr val="954F72"/>
+    </a:folHlink>
+  </a:clrScheme>
+</a:themeOverride>
+</file>
+
 <file path=ppt/theme/themeOverride3.xml><?xml version="1.0" encoding="utf-8"?>
 <a:themeOverride xmlns:a="http://schemas.openxmlformats.org/drawingml/2006/main">
   <a:clrScheme name="Office">

</xml_diff>

<commit_message>
chore: handle exceptions better within the controller
</commit_message>
<xml_diff>
--- a/WhyFSharp.pptx
+++ b/WhyFSharp.pptx
@@ -5,7 +5,7 @@
     <p:sldMasterId id="2147483648" r:id="rId1"/>
   </p:sldMasterIdLst>
   <p:notesMasterIdLst>
-    <p:notesMasterId r:id="rId45"/>
+    <p:notesMasterId r:id="rId46"/>
   </p:notesMasterIdLst>
   <p:sldIdLst>
     <p:sldId id="256" r:id="rId2"/>
@@ -25,32 +25,33 @@
     <p:sldId id="267" r:id="rId16"/>
     <p:sldId id="268" r:id="rId17"/>
     <p:sldId id="270" r:id="rId18"/>
-    <p:sldId id="272" r:id="rId19"/>
-    <p:sldId id="274" r:id="rId20"/>
+    <p:sldId id="303" r:id="rId19"/>
+    <p:sldId id="272" r:id="rId20"/>
     <p:sldId id="271" r:id="rId21"/>
-    <p:sldId id="273" r:id="rId22"/>
-    <p:sldId id="294" r:id="rId23"/>
-    <p:sldId id="275" r:id="rId24"/>
-    <p:sldId id="276" r:id="rId25"/>
-    <p:sldId id="277" r:id="rId26"/>
-    <p:sldId id="279" r:id="rId27"/>
-    <p:sldId id="278" r:id="rId28"/>
-    <p:sldId id="281" r:id="rId29"/>
-    <p:sldId id="282" r:id="rId30"/>
-    <p:sldId id="286" r:id="rId31"/>
-    <p:sldId id="289" r:id="rId32"/>
-    <p:sldId id="290" r:id="rId33"/>
-    <p:sldId id="291" r:id="rId34"/>
-    <p:sldId id="292" r:id="rId35"/>
-    <p:sldId id="293" r:id="rId36"/>
-    <p:sldId id="284" r:id="rId37"/>
-    <p:sldId id="285" r:id="rId38"/>
-    <p:sldId id="295" r:id="rId39"/>
-    <p:sldId id="297" r:id="rId40"/>
-    <p:sldId id="298" r:id="rId41"/>
-    <p:sldId id="299" r:id="rId42"/>
-    <p:sldId id="300" r:id="rId43"/>
-    <p:sldId id="301" r:id="rId44"/>
+    <p:sldId id="274" r:id="rId22"/>
+    <p:sldId id="273" r:id="rId23"/>
+    <p:sldId id="294" r:id="rId24"/>
+    <p:sldId id="275" r:id="rId25"/>
+    <p:sldId id="276" r:id="rId26"/>
+    <p:sldId id="277" r:id="rId27"/>
+    <p:sldId id="279" r:id="rId28"/>
+    <p:sldId id="278" r:id="rId29"/>
+    <p:sldId id="281" r:id="rId30"/>
+    <p:sldId id="282" r:id="rId31"/>
+    <p:sldId id="286" r:id="rId32"/>
+    <p:sldId id="289" r:id="rId33"/>
+    <p:sldId id="290" r:id="rId34"/>
+    <p:sldId id="291" r:id="rId35"/>
+    <p:sldId id="292" r:id="rId36"/>
+    <p:sldId id="293" r:id="rId37"/>
+    <p:sldId id="284" r:id="rId38"/>
+    <p:sldId id="285" r:id="rId39"/>
+    <p:sldId id="295" r:id="rId40"/>
+    <p:sldId id="297" r:id="rId41"/>
+    <p:sldId id="298" r:id="rId42"/>
+    <p:sldId id="299" r:id="rId43"/>
+    <p:sldId id="300" r:id="rId44"/>
+    <p:sldId id="301" r:id="rId45"/>
   </p:sldIdLst>
   <p:sldSz cx="12192000" cy="6858000"/>
   <p:notesSz cx="6858000" cy="9144000"/>
@@ -6524,7 +6525,7 @@
                   </a:schemeClr>
                 </a:solidFill>
               </a:rPr>
-              <a:t>Not my opinion, just have a look at the language space for the last 15 years…</a:t>
+              <a:t>Not my opinion, just have a look at the language space for the last 15 to 20 years…</a:t>
             </a:r>
           </a:p>
         </p:txBody>
@@ -6819,7 +6820,7 @@
         <p:spPr>
           <a:xfrm>
             <a:off x="4038599" y="3982504"/>
-            <a:ext cx="7188199" cy="2610801"/>
+            <a:ext cx="7188199" cy="1725167"/>
           </a:xfrm>
         </p:spPr>
         <p:txBody>
@@ -6831,7 +6832,7 @@
             <a:pPr marL="285750"/>
             <a:r>
               <a:rPr lang="en-US" sz="2000" dirty="0"/>
-              <a:t>An object of class </a:t>
+              <a:t>An instance of class </a:t>
             </a:r>
             <a:r>
               <a:rPr lang="en-US" sz="2000" b="1" dirty="0"/>
@@ -7584,7 +7585,13 @@
     </p:bg>
     <p:spTree>
       <p:nvGrpSpPr>
-        <p:cNvPr id="1" name=""/>
+        <p:cNvPr id="1" name="">
+          <a:extLst>
+            <a:ext uri="{FF2B5EF4-FFF2-40B4-BE49-F238E27FC236}">
+              <a16:creationId xmlns:a16="http://schemas.microsoft.com/office/drawing/2014/main" id="{02DEC265-5A67-42DF-C39C-235F07FAE195}"/>
+            </a:ext>
+          </a:extLst>
+        </p:cNvPr>
         <p:cNvGrpSpPr/>
         <p:nvPr/>
       </p:nvGrpSpPr>
@@ -7598,10 +7605,10 @@
       </p:grpSpPr>
       <p:sp>
         <p:nvSpPr>
-          <p:cNvPr id="12" name="Rectangle 11">
-            <a:extLst>
-              <a:ext uri="{FF2B5EF4-FFF2-40B4-BE49-F238E27FC236}">
-                <a16:creationId xmlns:a16="http://schemas.microsoft.com/office/drawing/2014/main" id="{42A5316D-ED2F-4F89-B4B4-8D9240B1A348}"/>
+          <p:cNvPr id="21" name="Rectangle 20">
+            <a:extLst>
+              <a:ext uri="{FF2B5EF4-FFF2-40B4-BE49-F238E27FC236}">
+                <a16:creationId xmlns:a16="http://schemas.microsoft.com/office/drawing/2014/main" id="{9085A906-4C97-C85B-C926-7039D800979B}"/>
               </a:ext>
               <a:ext uri="{C183D7F6-B498-43B3-948B-1728B52AA6E4}">
                 <adec:decorative xmlns:adec="http://schemas.microsoft.com/office/drawing/2017/decorative" val="1"/>
@@ -7693,6 +7700,582 @@
           <p:cNvPr id="2" name="Title 1">
             <a:extLst>
               <a:ext uri="{FF2B5EF4-FFF2-40B4-BE49-F238E27FC236}">
+                <a16:creationId xmlns:a16="http://schemas.microsoft.com/office/drawing/2014/main" id="{D5600C65-3A7A-0939-17A0-752E4BC87BCF}"/>
+              </a:ext>
+            </a:extLst>
+          </p:cNvPr>
+          <p:cNvSpPr>
+            <a:spLocks noGrp="1"/>
+          </p:cNvSpPr>
+          <p:nvPr>
+            <p:ph type="title"/>
+          </p:nvPr>
+        </p:nvSpPr>
+        <p:spPr>
+          <a:xfrm>
+            <a:off x="694510" y="1487272"/>
+            <a:ext cx="2743200" cy="2743200"/>
+          </a:xfrm>
+          <a:prstGeom prst="ellipse">
+            <a:avLst/>
+          </a:prstGeom>
+          <a:solidFill>
+            <a:srgbClr val="262626"/>
+          </a:solidFill>
+          <a:ln w="174625" cmpd="thinThick">
+            <a:solidFill>
+              <a:srgbClr val="262626"/>
+            </a:solidFill>
+          </a:ln>
+        </p:spPr>
+        <p:txBody>
+          <a:bodyPr vert="horz" lIns="91440" tIns="45720" rIns="91440" bIns="45720" rtlCol="0" anchor="ctr">
+            <a:normAutofit/>
+          </a:bodyPr>
+          <a:lstStyle/>
+          <a:p>
+            <a:pPr algn="ctr"/>
+            <a:r>
+              <a:rPr lang="en-US" sz="2600" kern="1200" dirty="0">
+                <a:solidFill>
+                  <a:srgbClr val="FFFFFF"/>
+                </a:solidFill>
+                <a:latin typeface="+mj-lt"/>
+                <a:ea typeface="+mj-ea"/>
+                <a:cs typeface="+mj-cs"/>
+              </a:rPr>
+              <a:t>#2 – Sum type</a:t>
+            </a:r>
+          </a:p>
+        </p:txBody>
+      </p:sp>
+      <p:sp>
+        <p:nvSpPr>
+          <p:cNvPr id="4" name="Text Placeholder 3">
+            <a:extLst>
+              <a:ext uri="{FF2B5EF4-FFF2-40B4-BE49-F238E27FC236}">
+                <a16:creationId xmlns:a16="http://schemas.microsoft.com/office/drawing/2014/main" id="{5EC582E0-3A64-B9B8-40F0-3571AB96CBBD}"/>
+              </a:ext>
+            </a:extLst>
+          </p:cNvPr>
+          <p:cNvSpPr>
+            <a:spLocks noGrp="1"/>
+          </p:cNvSpPr>
+          <p:nvPr>
+            <p:ph sz="half" idx="2"/>
+          </p:nvPr>
+        </p:nvSpPr>
+        <p:spPr>
+          <a:xfrm>
+            <a:off x="3939745" y="1996288"/>
+            <a:ext cx="7188199" cy="1725167"/>
+          </a:xfrm>
+        </p:spPr>
+        <p:txBody>
+          <a:bodyPr vert="horz" lIns="91440" tIns="45720" rIns="91440" bIns="45720" rtlCol="0">
+            <a:noAutofit/>
+          </a:bodyPr>
+          <a:lstStyle/>
+          <a:p>
+            <a:pPr marL="285750"/>
+            <a:r>
+              <a:rPr lang="en-US" sz="2000" dirty="0"/>
+              <a:t>A sum type allows for DIFFERENT representations for a type</a:t>
+            </a:r>
+          </a:p>
+          <a:p>
+            <a:pPr marL="285750"/>
+            <a:r>
+              <a:rPr lang="en-US" sz="2000" dirty="0"/>
+              <a:t>For example, you can represent in math a complex number as follow :</a:t>
+            </a:r>
+          </a:p>
+          <a:p>
+            <a:pPr marL="742950" lvl="1"/>
+            <a:r>
+              <a:rPr lang="en-US" sz="1600" b="1" dirty="0"/>
+              <a:t>𝚛 𝜃𝚒</a:t>
+            </a:r>
+          </a:p>
+          <a:p>
+            <a:pPr marL="742950" lvl="1"/>
+            <a:r>
+              <a:rPr lang="en-US" sz="1600" b="1" dirty="0"/>
+              <a:t>𝚊 + 𝚋 𝚒</a:t>
+            </a:r>
+          </a:p>
+        </p:txBody>
+      </p:sp>
+    </p:spTree>
+    <p:extLst>
+      <p:ext uri="{BB962C8B-B14F-4D97-AF65-F5344CB8AC3E}">
+        <p14:creationId xmlns:p14="http://schemas.microsoft.com/office/powerpoint/2010/main" val="3362560168"/>
+      </p:ext>
+    </p:extLst>
+  </p:cSld>
+  <p:clrMapOvr>
+    <a:masterClrMapping/>
+  </p:clrMapOvr>
+  <p:timing>
+    <p:tnLst>
+      <p:par>
+        <p:cTn id="1" dur="indefinite" restart="never" nodeType="tmRoot">
+          <p:childTnLst>
+            <p:seq concurrent="1" nextAc="seek">
+              <p:cTn id="2" dur="indefinite" nodeType="mainSeq">
+                <p:childTnLst>
+                  <p:par>
+                    <p:cTn id="3" fill="hold">
+                      <p:stCondLst>
+                        <p:cond delay="indefinite"/>
+                      </p:stCondLst>
+                      <p:childTnLst>
+                        <p:par>
+                          <p:cTn id="4" fill="hold">
+                            <p:stCondLst>
+                              <p:cond delay="0"/>
+                            </p:stCondLst>
+                            <p:childTnLst>
+                              <p:par>
+                                <p:cTn id="5" presetID="1" presetClass="entr" presetSubtype="0" fill="hold" grpId="0" nodeType="clickEffect">
+                                  <p:stCondLst>
+                                    <p:cond delay="0"/>
+                                  </p:stCondLst>
+                                  <p:childTnLst>
+                                    <p:set>
+                                      <p:cBhvr>
+                                        <p:cTn id="6" dur="1" fill="hold">
+                                          <p:stCondLst>
+                                            <p:cond delay="0"/>
+                                          </p:stCondLst>
+                                        </p:cTn>
+                                        <p:tgtEl>
+                                          <p:spTgt spid="4">
+                                            <p:txEl>
+                                              <p:pRg st="0" end="0"/>
+                                            </p:txEl>
+                                          </p:spTgt>
+                                        </p:tgtEl>
+                                        <p:attrNameLst>
+                                          <p:attrName>style.visibility</p:attrName>
+                                        </p:attrNameLst>
+                                      </p:cBhvr>
+                                      <p:to>
+                                        <p:strVal val="visible"/>
+                                      </p:to>
+                                    </p:set>
+                                  </p:childTnLst>
+                                </p:cTn>
+                              </p:par>
+                            </p:childTnLst>
+                          </p:cTn>
+                        </p:par>
+                      </p:childTnLst>
+                    </p:cTn>
+                  </p:par>
+                  <p:par>
+                    <p:cTn id="7" fill="hold">
+                      <p:stCondLst>
+                        <p:cond delay="indefinite"/>
+                      </p:stCondLst>
+                      <p:childTnLst>
+                        <p:par>
+                          <p:cTn id="8" fill="hold">
+                            <p:stCondLst>
+                              <p:cond delay="0"/>
+                            </p:stCondLst>
+                            <p:childTnLst>
+                              <p:par>
+                                <p:cTn id="9" presetID="1" presetClass="entr" presetSubtype="0" fill="hold" grpId="0" nodeType="clickEffect">
+                                  <p:stCondLst>
+                                    <p:cond delay="0"/>
+                                  </p:stCondLst>
+                                  <p:childTnLst>
+                                    <p:set>
+                                      <p:cBhvr>
+                                        <p:cTn id="10" dur="1" fill="hold">
+                                          <p:stCondLst>
+                                            <p:cond delay="0"/>
+                                          </p:stCondLst>
+                                        </p:cTn>
+                                        <p:tgtEl>
+                                          <p:spTgt spid="4">
+                                            <p:txEl>
+                                              <p:pRg st="1" end="1"/>
+                                            </p:txEl>
+                                          </p:spTgt>
+                                        </p:tgtEl>
+                                        <p:attrNameLst>
+                                          <p:attrName>style.visibility</p:attrName>
+                                        </p:attrNameLst>
+                                      </p:cBhvr>
+                                      <p:to>
+                                        <p:strVal val="visible"/>
+                                      </p:to>
+                                    </p:set>
+                                  </p:childTnLst>
+                                </p:cTn>
+                              </p:par>
+                              <p:par>
+                                <p:cTn id="11" presetID="1" presetClass="entr" presetSubtype="0" fill="hold" grpId="0" nodeType="withEffect">
+                                  <p:stCondLst>
+                                    <p:cond delay="0"/>
+                                  </p:stCondLst>
+                                  <p:childTnLst>
+                                    <p:set>
+                                      <p:cBhvr>
+                                        <p:cTn id="12" dur="1" fill="hold">
+                                          <p:stCondLst>
+                                            <p:cond delay="0"/>
+                                          </p:stCondLst>
+                                        </p:cTn>
+                                        <p:tgtEl>
+                                          <p:spTgt spid="4">
+                                            <p:txEl>
+                                              <p:pRg st="2" end="2"/>
+                                            </p:txEl>
+                                          </p:spTgt>
+                                        </p:tgtEl>
+                                        <p:attrNameLst>
+                                          <p:attrName>style.visibility</p:attrName>
+                                        </p:attrNameLst>
+                                      </p:cBhvr>
+                                      <p:to>
+                                        <p:strVal val="visible"/>
+                                      </p:to>
+                                    </p:set>
+                                  </p:childTnLst>
+                                </p:cTn>
+                              </p:par>
+                              <p:par>
+                                <p:cTn id="13" presetID="1" presetClass="entr" presetSubtype="0" fill="hold" grpId="0" nodeType="withEffect">
+                                  <p:stCondLst>
+                                    <p:cond delay="0"/>
+                                  </p:stCondLst>
+                                  <p:childTnLst>
+                                    <p:set>
+                                      <p:cBhvr>
+                                        <p:cTn id="14" dur="1" fill="hold">
+                                          <p:stCondLst>
+                                            <p:cond delay="0"/>
+                                          </p:stCondLst>
+                                        </p:cTn>
+                                        <p:tgtEl>
+                                          <p:spTgt spid="4">
+                                            <p:txEl>
+                                              <p:pRg st="3" end="3"/>
+                                            </p:txEl>
+                                          </p:spTgt>
+                                        </p:tgtEl>
+                                        <p:attrNameLst>
+                                          <p:attrName>style.visibility</p:attrName>
+                                        </p:attrNameLst>
+                                      </p:cBhvr>
+                                      <p:to>
+                                        <p:strVal val="visible"/>
+                                      </p:to>
+                                    </p:set>
+                                  </p:childTnLst>
+                                </p:cTn>
+                              </p:par>
+                            </p:childTnLst>
+                          </p:cTn>
+                        </p:par>
+                      </p:childTnLst>
+                    </p:cTn>
+                  </p:par>
+                  <p:par>
+                    <p:cTn id="15" fill="hold">
+                      <p:stCondLst>
+                        <p:cond delay="indefinite"/>
+                      </p:stCondLst>
+                      <p:childTnLst>
+                        <p:par>
+                          <p:cTn id="16" fill="hold">
+                            <p:stCondLst>
+                              <p:cond delay="0"/>
+                            </p:stCondLst>
+                            <p:childTnLst>
+                              <p:par>
+                                <p:cTn id="17" presetID="1" presetClass="entr" presetSubtype="0" fill="hold" nodeType="clickEffect">
+                                  <p:stCondLst>
+                                    <p:cond delay="0"/>
+                                  </p:stCondLst>
+                                  <p:childTnLst>
+                                    <p:set>
+                                      <p:cBhvr>
+                                        <p:cTn id="18" dur="1" fill="hold">
+                                          <p:stCondLst>
+                                            <p:cond delay="0"/>
+                                          </p:stCondLst>
+                                        </p:cTn>
+                                        <p:tgtEl>
+                                          <p:spTgt spid="4">
+                                            <p:txEl>
+                                              <p:pRg st="0" end="0"/>
+                                            </p:txEl>
+                                          </p:spTgt>
+                                        </p:tgtEl>
+                                        <p:attrNameLst>
+                                          <p:attrName>style.visibility</p:attrName>
+                                        </p:attrNameLst>
+                                      </p:cBhvr>
+                                      <p:to>
+                                        <p:strVal val="visible"/>
+                                      </p:to>
+                                    </p:set>
+                                  </p:childTnLst>
+                                </p:cTn>
+                              </p:par>
+                              <p:par>
+                                <p:cTn id="19" presetID="1" presetClass="entr" presetSubtype="0" fill="hold" nodeType="withEffect">
+                                  <p:stCondLst>
+                                    <p:cond delay="0"/>
+                                  </p:stCondLst>
+                                  <p:childTnLst>
+                                    <p:set>
+                                      <p:cBhvr>
+                                        <p:cTn id="20" dur="1" fill="hold">
+                                          <p:stCondLst>
+                                            <p:cond delay="0"/>
+                                          </p:stCondLst>
+                                        </p:cTn>
+                                        <p:tgtEl>
+                                          <p:spTgt spid="4">
+                                            <p:txEl>
+                                              <p:pRg st="1" end="1"/>
+                                            </p:txEl>
+                                          </p:spTgt>
+                                        </p:tgtEl>
+                                        <p:attrNameLst>
+                                          <p:attrName>style.visibility</p:attrName>
+                                        </p:attrNameLst>
+                                      </p:cBhvr>
+                                      <p:to>
+                                        <p:strVal val="visible"/>
+                                      </p:to>
+                                    </p:set>
+                                  </p:childTnLst>
+                                </p:cTn>
+                              </p:par>
+                              <p:par>
+                                <p:cTn id="21" presetID="1" presetClass="entr" presetSubtype="0" fill="hold" nodeType="withEffect">
+                                  <p:stCondLst>
+                                    <p:cond delay="0"/>
+                                  </p:stCondLst>
+                                  <p:childTnLst>
+                                    <p:set>
+                                      <p:cBhvr>
+                                        <p:cTn id="22" dur="1" fill="hold">
+                                          <p:stCondLst>
+                                            <p:cond delay="0"/>
+                                          </p:stCondLst>
+                                        </p:cTn>
+                                        <p:tgtEl>
+                                          <p:spTgt spid="4">
+                                            <p:txEl>
+                                              <p:pRg st="2" end="2"/>
+                                            </p:txEl>
+                                          </p:spTgt>
+                                        </p:tgtEl>
+                                        <p:attrNameLst>
+                                          <p:attrName>style.visibility</p:attrName>
+                                        </p:attrNameLst>
+                                      </p:cBhvr>
+                                      <p:to>
+                                        <p:strVal val="visible"/>
+                                      </p:to>
+                                    </p:set>
+                                  </p:childTnLst>
+                                </p:cTn>
+                              </p:par>
+                              <p:par>
+                                <p:cTn id="23" presetID="1" presetClass="entr" presetSubtype="0" fill="hold" nodeType="withEffect">
+                                  <p:stCondLst>
+                                    <p:cond delay="0"/>
+                                  </p:stCondLst>
+                                  <p:childTnLst>
+                                    <p:set>
+                                      <p:cBhvr>
+                                        <p:cTn id="24" dur="1" fill="hold">
+                                          <p:stCondLst>
+                                            <p:cond delay="0"/>
+                                          </p:stCondLst>
+                                        </p:cTn>
+                                        <p:tgtEl>
+                                          <p:spTgt spid="4">
+                                            <p:txEl>
+                                              <p:pRg st="3" end="3"/>
+                                            </p:txEl>
+                                          </p:spTgt>
+                                        </p:tgtEl>
+                                        <p:attrNameLst>
+                                          <p:attrName>style.visibility</p:attrName>
+                                        </p:attrNameLst>
+                                      </p:cBhvr>
+                                      <p:to>
+                                        <p:strVal val="visible"/>
+                                      </p:to>
+                                    </p:set>
+                                  </p:childTnLst>
+                                </p:cTn>
+                              </p:par>
+                            </p:childTnLst>
+                          </p:cTn>
+                        </p:par>
+                      </p:childTnLst>
+                    </p:cTn>
+                  </p:par>
+                </p:childTnLst>
+              </p:cTn>
+              <p:prevCondLst>
+                <p:cond evt="onPrev" delay="0">
+                  <p:tgtEl>
+                    <p:sldTgt/>
+                  </p:tgtEl>
+                </p:cond>
+              </p:prevCondLst>
+              <p:nextCondLst>
+                <p:cond evt="onNext" delay="0">
+                  <p:tgtEl>
+                    <p:sldTgt/>
+                  </p:tgtEl>
+                </p:cond>
+              </p:nextCondLst>
+            </p:seq>
+          </p:childTnLst>
+        </p:cTn>
+      </p:par>
+    </p:tnLst>
+    <p:bldLst>
+      <p:bldP spid="4" grpId="0" build="p"/>
+    </p:bldLst>
+  </p:timing>
+</p:sld>
+</file>
+
+<file path=ppt/slides/slide19.xml><?xml version="1.0" encoding="utf-8"?>
+<p:sld xmlns:a="http://schemas.openxmlformats.org/drawingml/2006/main" xmlns:r="http://schemas.openxmlformats.org/officeDocument/2006/relationships" xmlns:p="http://schemas.openxmlformats.org/presentationml/2006/main">
+  <p:cSld>
+    <p:bg>
+      <p:bgPr>
+        <a:solidFill>
+          <a:schemeClr val="bg1"/>
+        </a:solidFill>
+        <a:effectLst/>
+      </p:bgPr>
+    </p:bg>
+    <p:spTree>
+      <p:nvGrpSpPr>
+        <p:cNvPr id="1" name=""/>
+        <p:cNvGrpSpPr/>
+        <p:nvPr/>
+      </p:nvGrpSpPr>
+      <p:grpSpPr>
+        <a:xfrm>
+          <a:off x="0" y="0"/>
+          <a:ext cx="0" cy="0"/>
+          <a:chOff x="0" y="0"/>
+          <a:chExt cx="0" cy="0"/>
+        </a:xfrm>
+      </p:grpSpPr>
+      <p:sp>
+        <p:nvSpPr>
+          <p:cNvPr id="12" name="Rectangle 11">
+            <a:extLst>
+              <a:ext uri="{FF2B5EF4-FFF2-40B4-BE49-F238E27FC236}">
+                <a16:creationId xmlns:a16="http://schemas.microsoft.com/office/drawing/2014/main" id="{42A5316D-ED2F-4F89-B4B4-8D9240B1A348}"/>
+              </a:ext>
+              <a:ext uri="{C183D7F6-B498-43B3-948B-1728B52AA6E4}">
+                <adec:decorative xmlns:adec="http://schemas.microsoft.com/office/drawing/2017/decorative" val="1"/>
+              </a:ext>
+            </a:extLst>
+          </p:cNvPr>
+          <p:cNvSpPr>
+            <a:spLocks noGrp="1" noRot="1" noChangeAspect="1" noMove="1" noResize="1" noEditPoints="1" noAdjustHandles="1" noChangeArrowheads="1" noChangeShapeType="1" noTextEdit="1"/>
+          </p:cNvSpPr>
+          <p:nvPr>
+            <p:extLst>
+              <p:ext uri="{386F3935-93C4-4BCD-93E2-E3B085C9AB24}">
+                <p16:designElem xmlns:p16="http://schemas.microsoft.com/office/powerpoint/2015/main" val="1"/>
+              </p:ext>
+            </p:extLst>
+          </p:nvPr>
+        </p:nvSpPr>
+        <p:spPr>
+          <a:xfrm>
+            <a:off x="0" y="0"/>
+            <a:ext cx="2013557" cy="6858000"/>
+          </a:xfrm>
+          <a:prstGeom prst="rect">
+            <a:avLst/>
+          </a:prstGeom>
+          <a:solidFill>
+            <a:srgbClr val="7F7F7F"/>
+          </a:solidFill>
+          <a:ln>
+            <a:noFill/>
+          </a:ln>
+        </p:spPr>
+        <p:style>
+          <a:lnRef idx="2">
+            <a:schemeClr val="accent1">
+              <a:shade val="50000"/>
+            </a:schemeClr>
+          </a:lnRef>
+          <a:fillRef idx="1">
+            <a:schemeClr val="accent1"/>
+          </a:fillRef>
+          <a:effectRef idx="0">
+            <a:schemeClr val="accent1"/>
+          </a:effectRef>
+          <a:fontRef idx="minor">
+            <a:schemeClr val="lt1"/>
+          </a:fontRef>
+        </p:style>
+        <p:txBody>
+          <a:bodyPr rtlCol="0" anchor="ctr"/>
+          <a:lstStyle/>
+          <a:p>
+            <a:pPr marL="0" marR="0" lvl="0" indent="0" algn="ctr" defTabSz="914400" rtl="0" eaLnBrk="1" fontAlgn="auto" latinLnBrk="0" hangingPunct="1">
+              <a:lnSpc>
+                <a:spcPct val="100000"/>
+              </a:lnSpc>
+              <a:spcBef>
+                <a:spcPts val="0"/>
+              </a:spcBef>
+              <a:spcAft>
+                <a:spcPts val="0"/>
+              </a:spcAft>
+              <a:buClrTx/>
+              <a:buSzTx/>
+              <a:buFontTx/>
+              <a:buNone/>
+              <a:tabLst/>
+              <a:defRPr/>
+            </a:pPr>
+            <a:endParaRPr kumimoji="0" lang="en-US" sz="1800" b="0" i="0" u="none" strike="noStrike" kern="1200" cap="none" spc="0" normalizeH="0" baseline="0" noProof="0">
+              <a:ln>
+                <a:noFill/>
+              </a:ln>
+              <a:solidFill>
+                <a:prstClr val="white"/>
+              </a:solidFill>
+              <a:effectLst/>
+              <a:uLnTx/>
+              <a:uFillTx/>
+              <a:latin typeface="Calibri" panose="020F0502020204030204"/>
+              <a:ea typeface="+mn-ea"/>
+              <a:cs typeface="+mn-cs"/>
+            </a:endParaRPr>
+          </a:p>
+        </p:txBody>
+      </p:sp>
+      <p:sp>
+        <p:nvSpPr>
+          <p:cNvPr id="2" name="Title 1">
+            <a:extLst>
+              <a:ext uri="{FF2B5EF4-FFF2-40B4-BE49-F238E27FC236}">
                 <a16:creationId xmlns:a16="http://schemas.microsoft.com/office/drawing/2014/main" id="{179B0B2E-FC83-9949-A534-87EF6DE79877}"/>
               </a:ext>
             </a:extLst>
@@ -7787,7 +8370,725 @@
 </p:sld>
 </file>
 
-<file path=ppt/slides/slide19.xml><?xml version="1.0" encoding="utf-8"?>
+<file path=ppt/slides/slide2.xml><?xml version="1.0" encoding="utf-8"?>
+<p:sld xmlns:a="http://schemas.openxmlformats.org/drawingml/2006/main" xmlns:r="http://schemas.openxmlformats.org/officeDocument/2006/relationships" xmlns:p="http://schemas.openxmlformats.org/presentationml/2006/main">
+  <p:cSld>
+    <p:bg>
+      <p:bgPr>
+        <a:solidFill>
+          <a:schemeClr val="bg1"/>
+        </a:solidFill>
+        <a:effectLst/>
+      </p:bgPr>
+    </p:bg>
+    <p:spTree>
+      <p:nvGrpSpPr>
+        <p:cNvPr id="1" name=""/>
+        <p:cNvGrpSpPr/>
+        <p:nvPr/>
+      </p:nvGrpSpPr>
+      <p:grpSpPr>
+        <a:xfrm>
+          <a:off x="0" y="0"/>
+          <a:ext cx="0" cy="0"/>
+          <a:chOff x="0" y="0"/>
+          <a:chExt cx="0" cy="0"/>
+        </a:xfrm>
+      </p:grpSpPr>
+      <p:sp>
+        <p:nvSpPr>
+          <p:cNvPr id="10" name="Rectangle 9">
+            <a:extLst>
+              <a:ext uri="{FF2B5EF4-FFF2-40B4-BE49-F238E27FC236}">
+                <a16:creationId xmlns:a16="http://schemas.microsoft.com/office/drawing/2014/main" id="{2A8AA5BC-4F7A-4226-8F99-6D824B226A97}"/>
+              </a:ext>
+              <a:ext uri="{C183D7F6-B498-43B3-948B-1728B52AA6E4}">
+                <adec:decorative xmlns:adec="http://schemas.microsoft.com/office/drawing/2017/decorative" val="1"/>
+              </a:ext>
+            </a:extLst>
+          </p:cNvPr>
+          <p:cNvSpPr>
+            <a:spLocks noGrp="1" noRot="1" noChangeAspect="1" noMove="1" noResize="1" noEditPoints="1" noAdjustHandles="1" noChangeArrowheads="1" noChangeShapeType="1" noTextEdit="1"/>
+          </p:cNvSpPr>
+          <p:nvPr>
+            <p:extLst>
+              <p:ext uri="{386F3935-93C4-4BCD-93E2-E3B085C9AB24}">
+                <p16:designElem xmlns:p16="http://schemas.microsoft.com/office/powerpoint/2015/main" val="1"/>
+              </p:ext>
+            </p:extLst>
+          </p:nvPr>
+        </p:nvSpPr>
+        <p:spPr>
+          <a:xfrm>
+            <a:off x="0" y="-3324"/>
+            <a:ext cx="12192000" cy="6861324"/>
+          </a:xfrm>
+          <a:prstGeom prst="rect">
+            <a:avLst/>
+          </a:prstGeom>
+          <a:solidFill>
+            <a:schemeClr val="tx1">
+              <a:lumMod val="75000"/>
+              <a:lumOff val="25000"/>
+            </a:schemeClr>
+          </a:solidFill>
+          <a:ln>
+            <a:noFill/>
+          </a:ln>
+        </p:spPr>
+        <p:style>
+          <a:lnRef idx="2">
+            <a:schemeClr val="accent1">
+              <a:shade val="50000"/>
+            </a:schemeClr>
+          </a:lnRef>
+          <a:fillRef idx="1">
+            <a:schemeClr val="accent1"/>
+          </a:fillRef>
+          <a:effectRef idx="0">
+            <a:schemeClr val="accent1"/>
+          </a:effectRef>
+          <a:fontRef idx="minor">
+            <a:schemeClr val="lt1"/>
+          </a:fontRef>
+        </p:style>
+        <p:txBody>
+          <a:bodyPr rtlCol="0" anchor="ctr"/>
+          <a:lstStyle/>
+          <a:p>
+            <a:pPr marL="0" marR="0" lvl="0" indent="0" algn="ctr" defTabSz="914400" rtl="0" eaLnBrk="1" fontAlgn="auto" latinLnBrk="0" hangingPunct="1">
+              <a:lnSpc>
+                <a:spcPct val="100000"/>
+              </a:lnSpc>
+              <a:spcBef>
+                <a:spcPts val="0"/>
+              </a:spcBef>
+              <a:spcAft>
+                <a:spcPts val="0"/>
+              </a:spcAft>
+              <a:buClrTx/>
+              <a:buSzTx/>
+              <a:buFontTx/>
+              <a:buNone/>
+              <a:tabLst/>
+              <a:defRPr/>
+            </a:pPr>
+            <a:endParaRPr kumimoji="0" lang="en-US" sz="1800" b="0" i="0" u="none" strike="noStrike" kern="1200" cap="none" spc="0" normalizeH="0" baseline="0" noProof="0">
+              <a:ln>
+                <a:noFill/>
+              </a:ln>
+              <a:solidFill>
+                <a:prstClr val="white"/>
+              </a:solidFill>
+              <a:effectLst/>
+              <a:uLnTx/>
+              <a:uFillTx/>
+              <a:latin typeface="Calibri" panose="020F0502020204030204"/>
+              <a:ea typeface="+mn-ea"/>
+              <a:cs typeface="+mn-cs"/>
+            </a:endParaRPr>
+          </a:p>
+        </p:txBody>
+      </p:sp>
+      <p:cxnSp>
+        <p:nvCxnSpPr>
+          <p:cNvPr id="12" name="Straight Connector 11">
+            <a:extLst>
+              <a:ext uri="{FF2B5EF4-FFF2-40B4-BE49-F238E27FC236}">
+                <a16:creationId xmlns:a16="http://schemas.microsoft.com/office/drawing/2014/main" id="{911DBBF1-3229-4BD9-B3D1-B4CA571E7431}"/>
+              </a:ext>
+              <a:ext uri="{C183D7F6-B498-43B3-948B-1728B52AA6E4}">
+                <adec:decorative xmlns:adec="http://schemas.microsoft.com/office/drawing/2017/decorative" val="1"/>
+              </a:ext>
+            </a:extLst>
+          </p:cNvPr>
+          <p:cNvCxnSpPr>
+            <a:cxnSpLocks noGrp="1" noRot="1" noChangeAspect="1" noMove="1" noResize="1" noEditPoints="1" noAdjustHandles="1" noChangeArrowheads="1" noChangeShapeType="1"/>
+          </p:cNvCxnSpPr>
+          <p:nvPr>
+            <p:extLst>
+              <p:ext uri="{386F3935-93C4-4BCD-93E2-E3B085C9AB24}">
+                <p16:designElem xmlns:p16="http://schemas.microsoft.com/office/powerpoint/2015/main" val="1"/>
+              </p:ext>
+            </p:extLst>
+          </p:nvPr>
+        </p:nvCxnSpPr>
+        <p:spPr bwMode="white">
+          <a:xfrm>
+            <a:off x="0" y="843625"/>
+            <a:ext cx="12188824" cy="0"/>
+          </a:xfrm>
+          <a:prstGeom prst="line">
+            <a:avLst/>
+          </a:prstGeom>
+          <a:ln w="50800">
+            <a:solidFill>
+              <a:schemeClr val="bg1"/>
+            </a:solidFill>
+          </a:ln>
+        </p:spPr>
+        <p:style>
+          <a:lnRef idx="1">
+            <a:schemeClr val="accent1"/>
+          </a:lnRef>
+          <a:fillRef idx="0">
+            <a:schemeClr val="accent1"/>
+          </a:fillRef>
+          <a:effectRef idx="0">
+            <a:schemeClr val="accent1"/>
+          </a:effectRef>
+          <a:fontRef idx="minor">
+            <a:schemeClr val="tx1"/>
+          </a:fontRef>
+        </p:style>
+      </p:cxnSp>
+      <p:sp>
+        <p:nvSpPr>
+          <p:cNvPr id="14" name="Rectangle 13">
+            <a:extLst>
+              <a:ext uri="{FF2B5EF4-FFF2-40B4-BE49-F238E27FC236}">
+                <a16:creationId xmlns:a16="http://schemas.microsoft.com/office/drawing/2014/main" id="{5BC87C3E-1040-4EE4-9BDB-9537F7A1B335}"/>
+              </a:ext>
+              <a:ext uri="{C183D7F6-B498-43B3-948B-1728B52AA6E4}">
+                <adec:decorative xmlns:adec="http://schemas.microsoft.com/office/drawing/2017/decorative" val="1"/>
+              </a:ext>
+            </a:extLst>
+          </p:cNvPr>
+          <p:cNvSpPr>
+            <a:spLocks noGrp="1" noRot="1" noChangeAspect="1" noMove="1" noResize="1" noEditPoints="1" noAdjustHandles="1" noChangeArrowheads="1" noChangeShapeType="1" noTextEdit="1"/>
+          </p:cNvSpPr>
+          <p:nvPr>
+            <p:extLst>
+              <p:ext uri="{386F3935-93C4-4BCD-93E2-E3B085C9AB24}">
+                <p16:designElem xmlns:p16="http://schemas.microsoft.com/office/powerpoint/2015/main" val="1"/>
+              </p:ext>
+            </p:extLst>
+          </p:nvPr>
+        </p:nvSpPr>
+        <p:spPr>
+          <a:xfrm>
+            <a:off x="3176" y="968282"/>
+            <a:ext cx="12188824" cy="4946904"/>
+          </a:xfrm>
+          <a:prstGeom prst="rect">
+            <a:avLst/>
+          </a:prstGeom>
+          <a:solidFill>
+            <a:schemeClr val="bg1"/>
+          </a:solidFill>
+          <a:ln>
+            <a:noFill/>
+          </a:ln>
+        </p:spPr>
+        <p:style>
+          <a:lnRef idx="2">
+            <a:schemeClr val="accent1">
+              <a:shade val="50000"/>
+            </a:schemeClr>
+          </a:lnRef>
+          <a:fillRef idx="1">
+            <a:schemeClr val="accent1"/>
+          </a:fillRef>
+          <a:effectRef idx="0">
+            <a:schemeClr val="accent1"/>
+          </a:effectRef>
+          <a:fontRef idx="minor">
+            <a:schemeClr val="lt1"/>
+          </a:fontRef>
+        </p:style>
+        <p:txBody>
+          <a:bodyPr rtlCol="0" anchor="ctr"/>
+          <a:lstStyle/>
+          <a:p>
+            <a:pPr algn="ctr"/>
+            <a:endParaRPr lang="en-US"/>
+          </a:p>
+        </p:txBody>
+      </p:sp>
+      <p:sp>
+        <p:nvSpPr>
+          <p:cNvPr id="4" name="Title 3">
+            <a:extLst>
+              <a:ext uri="{FF2B5EF4-FFF2-40B4-BE49-F238E27FC236}">
+                <a16:creationId xmlns:a16="http://schemas.microsoft.com/office/drawing/2014/main" id="{9C5DE9BB-F19F-184F-9F7C-A50B42CB8F0E}"/>
+              </a:ext>
+            </a:extLst>
+          </p:cNvPr>
+          <p:cNvSpPr>
+            <a:spLocks noGrp="1"/>
+          </p:cNvSpPr>
+          <p:nvPr>
+            <p:ph type="title"/>
+          </p:nvPr>
+        </p:nvSpPr>
+        <p:spPr>
+          <a:xfrm>
+            <a:off x="795338" y="1566473"/>
+            <a:ext cx="10601325" cy="2166723"/>
+          </a:xfrm>
+        </p:spPr>
+        <p:txBody>
+          <a:bodyPr vert="horz" lIns="91440" tIns="45720" rIns="91440" bIns="45720" rtlCol="0" anchor="b">
+            <a:normAutofit/>
+          </a:bodyPr>
+          <a:lstStyle/>
+          <a:p>
+            <a:pPr algn="ctr"/>
+            <a:r>
+              <a:rPr lang="en-US" sz="6600" kern="1200" dirty="0">
+                <a:solidFill>
+                  <a:schemeClr val="tx1"/>
+                </a:solidFill>
+                <a:latin typeface="+mj-lt"/>
+                <a:ea typeface="+mj-ea"/>
+                <a:cs typeface="+mj-cs"/>
+              </a:rPr>
+              <a:t>“Point of view is worth 80 IQ points”</a:t>
+            </a:r>
+          </a:p>
+        </p:txBody>
+      </p:sp>
+      <p:sp>
+        <p:nvSpPr>
+          <p:cNvPr id="5" name="Subtitle 4">
+            <a:extLst>
+              <a:ext uri="{FF2B5EF4-FFF2-40B4-BE49-F238E27FC236}">
+                <a16:creationId xmlns:a16="http://schemas.microsoft.com/office/drawing/2014/main" id="{A72E419C-CB79-4040-8E5A-DF95EFABBEAF}"/>
+              </a:ext>
+            </a:extLst>
+          </p:cNvPr>
+          <p:cNvSpPr>
+            <a:spLocks noGrp="1"/>
+          </p:cNvSpPr>
+          <p:nvPr>
+            <p:ph type="body" idx="1"/>
+          </p:nvPr>
+        </p:nvSpPr>
+        <p:spPr>
+          <a:xfrm>
+            <a:off x="795338" y="4092320"/>
+            <a:ext cx="10601325" cy="1144884"/>
+          </a:xfrm>
+        </p:spPr>
+        <p:txBody>
+          <a:bodyPr vert="horz" lIns="91440" tIns="45720" rIns="91440" bIns="45720" rtlCol="0">
+            <a:normAutofit/>
+          </a:bodyPr>
+          <a:lstStyle/>
+          <a:p>
+            <a:pPr algn="ctr"/>
+            <a:r>
+              <a:rPr lang="en-US" kern="1200">
+                <a:solidFill>
+                  <a:schemeClr val="tx1"/>
+                </a:solidFill>
+                <a:latin typeface="+mn-lt"/>
+                <a:ea typeface="+mn-ea"/>
+                <a:cs typeface="+mn-cs"/>
+              </a:rPr>
+              <a:t>Alan Key</a:t>
+            </a:r>
+          </a:p>
+        </p:txBody>
+      </p:sp>
+      <p:cxnSp>
+        <p:nvCxnSpPr>
+          <p:cNvPr id="16" name="Straight Connector 15">
+            <a:extLst>
+              <a:ext uri="{FF2B5EF4-FFF2-40B4-BE49-F238E27FC236}">
+                <a16:creationId xmlns:a16="http://schemas.microsoft.com/office/drawing/2014/main" id="{42CDBECE-872A-4C73-9DC1-BB4E805E2CF5}"/>
+              </a:ext>
+              <a:ext uri="{C183D7F6-B498-43B3-948B-1728B52AA6E4}">
+                <adec:decorative xmlns:adec="http://schemas.microsoft.com/office/drawing/2017/decorative" val="1"/>
+              </a:ext>
+            </a:extLst>
+          </p:cNvPr>
+          <p:cNvCxnSpPr>
+            <a:cxnSpLocks noGrp="1" noRot="1" noChangeAspect="1" noMove="1" noResize="1" noEditPoints="1" noAdjustHandles="1" noChangeArrowheads="1" noChangeShapeType="1"/>
+          </p:cNvCxnSpPr>
+          <p:nvPr>
+            <p:extLst>
+              <p:ext uri="{386F3935-93C4-4BCD-93E2-E3B085C9AB24}">
+                <p16:designElem xmlns:p16="http://schemas.microsoft.com/office/powerpoint/2015/main" val="1"/>
+              </p:ext>
+            </p:extLst>
+          </p:nvPr>
+        </p:nvCxnSpPr>
+        <p:spPr>
+          <a:xfrm>
+            <a:off x="4724400" y="3894594"/>
+            <a:ext cx="2743200" cy="0"/>
+          </a:xfrm>
+          <a:prstGeom prst="line">
+            <a:avLst/>
+          </a:prstGeom>
+          <a:ln w="19050">
+            <a:solidFill>
+              <a:schemeClr val="tx1">
+                <a:lumMod val="50000"/>
+                <a:lumOff val="50000"/>
+              </a:schemeClr>
+            </a:solidFill>
+          </a:ln>
+        </p:spPr>
+        <p:style>
+          <a:lnRef idx="1">
+            <a:schemeClr val="accent1"/>
+          </a:lnRef>
+          <a:fillRef idx="0">
+            <a:schemeClr val="accent1"/>
+          </a:fillRef>
+          <a:effectRef idx="0">
+            <a:schemeClr val="accent1"/>
+          </a:effectRef>
+          <a:fontRef idx="minor">
+            <a:schemeClr val="tx1"/>
+          </a:fontRef>
+        </p:style>
+      </p:cxnSp>
+      <p:cxnSp>
+        <p:nvCxnSpPr>
+          <p:cNvPr id="18" name="Straight Connector 17">
+            <a:extLst>
+              <a:ext uri="{FF2B5EF4-FFF2-40B4-BE49-F238E27FC236}">
+                <a16:creationId xmlns:a16="http://schemas.microsoft.com/office/drawing/2014/main" id="{F5CD5A0B-CDD7-427C-AA42-2EECFDFA1811}"/>
+              </a:ext>
+              <a:ext uri="{C183D7F6-B498-43B3-948B-1728B52AA6E4}">
+                <adec:decorative xmlns:adec="http://schemas.microsoft.com/office/drawing/2017/decorative" val="1"/>
+              </a:ext>
+            </a:extLst>
+          </p:cNvPr>
+          <p:cNvCxnSpPr>
+            <a:cxnSpLocks noGrp="1" noRot="1" noChangeAspect="1" noMove="1" noResize="1" noEditPoints="1" noAdjustHandles="1" noChangeArrowheads="1" noChangeShapeType="1"/>
+          </p:cNvCxnSpPr>
+          <p:nvPr>
+            <p:extLst>
+              <p:ext uri="{386F3935-93C4-4BCD-93E2-E3B085C9AB24}">
+                <p16:designElem xmlns:p16="http://schemas.microsoft.com/office/powerpoint/2015/main" val="1"/>
+              </p:ext>
+            </p:extLst>
+          </p:nvPr>
+        </p:nvCxnSpPr>
+        <p:spPr bwMode="white">
+          <a:xfrm>
+            <a:off x="0" y="6028863"/>
+            <a:ext cx="12188824" cy="0"/>
+          </a:xfrm>
+          <a:prstGeom prst="line">
+            <a:avLst/>
+          </a:prstGeom>
+          <a:ln w="50800">
+            <a:solidFill>
+              <a:schemeClr val="bg1"/>
+            </a:solidFill>
+          </a:ln>
+        </p:spPr>
+        <p:style>
+          <a:lnRef idx="1">
+            <a:schemeClr val="accent1"/>
+          </a:lnRef>
+          <a:fillRef idx="0">
+            <a:schemeClr val="accent1"/>
+          </a:fillRef>
+          <a:effectRef idx="0">
+            <a:schemeClr val="accent1"/>
+          </a:effectRef>
+          <a:fontRef idx="minor">
+            <a:schemeClr val="tx1"/>
+          </a:fontRef>
+        </p:style>
+      </p:cxnSp>
+    </p:spTree>
+    <p:extLst>
+      <p:ext uri="{BB962C8B-B14F-4D97-AF65-F5344CB8AC3E}">
+        <p14:creationId xmlns:p14="http://schemas.microsoft.com/office/powerpoint/2010/main" val="2715581030"/>
+      </p:ext>
+    </p:extLst>
+  </p:cSld>
+  <p:clrMapOvr>
+    <a:masterClrMapping/>
+  </p:clrMapOvr>
+</p:sld>
+</file>
+
+<file path=ppt/slides/slide20.xml><?xml version="1.0" encoding="utf-8"?>
+<p:sld xmlns:a="http://schemas.openxmlformats.org/drawingml/2006/main" xmlns:r="http://schemas.openxmlformats.org/officeDocument/2006/relationships" xmlns:p="http://schemas.openxmlformats.org/presentationml/2006/main">
+  <p:cSld>
+    <p:bg>
+      <p:bgPr>
+        <a:solidFill>
+          <a:schemeClr val="bg1"/>
+        </a:solidFill>
+        <a:effectLst/>
+      </p:bgPr>
+    </p:bg>
+    <p:spTree>
+      <p:nvGrpSpPr>
+        <p:cNvPr id="1" name=""/>
+        <p:cNvGrpSpPr/>
+        <p:nvPr/>
+      </p:nvGrpSpPr>
+      <p:grpSpPr>
+        <a:xfrm>
+          <a:off x="0" y="0"/>
+          <a:ext cx="0" cy="0"/>
+          <a:chOff x="0" y="0"/>
+          <a:chExt cx="0" cy="0"/>
+        </a:xfrm>
+      </p:grpSpPr>
+      <p:sp>
+        <p:nvSpPr>
+          <p:cNvPr id="33" name="Rectangle 32">
+            <a:extLst>
+              <a:ext uri="{FF2B5EF4-FFF2-40B4-BE49-F238E27FC236}">
+                <a16:creationId xmlns:a16="http://schemas.microsoft.com/office/drawing/2014/main" id="{42A5316D-ED2F-4F89-B4B4-8D9240B1A348}"/>
+              </a:ext>
+              <a:ext uri="{C183D7F6-B498-43B3-948B-1728B52AA6E4}">
+                <adec:decorative xmlns:adec="http://schemas.microsoft.com/office/drawing/2017/decorative" val="1"/>
+              </a:ext>
+            </a:extLst>
+          </p:cNvPr>
+          <p:cNvSpPr>
+            <a:spLocks noGrp="1" noRot="1" noChangeAspect="1" noMove="1" noResize="1" noEditPoints="1" noAdjustHandles="1" noChangeArrowheads="1" noChangeShapeType="1" noTextEdit="1"/>
+          </p:cNvSpPr>
+          <p:nvPr>
+            <p:extLst>
+              <p:ext uri="{386F3935-93C4-4BCD-93E2-E3B085C9AB24}">
+                <p16:designElem xmlns:p16="http://schemas.microsoft.com/office/powerpoint/2015/main" val="1"/>
+              </p:ext>
+            </p:extLst>
+          </p:nvPr>
+        </p:nvSpPr>
+        <p:spPr>
+          <a:xfrm>
+            <a:off x="0" y="0"/>
+            <a:ext cx="2013557" cy="6858000"/>
+          </a:xfrm>
+          <a:prstGeom prst="rect">
+            <a:avLst/>
+          </a:prstGeom>
+          <a:solidFill>
+            <a:srgbClr val="7F7F7F"/>
+          </a:solidFill>
+          <a:ln>
+            <a:noFill/>
+          </a:ln>
+        </p:spPr>
+        <p:style>
+          <a:lnRef idx="2">
+            <a:schemeClr val="accent1">
+              <a:shade val="50000"/>
+            </a:schemeClr>
+          </a:lnRef>
+          <a:fillRef idx="1">
+            <a:schemeClr val="accent1"/>
+          </a:fillRef>
+          <a:effectRef idx="0">
+            <a:schemeClr val="accent1"/>
+          </a:effectRef>
+          <a:fontRef idx="minor">
+            <a:schemeClr val="lt1"/>
+          </a:fontRef>
+        </p:style>
+        <p:txBody>
+          <a:bodyPr rtlCol="0" anchor="ctr"/>
+          <a:lstStyle/>
+          <a:p>
+            <a:pPr marL="0" marR="0" lvl="0" indent="0" algn="ctr" defTabSz="914400" rtl="0" eaLnBrk="1" fontAlgn="auto" latinLnBrk="0" hangingPunct="1">
+              <a:lnSpc>
+                <a:spcPct val="100000"/>
+              </a:lnSpc>
+              <a:spcBef>
+                <a:spcPts val="0"/>
+              </a:spcBef>
+              <a:spcAft>
+                <a:spcPts val="0"/>
+              </a:spcAft>
+              <a:buClrTx/>
+              <a:buSzTx/>
+              <a:buFontTx/>
+              <a:buNone/>
+              <a:tabLst/>
+              <a:defRPr/>
+            </a:pPr>
+            <a:endParaRPr kumimoji="0" lang="en-US" sz="1800" b="0" i="0" u="none" strike="noStrike" kern="1200" cap="none" spc="0" normalizeH="0" baseline="0" noProof="0">
+              <a:ln>
+                <a:noFill/>
+              </a:ln>
+              <a:solidFill>
+                <a:prstClr val="white"/>
+              </a:solidFill>
+              <a:effectLst/>
+              <a:uLnTx/>
+              <a:uFillTx/>
+              <a:latin typeface="Calibri" panose="020F0502020204030204"/>
+              <a:ea typeface="+mn-ea"/>
+              <a:cs typeface="+mn-cs"/>
+            </a:endParaRPr>
+          </a:p>
+        </p:txBody>
+      </p:sp>
+      <p:sp>
+        <p:nvSpPr>
+          <p:cNvPr id="2" name="Title 1">
+            <a:extLst>
+              <a:ext uri="{FF2B5EF4-FFF2-40B4-BE49-F238E27FC236}">
+                <a16:creationId xmlns:a16="http://schemas.microsoft.com/office/drawing/2014/main" id="{179B0B2E-FC83-9949-A534-87EF6DE79877}"/>
+              </a:ext>
+            </a:extLst>
+          </p:cNvPr>
+          <p:cNvSpPr>
+            <a:spLocks noGrp="1"/>
+          </p:cNvSpPr>
+          <p:nvPr>
+            <p:ph type="title"/>
+          </p:nvPr>
+        </p:nvSpPr>
+        <p:spPr>
+          <a:xfrm>
+            <a:off x="694510" y="1487272"/>
+            <a:ext cx="2743200" cy="2743200"/>
+          </a:xfrm>
+          <a:prstGeom prst="ellipse">
+            <a:avLst/>
+          </a:prstGeom>
+          <a:solidFill>
+            <a:srgbClr val="262626"/>
+          </a:solidFill>
+          <a:ln w="174625" cmpd="thinThick">
+            <a:solidFill>
+              <a:srgbClr val="262626"/>
+            </a:solidFill>
+          </a:ln>
+        </p:spPr>
+        <p:txBody>
+          <a:bodyPr vert="horz" lIns="91440" tIns="45720" rIns="91440" bIns="45720" rtlCol="0" anchor="ctr">
+            <a:normAutofit/>
+          </a:bodyPr>
+          <a:lstStyle/>
+          <a:p>
+            <a:pPr algn="ctr"/>
+            <a:r>
+              <a:rPr lang="en-US" sz="2600" kern="1200" dirty="0">
+                <a:solidFill>
+                  <a:srgbClr val="FFFFFF"/>
+                </a:solidFill>
+                <a:latin typeface="+mj-lt"/>
+                <a:ea typeface="+mj-ea"/>
+                <a:cs typeface="+mj-cs"/>
+              </a:rPr>
+              <a:t>#2 </a:t>
+            </a:r>
+            <a:r>
+              <a:rPr lang="en-US" sz="2600" dirty="0">
+                <a:solidFill>
+                  <a:srgbClr val="FFFFFF"/>
+                </a:solidFill>
+              </a:rPr>
+              <a:t>- </a:t>
+            </a:r>
+            <a:r>
+              <a:rPr lang="en-US" sz="2600" kern="1200" dirty="0">
+                <a:solidFill>
+                  <a:srgbClr val="FFFFFF"/>
+                </a:solidFill>
+                <a:latin typeface="+mj-lt"/>
+                <a:ea typeface="+mj-ea"/>
+                <a:cs typeface="+mj-cs"/>
+              </a:rPr>
+              <a:t>Sum type</a:t>
+            </a:r>
+          </a:p>
+        </p:txBody>
+      </p:sp>
+      <p:pic>
+        <p:nvPicPr>
+          <p:cNvPr id="28" name="Content Placeholder 27" descr="Text&#10;&#10;Description automatically generated">
+            <a:extLst>
+              <a:ext uri="{FF2B5EF4-FFF2-40B4-BE49-F238E27FC236}">
+                <a16:creationId xmlns:a16="http://schemas.microsoft.com/office/drawing/2014/main" id="{E724F2A6-4B93-E94D-A7A9-21CE2B35CD16}"/>
+              </a:ext>
+            </a:extLst>
+          </p:cNvPr>
+          <p:cNvPicPr>
+            <a:picLocks noGrp="1" noChangeAspect="1"/>
+          </p:cNvPicPr>
+          <p:nvPr>
+            <p:ph idx="1"/>
+          </p:nvPr>
+        </p:nvPicPr>
+        <p:blipFill>
+          <a:blip r:embed="rId3"/>
+          <a:stretch>
+            <a:fillRect/>
+          </a:stretch>
+        </p:blipFill>
+        <p:spPr>
+          <a:xfrm>
+            <a:off x="4443305" y="802190"/>
+            <a:ext cx="5507039" cy="5987312"/>
+          </a:xfrm>
+          <a:prstGeom prst="rect">
+            <a:avLst/>
+          </a:prstGeom>
+        </p:spPr>
+      </p:pic>
+      <p:sp>
+        <p:nvSpPr>
+          <p:cNvPr id="22" name="Rectangle 21">
+            <a:extLst>
+              <a:ext uri="{FF2B5EF4-FFF2-40B4-BE49-F238E27FC236}">
+                <a16:creationId xmlns:a16="http://schemas.microsoft.com/office/drawing/2014/main" id="{79B163FB-0019-8245-8BAA-3644F154F737}"/>
+              </a:ext>
+            </a:extLst>
+          </p:cNvPr>
+          <p:cNvSpPr/>
+          <p:nvPr/>
+        </p:nvSpPr>
+        <p:spPr>
+          <a:xfrm>
+            <a:off x="4443305" y="424318"/>
+            <a:ext cx="4813817" cy="472940"/>
+          </a:xfrm>
+          <a:prstGeom prst="rect">
+            <a:avLst/>
+          </a:prstGeom>
+        </p:spPr>
+        <p:txBody>
+          <a:bodyPr vert="horz" lIns="91440" tIns="45720" rIns="91440" bIns="45720" rtlCol="0">
+            <a:normAutofit/>
+          </a:bodyPr>
+          <a:lstStyle/>
+          <a:p>
+            <a:pPr>
+              <a:lnSpc>
+                <a:spcPct val="90000"/>
+              </a:lnSpc>
+              <a:spcAft>
+                <a:spcPts val="600"/>
+              </a:spcAft>
+            </a:pPr>
+            <a:r>
+              <a:rPr lang="en-US" i="1" dirty="0"/>
+              <a:t>No sum type in C#, but you got Polymorphism…</a:t>
+            </a:r>
+          </a:p>
+        </p:txBody>
+      </p:sp>
+    </p:spTree>
+    <p:extLst>
+      <p:ext uri="{BB962C8B-B14F-4D97-AF65-F5344CB8AC3E}">
+        <p14:creationId xmlns:p14="http://schemas.microsoft.com/office/powerpoint/2010/main" val="503500249"/>
+      </p:ext>
+    </p:extLst>
+  </p:cSld>
+  <p:clrMapOvr>
+    <a:masterClrMapping/>
+  </p:clrMapOvr>
+</p:sld>
+</file>
+
+<file path=ppt/slides/slide21.xml><?xml version="1.0" encoding="utf-8"?>
 <p:sld xmlns:a="http://schemas.openxmlformats.org/drawingml/2006/main" xmlns:r="http://schemas.openxmlformats.org/officeDocument/2006/relationships" xmlns:p="http://schemas.openxmlformats.org/presentationml/2006/main">
   <p:cSld>
     <p:bg>
@@ -8261,725 +9562,7 @@
 </p:sld>
 </file>
 
-<file path=ppt/slides/slide2.xml><?xml version="1.0" encoding="utf-8"?>
-<p:sld xmlns:a="http://schemas.openxmlformats.org/drawingml/2006/main" xmlns:r="http://schemas.openxmlformats.org/officeDocument/2006/relationships" xmlns:p="http://schemas.openxmlformats.org/presentationml/2006/main">
-  <p:cSld>
-    <p:bg>
-      <p:bgPr>
-        <a:solidFill>
-          <a:schemeClr val="bg1"/>
-        </a:solidFill>
-        <a:effectLst/>
-      </p:bgPr>
-    </p:bg>
-    <p:spTree>
-      <p:nvGrpSpPr>
-        <p:cNvPr id="1" name=""/>
-        <p:cNvGrpSpPr/>
-        <p:nvPr/>
-      </p:nvGrpSpPr>
-      <p:grpSpPr>
-        <a:xfrm>
-          <a:off x="0" y="0"/>
-          <a:ext cx="0" cy="0"/>
-          <a:chOff x="0" y="0"/>
-          <a:chExt cx="0" cy="0"/>
-        </a:xfrm>
-      </p:grpSpPr>
-      <p:sp>
-        <p:nvSpPr>
-          <p:cNvPr id="10" name="Rectangle 9">
-            <a:extLst>
-              <a:ext uri="{FF2B5EF4-FFF2-40B4-BE49-F238E27FC236}">
-                <a16:creationId xmlns:a16="http://schemas.microsoft.com/office/drawing/2014/main" id="{2A8AA5BC-4F7A-4226-8F99-6D824B226A97}"/>
-              </a:ext>
-              <a:ext uri="{C183D7F6-B498-43B3-948B-1728B52AA6E4}">
-                <adec:decorative xmlns:adec="http://schemas.microsoft.com/office/drawing/2017/decorative" val="1"/>
-              </a:ext>
-            </a:extLst>
-          </p:cNvPr>
-          <p:cNvSpPr>
-            <a:spLocks noGrp="1" noRot="1" noChangeAspect="1" noMove="1" noResize="1" noEditPoints="1" noAdjustHandles="1" noChangeArrowheads="1" noChangeShapeType="1" noTextEdit="1"/>
-          </p:cNvSpPr>
-          <p:nvPr>
-            <p:extLst>
-              <p:ext uri="{386F3935-93C4-4BCD-93E2-E3B085C9AB24}">
-                <p16:designElem xmlns:p16="http://schemas.microsoft.com/office/powerpoint/2015/main" val="1"/>
-              </p:ext>
-            </p:extLst>
-          </p:nvPr>
-        </p:nvSpPr>
-        <p:spPr>
-          <a:xfrm>
-            <a:off x="0" y="-3324"/>
-            <a:ext cx="12192000" cy="6861324"/>
-          </a:xfrm>
-          <a:prstGeom prst="rect">
-            <a:avLst/>
-          </a:prstGeom>
-          <a:solidFill>
-            <a:schemeClr val="tx1">
-              <a:lumMod val="75000"/>
-              <a:lumOff val="25000"/>
-            </a:schemeClr>
-          </a:solidFill>
-          <a:ln>
-            <a:noFill/>
-          </a:ln>
-        </p:spPr>
-        <p:style>
-          <a:lnRef idx="2">
-            <a:schemeClr val="accent1">
-              <a:shade val="50000"/>
-            </a:schemeClr>
-          </a:lnRef>
-          <a:fillRef idx="1">
-            <a:schemeClr val="accent1"/>
-          </a:fillRef>
-          <a:effectRef idx="0">
-            <a:schemeClr val="accent1"/>
-          </a:effectRef>
-          <a:fontRef idx="minor">
-            <a:schemeClr val="lt1"/>
-          </a:fontRef>
-        </p:style>
-        <p:txBody>
-          <a:bodyPr rtlCol="0" anchor="ctr"/>
-          <a:lstStyle/>
-          <a:p>
-            <a:pPr marL="0" marR="0" lvl="0" indent="0" algn="ctr" defTabSz="914400" rtl="0" eaLnBrk="1" fontAlgn="auto" latinLnBrk="0" hangingPunct="1">
-              <a:lnSpc>
-                <a:spcPct val="100000"/>
-              </a:lnSpc>
-              <a:spcBef>
-                <a:spcPts val="0"/>
-              </a:spcBef>
-              <a:spcAft>
-                <a:spcPts val="0"/>
-              </a:spcAft>
-              <a:buClrTx/>
-              <a:buSzTx/>
-              <a:buFontTx/>
-              <a:buNone/>
-              <a:tabLst/>
-              <a:defRPr/>
-            </a:pPr>
-            <a:endParaRPr kumimoji="0" lang="en-US" sz="1800" b="0" i="0" u="none" strike="noStrike" kern="1200" cap="none" spc="0" normalizeH="0" baseline="0" noProof="0">
-              <a:ln>
-                <a:noFill/>
-              </a:ln>
-              <a:solidFill>
-                <a:prstClr val="white"/>
-              </a:solidFill>
-              <a:effectLst/>
-              <a:uLnTx/>
-              <a:uFillTx/>
-              <a:latin typeface="Calibri" panose="020F0502020204030204"/>
-              <a:ea typeface="+mn-ea"/>
-              <a:cs typeface="+mn-cs"/>
-            </a:endParaRPr>
-          </a:p>
-        </p:txBody>
-      </p:sp>
-      <p:cxnSp>
-        <p:nvCxnSpPr>
-          <p:cNvPr id="12" name="Straight Connector 11">
-            <a:extLst>
-              <a:ext uri="{FF2B5EF4-FFF2-40B4-BE49-F238E27FC236}">
-                <a16:creationId xmlns:a16="http://schemas.microsoft.com/office/drawing/2014/main" id="{911DBBF1-3229-4BD9-B3D1-B4CA571E7431}"/>
-              </a:ext>
-              <a:ext uri="{C183D7F6-B498-43B3-948B-1728B52AA6E4}">
-                <adec:decorative xmlns:adec="http://schemas.microsoft.com/office/drawing/2017/decorative" val="1"/>
-              </a:ext>
-            </a:extLst>
-          </p:cNvPr>
-          <p:cNvCxnSpPr>
-            <a:cxnSpLocks noGrp="1" noRot="1" noChangeAspect="1" noMove="1" noResize="1" noEditPoints="1" noAdjustHandles="1" noChangeArrowheads="1" noChangeShapeType="1"/>
-          </p:cNvCxnSpPr>
-          <p:nvPr>
-            <p:extLst>
-              <p:ext uri="{386F3935-93C4-4BCD-93E2-E3B085C9AB24}">
-                <p16:designElem xmlns:p16="http://schemas.microsoft.com/office/powerpoint/2015/main" val="1"/>
-              </p:ext>
-            </p:extLst>
-          </p:nvPr>
-        </p:nvCxnSpPr>
-        <p:spPr bwMode="white">
-          <a:xfrm>
-            <a:off x="0" y="843625"/>
-            <a:ext cx="12188824" cy="0"/>
-          </a:xfrm>
-          <a:prstGeom prst="line">
-            <a:avLst/>
-          </a:prstGeom>
-          <a:ln w="50800">
-            <a:solidFill>
-              <a:schemeClr val="bg1"/>
-            </a:solidFill>
-          </a:ln>
-        </p:spPr>
-        <p:style>
-          <a:lnRef idx="1">
-            <a:schemeClr val="accent1"/>
-          </a:lnRef>
-          <a:fillRef idx="0">
-            <a:schemeClr val="accent1"/>
-          </a:fillRef>
-          <a:effectRef idx="0">
-            <a:schemeClr val="accent1"/>
-          </a:effectRef>
-          <a:fontRef idx="minor">
-            <a:schemeClr val="tx1"/>
-          </a:fontRef>
-        </p:style>
-      </p:cxnSp>
-      <p:sp>
-        <p:nvSpPr>
-          <p:cNvPr id="14" name="Rectangle 13">
-            <a:extLst>
-              <a:ext uri="{FF2B5EF4-FFF2-40B4-BE49-F238E27FC236}">
-                <a16:creationId xmlns:a16="http://schemas.microsoft.com/office/drawing/2014/main" id="{5BC87C3E-1040-4EE4-9BDB-9537F7A1B335}"/>
-              </a:ext>
-              <a:ext uri="{C183D7F6-B498-43B3-948B-1728B52AA6E4}">
-                <adec:decorative xmlns:adec="http://schemas.microsoft.com/office/drawing/2017/decorative" val="1"/>
-              </a:ext>
-            </a:extLst>
-          </p:cNvPr>
-          <p:cNvSpPr>
-            <a:spLocks noGrp="1" noRot="1" noChangeAspect="1" noMove="1" noResize="1" noEditPoints="1" noAdjustHandles="1" noChangeArrowheads="1" noChangeShapeType="1" noTextEdit="1"/>
-          </p:cNvSpPr>
-          <p:nvPr>
-            <p:extLst>
-              <p:ext uri="{386F3935-93C4-4BCD-93E2-E3B085C9AB24}">
-                <p16:designElem xmlns:p16="http://schemas.microsoft.com/office/powerpoint/2015/main" val="1"/>
-              </p:ext>
-            </p:extLst>
-          </p:nvPr>
-        </p:nvSpPr>
-        <p:spPr>
-          <a:xfrm>
-            <a:off x="3176" y="968282"/>
-            <a:ext cx="12188824" cy="4946904"/>
-          </a:xfrm>
-          <a:prstGeom prst="rect">
-            <a:avLst/>
-          </a:prstGeom>
-          <a:solidFill>
-            <a:schemeClr val="bg1"/>
-          </a:solidFill>
-          <a:ln>
-            <a:noFill/>
-          </a:ln>
-        </p:spPr>
-        <p:style>
-          <a:lnRef idx="2">
-            <a:schemeClr val="accent1">
-              <a:shade val="50000"/>
-            </a:schemeClr>
-          </a:lnRef>
-          <a:fillRef idx="1">
-            <a:schemeClr val="accent1"/>
-          </a:fillRef>
-          <a:effectRef idx="0">
-            <a:schemeClr val="accent1"/>
-          </a:effectRef>
-          <a:fontRef idx="minor">
-            <a:schemeClr val="lt1"/>
-          </a:fontRef>
-        </p:style>
-        <p:txBody>
-          <a:bodyPr rtlCol="0" anchor="ctr"/>
-          <a:lstStyle/>
-          <a:p>
-            <a:pPr algn="ctr"/>
-            <a:endParaRPr lang="en-US"/>
-          </a:p>
-        </p:txBody>
-      </p:sp>
-      <p:sp>
-        <p:nvSpPr>
-          <p:cNvPr id="4" name="Title 3">
-            <a:extLst>
-              <a:ext uri="{FF2B5EF4-FFF2-40B4-BE49-F238E27FC236}">
-                <a16:creationId xmlns:a16="http://schemas.microsoft.com/office/drawing/2014/main" id="{9C5DE9BB-F19F-184F-9F7C-A50B42CB8F0E}"/>
-              </a:ext>
-            </a:extLst>
-          </p:cNvPr>
-          <p:cNvSpPr>
-            <a:spLocks noGrp="1"/>
-          </p:cNvSpPr>
-          <p:nvPr>
-            <p:ph type="title"/>
-          </p:nvPr>
-        </p:nvSpPr>
-        <p:spPr>
-          <a:xfrm>
-            <a:off x="795338" y="1566473"/>
-            <a:ext cx="10601325" cy="2166723"/>
-          </a:xfrm>
-        </p:spPr>
-        <p:txBody>
-          <a:bodyPr vert="horz" lIns="91440" tIns="45720" rIns="91440" bIns="45720" rtlCol="0" anchor="b">
-            <a:normAutofit/>
-          </a:bodyPr>
-          <a:lstStyle/>
-          <a:p>
-            <a:pPr algn="ctr"/>
-            <a:r>
-              <a:rPr lang="en-US" sz="6600" kern="1200" dirty="0">
-                <a:solidFill>
-                  <a:schemeClr val="tx1"/>
-                </a:solidFill>
-                <a:latin typeface="+mj-lt"/>
-                <a:ea typeface="+mj-ea"/>
-                <a:cs typeface="+mj-cs"/>
-              </a:rPr>
-              <a:t>“Point of view is worth 80 IQ points”</a:t>
-            </a:r>
-          </a:p>
-        </p:txBody>
-      </p:sp>
-      <p:sp>
-        <p:nvSpPr>
-          <p:cNvPr id="5" name="Subtitle 4">
-            <a:extLst>
-              <a:ext uri="{FF2B5EF4-FFF2-40B4-BE49-F238E27FC236}">
-                <a16:creationId xmlns:a16="http://schemas.microsoft.com/office/drawing/2014/main" id="{A72E419C-CB79-4040-8E5A-DF95EFABBEAF}"/>
-              </a:ext>
-            </a:extLst>
-          </p:cNvPr>
-          <p:cNvSpPr>
-            <a:spLocks noGrp="1"/>
-          </p:cNvSpPr>
-          <p:nvPr>
-            <p:ph type="body" idx="1"/>
-          </p:nvPr>
-        </p:nvSpPr>
-        <p:spPr>
-          <a:xfrm>
-            <a:off x="795338" y="4092320"/>
-            <a:ext cx="10601325" cy="1144884"/>
-          </a:xfrm>
-        </p:spPr>
-        <p:txBody>
-          <a:bodyPr vert="horz" lIns="91440" tIns="45720" rIns="91440" bIns="45720" rtlCol="0">
-            <a:normAutofit/>
-          </a:bodyPr>
-          <a:lstStyle/>
-          <a:p>
-            <a:pPr algn="ctr"/>
-            <a:r>
-              <a:rPr lang="en-US" kern="1200">
-                <a:solidFill>
-                  <a:schemeClr val="tx1"/>
-                </a:solidFill>
-                <a:latin typeface="+mn-lt"/>
-                <a:ea typeface="+mn-ea"/>
-                <a:cs typeface="+mn-cs"/>
-              </a:rPr>
-              <a:t>Alan Key</a:t>
-            </a:r>
-          </a:p>
-        </p:txBody>
-      </p:sp>
-      <p:cxnSp>
-        <p:nvCxnSpPr>
-          <p:cNvPr id="16" name="Straight Connector 15">
-            <a:extLst>
-              <a:ext uri="{FF2B5EF4-FFF2-40B4-BE49-F238E27FC236}">
-                <a16:creationId xmlns:a16="http://schemas.microsoft.com/office/drawing/2014/main" id="{42CDBECE-872A-4C73-9DC1-BB4E805E2CF5}"/>
-              </a:ext>
-              <a:ext uri="{C183D7F6-B498-43B3-948B-1728B52AA6E4}">
-                <adec:decorative xmlns:adec="http://schemas.microsoft.com/office/drawing/2017/decorative" val="1"/>
-              </a:ext>
-            </a:extLst>
-          </p:cNvPr>
-          <p:cNvCxnSpPr>
-            <a:cxnSpLocks noGrp="1" noRot="1" noChangeAspect="1" noMove="1" noResize="1" noEditPoints="1" noAdjustHandles="1" noChangeArrowheads="1" noChangeShapeType="1"/>
-          </p:cNvCxnSpPr>
-          <p:nvPr>
-            <p:extLst>
-              <p:ext uri="{386F3935-93C4-4BCD-93E2-E3B085C9AB24}">
-                <p16:designElem xmlns:p16="http://schemas.microsoft.com/office/powerpoint/2015/main" val="1"/>
-              </p:ext>
-            </p:extLst>
-          </p:nvPr>
-        </p:nvCxnSpPr>
-        <p:spPr>
-          <a:xfrm>
-            <a:off x="4724400" y="3894594"/>
-            <a:ext cx="2743200" cy="0"/>
-          </a:xfrm>
-          <a:prstGeom prst="line">
-            <a:avLst/>
-          </a:prstGeom>
-          <a:ln w="19050">
-            <a:solidFill>
-              <a:schemeClr val="tx1">
-                <a:lumMod val="50000"/>
-                <a:lumOff val="50000"/>
-              </a:schemeClr>
-            </a:solidFill>
-          </a:ln>
-        </p:spPr>
-        <p:style>
-          <a:lnRef idx="1">
-            <a:schemeClr val="accent1"/>
-          </a:lnRef>
-          <a:fillRef idx="0">
-            <a:schemeClr val="accent1"/>
-          </a:fillRef>
-          <a:effectRef idx="0">
-            <a:schemeClr val="accent1"/>
-          </a:effectRef>
-          <a:fontRef idx="minor">
-            <a:schemeClr val="tx1"/>
-          </a:fontRef>
-        </p:style>
-      </p:cxnSp>
-      <p:cxnSp>
-        <p:nvCxnSpPr>
-          <p:cNvPr id="18" name="Straight Connector 17">
-            <a:extLst>
-              <a:ext uri="{FF2B5EF4-FFF2-40B4-BE49-F238E27FC236}">
-                <a16:creationId xmlns:a16="http://schemas.microsoft.com/office/drawing/2014/main" id="{F5CD5A0B-CDD7-427C-AA42-2EECFDFA1811}"/>
-              </a:ext>
-              <a:ext uri="{C183D7F6-B498-43B3-948B-1728B52AA6E4}">
-                <adec:decorative xmlns:adec="http://schemas.microsoft.com/office/drawing/2017/decorative" val="1"/>
-              </a:ext>
-            </a:extLst>
-          </p:cNvPr>
-          <p:cNvCxnSpPr>
-            <a:cxnSpLocks noGrp="1" noRot="1" noChangeAspect="1" noMove="1" noResize="1" noEditPoints="1" noAdjustHandles="1" noChangeArrowheads="1" noChangeShapeType="1"/>
-          </p:cNvCxnSpPr>
-          <p:nvPr>
-            <p:extLst>
-              <p:ext uri="{386F3935-93C4-4BCD-93E2-E3B085C9AB24}">
-                <p16:designElem xmlns:p16="http://schemas.microsoft.com/office/powerpoint/2015/main" val="1"/>
-              </p:ext>
-            </p:extLst>
-          </p:nvPr>
-        </p:nvCxnSpPr>
-        <p:spPr bwMode="white">
-          <a:xfrm>
-            <a:off x="0" y="6028863"/>
-            <a:ext cx="12188824" cy="0"/>
-          </a:xfrm>
-          <a:prstGeom prst="line">
-            <a:avLst/>
-          </a:prstGeom>
-          <a:ln w="50800">
-            <a:solidFill>
-              <a:schemeClr val="bg1"/>
-            </a:solidFill>
-          </a:ln>
-        </p:spPr>
-        <p:style>
-          <a:lnRef idx="1">
-            <a:schemeClr val="accent1"/>
-          </a:lnRef>
-          <a:fillRef idx="0">
-            <a:schemeClr val="accent1"/>
-          </a:fillRef>
-          <a:effectRef idx="0">
-            <a:schemeClr val="accent1"/>
-          </a:effectRef>
-          <a:fontRef idx="minor">
-            <a:schemeClr val="tx1"/>
-          </a:fontRef>
-        </p:style>
-      </p:cxnSp>
-    </p:spTree>
-    <p:extLst>
-      <p:ext uri="{BB962C8B-B14F-4D97-AF65-F5344CB8AC3E}">
-        <p14:creationId xmlns:p14="http://schemas.microsoft.com/office/powerpoint/2010/main" val="2715581030"/>
-      </p:ext>
-    </p:extLst>
-  </p:cSld>
-  <p:clrMapOvr>
-    <a:masterClrMapping/>
-  </p:clrMapOvr>
-</p:sld>
-</file>
-
-<file path=ppt/slides/slide20.xml><?xml version="1.0" encoding="utf-8"?>
-<p:sld xmlns:a="http://schemas.openxmlformats.org/drawingml/2006/main" xmlns:r="http://schemas.openxmlformats.org/officeDocument/2006/relationships" xmlns:p="http://schemas.openxmlformats.org/presentationml/2006/main">
-  <p:cSld>
-    <p:bg>
-      <p:bgPr>
-        <a:solidFill>
-          <a:schemeClr val="bg1"/>
-        </a:solidFill>
-        <a:effectLst/>
-      </p:bgPr>
-    </p:bg>
-    <p:spTree>
-      <p:nvGrpSpPr>
-        <p:cNvPr id="1" name=""/>
-        <p:cNvGrpSpPr/>
-        <p:nvPr/>
-      </p:nvGrpSpPr>
-      <p:grpSpPr>
-        <a:xfrm>
-          <a:off x="0" y="0"/>
-          <a:ext cx="0" cy="0"/>
-          <a:chOff x="0" y="0"/>
-          <a:chExt cx="0" cy="0"/>
-        </a:xfrm>
-      </p:grpSpPr>
-      <p:sp>
-        <p:nvSpPr>
-          <p:cNvPr id="33" name="Rectangle 32">
-            <a:extLst>
-              <a:ext uri="{FF2B5EF4-FFF2-40B4-BE49-F238E27FC236}">
-                <a16:creationId xmlns:a16="http://schemas.microsoft.com/office/drawing/2014/main" id="{42A5316D-ED2F-4F89-B4B4-8D9240B1A348}"/>
-              </a:ext>
-              <a:ext uri="{C183D7F6-B498-43B3-948B-1728B52AA6E4}">
-                <adec:decorative xmlns:adec="http://schemas.microsoft.com/office/drawing/2017/decorative" val="1"/>
-              </a:ext>
-            </a:extLst>
-          </p:cNvPr>
-          <p:cNvSpPr>
-            <a:spLocks noGrp="1" noRot="1" noChangeAspect="1" noMove="1" noResize="1" noEditPoints="1" noAdjustHandles="1" noChangeArrowheads="1" noChangeShapeType="1" noTextEdit="1"/>
-          </p:cNvSpPr>
-          <p:nvPr>
-            <p:extLst>
-              <p:ext uri="{386F3935-93C4-4BCD-93E2-E3B085C9AB24}">
-                <p16:designElem xmlns:p16="http://schemas.microsoft.com/office/powerpoint/2015/main" val="1"/>
-              </p:ext>
-            </p:extLst>
-          </p:nvPr>
-        </p:nvSpPr>
-        <p:spPr>
-          <a:xfrm>
-            <a:off x="0" y="0"/>
-            <a:ext cx="2013557" cy="6858000"/>
-          </a:xfrm>
-          <a:prstGeom prst="rect">
-            <a:avLst/>
-          </a:prstGeom>
-          <a:solidFill>
-            <a:srgbClr val="7F7F7F"/>
-          </a:solidFill>
-          <a:ln>
-            <a:noFill/>
-          </a:ln>
-        </p:spPr>
-        <p:style>
-          <a:lnRef idx="2">
-            <a:schemeClr val="accent1">
-              <a:shade val="50000"/>
-            </a:schemeClr>
-          </a:lnRef>
-          <a:fillRef idx="1">
-            <a:schemeClr val="accent1"/>
-          </a:fillRef>
-          <a:effectRef idx="0">
-            <a:schemeClr val="accent1"/>
-          </a:effectRef>
-          <a:fontRef idx="minor">
-            <a:schemeClr val="lt1"/>
-          </a:fontRef>
-        </p:style>
-        <p:txBody>
-          <a:bodyPr rtlCol="0" anchor="ctr"/>
-          <a:lstStyle/>
-          <a:p>
-            <a:pPr marL="0" marR="0" lvl="0" indent="0" algn="ctr" defTabSz="914400" rtl="0" eaLnBrk="1" fontAlgn="auto" latinLnBrk="0" hangingPunct="1">
-              <a:lnSpc>
-                <a:spcPct val="100000"/>
-              </a:lnSpc>
-              <a:spcBef>
-                <a:spcPts val="0"/>
-              </a:spcBef>
-              <a:spcAft>
-                <a:spcPts val="0"/>
-              </a:spcAft>
-              <a:buClrTx/>
-              <a:buSzTx/>
-              <a:buFontTx/>
-              <a:buNone/>
-              <a:tabLst/>
-              <a:defRPr/>
-            </a:pPr>
-            <a:endParaRPr kumimoji="0" lang="en-US" sz="1800" b="0" i="0" u="none" strike="noStrike" kern="1200" cap="none" spc="0" normalizeH="0" baseline="0" noProof="0">
-              <a:ln>
-                <a:noFill/>
-              </a:ln>
-              <a:solidFill>
-                <a:prstClr val="white"/>
-              </a:solidFill>
-              <a:effectLst/>
-              <a:uLnTx/>
-              <a:uFillTx/>
-              <a:latin typeface="Calibri" panose="020F0502020204030204"/>
-              <a:ea typeface="+mn-ea"/>
-              <a:cs typeface="+mn-cs"/>
-            </a:endParaRPr>
-          </a:p>
-        </p:txBody>
-      </p:sp>
-      <p:sp>
-        <p:nvSpPr>
-          <p:cNvPr id="2" name="Title 1">
-            <a:extLst>
-              <a:ext uri="{FF2B5EF4-FFF2-40B4-BE49-F238E27FC236}">
-                <a16:creationId xmlns:a16="http://schemas.microsoft.com/office/drawing/2014/main" id="{179B0B2E-FC83-9949-A534-87EF6DE79877}"/>
-              </a:ext>
-            </a:extLst>
-          </p:cNvPr>
-          <p:cNvSpPr>
-            <a:spLocks noGrp="1"/>
-          </p:cNvSpPr>
-          <p:nvPr>
-            <p:ph type="title"/>
-          </p:nvPr>
-        </p:nvSpPr>
-        <p:spPr>
-          <a:xfrm>
-            <a:off x="694510" y="1487272"/>
-            <a:ext cx="2743200" cy="2743200"/>
-          </a:xfrm>
-          <a:prstGeom prst="ellipse">
-            <a:avLst/>
-          </a:prstGeom>
-          <a:solidFill>
-            <a:srgbClr val="262626"/>
-          </a:solidFill>
-          <a:ln w="174625" cmpd="thinThick">
-            <a:solidFill>
-              <a:srgbClr val="262626"/>
-            </a:solidFill>
-          </a:ln>
-        </p:spPr>
-        <p:txBody>
-          <a:bodyPr vert="horz" lIns="91440" tIns="45720" rIns="91440" bIns="45720" rtlCol="0" anchor="ctr">
-            <a:normAutofit/>
-          </a:bodyPr>
-          <a:lstStyle/>
-          <a:p>
-            <a:pPr algn="ctr"/>
-            <a:r>
-              <a:rPr lang="en-US" sz="2600" kern="1200" dirty="0">
-                <a:solidFill>
-                  <a:srgbClr val="FFFFFF"/>
-                </a:solidFill>
-                <a:latin typeface="+mj-lt"/>
-                <a:ea typeface="+mj-ea"/>
-                <a:cs typeface="+mj-cs"/>
-              </a:rPr>
-              <a:t>#2 </a:t>
-            </a:r>
-            <a:r>
-              <a:rPr lang="en-US" sz="2600" dirty="0">
-                <a:solidFill>
-                  <a:srgbClr val="FFFFFF"/>
-                </a:solidFill>
-              </a:rPr>
-              <a:t>- </a:t>
-            </a:r>
-            <a:r>
-              <a:rPr lang="en-US" sz="2600" kern="1200" dirty="0">
-                <a:solidFill>
-                  <a:srgbClr val="FFFFFF"/>
-                </a:solidFill>
-                <a:latin typeface="+mj-lt"/>
-                <a:ea typeface="+mj-ea"/>
-                <a:cs typeface="+mj-cs"/>
-              </a:rPr>
-              <a:t>Sum type</a:t>
-            </a:r>
-          </a:p>
-        </p:txBody>
-      </p:sp>
-      <p:pic>
-        <p:nvPicPr>
-          <p:cNvPr id="28" name="Content Placeholder 27" descr="Text&#10;&#10;Description automatically generated">
-            <a:extLst>
-              <a:ext uri="{FF2B5EF4-FFF2-40B4-BE49-F238E27FC236}">
-                <a16:creationId xmlns:a16="http://schemas.microsoft.com/office/drawing/2014/main" id="{E724F2A6-4B93-E94D-A7A9-21CE2B35CD16}"/>
-              </a:ext>
-            </a:extLst>
-          </p:cNvPr>
-          <p:cNvPicPr>
-            <a:picLocks noGrp="1" noChangeAspect="1"/>
-          </p:cNvPicPr>
-          <p:nvPr>
-            <p:ph idx="1"/>
-          </p:nvPr>
-        </p:nvPicPr>
-        <p:blipFill>
-          <a:blip r:embed="rId3"/>
-          <a:stretch>
-            <a:fillRect/>
-          </a:stretch>
-        </p:blipFill>
-        <p:spPr>
-          <a:xfrm>
-            <a:off x="4443305" y="802190"/>
-            <a:ext cx="5507039" cy="5987312"/>
-          </a:xfrm>
-          <a:prstGeom prst="rect">
-            <a:avLst/>
-          </a:prstGeom>
-        </p:spPr>
-      </p:pic>
-      <p:sp>
-        <p:nvSpPr>
-          <p:cNvPr id="22" name="Rectangle 21">
-            <a:extLst>
-              <a:ext uri="{FF2B5EF4-FFF2-40B4-BE49-F238E27FC236}">
-                <a16:creationId xmlns:a16="http://schemas.microsoft.com/office/drawing/2014/main" id="{79B163FB-0019-8245-8BAA-3644F154F737}"/>
-              </a:ext>
-            </a:extLst>
-          </p:cNvPr>
-          <p:cNvSpPr/>
-          <p:nvPr/>
-        </p:nvSpPr>
-        <p:spPr>
-          <a:xfrm>
-            <a:off x="4443305" y="424318"/>
-            <a:ext cx="4813817" cy="472940"/>
-          </a:xfrm>
-          <a:prstGeom prst="rect">
-            <a:avLst/>
-          </a:prstGeom>
-        </p:spPr>
-        <p:txBody>
-          <a:bodyPr vert="horz" lIns="91440" tIns="45720" rIns="91440" bIns="45720" rtlCol="0">
-            <a:normAutofit/>
-          </a:bodyPr>
-          <a:lstStyle/>
-          <a:p>
-            <a:pPr>
-              <a:lnSpc>
-                <a:spcPct val="90000"/>
-              </a:lnSpc>
-              <a:spcAft>
-                <a:spcPts val="600"/>
-              </a:spcAft>
-            </a:pPr>
-            <a:r>
-              <a:rPr lang="en-US" i="1" dirty="0"/>
-              <a:t>No sum type in C#, but you got Polymorphism…</a:t>
-            </a:r>
-          </a:p>
-        </p:txBody>
-      </p:sp>
-    </p:spTree>
-    <p:extLst>
-      <p:ext uri="{BB962C8B-B14F-4D97-AF65-F5344CB8AC3E}">
-        <p14:creationId xmlns:p14="http://schemas.microsoft.com/office/powerpoint/2010/main" val="503500249"/>
-      </p:ext>
-    </p:extLst>
-  </p:cSld>
-  <p:clrMapOvr>
-    <a:masterClrMapping/>
-  </p:clrMapOvr>
-</p:sld>
-</file>
-
-<file path=ppt/slides/slide21.xml><?xml version="1.0" encoding="utf-8"?>
+<file path=ppt/slides/slide22.xml><?xml version="1.0" encoding="utf-8"?>
 <p:sld xmlns:a="http://schemas.openxmlformats.org/drawingml/2006/main" xmlns:r="http://schemas.openxmlformats.org/officeDocument/2006/relationships" xmlns:p="http://schemas.openxmlformats.org/presentationml/2006/main">
   <p:cSld>
     <p:bg>
@@ -9346,7 +9929,7 @@
 </p:sld>
 </file>
 
-<file path=ppt/slides/slide22.xml><?xml version="1.0" encoding="utf-8"?>
+<file path=ppt/slides/slide23.xml><?xml version="1.0" encoding="utf-8"?>
 <p:sld xmlns:a="http://schemas.openxmlformats.org/drawingml/2006/main" xmlns:r="http://schemas.openxmlformats.org/officeDocument/2006/relationships" xmlns:p="http://schemas.openxmlformats.org/presentationml/2006/main">
   <p:cSld>
     <p:bg>
@@ -10253,7 +10836,7 @@
 </p:sld>
 </file>
 
-<file path=ppt/slides/slide23.xml><?xml version="1.0" encoding="utf-8"?>
+<file path=ppt/slides/slide24.xml><?xml version="1.0" encoding="utf-8"?>
 <p:sld xmlns:a="http://schemas.openxmlformats.org/drawingml/2006/main" xmlns:r="http://schemas.openxmlformats.org/officeDocument/2006/relationships" xmlns:p="http://schemas.openxmlformats.org/presentationml/2006/main">
   <p:cSld>
     <p:bg>
@@ -10597,7 +11180,7 @@
 </p:sld>
 </file>
 
-<file path=ppt/slides/slide24.xml><?xml version="1.0" encoding="utf-8"?>
+<file path=ppt/slides/slide25.xml><?xml version="1.0" encoding="utf-8"?>
 <p:sld xmlns:a="http://schemas.openxmlformats.org/drawingml/2006/main" xmlns:r="http://schemas.openxmlformats.org/officeDocument/2006/relationships" xmlns:p="http://schemas.openxmlformats.org/presentationml/2006/main">
   <p:cSld>
     <p:bg>
@@ -10964,7 +11547,7 @@
 </p:sld>
 </file>
 
-<file path=ppt/slides/slide25.xml><?xml version="1.0" encoding="utf-8"?>
+<file path=ppt/slides/slide26.xml><?xml version="1.0" encoding="utf-8"?>
 <p:sld xmlns:a="http://schemas.openxmlformats.org/drawingml/2006/main" xmlns:r="http://schemas.openxmlformats.org/officeDocument/2006/relationships" xmlns:p="http://schemas.openxmlformats.org/presentationml/2006/main">
   <p:cSld>
     <p:bg>
@@ -11205,256 +11788,6 @@
     <p:extLst>
       <p:ext uri="{BB962C8B-B14F-4D97-AF65-F5344CB8AC3E}">
         <p14:creationId xmlns:p14="http://schemas.microsoft.com/office/powerpoint/2010/main" val="3390254556"/>
-      </p:ext>
-    </p:extLst>
-  </p:cSld>
-  <p:clrMapOvr>
-    <a:masterClrMapping/>
-  </p:clrMapOvr>
-</p:sld>
-</file>
-
-<file path=ppt/slides/slide26.xml><?xml version="1.0" encoding="utf-8"?>
-<p:sld xmlns:a="http://schemas.openxmlformats.org/drawingml/2006/main" xmlns:r="http://schemas.openxmlformats.org/officeDocument/2006/relationships" xmlns:p="http://schemas.openxmlformats.org/presentationml/2006/main">
-  <p:cSld>
-    <p:bg>
-      <p:bgPr>
-        <a:solidFill>
-          <a:schemeClr val="bg1"/>
-        </a:solidFill>
-        <a:effectLst/>
-      </p:bgPr>
-    </p:bg>
-    <p:spTree>
-      <p:nvGrpSpPr>
-        <p:cNvPr id="1" name=""/>
-        <p:cNvGrpSpPr/>
-        <p:nvPr/>
-      </p:nvGrpSpPr>
-      <p:grpSpPr>
-        <a:xfrm>
-          <a:off x="0" y="0"/>
-          <a:ext cx="0" cy="0"/>
-          <a:chOff x="0" y="0"/>
-          <a:chExt cx="0" cy="0"/>
-        </a:xfrm>
-      </p:grpSpPr>
-      <p:sp>
-        <p:nvSpPr>
-          <p:cNvPr id="13" name="Rectangle 12">
-            <a:extLst>
-              <a:ext uri="{FF2B5EF4-FFF2-40B4-BE49-F238E27FC236}">
-                <a16:creationId xmlns:a16="http://schemas.microsoft.com/office/drawing/2014/main" id="{6753252F-4873-4F63-801D-CC719279A7D5}"/>
-              </a:ext>
-              <a:ext uri="{C183D7F6-B498-43B3-948B-1728B52AA6E4}">
-                <adec:decorative xmlns:adec="http://schemas.microsoft.com/office/drawing/2017/decorative" val="1"/>
-              </a:ext>
-            </a:extLst>
-          </p:cNvPr>
-          <p:cNvSpPr>
-            <a:spLocks noGrp="1" noRot="1" noChangeAspect="1" noMove="1" noResize="1" noEditPoints="1" noAdjustHandles="1" noChangeArrowheads="1" noChangeShapeType="1" noTextEdit="1"/>
-          </p:cNvSpPr>
-          <p:nvPr>
-            <p:extLst>
-              <p:ext uri="{386F3935-93C4-4BCD-93E2-E3B085C9AB24}">
-                <p16:designElem xmlns:p16="http://schemas.microsoft.com/office/powerpoint/2015/main" val="1"/>
-              </p:ext>
-            </p:extLst>
-          </p:nvPr>
-        </p:nvSpPr>
-        <p:spPr>
-          <a:xfrm>
-            <a:off x="0" y="0"/>
-            <a:ext cx="12192000" cy="6858000"/>
-          </a:xfrm>
-          <a:prstGeom prst="rect">
-            <a:avLst/>
-          </a:prstGeom>
-          <a:solidFill>
-            <a:srgbClr val="FFFFFF"/>
-          </a:solidFill>
-          <a:ln>
-            <a:noFill/>
-          </a:ln>
-        </p:spPr>
-        <p:style>
-          <a:lnRef idx="2">
-            <a:schemeClr val="accent1">
-              <a:shade val="50000"/>
-            </a:schemeClr>
-          </a:lnRef>
-          <a:fillRef idx="1">
-            <a:schemeClr val="accent1"/>
-          </a:fillRef>
-          <a:effectRef idx="0">
-            <a:schemeClr val="accent1"/>
-          </a:effectRef>
-          <a:fontRef idx="minor">
-            <a:schemeClr val="lt1"/>
-          </a:fontRef>
-        </p:style>
-        <p:txBody>
-          <a:bodyPr rtlCol="0" anchor="ctr"/>
-          <a:lstStyle/>
-          <a:p>
-            <a:pPr algn="ctr"/>
-            <a:endParaRPr lang="en-US"/>
-          </a:p>
-        </p:txBody>
-      </p:sp>
-      <p:sp>
-        <p:nvSpPr>
-          <p:cNvPr id="15" name="Rectangle 14">
-            <a:extLst>
-              <a:ext uri="{FF2B5EF4-FFF2-40B4-BE49-F238E27FC236}">
-                <a16:creationId xmlns:a16="http://schemas.microsoft.com/office/drawing/2014/main" id="{047C8CCB-F95D-4249-92DD-651249D3535A}"/>
-              </a:ext>
-              <a:ext uri="{C183D7F6-B498-43B3-948B-1728B52AA6E4}">
-                <adec:decorative xmlns:adec="http://schemas.microsoft.com/office/drawing/2017/decorative" val="1"/>
-              </a:ext>
-            </a:extLst>
-          </p:cNvPr>
-          <p:cNvSpPr>
-            <a:spLocks noGrp="1" noRot="1" noChangeAspect="1" noMove="1" noResize="1" noEditPoints="1" noAdjustHandles="1" noChangeArrowheads="1" noChangeShapeType="1" noTextEdit="1"/>
-          </p:cNvSpPr>
-          <p:nvPr>
-            <p:extLst>
-              <p:ext uri="{386F3935-93C4-4BCD-93E2-E3B085C9AB24}">
-                <p16:designElem xmlns:p16="http://schemas.microsoft.com/office/powerpoint/2015/main" val="1"/>
-              </p:ext>
-            </p:extLst>
-          </p:nvPr>
-        </p:nvSpPr>
-        <p:spPr>
-          <a:xfrm>
-            <a:off x="0" y="0"/>
-            <a:ext cx="2013557" cy="6858000"/>
-          </a:xfrm>
-          <a:prstGeom prst="rect">
-            <a:avLst/>
-          </a:prstGeom>
-          <a:solidFill>
-            <a:srgbClr val="7F7F7F"/>
-          </a:solidFill>
-          <a:ln>
-            <a:noFill/>
-          </a:ln>
-        </p:spPr>
-        <p:style>
-          <a:lnRef idx="2">
-            <a:schemeClr val="accent1">
-              <a:shade val="50000"/>
-            </a:schemeClr>
-          </a:lnRef>
-          <a:fillRef idx="1">
-            <a:schemeClr val="accent1"/>
-          </a:fillRef>
-          <a:effectRef idx="0">
-            <a:schemeClr val="accent1"/>
-          </a:effectRef>
-          <a:fontRef idx="minor">
-            <a:schemeClr val="lt1"/>
-          </a:fontRef>
-        </p:style>
-        <p:txBody>
-          <a:bodyPr rtlCol="0" anchor="ctr"/>
-          <a:lstStyle/>
-          <a:p>
-            <a:pPr algn="ctr"/>
-            <a:endParaRPr lang="en-US"/>
-          </a:p>
-        </p:txBody>
-      </p:sp>
-      <p:sp>
-        <p:nvSpPr>
-          <p:cNvPr id="2" name="Title 1">
-            <a:extLst>
-              <a:ext uri="{FF2B5EF4-FFF2-40B4-BE49-F238E27FC236}">
-                <a16:creationId xmlns:a16="http://schemas.microsoft.com/office/drawing/2014/main" id="{179B0B2E-FC83-9949-A534-87EF6DE79877}"/>
-              </a:ext>
-            </a:extLst>
-          </p:cNvPr>
-          <p:cNvSpPr>
-            <a:spLocks noGrp="1"/>
-          </p:cNvSpPr>
-          <p:nvPr>
-            <p:ph type="title"/>
-          </p:nvPr>
-        </p:nvSpPr>
-        <p:spPr>
-          <a:xfrm>
-            <a:off x="640080" y="2074363"/>
-            <a:ext cx="2752354" cy="2709275"/>
-          </a:xfrm>
-          <a:prstGeom prst="ellipse">
-            <a:avLst/>
-          </a:prstGeom>
-          <a:solidFill>
-            <a:srgbClr val="262626"/>
-          </a:solidFill>
-          <a:ln w="174625" cmpd="thinThick">
-            <a:solidFill>
-              <a:srgbClr val="262626"/>
-            </a:solidFill>
-          </a:ln>
-        </p:spPr>
-        <p:txBody>
-          <a:bodyPr vert="horz" lIns="91440" tIns="45720" rIns="91440" bIns="45720" rtlCol="0" anchor="ctr">
-            <a:normAutofit/>
-          </a:bodyPr>
-          <a:lstStyle/>
-          <a:p>
-            <a:pPr algn="ctr"/>
-            <a:r>
-              <a:rPr lang="en-US" sz="2600" kern="1200">
-                <a:solidFill>
-                  <a:srgbClr val="FFFFFF"/>
-                </a:solidFill>
-                <a:latin typeface="+mj-lt"/>
-                <a:ea typeface="+mj-ea"/>
-                <a:cs typeface="+mj-cs"/>
-              </a:rPr>
-              <a:t>#4 - Pattern matching</a:t>
-            </a:r>
-          </a:p>
-        </p:txBody>
-      </p:sp>
-      <p:pic>
-        <p:nvPicPr>
-          <p:cNvPr id="8" name="Content Placeholder 7" descr="Text&#10;&#10;Description automatically generated">
-            <a:extLst>
-              <a:ext uri="{FF2B5EF4-FFF2-40B4-BE49-F238E27FC236}">
-                <a16:creationId xmlns:a16="http://schemas.microsoft.com/office/drawing/2014/main" id="{1508E9CE-EF9B-C547-B7B6-342E87523D73}"/>
-              </a:ext>
-            </a:extLst>
-          </p:cNvPr>
-          <p:cNvPicPr>
-            <a:picLocks noGrp="1" noChangeAspect="1"/>
-          </p:cNvPicPr>
-          <p:nvPr>
-            <p:ph idx="1"/>
-          </p:nvPr>
-        </p:nvPicPr>
-        <p:blipFill>
-          <a:blip r:embed="rId3"/>
-          <a:stretch>
-            <a:fillRect/>
-          </a:stretch>
-        </p:blipFill>
-        <p:spPr>
-          <a:xfrm>
-            <a:off x="4038600" y="2088503"/>
-            <a:ext cx="7188199" cy="2677604"/>
-          </a:xfrm>
-          <a:prstGeom prst="rect">
-            <a:avLst/>
-          </a:prstGeom>
-        </p:spPr>
-      </p:pic>
-    </p:spTree>
-    <p:extLst>
-      <p:ext uri="{BB962C8B-B14F-4D97-AF65-F5344CB8AC3E}">
-        <p14:creationId xmlns:p14="http://schemas.microsoft.com/office/powerpoint/2010/main" val="2610137923"/>
       </p:ext>
     </p:extLst>
   </p:cSld>
@@ -11491,7 +11824,7 @@
       </p:grpSpPr>
       <p:sp>
         <p:nvSpPr>
-          <p:cNvPr id="12" name="Rectangle 11">
+          <p:cNvPr id="13" name="Rectangle 12">
             <a:extLst>
               <a:ext uri="{FF2B5EF4-FFF2-40B4-BE49-F238E27FC236}">
                 <a16:creationId xmlns:a16="http://schemas.microsoft.com/office/drawing/2014/main" id="{6753252F-4873-4F63-801D-CC719279A7D5}"/>
@@ -11554,7 +11887,7 @@
       </p:sp>
       <p:sp>
         <p:nvSpPr>
-          <p:cNvPr id="14" name="Rectangle 13">
+          <p:cNvPr id="15" name="Rectangle 14">
             <a:extLst>
               <a:ext uri="{FF2B5EF4-FFF2-40B4-BE49-F238E27FC236}">
                 <a16:creationId xmlns:a16="http://schemas.microsoft.com/office/drawing/2014/main" id="{047C8CCB-F95D-4249-92DD-651249D3535A}"/>
@@ -11671,6 +12004,256 @@
       </p:sp>
       <p:pic>
         <p:nvPicPr>
+          <p:cNvPr id="8" name="Content Placeholder 7" descr="Text&#10;&#10;Description automatically generated">
+            <a:extLst>
+              <a:ext uri="{FF2B5EF4-FFF2-40B4-BE49-F238E27FC236}">
+                <a16:creationId xmlns:a16="http://schemas.microsoft.com/office/drawing/2014/main" id="{1508E9CE-EF9B-C547-B7B6-342E87523D73}"/>
+              </a:ext>
+            </a:extLst>
+          </p:cNvPr>
+          <p:cNvPicPr>
+            <a:picLocks noGrp="1" noChangeAspect="1"/>
+          </p:cNvPicPr>
+          <p:nvPr>
+            <p:ph idx="1"/>
+          </p:nvPr>
+        </p:nvPicPr>
+        <p:blipFill>
+          <a:blip r:embed="rId3"/>
+          <a:stretch>
+            <a:fillRect/>
+          </a:stretch>
+        </p:blipFill>
+        <p:spPr>
+          <a:xfrm>
+            <a:off x="4038600" y="2088503"/>
+            <a:ext cx="7188199" cy="2677604"/>
+          </a:xfrm>
+          <a:prstGeom prst="rect">
+            <a:avLst/>
+          </a:prstGeom>
+        </p:spPr>
+      </p:pic>
+    </p:spTree>
+    <p:extLst>
+      <p:ext uri="{BB962C8B-B14F-4D97-AF65-F5344CB8AC3E}">
+        <p14:creationId xmlns:p14="http://schemas.microsoft.com/office/powerpoint/2010/main" val="2610137923"/>
+      </p:ext>
+    </p:extLst>
+  </p:cSld>
+  <p:clrMapOvr>
+    <a:masterClrMapping/>
+  </p:clrMapOvr>
+</p:sld>
+</file>
+
+<file path=ppt/slides/slide28.xml><?xml version="1.0" encoding="utf-8"?>
+<p:sld xmlns:a="http://schemas.openxmlformats.org/drawingml/2006/main" xmlns:r="http://schemas.openxmlformats.org/officeDocument/2006/relationships" xmlns:p="http://schemas.openxmlformats.org/presentationml/2006/main">
+  <p:cSld>
+    <p:bg>
+      <p:bgPr>
+        <a:solidFill>
+          <a:schemeClr val="bg1"/>
+        </a:solidFill>
+        <a:effectLst/>
+      </p:bgPr>
+    </p:bg>
+    <p:spTree>
+      <p:nvGrpSpPr>
+        <p:cNvPr id="1" name=""/>
+        <p:cNvGrpSpPr/>
+        <p:nvPr/>
+      </p:nvGrpSpPr>
+      <p:grpSpPr>
+        <a:xfrm>
+          <a:off x="0" y="0"/>
+          <a:ext cx="0" cy="0"/>
+          <a:chOff x="0" y="0"/>
+          <a:chExt cx="0" cy="0"/>
+        </a:xfrm>
+      </p:grpSpPr>
+      <p:sp>
+        <p:nvSpPr>
+          <p:cNvPr id="12" name="Rectangle 11">
+            <a:extLst>
+              <a:ext uri="{FF2B5EF4-FFF2-40B4-BE49-F238E27FC236}">
+                <a16:creationId xmlns:a16="http://schemas.microsoft.com/office/drawing/2014/main" id="{6753252F-4873-4F63-801D-CC719279A7D5}"/>
+              </a:ext>
+              <a:ext uri="{C183D7F6-B498-43B3-948B-1728B52AA6E4}">
+                <adec:decorative xmlns:adec="http://schemas.microsoft.com/office/drawing/2017/decorative" val="1"/>
+              </a:ext>
+            </a:extLst>
+          </p:cNvPr>
+          <p:cNvSpPr>
+            <a:spLocks noGrp="1" noRot="1" noChangeAspect="1" noMove="1" noResize="1" noEditPoints="1" noAdjustHandles="1" noChangeArrowheads="1" noChangeShapeType="1" noTextEdit="1"/>
+          </p:cNvSpPr>
+          <p:nvPr>
+            <p:extLst>
+              <p:ext uri="{386F3935-93C4-4BCD-93E2-E3B085C9AB24}">
+                <p16:designElem xmlns:p16="http://schemas.microsoft.com/office/powerpoint/2015/main" val="1"/>
+              </p:ext>
+            </p:extLst>
+          </p:nvPr>
+        </p:nvSpPr>
+        <p:spPr>
+          <a:xfrm>
+            <a:off x="0" y="0"/>
+            <a:ext cx="12192000" cy="6858000"/>
+          </a:xfrm>
+          <a:prstGeom prst="rect">
+            <a:avLst/>
+          </a:prstGeom>
+          <a:solidFill>
+            <a:srgbClr val="FFFFFF"/>
+          </a:solidFill>
+          <a:ln>
+            <a:noFill/>
+          </a:ln>
+        </p:spPr>
+        <p:style>
+          <a:lnRef idx="2">
+            <a:schemeClr val="accent1">
+              <a:shade val="50000"/>
+            </a:schemeClr>
+          </a:lnRef>
+          <a:fillRef idx="1">
+            <a:schemeClr val="accent1"/>
+          </a:fillRef>
+          <a:effectRef idx="0">
+            <a:schemeClr val="accent1"/>
+          </a:effectRef>
+          <a:fontRef idx="minor">
+            <a:schemeClr val="lt1"/>
+          </a:fontRef>
+        </p:style>
+        <p:txBody>
+          <a:bodyPr rtlCol="0" anchor="ctr"/>
+          <a:lstStyle/>
+          <a:p>
+            <a:pPr algn="ctr"/>
+            <a:endParaRPr lang="en-US"/>
+          </a:p>
+        </p:txBody>
+      </p:sp>
+      <p:sp>
+        <p:nvSpPr>
+          <p:cNvPr id="14" name="Rectangle 13">
+            <a:extLst>
+              <a:ext uri="{FF2B5EF4-FFF2-40B4-BE49-F238E27FC236}">
+                <a16:creationId xmlns:a16="http://schemas.microsoft.com/office/drawing/2014/main" id="{047C8CCB-F95D-4249-92DD-651249D3535A}"/>
+              </a:ext>
+              <a:ext uri="{C183D7F6-B498-43B3-948B-1728B52AA6E4}">
+                <adec:decorative xmlns:adec="http://schemas.microsoft.com/office/drawing/2017/decorative" val="1"/>
+              </a:ext>
+            </a:extLst>
+          </p:cNvPr>
+          <p:cNvSpPr>
+            <a:spLocks noGrp="1" noRot="1" noChangeAspect="1" noMove="1" noResize="1" noEditPoints="1" noAdjustHandles="1" noChangeArrowheads="1" noChangeShapeType="1" noTextEdit="1"/>
+          </p:cNvSpPr>
+          <p:nvPr>
+            <p:extLst>
+              <p:ext uri="{386F3935-93C4-4BCD-93E2-E3B085C9AB24}">
+                <p16:designElem xmlns:p16="http://schemas.microsoft.com/office/powerpoint/2015/main" val="1"/>
+              </p:ext>
+            </p:extLst>
+          </p:nvPr>
+        </p:nvSpPr>
+        <p:spPr>
+          <a:xfrm>
+            <a:off x="0" y="0"/>
+            <a:ext cx="2013557" cy="6858000"/>
+          </a:xfrm>
+          <a:prstGeom prst="rect">
+            <a:avLst/>
+          </a:prstGeom>
+          <a:solidFill>
+            <a:srgbClr val="7F7F7F"/>
+          </a:solidFill>
+          <a:ln>
+            <a:noFill/>
+          </a:ln>
+        </p:spPr>
+        <p:style>
+          <a:lnRef idx="2">
+            <a:schemeClr val="accent1">
+              <a:shade val="50000"/>
+            </a:schemeClr>
+          </a:lnRef>
+          <a:fillRef idx="1">
+            <a:schemeClr val="accent1"/>
+          </a:fillRef>
+          <a:effectRef idx="0">
+            <a:schemeClr val="accent1"/>
+          </a:effectRef>
+          <a:fontRef idx="minor">
+            <a:schemeClr val="lt1"/>
+          </a:fontRef>
+        </p:style>
+        <p:txBody>
+          <a:bodyPr rtlCol="0" anchor="ctr"/>
+          <a:lstStyle/>
+          <a:p>
+            <a:pPr algn="ctr"/>
+            <a:endParaRPr lang="en-US"/>
+          </a:p>
+        </p:txBody>
+      </p:sp>
+      <p:sp>
+        <p:nvSpPr>
+          <p:cNvPr id="2" name="Title 1">
+            <a:extLst>
+              <a:ext uri="{FF2B5EF4-FFF2-40B4-BE49-F238E27FC236}">
+                <a16:creationId xmlns:a16="http://schemas.microsoft.com/office/drawing/2014/main" id="{179B0B2E-FC83-9949-A534-87EF6DE79877}"/>
+              </a:ext>
+            </a:extLst>
+          </p:cNvPr>
+          <p:cNvSpPr>
+            <a:spLocks noGrp="1"/>
+          </p:cNvSpPr>
+          <p:nvPr>
+            <p:ph type="title"/>
+          </p:nvPr>
+        </p:nvSpPr>
+        <p:spPr>
+          <a:xfrm>
+            <a:off x="640080" y="2074363"/>
+            <a:ext cx="2752354" cy="2709275"/>
+          </a:xfrm>
+          <a:prstGeom prst="ellipse">
+            <a:avLst/>
+          </a:prstGeom>
+          <a:solidFill>
+            <a:srgbClr val="262626"/>
+          </a:solidFill>
+          <a:ln w="174625" cmpd="thinThick">
+            <a:solidFill>
+              <a:srgbClr val="262626"/>
+            </a:solidFill>
+          </a:ln>
+        </p:spPr>
+        <p:txBody>
+          <a:bodyPr vert="horz" lIns="91440" tIns="45720" rIns="91440" bIns="45720" rtlCol="0" anchor="ctr">
+            <a:normAutofit/>
+          </a:bodyPr>
+          <a:lstStyle/>
+          <a:p>
+            <a:pPr algn="ctr"/>
+            <a:r>
+              <a:rPr lang="en-US" sz="2600" kern="1200">
+                <a:solidFill>
+                  <a:srgbClr val="FFFFFF"/>
+                </a:solidFill>
+                <a:latin typeface="+mj-lt"/>
+                <a:ea typeface="+mj-ea"/>
+                <a:cs typeface="+mj-cs"/>
+              </a:rPr>
+              <a:t>#4 - Pattern matching</a:t>
+            </a:r>
+          </a:p>
+        </p:txBody>
+      </p:sp>
+      <p:pic>
+        <p:nvPicPr>
           <p:cNvPr id="7" name="Content Placeholder 6" descr="Graphical user interface, website&#10;&#10;Description automatically generated with medium confidence">
             <a:extLst>
               <a:ext uri="{FF2B5EF4-FFF2-40B4-BE49-F238E27FC236}">
@@ -11835,7 +12418,7 @@
 </p:sld>
 </file>
 
-<file path=ppt/slides/slide28.xml><?xml version="1.0" encoding="utf-8"?>
+<file path=ppt/slides/slide29.xml><?xml version="1.0" encoding="utf-8"?>
 <p:sld xmlns:a="http://schemas.openxmlformats.org/drawingml/2006/main" xmlns:r="http://schemas.openxmlformats.org/officeDocument/2006/relationships" xmlns:p="http://schemas.openxmlformats.org/presentationml/2006/main">
   <p:cSld>
     <p:bg>
@@ -12202,7 +12785,321 @@
 </p:sld>
 </file>
 
-<file path=ppt/slides/slide29.xml><?xml version="1.0" encoding="utf-8"?>
+<file path=ppt/slides/slide3.xml><?xml version="1.0" encoding="utf-8"?>
+<p:sld xmlns:a="http://schemas.openxmlformats.org/drawingml/2006/main" xmlns:r="http://schemas.openxmlformats.org/officeDocument/2006/relationships" xmlns:p="http://schemas.openxmlformats.org/presentationml/2006/main">
+  <p:cSld>
+    <p:bg>
+      <p:bgPr>
+        <a:solidFill>
+          <a:schemeClr val="bg1"/>
+        </a:solidFill>
+        <a:effectLst/>
+      </p:bgPr>
+    </p:bg>
+    <p:spTree>
+      <p:nvGrpSpPr>
+        <p:cNvPr id="1" name=""/>
+        <p:cNvGrpSpPr/>
+        <p:nvPr/>
+      </p:nvGrpSpPr>
+      <p:grpSpPr>
+        <a:xfrm>
+          <a:off x="0" y="0"/>
+          <a:ext cx="0" cy="0"/>
+          <a:chOff x="0" y="0"/>
+          <a:chExt cx="0" cy="0"/>
+        </a:xfrm>
+      </p:grpSpPr>
+      <p:sp>
+        <p:nvSpPr>
+          <p:cNvPr id="8" name="Rectangle 7">
+            <a:extLst>
+              <a:ext uri="{FF2B5EF4-FFF2-40B4-BE49-F238E27FC236}">
+                <a16:creationId xmlns:a16="http://schemas.microsoft.com/office/drawing/2014/main" id="{02D886F1-CB4A-4FC1-AAA7-9402B0D0DDDD}"/>
+              </a:ext>
+              <a:ext uri="{C183D7F6-B498-43B3-948B-1728B52AA6E4}">
+                <adec:decorative xmlns:adec="http://schemas.microsoft.com/office/drawing/2017/decorative" val="1"/>
+              </a:ext>
+            </a:extLst>
+          </p:cNvPr>
+          <p:cNvSpPr>
+            <a:spLocks noGrp="1" noRot="1" noChangeAspect="1" noMove="1" noResize="1" noEditPoints="1" noAdjustHandles="1" noChangeArrowheads="1" noChangeShapeType="1" noTextEdit="1"/>
+          </p:cNvSpPr>
+          <p:nvPr>
+            <p:extLst>
+              <p:ext uri="{386F3935-93C4-4BCD-93E2-E3B085C9AB24}">
+                <p16:designElem xmlns:p16="http://schemas.microsoft.com/office/powerpoint/2015/main" val="1"/>
+              </p:ext>
+            </p:extLst>
+          </p:nvPr>
+        </p:nvSpPr>
+        <p:spPr>
+          <a:xfrm>
+            <a:off x="0" y="0"/>
+            <a:ext cx="2013557" cy="6858000"/>
+          </a:xfrm>
+          <a:prstGeom prst="rect">
+            <a:avLst/>
+          </a:prstGeom>
+          <a:solidFill>
+            <a:srgbClr val="7F7F7F"/>
+          </a:solidFill>
+          <a:ln>
+            <a:noFill/>
+          </a:ln>
+        </p:spPr>
+        <p:style>
+          <a:lnRef idx="2">
+            <a:schemeClr val="accent1">
+              <a:shade val="50000"/>
+            </a:schemeClr>
+          </a:lnRef>
+          <a:fillRef idx="1">
+            <a:schemeClr val="accent1"/>
+          </a:fillRef>
+          <a:effectRef idx="0">
+            <a:schemeClr val="accent1"/>
+          </a:effectRef>
+          <a:fontRef idx="minor">
+            <a:schemeClr val="lt1"/>
+          </a:fontRef>
+        </p:style>
+        <p:txBody>
+          <a:bodyPr rtlCol="0" anchor="ctr"/>
+          <a:lstStyle/>
+          <a:p>
+            <a:pPr marL="0" marR="0" lvl="0" indent="0" algn="ctr" defTabSz="914400" rtl="0" eaLnBrk="1" fontAlgn="auto" latinLnBrk="0" hangingPunct="1">
+              <a:lnSpc>
+                <a:spcPct val="100000"/>
+              </a:lnSpc>
+              <a:spcBef>
+                <a:spcPts val="0"/>
+              </a:spcBef>
+              <a:spcAft>
+                <a:spcPts val="0"/>
+              </a:spcAft>
+              <a:buClrTx/>
+              <a:buSzTx/>
+              <a:buFontTx/>
+              <a:buNone/>
+              <a:tabLst/>
+              <a:defRPr/>
+            </a:pPr>
+            <a:endParaRPr kumimoji="0" lang="en-US" sz="1800" b="0" i="0" u="none" strike="noStrike" kern="1200" cap="none" spc="0" normalizeH="0" baseline="0" noProof="0">
+              <a:ln>
+                <a:noFill/>
+              </a:ln>
+              <a:solidFill>
+                <a:prstClr val="white"/>
+              </a:solidFill>
+              <a:effectLst/>
+              <a:uLnTx/>
+              <a:uFillTx/>
+              <a:latin typeface="Calibri" panose="020F0502020204030204"/>
+              <a:ea typeface="+mn-ea"/>
+              <a:cs typeface="+mn-cs"/>
+            </a:endParaRPr>
+          </a:p>
+        </p:txBody>
+      </p:sp>
+      <p:sp>
+        <p:nvSpPr>
+          <p:cNvPr id="10" name="Rectangle 9">
+            <a:extLst>
+              <a:ext uri="{FF2B5EF4-FFF2-40B4-BE49-F238E27FC236}">
+                <a16:creationId xmlns:a16="http://schemas.microsoft.com/office/drawing/2014/main" id="{762B7B97-C3EE-4AEE-A61F-AFA873FE2FCA}"/>
+              </a:ext>
+              <a:ext uri="{C183D7F6-B498-43B3-948B-1728B52AA6E4}">
+                <adec:decorative xmlns:adec="http://schemas.microsoft.com/office/drawing/2017/decorative" val="1"/>
+              </a:ext>
+            </a:extLst>
+          </p:cNvPr>
+          <p:cNvSpPr>
+            <a:spLocks noGrp="1" noRot="1" noChangeAspect="1" noMove="1" noResize="1" noEditPoints="1" noAdjustHandles="1" noChangeArrowheads="1" noChangeShapeType="1" noTextEdit="1"/>
+          </p:cNvSpPr>
+          <p:nvPr>
+            <p:extLst>
+              <p:ext uri="{386F3935-93C4-4BCD-93E2-E3B085C9AB24}">
+                <p16:designElem xmlns:p16="http://schemas.microsoft.com/office/powerpoint/2015/main" val="1"/>
+              </p:ext>
+            </p:extLst>
+          </p:nvPr>
+        </p:nvSpPr>
+        <p:spPr>
+          <a:xfrm flipH="1">
+            <a:off x="2013557" y="0"/>
+            <a:ext cx="10178443" cy="6858000"/>
+          </a:xfrm>
+          <a:prstGeom prst="rect">
+            <a:avLst/>
+          </a:prstGeom>
+          <a:solidFill>
+            <a:schemeClr val="tx1">
+              <a:lumMod val="75000"/>
+              <a:lumOff val="25000"/>
+            </a:schemeClr>
+          </a:solidFill>
+          <a:ln>
+            <a:noFill/>
+          </a:ln>
+        </p:spPr>
+        <p:style>
+          <a:lnRef idx="2">
+            <a:schemeClr val="accent1">
+              <a:shade val="50000"/>
+            </a:schemeClr>
+          </a:lnRef>
+          <a:fillRef idx="1">
+            <a:schemeClr val="accent1"/>
+          </a:fillRef>
+          <a:effectRef idx="0">
+            <a:schemeClr val="accent1"/>
+          </a:effectRef>
+          <a:fontRef idx="minor">
+            <a:schemeClr val="lt1"/>
+          </a:fontRef>
+        </p:style>
+        <p:txBody>
+          <a:bodyPr rtlCol="0" anchor="ctr"/>
+          <a:lstStyle/>
+          <a:p>
+            <a:pPr marL="0" marR="0" lvl="0" indent="0" algn="ctr" defTabSz="914400" rtl="0" eaLnBrk="1" fontAlgn="auto" latinLnBrk="0" hangingPunct="1">
+              <a:lnSpc>
+                <a:spcPct val="100000"/>
+              </a:lnSpc>
+              <a:spcBef>
+                <a:spcPts val="0"/>
+              </a:spcBef>
+              <a:spcAft>
+                <a:spcPts val="0"/>
+              </a:spcAft>
+              <a:buClrTx/>
+              <a:buSzTx/>
+              <a:buFontTx/>
+              <a:buNone/>
+              <a:tabLst/>
+              <a:defRPr/>
+            </a:pPr>
+            <a:endParaRPr kumimoji="0" lang="en-US" sz="1800" b="0" i="0" u="none" strike="noStrike" kern="1200" cap="none" spc="0" normalizeH="0" baseline="0" noProof="0">
+              <a:ln>
+                <a:noFill/>
+              </a:ln>
+              <a:solidFill>
+                <a:prstClr val="white"/>
+              </a:solidFill>
+              <a:effectLst/>
+              <a:uLnTx/>
+              <a:uFillTx/>
+              <a:latin typeface="Calibri" panose="020F0502020204030204"/>
+              <a:ea typeface="+mn-ea"/>
+              <a:cs typeface="+mn-cs"/>
+            </a:endParaRPr>
+          </a:p>
+        </p:txBody>
+      </p:sp>
+      <p:sp>
+        <p:nvSpPr>
+          <p:cNvPr id="2" name="Title 1">
+            <a:extLst>
+              <a:ext uri="{FF2B5EF4-FFF2-40B4-BE49-F238E27FC236}">
+                <a16:creationId xmlns:a16="http://schemas.microsoft.com/office/drawing/2014/main" id="{F9902A6B-44D9-D746-952F-83A71750B989}"/>
+              </a:ext>
+            </a:extLst>
+          </p:cNvPr>
+          <p:cNvSpPr>
+            <a:spLocks noGrp="1"/>
+          </p:cNvSpPr>
+          <p:nvPr>
+            <p:ph type="title"/>
+          </p:nvPr>
+        </p:nvSpPr>
+        <p:spPr>
+          <a:xfrm>
+            <a:off x="623787" y="1635358"/>
+            <a:ext cx="2752344" cy="2706624"/>
+          </a:xfrm>
+          <a:prstGeom prst="ellipse">
+            <a:avLst/>
+          </a:prstGeom>
+          <a:solidFill>
+            <a:schemeClr val="bg1"/>
+          </a:solidFill>
+          <a:ln w="174625" cmpd="thinThick">
+            <a:solidFill>
+              <a:schemeClr val="bg1"/>
+            </a:solidFill>
+          </a:ln>
+        </p:spPr>
+        <p:txBody>
+          <a:bodyPr>
+            <a:normAutofit/>
+          </a:bodyPr>
+          <a:lstStyle/>
+          <a:p>
+            <a:pPr algn="ctr"/>
+            <a:r>
+              <a:rPr lang="en-GB" sz="2600" dirty="0"/>
+              <a:t>What is F# ?</a:t>
+            </a:r>
+          </a:p>
+        </p:txBody>
+      </p:sp>
+      <p:sp>
+        <p:nvSpPr>
+          <p:cNvPr id="3" name="Content Placeholder 2">
+            <a:extLst>
+              <a:ext uri="{FF2B5EF4-FFF2-40B4-BE49-F238E27FC236}">
+                <a16:creationId xmlns:a16="http://schemas.microsoft.com/office/drawing/2014/main" id="{F4BF5C52-AFEC-6240-9DF8-F7612BB6C130}"/>
+              </a:ext>
+            </a:extLst>
+          </p:cNvPr>
+          <p:cNvSpPr>
+            <a:spLocks noGrp="1"/>
+          </p:cNvSpPr>
+          <p:nvPr>
+            <p:ph idx="1"/>
+          </p:nvPr>
+        </p:nvSpPr>
+        <p:spPr>
+          <a:xfrm>
+            <a:off x="4027114" y="1835712"/>
+            <a:ext cx="7915856" cy="2305915"/>
+          </a:xfrm>
+        </p:spPr>
+        <p:txBody>
+          <a:bodyPr anchor="ctr">
+            <a:normAutofit/>
+          </a:bodyPr>
+          <a:lstStyle/>
+          <a:p>
+            <a:pPr marL="0" indent="0">
+              <a:buNone/>
+            </a:pPr>
+            <a:r>
+              <a:rPr lang="en-GB" sz="4400" b="1" dirty="0">
+                <a:solidFill>
+                  <a:schemeClr val="bg1"/>
+                </a:solidFill>
+              </a:rPr>
+              <a:t>General purpose language on .NET designed by Don Syme, from Microsoft Research</a:t>
+            </a:r>
+          </a:p>
+        </p:txBody>
+      </p:sp>
+    </p:spTree>
+    <p:extLst>
+      <p:ext uri="{BB962C8B-B14F-4D97-AF65-F5344CB8AC3E}">
+        <p14:creationId xmlns:p14="http://schemas.microsoft.com/office/powerpoint/2010/main" val="354495231"/>
+      </p:ext>
+    </p:extLst>
+  </p:cSld>
+  <p:clrMapOvr>
+    <a:masterClrMapping/>
+  </p:clrMapOvr>
+</p:sld>
+</file>
+
+<file path=ppt/slides/slide30.xml><?xml version="1.0" encoding="utf-8"?>
 <p:sld xmlns:a="http://schemas.openxmlformats.org/drawingml/2006/main" xmlns:r="http://schemas.openxmlformats.org/officeDocument/2006/relationships" xmlns:p="http://schemas.openxmlformats.org/presentationml/2006/main">
   <p:cSld>
     <p:bg>
@@ -12879,321 +13776,7 @@
 </p:sld>
 </file>
 
-<file path=ppt/slides/slide3.xml><?xml version="1.0" encoding="utf-8"?>
-<p:sld xmlns:a="http://schemas.openxmlformats.org/drawingml/2006/main" xmlns:r="http://schemas.openxmlformats.org/officeDocument/2006/relationships" xmlns:p="http://schemas.openxmlformats.org/presentationml/2006/main">
-  <p:cSld>
-    <p:bg>
-      <p:bgPr>
-        <a:solidFill>
-          <a:schemeClr val="bg1"/>
-        </a:solidFill>
-        <a:effectLst/>
-      </p:bgPr>
-    </p:bg>
-    <p:spTree>
-      <p:nvGrpSpPr>
-        <p:cNvPr id="1" name=""/>
-        <p:cNvGrpSpPr/>
-        <p:nvPr/>
-      </p:nvGrpSpPr>
-      <p:grpSpPr>
-        <a:xfrm>
-          <a:off x="0" y="0"/>
-          <a:ext cx="0" cy="0"/>
-          <a:chOff x="0" y="0"/>
-          <a:chExt cx="0" cy="0"/>
-        </a:xfrm>
-      </p:grpSpPr>
-      <p:sp>
-        <p:nvSpPr>
-          <p:cNvPr id="8" name="Rectangle 7">
-            <a:extLst>
-              <a:ext uri="{FF2B5EF4-FFF2-40B4-BE49-F238E27FC236}">
-                <a16:creationId xmlns:a16="http://schemas.microsoft.com/office/drawing/2014/main" id="{02D886F1-CB4A-4FC1-AAA7-9402B0D0DDDD}"/>
-              </a:ext>
-              <a:ext uri="{C183D7F6-B498-43B3-948B-1728B52AA6E4}">
-                <adec:decorative xmlns:adec="http://schemas.microsoft.com/office/drawing/2017/decorative" val="1"/>
-              </a:ext>
-            </a:extLst>
-          </p:cNvPr>
-          <p:cNvSpPr>
-            <a:spLocks noGrp="1" noRot="1" noChangeAspect="1" noMove="1" noResize="1" noEditPoints="1" noAdjustHandles="1" noChangeArrowheads="1" noChangeShapeType="1" noTextEdit="1"/>
-          </p:cNvSpPr>
-          <p:nvPr>
-            <p:extLst>
-              <p:ext uri="{386F3935-93C4-4BCD-93E2-E3B085C9AB24}">
-                <p16:designElem xmlns:p16="http://schemas.microsoft.com/office/powerpoint/2015/main" val="1"/>
-              </p:ext>
-            </p:extLst>
-          </p:nvPr>
-        </p:nvSpPr>
-        <p:spPr>
-          <a:xfrm>
-            <a:off x="0" y="0"/>
-            <a:ext cx="2013557" cy="6858000"/>
-          </a:xfrm>
-          <a:prstGeom prst="rect">
-            <a:avLst/>
-          </a:prstGeom>
-          <a:solidFill>
-            <a:srgbClr val="7F7F7F"/>
-          </a:solidFill>
-          <a:ln>
-            <a:noFill/>
-          </a:ln>
-        </p:spPr>
-        <p:style>
-          <a:lnRef idx="2">
-            <a:schemeClr val="accent1">
-              <a:shade val="50000"/>
-            </a:schemeClr>
-          </a:lnRef>
-          <a:fillRef idx="1">
-            <a:schemeClr val="accent1"/>
-          </a:fillRef>
-          <a:effectRef idx="0">
-            <a:schemeClr val="accent1"/>
-          </a:effectRef>
-          <a:fontRef idx="minor">
-            <a:schemeClr val="lt1"/>
-          </a:fontRef>
-        </p:style>
-        <p:txBody>
-          <a:bodyPr rtlCol="0" anchor="ctr"/>
-          <a:lstStyle/>
-          <a:p>
-            <a:pPr marL="0" marR="0" lvl="0" indent="0" algn="ctr" defTabSz="914400" rtl="0" eaLnBrk="1" fontAlgn="auto" latinLnBrk="0" hangingPunct="1">
-              <a:lnSpc>
-                <a:spcPct val="100000"/>
-              </a:lnSpc>
-              <a:spcBef>
-                <a:spcPts val="0"/>
-              </a:spcBef>
-              <a:spcAft>
-                <a:spcPts val="0"/>
-              </a:spcAft>
-              <a:buClrTx/>
-              <a:buSzTx/>
-              <a:buFontTx/>
-              <a:buNone/>
-              <a:tabLst/>
-              <a:defRPr/>
-            </a:pPr>
-            <a:endParaRPr kumimoji="0" lang="en-US" sz="1800" b="0" i="0" u="none" strike="noStrike" kern="1200" cap="none" spc="0" normalizeH="0" baseline="0" noProof="0">
-              <a:ln>
-                <a:noFill/>
-              </a:ln>
-              <a:solidFill>
-                <a:prstClr val="white"/>
-              </a:solidFill>
-              <a:effectLst/>
-              <a:uLnTx/>
-              <a:uFillTx/>
-              <a:latin typeface="Calibri" panose="020F0502020204030204"/>
-              <a:ea typeface="+mn-ea"/>
-              <a:cs typeface="+mn-cs"/>
-            </a:endParaRPr>
-          </a:p>
-        </p:txBody>
-      </p:sp>
-      <p:sp>
-        <p:nvSpPr>
-          <p:cNvPr id="10" name="Rectangle 9">
-            <a:extLst>
-              <a:ext uri="{FF2B5EF4-FFF2-40B4-BE49-F238E27FC236}">
-                <a16:creationId xmlns:a16="http://schemas.microsoft.com/office/drawing/2014/main" id="{762B7B97-C3EE-4AEE-A61F-AFA873FE2FCA}"/>
-              </a:ext>
-              <a:ext uri="{C183D7F6-B498-43B3-948B-1728B52AA6E4}">
-                <adec:decorative xmlns:adec="http://schemas.microsoft.com/office/drawing/2017/decorative" val="1"/>
-              </a:ext>
-            </a:extLst>
-          </p:cNvPr>
-          <p:cNvSpPr>
-            <a:spLocks noGrp="1" noRot="1" noChangeAspect="1" noMove="1" noResize="1" noEditPoints="1" noAdjustHandles="1" noChangeArrowheads="1" noChangeShapeType="1" noTextEdit="1"/>
-          </p:cNvSpPr>
-          <p:nvPr>
-            <p:extLst>
-              <p:ext uri="{386F3935-93C4-4BCD-93E2-E3B085C9AB24}">
-                <p16:designElem xmlns:p16="http://schemas.microsoft.com/office/powerpoint/2015/main" val="1"/>
-              </p:ext>
-            </p:extLst>
-          </p:nvPr>
-        </p:nvSpPr>
-        <p:spPr>
-          <a:xfrm flipH="1">
-            <a:off x="2013557" y="0"/>
-            <a:ext cx="10178443" cy="6858000"/>
-          </a:xfrm>
-          <a:prstGeom prst="rect">
-            <a:avLst/>
-          </a:prstGeom>
-          <a:solidFill>
-            <a:schemeClr val="tx1">
-              <a:lumMod val="75000"/>
-              <a:lumOff val="25000"/>
-            </a:schemeClr>
-          </a:solidFill>
-          <a:ln>
-            <a:noFill/>
-          </a:ln>
-        </p:spPr>
-        <p:style>
-          <a:lnRef idx="2">
-            <a:schemeClr val="accent1">
-              <a:shade val="50000"/>
-            </a:schemeClr>
-          </a:lnRef>
-          <a:fillRef idx="1">
-            <a:schemeClr val="accent1"/>
-          </a:fillRef>
-          <a:effectRef idx="0">
-            <a:schemeClr val="accent1"/>
-          </a:effectRef>
-          <a:fontRef idx="minor">
-            <a:schemeClr val="lt1"/>
-          </a:fontRef>
-        </p:style>
-        <p:txBody>
-          <a:bodyPr rtlCol="0" anchor="ctr"/>
-          <a:lstStyle/>
-          <a:p>
-            <a:pPr marL="0" marR="0" lvl="0" indent="0" algn="ctr" defTabSz="914400" rtl="0" eaLnBrk="1" fontAlgn="auto" latinLnBrk="0" hangingPunct="1">
-              <a:lnSpc>
-                <a:spcPct val="100000"/>
-              </a:lnSpc>
-              <a:spcBef>
-                <a:spcPts val="0"/>
-              </a:spcBef>
-              <a:spcAft>
-                <a:spcPts val="0"/>
-              </a:spcAft>
-              <a:buClrTx/>
-              <a:buSzTx/>
-              <a:buFontTx/>
-              <a:buNone/>
-              <a:tabLst/>
-              <a:defRPr/>
-            </a:pPr>
-            <a:endParaRPr kumimoji="0" lang="en-US" sz="1800" b="0" i="0" u="none" strike="noStrike" kern="1200" cap="none" spc="0" normalizeH="0" baseline="0" noProof="0">
-              <a:ln>
-                <a:noFill/>
-              </a:ln>
-              <a:solidFill>
-                <a:prstClr val="white"/>
-              </a:solidFill>
-              <a:effectLst/>
-              <a:uLnTx/>
-              <a:uFillTx/>
-              <a:latin typeface="Calibri" panose="020F0502020204030204"/>
-              <a:ea typeface="+mn-ea"/>
-              <a:cs typeface="+mn-cs"/>
-            </a:endParaRPr>
-          </a:p>
-        </p:txBody>
-      </p:sp>
-      <p:sp>
-        <p:nvSpPr>
-          <p:cNvPr id="2" name="Title 1">
-            <a:extLst>
-              <a:ext uri="{FF2B5EF4-FFF2-40B4-BE49-F238E27FC236}">
-                <a16:creationId xmlns:a16="http://schemas.microsoft.com/office/drawing/2014/main" id="{F9902A6B-44D9-D746-952F-83A71750B989}"/>
-              </a:ext>
-            </a:extLst>
-          </p:cNvPr>
-          <p:cNvSpPr>
-            <a:spLocks noGrp="1"/>
-          </p:cNvSpPr>
-          <p:nvPr>
-            <p:ph type="title"/>
-          </p:nvPr>
-        </p:nvSpPr>
-        <p:spPr>
-          <a:xfrm>
-            <a:off x="623787" y="1635358"/>
-            <a:ext cx="2752344" cy="2706624"/>
-          </a:xfrm>
-          <a:prstGeom prst="ellipse">
-            <a:avLst/>
-          </a:prstGeom>
-          <a:solidFill>
-            <a:schemeClr val="bg1"/>
-          </a:solidFill>
-          <a:ln w="174625" cmpd="thinThick">
-            <a:solidFill>
-              <a:schemeClr val="bg1"/>
-            </a:solidFill>
-          </a:ln>
-        </p:spPr>
-        <p:txBody>
-          <a:bodyPr>
-            <a:normAutofit/>
-          </a:bodyPr>
-          <a:lstStyle/>
-          <a:p>
-            <a:pPr algn="ctr"/>
-            <a:r>
-              <a:rPr lang="en-GB" sz="2600" dirty="0"/>
-              <a:t>What is F# ?</a:t>
-            </a:r>
-          </a:p>
-        </p:txBody>
-      </p:sp>
-      <p:sp>
-        <p:nvSpPr>
-          <p:cNvPr id="3" name="Content Placeholder 2">
-            <a:extLst>
-              <a:ext uri="{FF2B5EF4-FFF2-40B4-BE49-F238E27FC236}">
-                <a16:creationId xmlns:a16="http://schemas.microsoft.com/office/drawing/2014/main" id="{F4BF5C52-AFEC-6240-9DF8-F7612BB6C130}"/>
-              </a:ext>
-            </a:extLst>
-          </p:cNvPr>
-          <p:cNvSpPr>
-            <a:spLocks noGrp="1"/>
-          </p:cNvSpPr>
-          <p:nvPr>
-            <p:ph idx="1"/>
-          </p:nvPr>
-        </p:nvSpPr>
-        <p:spPr>
-          <a:xfrm>
-            <a:off x="4027114" y="1835712"/>
-            <a:ext cx="7915856" cy="2305915"/>
-          </a:xfrm>
-        </p:spPr>
-        <p:txBody>
-          <a:bodyPr anchor="ctr">
-            <a:normAutofit/>
-          </a:bodyPr>
-          <a:lstStyle/>
-          <a:p>
-            <a:pPr marL="0" indent="0">
-              <a:buNone/>
-            </a:pPr>
-            <a:r>
-              <a:rPr lang="en-GB" sz="4400" b="1" dirty="0">
-                <a:solidFill>
-                  <a:schemeClr val="bg1"/>
-                </a:solidFill>
-              </a:rPr>
-              <a:t>General purpose language on .NET designed by Don Syme, from Microsoft Research</a:t>
-            </a:r>
-          </a:p>
-        </p:txBody>
-      </p:sp>
-    </p:spTree>
-    <p:extLst>
-      <p:ext uri="{BB962C8B-B14F-4D97-AF65-F5344CB8AC3E}">
-        <p14:creationId xmlns:p14="http://schemas.microsoft.com/office/powerpoint/2010/main" val="354495231"/>
-      </p:ext>
-    </p:extLst>
-  </p:cSld>
-  <p:clrMapOvr>
-    <a:masterClrMapping/>
-  </p:clrMapOvr>
-</p:sld>
-</file>
-
-<file path=ppt/slides/slide30.xml><?xml version="1.0" encoding="utf-8"?>
+<file path=ppt/slides/slide31.xml><?xml version="1.0" encoding="utf-8"?>
 <p:sld xmlns:a="http://schemas.openxmlformats.org/drawingml/2006/main" xmlns:r="http://schemas.openxmlformats.org/officeDocument/2006/relationships" xmlns:p="http://schemas.openxmlformats.org/presentationml/2006/main">
   <p:cSld>
     <p:bg>
@@ -13517,7 +14100,7 @@
 </p:sld>
 </file>
 
-<file path=ppt/slides/slide31.xml><?xml version="1.0" encoding="utf-8"?>
+<file path=ppt/slides/slide32.xml><?xml version="1.0" encoding="utf-8"?>
 <p:sld xmlns:a="http://schemas.openxmlformats.org/drawingml/2006/main" xmlns:r="http://schemas.openxmlformats.org/officeDocument/2006/relationships" xmlns:p="http://schemas.openxmlformats.org/presentationml/2006/main">
   <p:cSld>
     <p:spTree>
@@ -13615,7 +14198,7 @@
 </p:sld>
 </file>
 
-<file path=ppt/slides/slide32.xml><?xml version="1.0" encoding="utf-8"?>
+<file path=ppt/slides/slide33.xml><?xml version="1.0" encoding="utf-8"?>
 <p:sld xmlns:a="http://schemas.openxmlformats.org/drawingml/2006/main" xmlns:r="http://schemas.openxmlformats.org/officeDocument/2006/relationships" xmlns:p="http://schemas.openxmlformats.org/presentationml/2006/main">
   <p:cSld>
     <p:spTree>
@@ -13713,7 +14296,7 @@
 </p:sld>
 </file>
 
-<file path=ppt/slides/slide33.xml><?xml version="1.0" encoding="utf-8"?>
+<file path=ppt/slides/slide34.xml><?xml version="1.0" encoding="utf-8"?>
 <p:sld xmlns:a="http://schemas.openxmlformats.org/drawingml/2006/main" xmlns:r="http://schemas.openxmlformats.org/officeDocument/2006/relationships" xmlns:p="http://schemas.openxmlformats.org/presentationml/2006/main">
   <p:cSld>
     <p:spTree>
@@ -13811,7 +14394,7 @@
 </p:sld>
 </file>
 
-<file path=ppt/slides/slide34.xml><?xml version="1.0" encoding="utf-8"?>
+<file path=ppt/slides/slide35.xml><?xml version="1.0" encoding="utf-8"?>
 <p:sld xmlns:a="http://schemas.openxmlformats.org/drawingml/2006/main" xmlns:r="http://schemas.openxmlformats.org/officeDocument/2006/relationships" xmlns:p="http://schemas.openxmlformats.org/presentationml/2006/main">
   <p:cSld>
     <p:spTree>
@@ -13909,7 +14492,7 @@
 </p:sld>
 </file>
 
-<file path=ppt/slides/slide35.xml><?xml version="1.0" encoding="utf-8"?>
+<file path=ppt/slides/slide36.xml><?xml version="1.0" encoding="utf-8"?>
 <p:sld xmlns:a="http://schemas.openxmlformats.org/drawingml/2006/main" xmlns:r="http://schemas.openxmlformats.org/officeDocument/2006/relationships" xmlns:p="http://schemas.openxmlformats.org/presentationml/2006/main">
   <p:cSld>
     <p:spTree>
@@ -14007,7 +14590,7 @@
 </p:sld>
 </file>
 
-<file path=ppt/slides/slide36.xml><?xml version="1.0" encoding="utf-8"?>
+<file path=ppt/slides/slide37.xml><?xml version="1.0" encoding="utf-8"?>
 <p:sld xmlns:a="http://schemas.openxmlformats.org/drawingml/2006/main" xmlns:r="http://schemas.openxmlformats.org/officeDocument/2006/relationships" xmlns:p="http://schemas.openxmlformats.org/presentationml/2006/main">
   <p:cSld>
     <p:bg>
@@ -14228,7 +14811,7 @@
                   <a:schemeClr val="bg1"/>
                 </a:solidFill>
               </a:rPr>
-              <a:t>F# is production ready, for a while now</a:t>
+              <a:t>F# has been production ready for a while now…</a:t>
             </a:r>
           </a:p>
           <a:p>
@@ -14654,7 +15237,7 @@
 </p:sld>
 </file>
 
-<file path=ppt/slides/slide37.xml><?xml version="1.0" encoding="utf-8"?>
+<file path=ppt/slides/slide38.xml><?xml version="1.0" encoding="utf-8"?>
 <p:sld xmlns:a="http://schemas.openxmlformats.org/drawingml/2006/main" xmlns:r="http://schemas.openxmlformats.org/officeDocument/2006/relationships" xmlns:p="http://schemas.openxmlformats.org/presentationml/2006/main">
   <p:cSld>
     <p:bg>
@@ -14940,7 +15523,15 @@
           <a:lstStyle/>
           <a:p>
             <a:pPr algn="ctr"/>
-            <a:endParaRPr lang="en-US" kern="1200">
+            <a:r>
+              <a:rPr lang="en-US" dirty="0">
+                <a:solidFill>
+                  <a:schemeClr val="tx1"/>
+                </a:solidFill>
+              </a:rPr>
+              <a:t>Questions ?</a:t>
+            </a:r>
+            <a:endParaRPr lang="en-US" kern="1200" dirty="0">
               <a:solidFill>
                 <a:schemeClr val="tx1"/>
               </a:solidFill>
@@ -14951,7 +15542,7 @@
           </a:p>
           <a:p>
             <a:pPr algn="ctr"/>
-            <a:endParaRPr lang="en-US" kern="1200">
+            <a:endParaRPr lang="en-US" kern="1200" dirty="0">
               <a:solidFill>
                 <a:schemeClr val="tx1"/>
               </a:solidFill>
@@ -15030,7 +15621,7 @@
 </p:sld>
 </file>
 
-<file path=ppt/slides/slide38.xml><?xml version="1.0" encoding="utf-8"?>
+<file path=ppt/slides/slide39.xml><?xml version="1.0" encoding="utf-8"?>
 <p:sld xmlns:a="http://schemas.openxmlformats.org/drawingml/2006/main" xmlns:r="http://schemas.openxmlformats.org/officeDocument/2006/relationships" xmlns:p="http://schemas.openxmlformats.org/presentationml/2006/main">
   <p:cSld>
     <p:bg>
@@ -15403,379 +15994,6 @@
     <p:extLst>
       <p:ext uri="{BB962C8B-B14F-4D97-AF65-F5344CB8AC3E}">
         <p14:creationId xmlns:p14="http://schemas.microsoft.com/office/powerpoint/2010/main" val="2832492486"/>
-      </p:ext>
-    </p:extLst>
-  </p:cSld>
-  <p:clrMapOvr>
-    <a:overrideClrMapping bg1="lt1" tx1="dk1" bg2="lt2" tx2="dk2" accent1="accent1" accent2="accent2" accent3="accent3" accent4="accent4" accent5="accent5" accent6="accent6" hlink="hlink" folHlink="folHlink"/>
-  </p:clrMapOvr>
-</p:sld>
-</file>
-
-<file path=ppt/slides/slide39.xml><?xml version="1.0" encoding="utf-8"?>
-<p:sld xmlns:a="http://schemas.openxmlformats.org/drawingml/2006/main" xmlns:r="http://schemas.openxmlformats.org/officeDocument/2006/relationships" xmlns:p="http://schemas.openxmlformats.org/presentationml/2006/main">
-  <p:cSld>
-    <p:bg>
-      <p:bgPr>
-        <a:solidFill>
-          <a:schemeClr val="bg1"/>
-        </a:solidFill>
-        <a:effectLst/>
-      </p:bgPr>
-    </p:bg>
-    <p:spTree>
-      <p:nvGrpSpPr>
-        <p:cNvPr id="1" name="">
-          <a:extLst>
-            <a:ext uri="{FF2B5EF4-FFF2-40B4-BE49-F238E27FC236}">
-              <a16:creationId xmlns:a16="http://schemas.microsoft.com/office/drawing/2014/main" id="{83BB7EBB-36FE-DC80-FB47-0649996DEF49}"/>
-            </a:ext>
-          </a:extLst>
-        </p:cNvPr>
-        <p:cNvGrpSpPr/>
-        <p:nvPr/>
-      </p:nvGrpSpPr>
-      <p:grpSpPr>
-        <a:xfrm>
-          <a:off x="0" y="0"/>
-          <a:ext cx="0" cy="0"/>
-          <a:chOff x="0" y="0"/>
-          <a:chExt cx="0" cy="0"/>
-        </a:xfrm>
-      </p:grpSpPr>
-      <p:sp>
-        <p:nvSpPr>
-          <p:cNvPr id="22" name="Rectangle 11">
-            <a:extLst>
-              <a:ext uri="{FF2B5EF4-FFF2-40B4-BE49-F238E27FC236}">
-                <a16:creationId xmlns:a16="http://schemas.microsoft.com/office/drawing/2014/main" id="{A1D5B6BD-0D0F-3053-6951-529A13B10D26}"/>
-              </a:ext>
-              <a:ext uri="{C183D7F6-B498-43B3-948B-1728B52AA6E4}">
-                <adec:decorative xmlns:adec="http://schemas.microsoft.com/office/drawing/2017/decorative" val="1"/>
-              </a:ext>
-            </a:extLst>
-          </p:cNvPr>
-          <p:cNvSpPr>
-            <a:spLocks noGrp="1" noRot="1" noChangeAspect="1" noMove="1" noResize="1" noEditPoints="1" noAdjustHandles="1" noChangeArrowheads="1" noChangeShapeType="1" noTextEdit="1"/>
-          </p:cNvSpPr>
-          <p:nvPr>
-            <p:extLst>
-              <p:ext uri="{386F3935-93C4-4BCD-93E2-E3B085C9AB24}">
-                <p16:designElem xmlns:p16="http://schemas.microsoft.com/office/powerpoint/2015/main" val="1"/>
-              </p:ext>
-            </p:extLst>
-          </p:nvPr>
-        </p:nvSpPr>
-        <p:spPr>
-          <a:xfrm>
-            <a:off x="0" y="-3324"/>
-            <a:ext cx="12192000" cy="6861324"/>
-          </a:xfrm>
-          <a:prstGeom prst="rect">
-            <a:avLst/>
-          </a:prstGeom>
-          <a:solidFill>
-            <a:schemeClr val="tx1">
-              <a:lumMod val="75000"/>
-              <a:lumOff val="25000"/>
-            </a:schemeClr>
-          </a:solidFill>
-          <a:ln>
-            <a:noFill/>
-          </a:ln>
-        </p:spPr>
-        <p:style>
-          <a:lnRef idx="2">
-            <a:schemeClr val="accent1">
-              <a:shade val="50000"/>
-            </a:schemeClr>
-          </a:lnRef>
-          <a:fillRef idx="1">
-            <a:schemeClr val="accent1"/>
-          </a:fillRef>
-          <a:effectRef idx="0">
-            <a:schemeClr val="accent1"/>
-          </a:effectRef>
-          <a:fontRef idx="minor">
-            <a:schemeClr val="lt1"/>
-          </a:fontRef>
-        </p:style>
-        <p:txBody>
-          <a:bodyPr rtlCol="0" anchor="ctr"/>
-          <a:lstStyle/>
-          <a:p>
-            <a:pPr marL="0" marR="0" lvl="0" indent="0" algn="ctr" defTabSz="914400" rtl="0" eaLnBrk="1" fontAlgn="auto" latinLnBrk="0" hangingPunct="1">
-              <a:lnSpc>
-                <a:spcPct val="100000"/>
-              </a:lnSpc>
-              <a:spcBef>
-                <a:spcPts val="0"/>
-              </a:spcBef>
-              <a:spcAft>
-                <a:spcPts val="0"/>
-              </a:spcAft>
-              <a:buClrTx/>
-              <a:buSzTx/>
-              <a:buFontTx/>
-              <a:buNone/>
-              <a:tabLst/>
-              <a:defRPr/>
-            </a:pPr>
-            <a:endParaRPr kumimoji="0" lang="en-US" sz="1800" b="0" i="0" u="none" strike="noStrike" kern="1200" cap="none" spc="0" normalizeH="0" baseline="0" noProof="0">
-              <a:ln>
-                <a:noFill/>
-              </a:ln>
-              <a:solidFill>
-                <a:prstClr val="white"/>
-              </a:solidFill>
-              <a:effectLst/>
-              <a:uLnTx/>
-              <a:uFillTx/>
-              <a:latin typeface="Calibri" panose="020F0502020204030204"/>
-              <a:ea typeface="+mn-ea"/>
-              <a:cs typeface="+mn-cs"/>
-            </a:endParaRPr>
-          </a:p>
-        </p:txBody>
-      </p:sp>
-      <p:sp>
-        <p:nvSpPr>
-          <p:cNvPr id="23" name="Rectangle 13">
-            <a:extLst>
-              <a:ext uri="{FF2B5EF4-FFF2-40B4-BE49-F238E27FC236}">
-                <a16:creationId xmlns:a16="http://schemas.microsoft.com/office/drawing/2014/main" id="{C0504A8D-6967-C73D-C144-2C2A8B8E11CC}"/>
-              </a:ext>
-              <a:ext uri="{C183D7F6-B498-43B3-948B-1728B52AA6E4}">
-                <adec:decorative xmlns:adec="http://schemas.microsoft.com/office/drawing/2017/decorative" val="1"/>
-              </a:ext>
-            </a:extLst>
-          </p:cNvPr>
-          <p:cNvSpPr>
-            <a:spLocks noGrp="1" noRot="1" noChangeAspect="1" noMove="1" noResize="1" noEditPoints="1" noAdjustHandles="1" noChangeArrowheads="1" noChangeShapeType="1" noTextEdit="1"/>
-          </p:cNvSpPr>
-          <p:nvPr>
-            <p:extLst>
-              <p:ext uri="{386F3935-93C4-4BCD-93E2-E3B085C9AB24}">
-                <p16:designElem xmlns:p16="http://schemas.microsoft.com/office/powerpoint/2015/main" val="1"/>
-              </p:ext>
-            </p:extLst>
-          </p:nvPr>
-        </p:nvSpPr>
-        <p:spPr bwMode="ltGray">
-          <a:xfrm>
-            <a:off x="795338" y="981075"/>
-            <a:ext cx="10601325" cy="4552949"/>
-          </a:xfrm>
-          <a:prstGeom prst="rect">
-            <a:avLst/>
-          </a:prstGeom>
-          <a:solidFill>
-            <a:schemeClr val="bg1"/>
-          </a:solidFill>
-          <a:ln w="127000" cap="sq" cmpd="thinThick">
-            <a:solidFill>
-              <a:schemeClr val="bg1"/>
-            </a:solidFill>
-          </a:ln>
-        </p:spPr>
-        <p:style>
-          <a:lnRef idx="2">
-            <a:schemeClr val="accent1">
-              <a:shade val="50000"/>
-            </a:schemeClr>
-          </a:lnRef>
-          <a:fillRef idx="1">
-            <a:schemeClr val="accent1"/>
-          </a:fillRef>
-          <a:effectRef idx="0">
-            <a:schemeClr val="accent1"/>
-          </a:effectRef>
-          <a:fontRef idx="minor">
-            <a:schemeClr val="lt1"/>
-          </a:fontRef>
-        </p:style>
-        <p:txBody>
-          <a:bodyPr rtlCol="0" anchor="ctr"/>
-          <a:lstStyle/>
-          <a:p>
-            <a:pPr marL="0" marR="0" lvl="0" indent="0" algn="ctr" defTabSz="914400" rtl="0" eaLnBrk="1" fontAlgn="auto" latinLnBrk="0" hangingPunct="1">
-              <a:lnSpc>
-                <a:spcPct val="100000"/>
-              </a:lnSpc>
-              <a:spcBef>
-                <a:spcPts val="0"/>
-              </a:spcBef>
-              <a:spcAft>
-                <a:spcPts val="0"/>
-              </a:spcAft>
-              <a:buClrTx/>
-              <a:buSzTx/>
-              <a:buFontTx/>
-              <a:buNone/>
-              <a:tabLst/>
-              <a:defRPr/>
-            </a:pPr>
-            <a:endParaRPr kumimoji="0" lang="en-US" sz="1800" b="0" i="0" u="none" strike="noStrike" kern="1200" cap="none" spc="0" normalizeH="0" baseline="0" noProof="0" dirty="0">
-              <a:ln>
-                <a:noFill/>
-              </a:ln>
-              <a:solidFill>
-                <a:prstClr val="white"/>
-              </a:solidFill>
-              <a:effectLst/>
-              <a:uLnTx/>
-              <a:uFillTx/>
-              <a:latin typeface="Calibri" panose="020F0502020204030204"/>
-              <a:ea typeface="+mn-ea"/>
-              <a:cs typeface="+mn-cs"/>
-            </a:endParaRPr>
-          </a:p>
-        </p:txBody>
-      </p:sp>
-      <p:sp>
-        <p:nvSpPr>
-          <p:cNvPr id="2" name="Title 1">
-            <a:extLst>
-              <a:ext uri="{FF2B5EF4-FFF2-40B4-BE49-F238E27FC236}">
-                <a16:creationId xmlns:a16="http://schemas.microsoft.com/office/drawing/2014/main" id="{035F2B61-9A62-6CDE-DA18-DBE796ABC33E}"/>
-              </a:ext>
-            </a:extLst>
-          </p:cNvPr>
-          <p:cNvSpPr>
-            <a:spLocks noGrp="1"/>
-          </p:cNvSpPr>
-          <p:nvPr>
-            <p:ph type="title"/>
-          </p:nvPr>
-        </p:nvSpPr>
-        <p:spPr>
-          <a:xfrm>
-            <a:off x="1537097" y="1428750"/>
-            <a:ext cx="9117807" cy="2105026"/>
-          </a:xfrm>
-        </p:spPr>
-        <p:txBody>
-          <a:bodyPr vert="horz" lIns="91440" tIns="45720" rIns="91440" bIns="45720" rtlCol="0" anchor="b">
-            <a:normAutofit/>
-          </a:bodyPr>
-          <a:lstStyle/>
-          <a:p>
-            <a:pPr algn="ctr"/>
-            <a:r>
-              <a:rPr lang="en-US" kern="1200" dirty="0">
-                <a:solidFill>
-                  <a:schemeClr val="tx1"/>
-                </a:solidFill>
-                <a:latin typeface="+mj-lt"/>
-                <a:ea typeface="+mj-ea"/>
-                <a:cs typeface="+mj-cs"/>
-              </a:rPr>
-              <a:t>F# Workshop !</a:t>
-            </a:r>
-          </a:p>
-        </p:txBody>
-      </p:sp>
-      <p:sp>
-        <p:nvSpPr>
-          <p:cNvPr id="7" name="Text Placeholder 6">
-            <a:extLst>
-              <a:ext uri="{FF2B5EF4-FFF2-40B4-BE49-F238E27FC236}">
-                <a16:creationId xmlns:a16="http://schemas.microsoft.com/office/drawing/2014/main" id="{CF784627-2A18-8D20-4A08-AD0CE4F3F272}"/>
-              </a:ext>
-            </a:extLst>
-          </p:cNvPr>
-          <p:cNvSpPr>
-            <a:spLocks noGrp="1"/>
-          </p:cNvSpPr>
-          <p:nvPr>
-            <p:ph type="body" idx="1"/>
-          </p:nvPr>
-        </p:nvSpPr>
-        <p:spPr>
-          <a:xfrm>
-            <a:off x="1537097" y="3960557"/>
-            <a:ext cx="9117807" cy="1097215"/>
-          </a:xfrm>
-        </p:spPr>
-        <p:txBody>
-          <a:bodyPr vert="horz" lIns="91440" tIns="45720" rIns="91440" bIns="45720" rtlCol="0">
-            <a:normAutofit/>
-          </a:bodyPr>
-          <a:lstStyle/>
-          <a:p>
-            <a:pPr algn="ctr"/>
-            <a:r>
-              <a:rPr lang="en-US" sz="2200" i="1" dirty="0">
-                <a:solidFill>
-                  <a:schemeClr val="bg2">
-                    <a:lumMod val="75000"/>
-                  </a:schemeClr>
-                </a:solidFill>
-              </a:rPr>
-              <a:t>Let’s code something simple in a realistic production ready software architecture</a:t>
-            </a:r>
-          </a:p>
-        </p:txBody>
-      </p:sp>
-      <p:cxnSp>
-        <p:nvCxnSpPr>
-          <p:cNvPr id="24" name="Straight Connector 15">
-            <a:extLst>
-              <a:ext uri="{FF2B5EF4-FFF2-40B4-BE49-F238E27FC236}">
-                <a16:creationId xmlns:a16="http://schemas.microsoft.com/office/drawing/2014/main" id="{E7BA51F8-D7A6-13C6-D49E-9530A2911C4D}"/>
-              </a:ext>
-              <a:ext uri="{C183D7F6-B498-43B3-948B-1728B52AA6E4}">
-                <adec:decorative xmlns:adec="http://schemas.microsoft.com/office/drawing/2017/decorative" val="1"/>
-              </a:ext>
-            </a:extLst>
-          </p:cNvPr>
-          <p:cNvCxnSpPr>
-            <a:cxnSpLocks noGrp="1" noRot="1" noChangeAspect="1" noMove="1" noResize="1" noEditPoints="1" noAdjustHandles="1" noChangeArrowheads="1" noChangeShapeType="1"/>
-          </p:cNvCxnSpPr>
-          <p:nvPr>
-            <p:extLst>
-              <p:ext uri="{386F3935-93C4-4BCD-93E2-E3B085C9AB24}">
-                <p16:designElem xmlns:p16="http://schemas.microsoft.com/office/powerpoint/2015/main" val="1"/>
-              </p:ext>
-            </p:extLst>
-          </p:nvPr>
-        </p:nvCxnSpPr>
-        <p:spPr>
-          <a:xfrm>
-            <a:off x="3352800" y="3771366"/>
-            <a:ext cx="5486400" cy="0"/>
-          </a:xfrm>
-          <a:prstGeom prst="line">
-            <a:avLst/>
-          </a:prstGeom>
-          <a:ln w="22225">
-            <a:solidFill>
-              <a:schemeClr val="tx1">
-                <a:lumMod val="50000"/>
-                <a:lumOff val="50000"/>
-              </a:schemeClr>
-            </a:solidFill>
-          </a:ln>
-        </p:spPr>
-        <p:style>
-          <a:lnRef idx="1">
-            <a:schemeClr val="accent1"/>
-          </a:lnRef>
-          <a:fillRef idx="0">
-            <a:schemeClr val="accent1"/>
-          </a:fillRef>
-          <a:effectRef idx="0">
-            <a:schemeClr val="accent1"/>
-          </a:effectRef>
-          <a:fontRef idx="minor">
-            <a:schemeClr val="tx1"/>
-          </a:fontRef>
-        </p:style>
-      </p:cxnSp>
-    </p:spTree>
-    <p:extLst>
-      <p:ext uri="{BB962C8B-B14F-4D97-AF65-F5344CB8AC3E}">
-        <p14:creationId xmlns:p14="http://schemas.microsoft.com/office/powerpoint/2010/main" val="2860050399"/>
       </p:ext>
     </p:extLst>
   </p:cSld>
@@ -16433,6 +16651,379 @@
 <file path=ppt/slides/slide40.xml><?xml version="1.0" encoding="utf-8"?>
 <p:sld xmlns:a="http://schemas.openxmlformats.org/drawingml/2006/main" xmlns:r="http://schemas.openxmlformats.org/officeDocument/2006/relationships" xmlns:p="http://schemas.openxmlformats.org/presentationml/2006/main">
   <p:cSld>
+    <p:bg>
+      <p:bgPr>
+        <a:solidFill>
+          <a:schemeClr val="bg1"/>
+        </a:solidFill>
+        <a:effectLst/>
+      </p:bgPr>
+    </p:bg>
+    <p:spTree>
+      <p:nvGrpSpPr>
+        <p:cNvPr id="1" name="">
+          <a:extLst>
+            <a:ext uri="{FF2B5EF4-FFF2-40B4-BE49-F238E27FC236}">
+              <a16:creationId xmlns:a16="http://schemas.microsoft.com/office/drawing/2014/main" id="{83BB7EBB-36FE-DC80-FB47-0649996DEF49}"/>
+            </a:ext>
+          </a:extLst>
+        </p:cNvPr>
+        <p:cNvGrpSpPr/>
+        <p:nvPr/>
+      </p:nvGrpSpPr>
+      <p:grpSpPr>
+        <a:xfrm>
+          <a:off x="0" y="0"/>
+          <a:ext cx="0" cy="0"/>
+          <a:chOff x="0" y="0"/>
+          <a:chExt cx="0" cy="0"/>
+        </a:xfrm>
+      </p:grpSpPr>
+      <p:sp>
+        <p:nvSpPr>
+          <p:cNvPr id="22" name="Rectangle 11">
+            <a:extLst>
+              <a:ext uri="{FF2B5EF4-FFF2-40B4-BE49-F238E27FC236}">
+                <a16:creationId xmlns:a16="http://schemas.microsoft.com/office/drawing/2014/main" id="{A1D5B6BD-0D0F-3053-6951-529A13B10D26}"/>
+              </a:ext>
+              <a:ext uri="{C183D7F6-B498-43B3-948B-1728B52AA6E4}">
+                <adec:decorative xmlns:adec="http://schemas.microsoft.com/office/drawing/2017/decorative" val="1"/>
+              </a:ext>
+            </a:extLst>
+          </p:cNvPr>
+          <p:cNvSpPr>
+            <a:spLocks noGrp="1" noRot="1" noChangeAspect="1" noMove="1" noResize="1" noEditPoints="1" noAdjustHandles="1" noChangeArrowheads="1" noChangeShapeType="1" noTextEdit="1"/>
+          </p:cNvSpPr>
+          <p:nvPr>
+            <p:extLst>
+              <p:ext uri="{386F3935-93C4-4BCD-93E2-E3B085C9AB24}">
+                <p16:designElem xmlns:p16="http://schemas.microsoft.com/office/powerpoint/2015/main" val="1"/>
+              </p:ext>
+            </p:extLst>
+          </p:nvPr>
+        </p:nvSpPr>
+        <p:spPr>
+          <a:xfrm>
+            <a:off x="0" y="-3324"/>
+            <a:ext cx="12192000" cy="6861324"/>
+          </a:xfrm>
+          <a:prstGeom prst="rect">
+            <a:avLst/>
+          </a:prstGeom>
+          <a:solidFill>
+            <a:schemeClr val="tx1">
+              <a:lumMod val="75000"/>
+              <a:lumOff val="25000"/>
+            </a:schemeClr>
+          </a:solidFill>
+          <a:ln>
+            <a:noFill/>
+          </a:ln>
+        </p:spPr>
+        <p:style>
+          <a:lnRef idx="2">
+            <a:schemeClr val="accent1">
+              <a:shade val="50000"/>
+            </a:schemeClr>
+          </a:lnRef>
+          <a:fillRef idx="1">
+            <a:schemeClr val="accent1"/>
+          </a:fillRef>
+          <a:effectRef idx="0">
+            <a:schemeClr val="accent1"/>
+          </a:effectRef>
+          <a:fontRef idx="minor">
+            <a:schemeClr val="lt1"/>
+          </a:fontRef>
+        </p:style>
+        <p:txBody>
+          <a:bodyPr rtlCol="0" anchor="ctr"/>
+          <a:lstStyle/>
+          <a:p>
+            <a:pPr marL="0" marR="0" lvl="0" indent="0" algn="ctr" defTabSz="914400" rtl="0" eaLnBrk="1" fontAlgn="auto" latinLnBrk="0" hangingPunct="1">
+              <a:lnSpc>
+                <a:spcPct val="100000"/>
+              </a:lnSpc>
+              <a:spcBef>
+                <a:spcPts val="0"/>
+              </a:spcBef>
+              <a:spcAft>
+                <a:spcPts val="0"/>
+              </a:spcAft>
+              <a:buClrTx/>
+              <a:buSzTx/>
+              <a:buFontTx/>
+              <a:buNone/>
+              <a:tabLst/>
+              <a:defRPr/>
+            </a:pPr>
+            <a:endParaRPr kumimoji="0" lang="en-US" sz="1800" b="0" i="0" u="none" strike="noStrike" kern="1200" cap="none" spc="0" normalizeH="0" baseline="0" noProof="0">
+              <a:ln>
+                <a:noFill/>
+              </a:ln>
+              <a:solidFill>
+                <a:prstClr val="white"/>
+              </a:solidFill>
+              <a:effectLst/>
+              <a:uLnTx/>
+              <a:uFillTx/>
+              <a:latin typeface="Calibri" panose="020F0502020204030204"/>
+              <a:ea typeface="+mn-ea"/>
+              <a:cs typeface="+mn-cs"/>
+            </a:endParaRPr>
+          </a:p>
+        </p:txBody>
+      </p:sp>
+      <p:sp>
+        <p:nvSpPr>
+          <p:cNvPr id="23" name="Rectangle 13">
+            <a:extLst>
+              <a:ext uri="{FF2B5EF4-FFF2-40B4-BE49-F238E27FC236}">
+                <a16:creationId xmlns:a16="http://schemas.microsoft.com/office/drawing/2014/main" id="{C0504A8D-6967-C73D-C144-2C2A8B8E11CC}"/>
+              </a:ext>
+              <a:ext uri="{C183D7F6-B498-43B3-948B-1728B52AA6E4}">
+                <adec:decorative xmlns:adec="http://schemas.microsoft.com/office/drawing/2017/decorative" val="1"/>
+              </a:ext>
+            </a:extLst>
+          </p:cNvPr>
+          <p:cNvSpPr>
+            <a:spLocks noGrp="1" noRot="1" noChangeAspect="1" noMove="1" noResize="1" noEditPoints="1" noAdjustHandles="1" noChangeArrowheads="1" noChangeShapeType="1" noTextEdit="1"/>
+          </p:cNvSpPr>
+          <p:nvPr>
+            <p:extLst>
+              <p:ext uri="{386F3935-93C4-4BCD-93E2-E3B085C9AB24}">
+                <p16:designElem xmlns:p16="http://schemas.microsoft.com/office/powerpoint/2015/main" val="1"/>
+              </p:ext>
+            </p:extLst>
+          </p:nvPr>
+        </p:nvSpPr>
+        <p:spPr bwMode="ltGray">
+          <a:xfrm>
+            <a:off x="795338" y="981075"/>
+            <a:ext cx="10601325" cy="4552949"/>
+          </a:xfrm>
+          <a:prstGeom prst="rect">
+            <a:avLst/>
+          </a:prstGeom>
+          <a:solidFill>
+            <a:schemeClr val="bg1"/>
+          </a:solidFill>
+          <a:ln w="127000" cap="sq" cmpd="thinThick">
+            <a:solidFill>
+              <a:schemeClr val="bg1"/>
+            </a:solidFill>
+          </a:ln>
+        </p:spPr>
+        <p:style>
+          <a:lnRef idx="2">
+            <a:schemeClr val="accent1">
+              <a:shade val="50000"/>
+            </a:schemeClr>
+          </a:lnRef>
+          <a:fillRef idx="1">
+            <a:schemeClr val="accent1"/>
+          </a:fillRef>
+          <a:effectRef idx="0">
+            <a:schemeClr val="accent1"/>
+          </a:effectRef>
+          <a:fontRef idx="minor">
+            <a:schemeClr val="lt1"/>
+          </a:fontRef>
+        </p:style>
+        <p:txBody>
+          <a:bodyPr rtlCol="0" anchor="ctr"/>
+          <a:lstStyle/>
+          <a:p>
+            <a:pPr marL="0" marR="0" lvl="0" indent="0" algn="ctr" defTabSz="914400" rtl="0" eaLnBrk="1" fontAlgn="auto" latinLnBrk="0" hangingPunct="1">
+              <a:lnSpc>
+                <a:spcPct val="100000"/>
+              </a:lnSpc>
+              <a:spcBef>
+                <a:spcPts val="0"/>
+              </a:spcBef>
+              <a:spcAft>
+                <a:spcPts val="0"/>
+              </a:spcAft>
+              <a:buClrTx/>
+              <a:buSzTx/>
+              <a:buFontTx/>
+              <a:buNone/>
+              <a:tabLst/>
+              <a:defRPr/>
+            </a:pPr>
+            <a:endParaRPr kumimoji="0" lang="en-US" sz="1800" b="0" i="0" u="none" strike="noStrike" kern="1200" cap="none" spc="0" normalizeH="0" baseline="0" noProof="0" dirty="0">
+              <a:ln>
+                <a:noFill/>
+              </a:ln>
+              <a:solidFill>
+                <a:prstClr val="white"/>
+              </a:solidFill>
+              <a:effectLst/>
+              <a:uLnTx/>
+              <a:uFillTx/>
+              <a:latin typeface="Calibri" panose="020F0502020204030204"/>
+              <a:ea typeface="+mn-ea"/>
+              <a:cs typeface="+mn-cs"/>
+            </a:endParaRPr>
+          </a:p>
+        </p:txBody>
+      </p:sp>
+      <p:sp>
+        <p:nvSpPr>
+          <p:cNvPr id="2" name="Title 1">
+            <a:extLst>
+              <a:ext uri="{FF2B5EF4-FFF2-40B4-BE49-F238E27FC236}">
+                <a16:creationId xmlns:a16="http://schemas.microsoft.com/office/drawing/2014/main" id="{035F2B61-9A62-6CDE-DA18-DBE796ABC33E}"/>
+              </a:ext>
+            </a:extLst>
+          </p:cNvPr>
+          <p:cNvSpPr>
+            <a:spLocks noGrp="1"/>
+          </p:cNvSpPr>
+          <p:nvPr>
+            <p:ph type="title"/>
+          </p:nvPr>
+        </p:nvSpPr>
+        <p:spPr>
+          <a:xfrm>
+            <a:off x="1537097" y="1428750"/>
+            <a:ext cx="9117807" cy="2105026"/>
+          </a:xfrm>
+        </p:spPr>
+        <p:txBody>
+          <a:bodyPr vert="horz" lIns="91440" tIns="45720" rIns="91440" bIns="45720" rtlCol="0" anchor="b">
+            <a:normAutofit/>
+          </a:bodyPr>
+          <a:lstStyle/>
+          <a:p>
+            <a:pPr algn="ctr"/>
+            <a:r>
+              <a:rPr lang="en-US" kern="1200" dirty="0">
+                <a:solidFill>
+                  <a:schemeClr val="tx1"/>
+                </a:solidFill>
+                <a:latin typeface="+mj-lt"/>
+                <a:ea typeface="+mj-ea"/>
+                <a:cs typeface="+mj-cs"/>
+              </a:rPr>
+              <a:t>F# Workshop !</a:t>
+            </a:r>
+          </a:p>
+        </p:txBody>
+      </p:sp>
+      <p:sp>
+        <p:nvSpPr>
+          <p:cNvPr id="7" name="Text Placeholder 6">
+            <a:extLst>
+              <a:ext uri="{FF2B5EF4-FFF2-40B4-BE49-F238E27FC236}">
+                <a16:creationId xmlns:a16="http://schemas.microsoft.com/office/drawing/2014/main" id="{CF784627-2A18-8D20-4A08-AD0CE4F3F272}"/>
+              </a:ext>
+            </a:extLst>
+          </p:cNvPr>
+          <p:cNvSpPr>
+            <a:spLocks noGrp="1"/>
+          </p:cNvSpPr>
+          <p:nvPr>
+            <p:ph type="body" idx="1"/>
+          </p:nvPr>
+        </p:nvSpPr>
+        <p:spPr>
+          <a:xfrm>
+            <a:off x="1537097" y="3960557"/>
+            <a:ext cx="9117807" cy="1097215"/>
+          </a:xfrm>
+        </p:spPr>
+        <p:txBody>
+          <a:bodyPr vert="horz" lIns="91440" tIns="45720" rIns="91440" bIns="45720" rtlCol="0">
+            <a:normAutofit/>
+          </a:bodyPr>
+          <a:lstStyle/>
+          <a:p>
+            <a:pPr algn="ctr"/>
+            <a:r>
+              <a:rPr lang="en-US" sz="2200" i="1" dirty="0">
+                <a:solidFill>
+                  <a:schemeClr val="bg2">
+                    <a:lumMod val="75000"/>
+                  </a:schemeClr>
+                </a:solidFill>
+              </a:rPr>
+              <a:t>Let’s code something simple in a realistic production ready software architecture</a:t>
+            </a:r>
+          </a:p>
+        </p:txBody>
+      </p:sp>
+      <p:cxnSp>
+        <p:nvCxnSpPr>
+          <p:cNvPr id="24" name="Straight Connector 15">
+            <a:extLst>
+              <a:ext uri="{FF2B5EF4-FFF2-40B4-BE49-F238E27FC236}">
+                <a16:creationId xmlns:a16="http://schemas.microsoft.com/office/drawing/2014/main" id="{E7BA51F8-D7A6-13C6-D49E-9530A2911C4D}"/>
+              </a:ext>
+              <a:ext uri="{C183D7F6-B498-43B3-948B-1728B52AA6E4}">
+                <adec:decorative xmlns:adec="http://schemas.microsoft.com/office/drawing/2017/decorative" val="1"/>
+              </a:ext>
+            </a:extLst>
+          </p:cNvPr>
+          <p:cNvCxnSpPr>
+            <a:cxnSpLocks noGrp="1" noRot="1" noChangeAspect="1" noMove="1" noResize="1" noEditPoints="1" noAdjustHandles="1" noChangeArrowheads="1" noChangeShapeType="1"/>
+          </p:cNvCxnSpPr>
+          <p:nvPr>
+            <p:extLst>
+              <p:ext uri="{386F3935-93C4-4BCD-93E2-E3B085C9AB24}">
+                <p16:designElem xmlns:p16="http://schemas.microsoft.com/office/powerpoint/2015/main" val="1"/>
+              </p:ext>
+            </p:extLst>
+          </p:nvPr>
+        </p:nvCxnSpPr>
+        <p:spPr>
+          <a:xfrm>
+            <a:off x="3352800" y="3771366"/>
+            <a:ext cx="5486400" cy="0"/>
+          </a:xfrm>
+          <a:prstGeom prst="line">
+            <a:avLst/>
+          </a:prstGeom>
+          <a:ln w="22225">
+            <a:solidFill>
+              <a:schemeClr val="tx1">
+                <a:lumMod val="50000"/>
+                <a:lumOff val="50000"/>
+              </a:schemeClr>
+            </a:solidFill>
+          </a:ln>
+        </p:spPr>
+        <p:style>
+          <a:lnRef idx="1">
+            <a:schemeClr val="accent1"/>
+          </a:lnRef>
+          <a:fillRef idx="0">
+            <a:schemeClr val="accent1"/>
+          </a:fillRef>
+          <a:effectRef idx="0">
+            <a:schemeClr val="accent1"/>
+          </a:effectRef>
+          <a:fontRef idx="minor">
+            <a:schemeClr val="tx1"/>
+          </a:fontRef>
+        </p:style>
+      </p:cxnSp>
+    </p:spTree>
+    <p:extLst>
+      <p:ext uri="{BB962C8B-B14F-4D97-AF65-F5344CB8AC3E}">
+        <p14:creationId xmlns:p14="http://schemas.microsoft.com/office/powerpoint/2010/main" val="2860050399"/>
+      </p:ext>
+    </p:extLst>
+  </p:cSld>
+  <p:clrMapOvr>
+    <a:overrideClrMapping bg1="lt1" tx1="dk1" bg2="lt2" tx2="dk2" accent1="accent1" accent2="accent2" accent3="accent3" accent4="accent4" accent5="accent5" accent6="accent6" hlink="hlink" folHlink="folHlink"/>
+  </p:clrMapOvr>
+</p:sld>
+</file>
+
+<file path=ppt/slides/slide41.xml><?xml version="1.0" encoding="utf-8"?>
+<p:sld xmlns:a="http://schemas.openxmlformats.org/drawingml/2006/main" xmlns:r="http://schemas.openxmlformats.org/officeDocument/2006/relationships" xmlns:p="http://schemas.openxmlformats.org/presentationml/2006/main">
+  <p:cSld>
     <p:spTree>
       <p:nvGrpSpPr>
         <p:cNvPr id="1" name="">
@@ -16526,7 +17117,7 @@
         </p:nvSpPr>
         <p:spPr>
           <a:xfrm>
-            <a:off x="4520514" y="1487272"/>
+            <a:off x="5403062" y="1487272"/>
             <a:ext cx="6094428" cy="707886"/>
           </a:xfrm>
           <a:prstGeom prst="rect">
@@ -16569,7 +17160,7 @@
         </p:nvSpPr>
         <p:spPr>
           <a:xfrm>
-            <a:off x="4520514" y="2781859"/>
+            <a:off x="5403062" y="2781859"/>
             <a:ext cx="6094428" cy="1938992"/>
           </a:xfrm>
           <a:prstGeom prst="rect">
@@ -16621,7 +17212,7 @@
 </p:sld>
 </file>
 
-<file path=ppt/slides/slide41.xml><?xml version="1.0" encoding="utf-8"?>
+<file path=ppt/slides/slide42.xml><?xml version="1.0" encoding="utf-8"?>
 <p:sld xmlns:a="http://schemas.openxmlformats.org/drawingml/2006/main" xmlns:r="http://schemas.openxmlformats.org/officeDocument/2006/relationships" xmlns:p="http://schemas.openxmlformats.org/presentationml/2006/main">
   <p:cSld>
     <p:spTree>
@@ -16857,7 +17448,7 @@
 </p:sld>
 </file>
 
-<file path=ppt/slides/slide42.xml><?xml version="1.0" encoding="utf-8"?>
+<file path=ppt/slides/slide43.xml><?xml version="1.0" encoding="utf-8"?>
 <p:sld xmlns:a="http://schemas.openxmlformats.org/drawingml/2006/main" xmlns:r="http://schemas.openxmlformats.org/officeDocument/2006/relationships" xmlns:p="http://schemas.openxmlformats.org/presentationml/2006/main">
   <p:cSld>
     <p:bg>
@@ -17045,7 +17636,7 @@
 </p:sld>
 </file>
 
-<file path=ppt/slides/slide43.xml><?xml version="1.0" encoding="utf-8"?>
+<file path=ppt/slides/slide44.xml><?xml version="1.0" encoding="utf-8"?>
 <p:sld xmlns:a="http://schemas.openxmlformats.org/drawingml/2006/main" xmlns:r="http://schemas.openxmlformats.org/officeDocument/2006/relationships" xmlns:p="http://schemas.openxmlformats.org/presentationml/2006/main">
   <p:cSld>
     <p:bg>
@@ -20655,6 +21246,49 @@
 </a:themeOverride>
 </file>
 
+<file path=ppt/theme/themeOverride25.xml><?xml version="1.0" encoding="utf-8"?>
+<a:themeOverride xmlns:a="http://schemas.openxmlformats.org/drawingml/2006/main">
+  <a:clrScheme name="Office">
+    <a:dk1>
+      <a:sysClr val="windowText" lastClr="000000"/>
+    </a:dk1>
+    <a:lt1>
+      <a:sysClr val="window" lastClr="FFFFFF"/>
+    </a:lt1>
+    <a:dk2>
+      <a:srgbClr val="44546A"/>
+    </a:dk2>
+    <a:lt2>
+      <a:srgbClr val="E7E6E6"/>
+    </a:lt2>
+    <a:accent1>
+      <a:srgbClr val="4472C4"/>
+    </a:accent1>
+    <a:accent2>
+      <a:srgbClr val="ED7D31"/>
+    </a:accent2>
+    <a:accent3>
+      <a:srgbClr val="A5A5A5"/>
+    </a:accent3>
+    <a:accent4>
+      <a:srgbClr val="FFC000"/>
+    </a:accent4>
+    <a:accent5>
+      <a:srgbClr val="5B9BD5"/>
+    </a:accent5>
+    <a:accent6>
+      <a:srgbClr val="70AD47"/>
+    </a:accent6>
+    <a:hlink>
+      <a:srgbClr val="0563C1"/>
+    </a:hlink>
+    <a:folHlink>
+      <a:srgbClr val="954F72"/>
+    </a:folHlink>
+  </a:clrScheme>
+</a:themeOverride>
+</file>
+
 <file path=ppt/theme/themeOverride3.xml><?xml version="1.0" encoding="utf-8"?>
 <a:themeOverride xmlns:a="http://schemas.openxmlformats.org/drawingml/2006/main">
   <a:clrScheme name="Office">

</xml_diff>

<commit_message>
chore: update talk slides and produce PDF export
</commit_message>
<xml_diff>
--- a/WhyFSharp.pptx
+++ b/WhyFSharp.pptx
@@ -5,7 +5,7 @@
     <p:sldMasterId id="2147483648" r:id="rId1"/>
   </p:sldMasterIdLst>
   <p:notesMasterIdLst>
-    <p:notesMasterId r:id="rId46"/>
+    <p:notesMasterId r:id="rId45"/>
   </p:notesMasterIdLst>
   <p:sldIdLst>
     <p:sldId id="256" r:id="rId2"/>
@@ -39,19 +39,18 @@
     <p:sldId id="281" r:id="rId30"/>
     <p:sldId id="282" r:id="rId31"/>
     <p:sldId id="286" r:id="rId32"/>
-    <p:sldId id="289" r:id="rId33"/>
-    <p:sldId id="290" r:id="rId34"/>
-    <p:sldId id="291" r:id="rId35"/>
-    <p:sldId id="292" r:id="rId36"/>
-    <p:sldId id="293" r:id="rId37"/>
-    <p:sldId id="284" r:id="rId38"/>
-    <p:sldId id="285" r:id="rId39"/>
-    <p:sldId id="295" r:id="rId40"/>
-    <p:sldId id="297" r:id="rId41"/>
-    <p:sldId id="298" r:id="rId42"/>
-    <p:sldId id="299" r:id="rId43"/>
-    <p:sldId id="300" r:id="rId44"/>
-    <p:sldId id="301" r:id="rId45"/>
+    <p:sldId id="290" r:id="rId33"/>
+    <p:sldId id="291" r:id="rId34"/>
+    <p:sldId id="292" r:id="rId35"/>
+    <p:sldId id="293" r:id="rId36"/>
+    <p:sldId id="284" r:id="rId37"/>
+    <p:sldId id="285" r:id="rId38"/>
+    <p:sldId id="295" r:id="rId39"/>
+    <p:sldId id="297" r:id="rId40"/>
+    <p:sldId id="298" r:id="rId41"/>
+    <p:sldId id="299" r:id="rId42"/>
+    <p:sldId id="300" r:id="rId43"/>
+    <p:sldId id="301" r:id="rId44"/>
   </p:sldIdLst>
   <p:sldSz cx="12192000" cy="6858000"/>
   <p:notesSz cx="6858000" cy="9144000"/>
@@ -240,7 +239,7 @@
           <a:p>
             <a:fld id="{79CF1CE2-A019-41CB-AAB6-3FFF10473091}" type="datetimeFigureOut">
               <a:rPr lang="en-US" smtClean="0"/>
-              <a:t>10/4/24</a:t>
+              <a:t>10/8/24</a:t>
             </a:fld>
             <a:endParaRPr lang="en-US"/>
           </a:p>
@@ -1037,7 +1036,7 @@
           <a:p>
             <a:fld id="{F5ABE94F-FE31-5248-AEE3-ACF1E10E8A60}" type="datetimeFigureOut">
               <a:rPr lang="fr-FR" smtClean="0"/>
-              <a:t>04/10/2024</a:t>
+              <a:t>08/10/2024</a:t>
             </a:fld>
             <a:endParaRPr lang="fr-FR"/>
           </a:p>
@@ -1237,7 +1236,7 @@
           <a:p>
             <a:fld id="{F5ABE94F-FE31-5248-AEE3-ACF1E10E8A60}" type="datetimeFigureOut">
               <a:rPr lang="fr-FR" smtClean="0"/>
-              <a:t>04/10/2024</a:t>
+              <a:t>08/10/2024</a:t>
             </a:fld>
             <a:endParaRPr lang="fr-FR"/>
           </a:p>
@@ -1447,7 +1446,7 @@
           <a:p>
             <a:fld id="{F5ABE94F-FE31-5248-AEE3-ACF1E10E8A60}" type="datetimeFigureOut">
               <a:rPr lang="fr-FR" smtClean="0"/>
-              <a:t>04/10/2024</a:t>
+              <a:t>08/10/2024</a:t>
             </a:fld>
             <a:endParaRPr lang="fr-FR"/>
           </a:p>
@@ -1647,7 +1646,7 @@
           <a:p>
             <a:fld id="{F5ABE94F-FE31-5248-AEE3-ACF1E10E8A60}" type="datetimeFigureOut">
               <a:rPr lang="fr-FR" smtClean="0"/>
-              <a:t>04/10/2024</a:t>
+              <a:t>08/10/2024</a:t>
             </a:fld>
             <a:endParaRPr lang="fr-FR"/>
           </a:p>
@@ -1923,7 +1922,7 @@
           <a:p>
             <a:fld id="{F5ABE94F-FE31-5248-AEE3-ACF1E10E8A60}" type="datetimeFigureOut">
               <a:rPr lang="fr-FR" smtClean="0"/>
-              <a:t>04/10/2024</a:t>
+              <a:t>08/10/2024</a:t>
             </a:fld>
             <a:endParaRPr lang="fr-FR"/>
           </a:p>
@@ -2191,7 +2190,7 @@
           <a:p>
             <a:fld id="{F5ABE94F-FE31-5248-AEE3-ACF1E10E8A60}" type="datetimeFigureOut">
               <a:rPr lang="fr-FR" smtClean="0"/>
-              <a:t>04/10/2024</a:t>
+              <a:t>08/10/2024</a:t>
             </a:fld>
             <a:endParaRPr lang="fr-FR"/>
           </a:p>
@@ -2606,7 +2605,7 @@
           <a:p>
             <a:fld id="{F5ABE94F-FE31-5248-AEE3-ACF1E10E8A60}" type="datetimeFigureOut">
               <a:rPr lang="fr-FR" smtClean="0"/>
-              <a:t>04/10/2024</a:t>
+              <a:t>08/10/2024</a:t>
             </a:fld>
             <a:endParaRPr lang="fr-FR"/>
           </a:p>
@@ -2748,7 +2747,7 @@
           <a:p>
             <a:fld id="{F5ABE94F-FE31-5248-AEE3-ACF1E10E8A60}" type="datetimeFigureOut">
               <a:rPr lang="fr-FR" smtClean="0"/>
-              <a:t>04/10/2024</a:t>
+              <a:t>08/10/2024</a:t>
             </a:fld>
             <a:endParaRPr lang="fr-FR"/>
           </a:p>
@@ -2861,7 +2860,7 @@
           <a:p>
             <a:fld id="{F5ABE94F-FE31-5248-AEE3-ACF1E10E8A60}" type="datetimeFigureOut">
               <a:rPr lang="fr-FR" smtClean="0"/>
-              <a:t>04/10/2024</a:t>
+              <a:t>08/10/2024</a:t>
             </a:fld>
             <a:endParaRPr lang="fr-FR"/>
           </a:p>
@@ -3174,7 +3173,7 @@
           <a:p>
             <a:fld id="{F5ABE94F-FE31-5248-AEE3-ACF1E10E8A60}" type="datetimeFigureOut">
               <a:rPr lang="fr-FR" smtClean="0"/>
-              <a:t>04/10/2024</a:t>
+              <a:t>08/10/2024</a:t>
             </a:fld>
             <a:endParaRPr lang="fr-FR"/>
           </a:p>
@@ -3463,7 +3462,7 @@
           <a:p>
             <a:fld id="{F5ABE94F-FE31-5248-AEE3-ACF1E10E8A60}" type="datetimeFigureOut">
               <a:rPr lang="fr-FR" smtClean="0"/>
-              <a:t>04/10/2024</a:t>
+              <a:t>08/10/2024</a:t>
             </a:fld>
             <a:endParaRPr lang="fr-FR"/>
           </a:p>
@@ -3706,7 +3705,7 @@
           <a:p>
             <a:fld id="{F5ABE94F-FE31-5248-AEE3-ACF1E10E8A60}" type="datetimeFigureOut">
               <a:rPr lang="fr-FR" smtClean="0"/>
-              <a:t>04/10/2024</a:t>
+              <a:t>08/10/2024</a:t>
             </a:fld>
             <a:endParaRPr lang="fr-FR"/>
           </a:p>
@@ -4416,7 +4415,7 @@
           <a:p>
             <a:r>
               <a:rPr lang="en-US" dirty="0"/>
-              <a:t>Updated on October 2024</a:t>
+              <a:t>updated on October 2024</a:t>
             </a:r>
           </a:p>
         </p:txBody>
@@ -4564,7 +4563,7 @@
                               <p:par>
                                 <p:cTn id="5" presetID="10" presetClass="entr" presetSubtype="0" fill="hold" grpId="0" nodeType="withEffect">
                                   <p:stCondLst>
-                                    <p:cond delay="1000"/>
+                                    <p:cond delay="500"/>
                                   </p:stCondLst>
                                   <p:iterate type="wd">
                                     <p:tmPct val="15000"/>
@@ -4607,6 +4606,44 @@
                                   </p:childTnLst>
                                 </p:cTn>
                               </p:par>
+                              <p:par>
+                                <p:cTn id="8" presetID="10" presetClass="entr" presetSubtype="0" fill="hold" grpId="0" nodeType="withEffect">
+                                  <p:stCondLst>
+                                    <p:cond delay="500"/>
+                                  </p:stCondLst>
+                                  <p:iterate type="wd">
+                                    <p:tmPct val="15000"/>
+                                  </p:iterate>
+                                  <p:childTnLst>
+                                    <p:set>
+                                      <p:cBhvr>
+                                        <p:cTn id="9" dur="1" fill="hold">
+                                          <p:stCondLst>
+                                            <p:cond delay="0"/>
+                                          </p:stCondLst>
+                                        </p:cTn>
+                                        <p:tgtEl>
+                                          <p:spTgt spid="2"/>
+                                        </p:tgtEl>
+                                        <p:attrNameLst>
+                                          <p:attrName>style.visibility</p:attrName>
+                                        </p:attrNameLst>
+                                      </p:cBhvr>
+                                      <p:to>
+                                        <p:strVal val="visible"/>
+                                      </p:to>
+                                    </p:set>
+                                    <p:animEffect transition="in" filter="fade">
+                                      <p:cBhvr>
+                                        <p:cTn id="10" dur="1000"/>
+                                        <p:tgtEl>
+                                          <p:spTgt spid="2"/>
+                                        </p:tgtEl>
+                                      </p:cBhvr>
+                                    </p:animEffect>
+                                  </p:childTnLst>
+                                </p:cTn>
+                              </p:par>
                             </p:childTnLst>
                           </p:cTn>
                         </p:par>
@@ -4614,19 +4651,19 @@
                     </p:cTn>
                   </p:par>
                   <p:par>
-                    <p:cTn id="8" fill="hold">
+                    <p:cTn id="11" fill="hold">
                       <p:stCondLst>
                         <p:cond delay="indefinite"/>
                       </p:stCondLst>
                       <p:childTnLst>
                         <p:par>
-                          <p:cTn id="9" fill="hold">
+                          <p:cTn id="12" fill="hold">
                             <p:stCondLst>
                               <p:cond delay="0"/>
                             </p:stCondLst>
                             <p:childTnLst>
                               <p:par>
-                                <p:cTn id="10" presetID="10" presetClass="entr" presetSubtype="0" fill="hold" grpId="0" nodeType="clickEffect">
+                                <p:cTn id="13" presetID="10" presetClass="entr" presetSubtype="0" fill="hold" grpId="0" nodeType="clickEffect">
                                   <p:stCondLst>
                                     <p:cond delay="1000"/>
                                   </p:stCondLst>
@@ -4636,7 +4673,7 @@
                                   <p:childTnLst>
                                     <p:set>
                                       <p:cBhvr>
-                                        <p:cTn id="11" dur="1" fill="hold">
+                                        <p:cTn id="14" dur="1" fill="hold">
                                           <p:stCondLst>
                                             <p:cond delay="0"/>
                                           </p:stCondLst>
@@ -4658,51 +4695,13 @@
                                     </p:set>
                                     <p:animEffect transition="in" filter="fade">
                                       <p:cBhvr>
-                                        <p:cTn id="12" dur="1000"/>
+                                        <p:cTn id="15" dur="1000"/>
                                         <p:tgtEl>
                                           <p:spTgt spid="3">
                                             <p:txEl>
                                               <p:pRg st="1" end="1"/>
                                             </p:txEl>
                                           </p:spTgt>
-                                        </p:tgtEl>
-                                      </p:cBhvr>
-                                    </p:animEffect>
-                                  </p:childTnLst>
-                                </p:cTn>
-                              </p:par>
-                              <p:par>
-                                <p:cTn id="13" presetID="10" presetClass="entr" presetSubtype="0" fill="hold" grpId="0" nodeType="withEffect">
-                                  <p:stCondLst>
-                                    <p:cond delay="500"/>
-                                  </p:stCondLst>
-                                  <p:iterate type="wd">
-                                    <p:tmPct val="15000"/>
-                                  </p:iterate>
-                                  <p:childTnLst>
-                                    <p:set>
-                                      <p:cBhvr>
-                                        <p:cTn id="14" dur="1" fill="hold">
-                                          <p:stCondLst>
-                                            <p:cond delay="0"/>
-                                          </p:stCondLst>
-                                        </p:cTn>
-                                        <p:tgtEl>
-                                          <p:spTgt spid="2"/>
-                                        </p:tgtEl>
-                                        <p:attrNameLst>
-                                          <p:attrName>style.visibility</p:attrName>
-                                        </p:attrNameLst>
-                                      </p:cBhvr>
-                                      <p:to>
-                                        <p:strVal val="visible"/>
-                                      </p:to>
-                                    </p:set>
-                                    <p:animEffect transition="in" filter="fade">
-                                      <p:cBhvr>
-                                        <p:cTn id="15" dur="1000"/>
-                                        <p:tgtEl>
-                                          <p:spTgt spid="2"/>
                                         </p:tgtEl>
                                       </p:cBhvr>
                                     </p:animEffect>
@@ -4738,7 +4737,7 @@
     </p:tnLst>
     <p:bldLst>
       <p:bldP spid="2" grpId="0"/>
-      <p:bldP spid="3" grpId="0" build="p"/>
+      <p:bldP spid="3" grpId="0" uiExpand="1" build="p"/>
     </p:bldLst>
   </p:timing>
 </p:sld>
@@ -6525,7 +6524,7 @@
                   </a:schemeClr>
                 </a:solidFill>
               </a:rPr>
-              <a:t>Not my opinion, just have a look at the language space for the last 15 to 20 years…</a:t>
+              <a:t>Not an opinion, just have a look at the language design space of the last 15 to 20 years…</a:t>
             </a:r>
           </a:p>
         </p:txBody>
@@ -7768,7 +7767,7 @@
         <p:spPr>
           <a:xfrm>
             <a:off x="3939745" y="1996288"/>
-            <a:ext cx="7188199" cy="1725167"/>
+            <a:ext cx="7218406" cy="2130869"/>
           </a:xfrm>
         </p:spPr>
         <p:txBody>
@@ -7793,14 +7792,14 @@
           <a:p>
             <a:pPr marL="742950" lvl="1"/>
             <a:r>
-              <a:rPr lang="en-US" sz="1600" b="1" dirty="0"/>
+              <a:rPr lang="en-US" sz="2000" b="1" dirty="0"/>
               <a:t>𝚛 𝜃𝚒</a:t>
             </a:r>
           </a:p>
           <a:p>
             <a:pPr marL="742950" lvl="1"/>
             <a:r>
-              <a:rPr lang="en-US" sz="1600" b="1" dirty="0"/>
+              <a:rPr lang="en-US" sz="2000" b="1" dirty="0"/>
               <a:t>𝚊 + 𝚋 𝚒</a:t>
             </a:r>
           </a:p>
@@ -7837,7 +7836,7 @@
                             </p:stCondLst>
                             <p:childTnLst>
                               <p:par>
-                                <p:cTn id="5" presetID="1" presetClass="entr" presetSubtype="0" fill="hold" grpId="0" nodeType="clickEffect">
+                                <p:cTn id="5" presetID="1" presetClass="entr" presetSubtype="0" fill="hold" nodeType="clickEffect">
                                   <p:stCondLst>
                                     <p:cond delay="0"/>
                                   </p:stCondLst>
@@ -7886,7 +7885,7 @@
                             </p:stCondLst>
                             <p:childTnLst>
                               <p:par>
-                                <p:cTn id="9" presetID="1" presetClass="entr" presetSubtype="0" fill="hold" grpId="0" nodeType="clickEffect">
+                                <p:cTn id="9" presetID="1" presetClass="entr" presetSubtype="0" fill="hold" nodeType="clickEffect">
                                   <p:stCondLst>
                                     <p:cond delay="0"/>
                                   </p:stCondLst>
@@ -7917,7 +7916,7 @@
                                 </p:cTn>
                               </p:par>
                               <p:par>
-                                <p:cTn id="11" presetID="1" presetClass="entr" presetSubtype="0" fill="hold" grpId="0" nodeType="withEffect">
+                                <p:cTn id="11" presetID="1" presetClass="entr" presetSubtype="0" fill="hold" nodeType="withEffect">
                                   <p:stCondLst>
                                     <p:cond delay="0"/>
                                   </p:stCondLst>
@@ -7948,7 +7947,7 @@
                                 </p:cTn>
                               </p:par>
                               <p:par>
-                                <p:cTn id="13" presetID="1" presetClass="entr" presetSubtype="0" fill="hold" grpId="0" nodeType="withEffect">
+                                <p:cTn id="13" presetID="1" presetClass="entr" presetSubtype="0" fill="hold" nodeType="withEffect">
                                   <p:stCondLst>
                                     <p:cond delay="0"/>
                                   </p:stCondLst>
@@ -7956,148 +7955,6 @@
                                     <p:set>
                                       <p:cBhvr>
                                         <p:cTn id="14" dur="1" fill="hold">
-                                          <p:stCondLst>
-                                            <p:cond delay="0"/>
-                                          </p:stCondLst>
-                                        </p:cTn>
-                                        <p:tgtEl>
-                                          <p:spTgt spid="4">
-                                            <p:txEl>
-                                              <p:pRg st="3" end="3"/>
-                                            </p:txEl>
-                                          </p:spTgt>
-                                        </p:tgtEl>
-                                        <p:attrNameLst>
-                                          <p:attrName>style.visibility</p:attrName>
-                                        </p:attrNameLst>
-                                      </p:cBhvr>
-                                      <p:to>
-                                        <p:strVal val="visible"/>
-                                      </p:to>
-                                    </p:set>
-                                  </p:childTnLst>
-                                </p:cTn>
-                              </p:par>
-                            </p:childTnLst>
-                          </p:cTn>
-                        </p:par>
-                      </p:childTnLst>
-                    </p:cTn>
-                  </p:par>
-                  <p:par>
-                    <p:cTn id="15" fill="hold">
-                      <p:stCondLst>
-                        <p:cond delay="indefinite"/>
-                      </p:stCondLst>
-                      <p:childTnLst>
-                        <p:par>
-                          <p:cTn id="16" fill="hold">
-                            <p:stCondLst>
-                              <p:cond delay="0"/>
-                            </p:stCondLst>
-                            <p:childTnLst>
-                              <p:par>
-                                <p:cTn id="17" presetID="1" presetClass="entr" presetSubtype="0" fill="hold" nodeType="clickEffect">
-                                  <p:stCondLst>
-                                    <p:cond delay="0"/>
-                                  </p:stCondLst>
-                                  <p:childTnLst>
-                                    <p:set>
-                                      <p:cBhvr>
-                                        <p:cTn id="18" dur="1" fill="hold">
-                                          <p:stCondLst>
-                                            <p:cond delay="0"/>
-                                          </p:stCondLst>
-                                        </p:cTn>
-                                        <p:tgtEl>
-                                          <p:spTgt spid="4">
-                                            <p:txEl>
-                                              <p:pRg st="0" end="0"/>
-                                            </p:txEl>
-                                          </p:spTgt>
-                                        </p:tgtEl>
-                                        <p:attrNameLst>
-                                          <p:attrName>style.visibility</p:attrName>
-                                        </p:attrNameLst>
-                                      </p:cBhvr>
-                                      <p:to>
-                                        <p:strVal val="visible"/>
-                                      </p:to>
-                                    </p:set>
-                                  </p:childTnLst>
-                                </p:cTn>
-                              </p:par>
-                              <p:par>
-                                <p:cTn id="19" presetID="1" presetClass="entr" presetSubtype="0" fill="hold" nodeType="withEffect">
-                                  <p:stCondLst>
-                                    <p:cond delay="0"/>
-                                  </p:stCondLst>
-                                  <p:childTnLst>
-                                    <p:set>
-                                      <p:cBhvr>
-                                        <p:cTn id="20" dur="1" fill="hold">
-                                          <p:stCondLst>
-                                            <p:cond delay="0"/>
-                                          </p:stCondLst>
-                                        </p:cTn>
-                                        <p:tgtEl>
-                                          <p:spTgt spid="4">
-                                            <p:txEl>
-                                              <p:pRg st="1" end="1"/>
-                                            </p:txEl>
-                                          </p:spTgt>
-                                        </p:tgtEl>
-                                        <p:attrNameLst>
-                                          <p:attrName>style.visibility</p:attrName>
-                                        </p:attrNameLst>
-                                      </p:cBhvr>
-                                      <p:to>
-                                        <p:strVal val="visible"/>
-                                      </p:to>
-                                    </p:set>
-                                  </p:childTnLst>
-                                </p:cTn>
-                              </p:par>
-                              <p:par>
-                                <p:cTn id="21" presetID="1" presetClass="entr" presetSubtype="0" fill="hold" nodeType="withEffect">
-                                  <p:stCondLst>
-                                    <p:cond delay="0"/>
-                                  </p:stCondLst>
-                                  <p:childTnLst>
-                                    <p:set>
-                                      <p:cBhvr>
-                                        <p:cTn id="22" dur="1" fill="hold">
-                                          <p:stCondLst>
-                                            <p:cond delay="0"/>
-                                          </p:stCondLst>
-                                        </p:cTn>
-                                        <p:tgtEl>
-                                          <p:spTgt spid="4">
-                                            <p:txEl>
-                                              <p:pRg st="2" end="2"/>
-                                            </p:txEl>
-                                          </p:spTgt>
-                                        </p:tgtEl>
-                                        <p:attrNameLst>
-                                          <p:attrName>style.visibility</p:attrName>
-                                        </p:attrNameLst>
-                                      </p:cBhvr>
-                                      <p:to>
-                                        <p:strVal val="visible"/>
-                                      </p:to>
-                                    </p:set>
-                                  </p:childTnLst>
-                                </p:cTn>
-                              </p:par>
-                              <p:par>
-                                <p:cTn id="23" presetID="1" presetClass="entr" presetSubtype="0" fill="hold" nodeType="withEffect">
-                                  <p:stCondLst>
-                                    <p:cond delay="0"/>
-                                  </p:stCondLst>
-                                  <p:childTnLst>
-                                    <p:set>
-                                      <p:cBhvr>
-                                        <p:cTn id="24" dur="1" fill="hold">
                                           <p:stCondLst>
                                             <p:cond delay="0"/>
                                           </p:stCondLst>
@@ -8147,9 +8004,6 @@
         </p:cTn>
       </p:par>
     </p:tnLst>
-    <p:bldLst>
-      <p:bldP spid="4" grpId="0" build="p"/>
-    </p:bldLst>
   </p:timing>
 </p:sld>
 </file>
@@ -9856,7 +9710,7 @@
                   </a:schemeClr>
                 </a:solidFill>
               </a:rPr>
-              <a:t>…yes, it’s a very big deal, have a look at C# 9 records or Immutable collections… </a:t>
+              <a:t>…yes, it’s a very big deal, have a look at C# records or Immutable collections… </a:t>
             </a:r>
           </a:p>
         </p:txBody>
@@ -11092,29 +10946,7 @@
                 </a:solidFill>
                 <a:hlinkClick r:id="rId4"/>
               </a:rPr>
-              <a:t>@KevlinHenney presentation at </a:t>
-            </a:r>
-            <a:r>
-              <a:rPr lang="en-US" sz="2200" i="1" dirty="0" err="1">
-                <a:solidFill>
-                  <a:schemeClr val="bg2">
-                    <a:lumMod val="75000"/>
-                  </a:schemeClr>
-                </a:solidFill>
-                <a:hlinkClick r:id="rId4"/>
-              </a:rPr>
-              <a:t>Ncraft</a:t>
-            </a:r>
-            <a:r>
-              <a:rPr lang="en-US" sz="2200" i="1" dirty="0">
-                <a:solidFill>
-                  <a:schemeClr val="bg2">
-                    <a:lumMod val="75000"/>
-                  </a:schemeClr>
-                </a:solidFill>
-                <a:hlinkClick r:id="rId4"/>
-              </a:rPr>
-              <a:t> 2018</a:t>
+              <a:t>@KevlinHenney great 2018 talk</a:t>
             </a:r>
             <a:r>
               <a:rPr lang="en-US" sz="2200" i="1" dirty="0">
@@ -14158,10 +13990,10 @@
       </p:sp>
       <p:pic>
         <p:nvPicPr>
-          <p:cNvPr id="5" name="Content Placeholder 4" descr="Graphical user interface, text&#10;&#10;Description automatically generated">
-            <a:extLst>
-              <a:ext uri="{FF2B5EF4-FFF2-40B4-BE49-F238E27FC236}">
-                <a16:creationId xmlns:a16="http://schemas.microsoft.com/office/drawing/2014/main" id="{5593FB75-D9A4-B84B-B0A6-F7693BF6E591}"/>
+          <p:cNvPr id="11" name="Content Placeholder 10" descr="Text&#10;&#10;Description automatically generated">
+            <a:extLst>
+              <a:ext uri="{FF2B5EF4-FFF2-40B4-BE49-F238E27FC236}">
+                <a16:creationId xmlns:a16="http://schemas.microsoft.com/office/drawing/2014/main" id="{5640755B-69EA-814F-8CC5-3DAED10FD16B}"/>
               </a:ext>
             </a:extLst>
           </p:cNvPr>
@@ -14180,15 +14012,15 @@
         </p:blipFill>
         <p:spPr>
           <a:xfrm>
-            <a:off x="1643063" y="2239693"/>
-            <a:ext cx="8486775" cy="3357405"/>
+            <a:off x="1493398" y="2107803"/>
+            <a:ext cx="9205203" cy="2642394"/>
           </a:xfrm>
         </p:spPr>
       </p:pic>
     </p:spTree>
     <p:extLst>
       <p:ext uri="{BB962C8B-B14F-4D97-AF65-F5344CB8AC3E}">
-        <p14:creationId xmlns:p14="http://schemas.microsoft.com/office/powerpoint/2010/main" val="864006971"/>
+        <p14:creationId xmlns:p14="http://schemas.microsoft.com/office/powerpoint/2010/main" val="2300790624"/>
       </p:ext>
     </p:extLst>
   </p:cSld>
@@ -14256,10 +14088,10 @@
       </p:sp>
       <p:pic>
         <p:nvPicPr>
-          <p:cNvPr id="11" name="Content Placeholder 10" descr="Text&#10;&#10;Description automatically generated">
-            <a:extLst>
-              <a:ext uri="{FF2B5EF4-FFF2-40B4-BE49-F238E27FC236}">
-                <a16:creationId xmlns:a16="http://schemas.microsoft.com/office/drawing/2014/main" id="{5640755B-69EA-814F-8CC5-3DAED10FD16B}"/>
+          <p:cNvPr id="6" name="Content Placeholder 5" descr="Text&#10;&#10;Description automatically generated">
+            <a:extLst>
+              <a:ext uri="{FF2B5EF4-FFF2-40B4-BE49-F238E27FC236}">
+                <a16:creationId xmlns:a16="http://schemas.microsoft.com/office/drawing/2014/main" id="{CDE8AD5F-E6AB-4441-A830-A2C8779861C1}"/>
               </a:ext>
             </a:extLst>
           </p:cNvPr>
@@ -14278,15 +14110,15 @@
         </p:blipFill>
         <p:spPr>
           <a:xfrm>
-            <a:off x="1493398" y="2107803"/>
-            <a:ext cx="9205203" cy="2642394"/>
+            <a:off x="2722562" y="1690688"/>
+            <a:ext cx="6678613" cy="4339467"/>
           </a:xfrm>
         </p:spPr>
       </p:pic>
     </p:spTree>
     <p:extLst>
       <p:ext uri="{BB962C8B-B14F-4D97-AF65-F5344CB8AC3E}">
-        <p14:creationId xmlns:p14="http://schemas.microsoft.com/office/powerpoint/2010/main" val="2300790624"/>
+        <p14:creationId xmlns:p14="http://schemas.microsoft.com/office/powerpoint/2010/main" val="431671949"/>
       </p:ext>
     </p:extLst>
   </p:cSld>
@@ -14338,7 +14170,7 @@
           <a:p>
             <a:pPr algn="ctr"/>
             <a:r>
-              <a:rPr lang="en-US" sz="5400" dirty="0"/>
+              <a:rPr lang="en-US" sz="5400"/>
               <a:t>F# Samples</a:t>
             </a:r>
             <a:endParaRPr lang="en-US" sz="5400" kern="1200" dirty="0">
@@ -14354,10 +14186,10 @@
       </p:sp>
       <p:pic>
         <p:nvPicPr>
-          <p:cNvPr id="6" name="Content Placeholder 5" descr="Text&#10;&#10;Description automatically generated">
-            <a:extLst>
-              <a:ext uri="{FF2B5EF4-FFF2-40B4-BE49-F238E27FC236}">
-                <a16:creationId xmlns:a16="http://schemas.microsoft.com/office/drawing/2014/main" id="{CDE8AD5F-E6AB-4441-A830-A2C8779861C1}"/>
+          <p:cNvPr id="20" name="Content Placeholder 19" descr="Text&#10;&#10;Description automatically generated">
+            <a:extLst>
+              <a:ext uri="{FF2B5EF4-FFF2-40B4-BE49-F238E27FC236}">
+                <a16:creationId xmlns:a16="http://schemas.microsoft.com/office/drawing/2014/main" id="{0843AB3D-E2AA-3147-A60A-D9A9FBB57E4F}"/>
               </a:ext>
             </a:extLst>
           </p:cNvPr>
@@ -14376,15 +14208,15 @@
         </p:blipFill>
         <p:spPr>
           <a:xfrm>
-            <a:off x="2722562" y="1690688"/>
-            <a:ext cx="6678613" cy="4339467"/>
+            <a:off x="2538560" y="1690688"/>
+            <a:ext cx="7114880" cy="5119106"/>
           </a:xfrm>
         </p:spPr>
       </p:pic>
     </p:spTree>
     <p:extLst>
       <p:ext uri="{BB962C8B-B14F-4D97-AF65-F5344CB8AC3E}">
-        <p14:creationId xmlns:p14="http://schemas.microsoft.com/office/powerpoint/2010/main" val="431671949"/>
+        <p14:creationId xmlns:p14="http://schemas.microsoft.com/office/powerpoint/2010/main" val="1140163805"/>
       </p:ext>
     </p:extLst>
   </p:cSld>
@@ -14452,104 +14284,6 @@
       </p:sp>
       <p:pic>
         <p:nvPicPr>
-          <p:cNvPr id="20" name="Content Placeholder 19" descr="Text&#10;&#10;Description automatically generated">
-            <a:extLst>
-              <a:ext uri="{FF2B5EF4-FFF2-40B4-BE49-F238E27FC236}">
-                <a16:creationId xmlns:a16="http://schemas.microsoft.com/office/drawing/2014/main" id="{0843AB3D-E2AA-3147-A60A-D9A9FBB57E4F}"/>
-              </a:ext>
-            </a:extLst>
-          </p:cNvPr>
-          <p:cNvPicPr>
-            <a:picLocks noGrp="1" noChangeAspect="1"/>
-          </p:cNvPicPr>
-          <p:nvPr>
-            <p:ph idx="1"/>
-          </p:nvPr>
-        </p:nvPicPr>
-        <p:blipFill>
-          <a:blip r:embed="rId2"/>
-          <a:stretch>
-            <a:fillRect/>
-          </a:stretch>
-        </p:blipFill>
-        <p:spPr>
-          <a:xfrm>
-            <a:off x="2538560" y="1690688"/>
-            <a:ext cx="7114880" cy="5119106"/>
-          </a:xfrm>
-        </p:spPr>
-      </p:pic>
-    </p:spTree>
-    <p:extLst>
-      <p:ext uri="{BB962C8B-B14F-4D97-AF65-F5344CB8AC3E}">
-        <p14:creationId xmlns:p14="http://schemas.microsoft.com/office/powerpoint/2010/main" val="1140163805"/>
-      </p:ext>
-    </p:extLst>
-  </p:cSld>
-  <p:clrMapOvr>
-    <a:masterClrMapping/>
-  </p:clrMapOvr>
-</p:sld>
-</file>
-
-<file path=ppt/slides/slide36.xml><?xml version="1.0" encoding="utf-8"?>
-<p:sld xmlns:a="http://schemas.openxmlformats.org/drawingml/2006/main" xmlns:r="http://schemas.openxmlformats.org/officeDocument/2006/relationships" xmlns:p="http://schemas.openxmlformats.org/presentationml/2006/main">
-  <p:cSld>
-    <p:spTree>
-      <p:nvGrpSpPr>
-        <p:cNvPr id="1" name=""/>
-        <p:cNvGrpSpPr/>
-        <p:nvPr/>
-      </p:nvGrpSpPr>
-      <p:grpSpPr>
-        <a:xfrm>
-          <a:off x="0" y="0"/>
-          <a:ext cx="0" cy="0"/>
-          <a:chOff x="0" y="0"/>
-          <a:chExt cx="0" cy="0"/>
-        </a:xfrm>
-      </p:grpSpPr>
-      <p:sp>
-        <p:nvSpPr>
-          <p:cNvPr id="2" name="Title 1">
-            <a:extLst>
-              <a:ext uri="{FF2B5EF4-FFF2-40B4-BE49-F238E27FC236}">
-                <a16:creationId xmlns:a16="http://schemas.microsoft.com/office/drawing/2014/main" id="{179B0B2E-FC83-9949-A534-87EF6DE79877}"/>
-              </a:ext>
-            </a:extLst>
-          </p:cNvPr>
-          <p:cNvSpPr>
-            <a:spLocks noGrp="1"/>
-          </p:cNvSpPr>
-          <p:nvPr>
-            <p:ph type="title"/>
-          </p:nvPr>
-        </p:nvSpPr>
-        <p:spPr/>
-        <p:txBody>
-          <a:bodyPr vert="horz" lIns="91440" tIns="45720" rIns="91440" bIns="45720" rtlCol="0" anchor="b">
-            <a:normAutofit/>
-          </a:bodyPr>
-          <a:lstStyle/>
-          <a:p>
-            <a:pPr algn="ctr"/>
-            <a:r>
-              <a:rPr lang="en-US" sz="5400"/>
-              <a:t>F# Samples</a:t>
-            </a:r>
-            <a:endParaRPr lang="en-US" sz="5400" kern="1200" dirty="0">
-              <a:solidFill>
-                <a:schemeClr val="tx1"/>
-              </a:solidFill>
-              <a:latin typeface="+mj-lt"/>
-              <a:ea typeface="+mj-ea"/>
-              <a:cs typeface="+mj-cs"/>
-            </a:endParaRPr>
-          </a:p>
-        </p:txBody>
-      </p:sp>
-      <p:pic>
-        <p:nvPicPr>
           <p:cNvPr id="10" name="Content Placeholder 9" descr="Text&#10;&#10;Description automatically generated">
             <a:extLst>
               <a:ext uri="{FF2B5EF4-FFF2-40B4-BE49-F238E27FC236}">
@@ -14590,7 +14324,7 @@
 </p:sld>
 </file>
 
-<file path=ppt/slides/slide37.xml><?xml version="1.0" encoding="utf-8"?>
+<file path=ppt/slides/slide36.xml><?xml version="1.0" encoding="utf-8"?>
 <p:sld xmlns:a="http://schemas.openxmlformats.org/drawingml/2006/main" xmlns:r="http://schemas.openxmlformats.org/officeDocument/2006/relationships" xmlns:p="http://schemas.openxmlformats.org/presentationml/2006/main">
   <p:cSld>
     <p:bg>
@@ -14821,7 +14555,29 @@
                   <a:schemeClr val="bg1"/>
                 </a:solidFill>
               </a:rPr>
-              <a:t>C# is not dead and will continues to evolve… F# is just another option on the .NET platform</a:t>
+              <a:t>F# is another viable option on the .NET platform</a:t>
+            </a:r>
+          </a:p>
+          <a:p>
+            <a:pPr lvl="1"/>
+            <a:r>
+              <a:rPr lang="en-GB" sz="2600" dirty="0">
+                <a:solidFill>
+                  <a:schemeClr val="bg1"/>
+                </a:solidFill>
+              </a:rPr>
+              <a:t>A good fit for Business Line application</a:t>
+            </a:r>
+          </a:p>
+          <a:p>
+            <a:pPr lvl="1"/>
+            <a:r>
+              <a:rPr lang="en-GB" sz="2600" dirty="0">
+                <a:solidFill>
+                  <a:schemeClr val="bg1"/>
+                </a:solidFill>
+              </a:rPr>
+              <a:t>Immutability by default makes it less of a good fit when latency and raw performance is critical</a:t>
             </a:r>
           </a:p>
           <a:p>
@@ -15203,6 +14959,164 @@
                                   </p:childTnLst>
                                 </p:cTn>
                               </p:par>
+                              <p:par>
+                                <p:cTn id="24" presetID="42" presetClass="entr" presetSubtype="0" fill="hold" grpId="0" nodeType="withEffect">
+                                  <p:stCondLst>
+                                    <p:cond delay="0"/>
+                                  </p:stCondLst>
+                                  <p:childTnLst>
+                                    <p:set>
+                                      <p:cBhvr>
+                                        <p:cTn id="25" dur="1" fill="hold">
+                                          <p:stCondLst>
+                                            <p:cond delay="0"/>
+                                          </p:stCondLst>
+                                        </p:cTn>
+                                        <p:tgtEl>
+                                          <p:spTgt spid="7">
+                                            <p:txEl>
+                                              <p:pRg st="3" end="3"/>
+                                            </p:txEl>
+                                          </p:spTgt>
+                                        </p:tgtEl>
+                                        <p:attrNameLst>
+                                          <p:attrName>style.visibility</p:attrName>
+                                        </p:attrNameLst>
+                                      </p:cBhvr>
+                                      <p:to>
+                                        <p:strVal val="visible"/>
+                                      </p:to>
+                                    </p:set>
+                                    <p:animEffect transition="in" filter="fade">
+                                      <p:cBhvr>
+                                        <p:cTn id="26" dur="1000"/>
+                                        <p:tgtEl>
+                                          <p:spTgt spid="7">
+                                            <p:txEl>
+                                              <p:pRg st="3" end="3"/>
+                                            </p:txEl>
+                                          </p:spTgt>
+                                        </p:tgtEl>
+                                      </p:cBhvr>
+                                    </p:animEffect>
+                                    <p:anim calcmode="lin" valueType="num">
+                                      <p:cBhvr>
+                                        <p:cTn id="27" dur="1000" fill="hold"/>
+                                        <p:tgtEl>
+                                          <p:spTgt spid="7">
+                                            <p:txEl>
+                                              <p:pRg st="3" end="3"/>
+                                            </p:txEl>
+                                          </p:spTgt>
+                                        </p:tgtEl>
+                                        <p:attrNameLst>
+                                          <p:attrName>ppt_x</p:attrName>
+                                        </p:attrNameLst>
+                                      </p:cBhvr>
+                                      <p:tavLst>
+                                        <p:tav tm="0">
+                                          <p:val>
+                                            <p:strVal val="#ppt_x"/>
+                                          </p:val>
+                                        </p:tav>
+                                        <p:tav tm="100000">
+                                          <p:val>
+                                            <p:strVal val="#ppt_x"/>
+                                          </p:val>
+                                        </p:tav>
+                                      </p:tavLst>
+                                    </p:anim>
+                                    <p:anim calcmode="lin" valueType="num">
+                                      <p:cBhvr>
+                                        <p:cTn id="28" dur="1000" fill="hold"/>
+                                        <p:tgtEl>
+                                          <p:spTgt spid="7">
+                                            <p:txEl>
+                                              <p:pRg st="3" end="3"/>
+                                            </p:txEl>
+                                          </p:spTgt>
+                                        </p:tgtEl>
+                                        <p:attrNameLst>
+                                          <p:attrName>ppt_y</p:attrName>
+                                        </p:attrNameLst>
+                                      </p:cBhvr>
+                                      <p:tavLst>
+                                        <p:tav tm="0">
+                                          <p:val>
+                                            <p:strVal val="#ppt_y+.1"/>
+                                          </p:val>
+                                        </p:tav>
+                                        <p:tav tm="100000">
+                                          <p:val>
+                                            <p:strVal val="#ppt_y"/>
+                                          </p:val>
+                                        </p:tav>
+                                      </p:tavLst>
+                                    </p:anim>
+                                  </p:childTnLst>
+                                </p:cTn>
+                              </p:par>
+                            </p:childTnLst>
+                          </p:cTn>
+                        </p:par>
+                      </p:childTnLst>
+                    </p:cTn>
+                  </p:par>
+                  <p:par>
+                    <p:cTn id="29" fill="hold">
+                      <p:stCondLst>
+                        <p:cond delay="indefinite"/>
+                      </p:stCondLst>
+                      <p:childTnLst>
+                        <p:par>
+                          <p:cTn id="30" fill="hold">
+                            <p:stCondLst>
+                              <p:cond delay="0"/>
+                            </p:stCondLst>
+                            <p:childTnLst>
+                              <p:par>
+                                <p:cTn id="31" presetID="10" presetClass="entr" presetSubtype="0" fill="hold" nodeType="clickEffect">
+                                  <p:stCondLst>
+                                    <p:cond delay="0"/>
+                                  </p:stCondLst>
+                                  <p:childTnLst>
+                                    <p:set>
+                                      <p:cBhvr>
+                                        <p:cTn id="32" dur="1" fill="hold">
+                                          <p:stCondLst>
+                                            <p:cond delay="0"/>
+                                          </p:stCondLst>
+                                        </p:cTn>
+                                        <p:tgtEl>
+                                          <p:spTgt spid="7">
+                                            <p:txEl>
+                                              <p:pRg st="4" end="4"/>
+                                            </p:txEl>
+                                          </p:spTgt>
+                                        </p:tgtEl>
+                                        <p:attrNameLst>
+                                          <p:attrName>style.visibility</p:attrName>
+                                        </p:attrNameLst>
+                                      </p:cBhvr>
+                                      <p:to>
+                                        <p:strVal val="visible"/>
+                                      </p:to>
+                                    </p:set>
+                                    <p:animEffect transition="in" filter="fade">
+                                      <p:cBhvr>
+                                        <p:cTn id="33" dur="500"/>
+                                        <p:tgtEl>
+                                          <p:spTgt spid="7">
+                                            <p:txEl>
+                                              <p:pRg st="4" end="4"/>
+                                            </p:txEl>
+                                          </p:spTgt>
+                                        </p:tgtEl>
+                                      </p:cBhvr>
+                                    </p:animEffect>
+                                  </p:childTnLst>
+                                </p:cTn>
+                              </p:par>
                             </p:childTnLst>
                           </p:cTn>
                         </p:par>
@@ -15231,13 +15145,13 @@
       </p:par>
     </p:tnLst>
     <p:bldLst>
-      <p:bldP spid="7" grpId="0" build="p"/>
+      <p:bldP spid="7" grpId="0" uiExpand="1" build="p"/>
     </p:bldLst>
   </p:timing>
 </p:sld>
 </file>
 
-<file path=ppt/slides/slide38.xml><?xml version="1.0" encoding="utf-8"?>
+<file path=ppt/slides/slide37.xml><?xml version="1.0" encoding="utf-8"?>
 <p:sld xmlns:a="http://schemas.openxmlformats.org/drawingml/2006/main" xmlns:r="http://schemas.openxmlformats.org/officeDocument/2006/relationships" xmlns:p="http://schemas.openxmlformats.org/presentationml/2006/main">
   <p:cSld>
     <p:bg>
@@ -15621,7 +15535,7 @@
 </p:sld>
 </file>
 
-<file path=ppt/slides/slide39.xml><?xml version="1.0" encoding="utf-8"?>
+<file path=ppt/slides/slide38.xml><?xml version="1.0" encoding="utf-8"?>
 <p:sld xmlns:a="http://schemas.openxmlformats.org/drawingml/2006/main" xmlns:r="http://schemas.openxmlformats.org/officeDocument/2006/relationships" xmlns:p="http://schemas.openxmlformats.org/presentationml/2006/main">
   <p:cSld>
     <p:bg>
@@ -16003,6 +15917,379 @@
 </p:sld>
 </file>
 
+<file path=ppt/slides/slide39.xml><?xml version="1.0" encoding="utf-8"?>
+<p:sld xmlns:a="http://schemas.openxmlformats.org/drawingml/2006/main" xmlns:r="http://schemas.openxmlformats.org/officeDocument/2006/relationships" xmlns:p="http://schemas.openxmlformats.org/presentationml/2006/main">
+  <p:cSld>
+    <p:bg>
+      <p:bgPr>
+        <a:solidFill>
+          <a:schemeClr val="bg1"/>
+        </a:solidFill>
+        <a:effectLst/>
+      </p:bgPr>
+    </p:bg>
+    <p:spTree>
+      <p:nvGrpSpPr>
+        <p:cNvPr id="1" name="">
+          <a:extLst>
+            <a:ext uri="{FF2B5EF4-FFF2-40B4-BE49-F238E27FC236}">
+              <a16:creationId xmlns:a16="http://schemas.microsoft.com/office/drawing/2014/main" id="{83BB7EBB-36FE-DC80-FB47-0649996DEF49}"/>
+            </a:ext>
+          </a:extLst>
+        </p:cNvPr>
+        <p:cNvGrpSpPr/>
+        <p:nvPr/>
+      </p:nvGrpSpPr>
+      <p:grpSpPr>
+        <a:xfrm>
+          <a:off x="0" y="0"/>
+          <a:ext cx="0" cy="0"/>
+          <a:chOff x="0" y="0"/>
+          <a:chExt cx="0" cy="0"/>
+        </a:xfrm>
+      </p:grpSpPr>
+      <p:sp>
+        <p:nvSpPr>
+          <p:cNvPr id="22" name="Rectangle 11">
+            <a:extLst>
+              <a:ext uri="{FF2B5EF4-FFF2-40B4-BE49-F238E27FC236}">
+                <a16:creationId xmlns:a16="http://schemas.microsoft.com/office/drawing/2014/main" id="{A1D5B6BD-0D0F-3053-6951-529A13B10D26}"/>
+              </a:ext>
+              <a:ext uri="{C183D7F6-B498-43B3-948B-1728B52AA6E4}">
+                <adec:decorative xmlns:adec="http://schemas.microsoft.com/office/drawing/2017/decorative" val="1"/>
+              </a:ext>
+            </a:extLst>
+          </p:cNvPr>
+          <p:cNvSpPr>
+            <a:spLocks noGrp="1" noRot="1" noChangeAspect="1" noMove="1" noResize="1" noEditPoints="1" noAdjustHandles="1" noChangeArrowheads="1" noChangeShapeType="1" noTextEdit="1"/>
+          </p:cNvSpPr>
+          <p:nvPr>
+            <p:extLst>
+              <p:ext uri="{386F3935-93C4-4BCD-93E2-E3B085C9AB24}">
+                <p16:designElem xmlns:p16="http://schemas.microsoft.com/office/powerpoint/2015/main" val="1"/>
+              </p:ext>
+            </p:extLst>
+          </p:nvPr>
+        </p:nvSpPr>
+        <p:spPr>
+          <a:xfrm>
+            <a:off x="0" y="-3324"/>
+            <a:ext cx="12192000" cy="6861324"/>
+          </a:xfrm>
+          <a:prstGeom prst="rect">
+            <a:avLst/>
+          </a:prstGeom>
+          <a:solidFill>
+            <a:schemeClr val="tx1">
+              <a:lumMod val="75000"/>
+              <a:lumOff val="25000"/>
+            </a:schemeClr>
+          </a:solidFill>
+          <a:ln>
+            <a:noFill/>
+          </a:ln>
+        </p:spPr>
+        <p:style>
+          <a:lnRef idx="2">
+            <a:schemeClr val="accent1">
+              <a:shade val="50000"/>
+            </a:schemeClr>
+          </a:lnRef>
+          <a:fillRef idx="1">
+            <a:schemeClr val="accent1"/>
+          </a:fillRef>
+          <a:effectRef idx="0">
+            <a:schemeClr val="accent1"/>
+          </a:effectRef>
+          <a:fontRef idx="minor">
+            <a:schemeClr val="lt1"/>
+          </a:fontRef>
+        </p:style>
+        <p:txBody>
+          <a:bodyPr rtlCol="0" anchor="ctr"/>
+          <a:lstStyle/>
+          <a:p>
+            <a:pPr marL="0" marR="0" lvl="0" indent="0" algn="ctr" defTabSz="914400" rtl="0" eaLnBrk="1" fontAlgn="auto" latinLnBrk="0" hangingPunct="1">
+              <a:lnSpc>
+                <a:spcPct val="100000"/>
+              </a:lnSpc>
+              <a:spcBef>
+                <a:spcPts val="0"/>
+              </a:spcBef>
+              <a:spcAft>
+                <a:spcPts val="0"/>
+              </a:spcAft>
+              <a:buClrTx/>
+              <a:buSzTx/>
+              <a:buFontTx/>
+              <a:buNone/>
+              <a:tabLst/>
+              <a:defRPr/>
+            </a:pPr>
+            <a:endParaRPr kumimoji="0" lang="en-US" sz="1800" b="0" i="0" u="none" strike="noStrike" kern="1200" cap="none" spc="0" normalizeH="0" baseline="0" noProof="0">
+              <a:ln>
+                <a:noFill/>
+              </a:ln>
+              <a:solidFill>
+                <a:prstClr val="white"/>
+              </a:solidFill>
+              <a:effectLst/>
+              <a:uLnTx/>
+              <a:uFillTx/>
+              <a:latin typeface="Calibri" panose="020F0502020204030204"/>
+              <a:ea typeface="+mn-ea"/>
+              <a:cs typeface="+mn-cs"/>
+            </a:endParaRPr>
+          </a:p>
+        </p:txBody>
+      </p:sp>
+      <p:sp>
+        <p:nvSpPr>
+          <p:cNvPr id="23" name="Rectangle 13">
+            <a:extLst>
+              <a:ext uri="{FF2B5EF4-FFF2-40B4-BE49-F238E27FC236}">
+                <a16:creationId xmlns:a16="http://schemas.microsoft.com/office/drawing/2014/main" id="{C0504A8D-6967-C73D-C144-2C2A8B8E11CC}"/>
+              </a:ext>
+              <a:ext uri="{C183D7F6-B498-43B3-948B-1728B52AA6E4}">
+                <adec:decorative xmlns:adec="http://schemas.microsoft.com/office/drawing/2017/decorative" val="1"/>
+              </a:ext>
+            </a:extLst>
+          </p:cNvPr>
+          <p:cNvSpPr>
+            <a:spLocks noGrp="1" noRot="1" noChangeAspect="1" noMove="1" noResize="1" noEditPoints="1" noAdjustHandles="1" noChangeArrowheads="1" noChangeShapeType="1" noTextEdit="1"/>
+          </p:cNvSpPr>
+          <p:nvPr>
+            <p:extLst>
+              <p:ext uri="{386F3935-93C4-4BCD-93E2-E3B085C9AB24}">
+                <p16:designElem xmlns:p16="http://schemas.microsoft.com/office/powerpoint/2015/main" val="1"/>
+              </p:ext>
+            </p:extLst>
+          </p:nvPr>
+        </p:nvSpPr>
+        <p:spPr bwMode="ltGray">
+          <a:xfrm>
+            <a:off x="795338" y="981075"/>
+            <a:ext cx="10601325" cy="4552949"/>
+          </a:xfrm>
+          <a:prstGeom prst="rect">
+            <a:avLst/>
+          </a:prstGeom>
+          <a:solidFill>
+            <a:schemeClr val="bg1"/>
+          </a:solidFill>
+          <a:ln w="127000" cap="sq" cmpd="thinThick">
+            <a:solidFill>
+              <a:schemeClr val="bg1"/>
+            </a:solidFill>
+          </a:ln>
+        </p:spPr>
+        <p:style>
+          <a:lnRef idx="2">
+            <a:schemeClr val="accent1">
+              <a:shade val="50000"/>
+            </a:schemeClr>
+          </a:lnRef>
+          <a:fillRef idx="1">
+            <a:schemeClr val="accent1"/>
+          </a:fillRef>
+          <a:effectRef idx="0">
+            <a:schemeClr val="accent1"/>
+          </a:effectRef>
+          <a:fontRef idx="minor">
+            <a:schemeClr val="lt1"/>
+          </a:fontRef>
+        </p:style>
+        <p:txBody>
+          <a:bodyPr rtlCol="0" anchor="ctr"/>
+          <a:lstStyle/>
+          <a:p>
+            <a:pPr marL="0" marR="0" lvl="0" indent="0" algn="ctr" defTabSz="914400" rtl="0" eaLnBrk="1" fontAlgn="auto" latinLnBrk="0" hangingPunct="1">
+              <a:lnSpc>
+                <a:spcPct val="100000"/>
+              </a:lnSpc>
+              <a:spcBef>
+                <a:spcPts val="0"/>
+              </a:spcBef>
+              <a:spcAft>
+                <a:spcPts val="0"/>
+              </a:spcAft>
+              <a:buClrTx/>
+              <a:buSzTx/>
+              <a:buFontTx/>
+              <a:buNone/>
+              <a:tabLst/>
+              <a:defRPr/>
+            </a:pPr>
+            <a:endParaRPr kumimoji="0" lang="en-US" sz="1800" b="0" i="0" u="none" strike="noStrike" kern="1200" cap="none" spc="0" normalizeH="0" baseline="0" noProof="0" dirty="0">
+              <a:ln>
+                <a:noFill/>
+              </a:ln>
+              <a:solidFill>
+                <a:prstClr val="white"/>
+              </a:solidFill>
+              <a:effectLst/>
+              <a:uLnTx/>
+              <a:uFillTx/>
+              <a:latin typeface="Calibri" panose="020F0502020204030204"/>
+              <a:ea typeface="+mn-ea"/>
+              <a:cs typeface="+mn-cs"/>
+            </a:endParaRPr>
+          </a:p>
+        </p:txBody>
+      </p:sp>
+      <p:sp>
+        <p:nvSpPr>
+          <p:cNvPr id="2" name="Title 1">
+            <a:extLst>
+              <a:ext uri="{FF2B5EF4-FFF2-40B4-BE49-F238E27FC236}">
+                <a16:creationId xmlns:a16="http://schemas.microsoft.com/office/drawing/2014/main" id="{035F2B61-9A62-6CDE-DA18-DBE796ABC33E}"/>
+              </a:ext>
+            </a:extLst>
+          </p:cNvPr>
+          <p:cNvSpPr>
+            <a:spLocks noGrp="1"/>
+          </p:cNvSpPr>
+          <p:nvPr>
+            <p:ph type="title"/>
+          </p:nvPr>
+        </p:nvSpPr>
+        <p:spPr>
+          <a:xfrm>
+            <a:off x="1537097" y="1428750"/>
+            <a:ext cx="9117807" cy="2105026"/>
+          </a:xfrm>
+        </p:spPr>
+        <p:txBody>
+          <a:bodyPr vert="horz" lIns="91440" tIns="45720" rIns="91440" bIns="45720" rtlCol="0" anchor="b">
+            <a:normAutofit/>
+          </a:bodyPr>
+          <a:lstStyle/>
+          <a:p>
+            <a:pPr algn="ctr"/>
+            <a:r>
+              <a:rPr lang="en-US" kern="1200" dirty="0">
+                <a:solidFill>
+                  <a:schemeClr val="tx1"/>
+                </a:solidFill>
+                <a:latin typeface="+mj-lt"/>
+                <a:ea typeface="+mj-ea"/>
+                <a:cs typeface="+mj-cs"/>
+              </a:rPr>
+              <a:t>F# Workshop !</a:t>
+            </a:r>
+          </a:p>
+        </p:txBody>
+      </p:sp>
+      <p:sp>
+        <p:nvSpPr>
+          <p:cNvPr id="7" name="Text Placeholder 6">
+            <a:extLst>
+              <a:ext uri="{FF2B5EF4-FFF2-40B4-BE49-F238E27FC236}">
+                <a16:creationId xmlns:a16="http://schemas.microsoft.com/office/drawing/2014/main" id="{CF784627-2A18-8D20-4A08-AD0CE4F3F272}"/>
+              </a:ext>
+            </a:extLst>
+          </p:cNvPr>
+          <p:cNvSpPr>
+            <a:spLocks noGrp="1"/>
+          </p:cNvSpPr>
+          <p:nvPr>
+            <p:ph type="body" idx="1"/>
+          </p:nvPr>
+        </p:nvSpPr>
+        <p:spPr>
+          <a:xfrm>
+            <a:off x="1537097" y="3960557"/>
+            <a:ext cx="9117807" cy="1097215"/>
+          </a:xfrm>
+        </p:spPr>
+        <p:txBody>
+          <a:bodyPr vert="horz" lIns="91440" tIns="45720" rIns="91440" bIns="45720" rtlCol="0">
+            <a:normAutofit/>
+          </a:bodyPr>
+          <a:lstStyle/>
+          <a:p>
+            <a:pPr algn="ctr"/>
+            <a:r>
+              <a:rPr lang="en-US" sz="2200" i="1" dirty="0">
+                <a:solidFill>
+                  <a:schemeClr val="bg2">
+                    <a:lumMod val="75000"/>
+                  </a:schemeClr>
+                </a:solidFill>
+              </a:rPr>
+              <a:t>Let’s code something simple in a realistic production ready software architecture</a:t>
+            </a:r>
+          </a:p>
+        </p:txBody>
+      </p:sp>
+      <p:cxnSp>
+        <p:nvCxnSpPr>
+          <p:cNvPr id="24" name="Straight Connector 15">
+            <a:extLst>
+              <a:ext uri="{FF2B5EF4-FFF2-40B4-BE49-F238E27FC236}">
+                <a16:creationId xmlns:a16="http://schemas.microsoft.com/office/drawing/2014/main" id="{E7BA51F8-D7A6-13C6-D49E-9530A2911C4D}"/>
+              </a:ext>
+              <a:ext uri="{C183D7F6-B498-43B3-948B-1728B52AA6E4}">
+                <adec:decorative xmlns:adec="http://schemas.microsoft.com/office/drawing/2017/decorative" val="1"/>
+              </a:ext>
+            </a:extLst>
+          </p:cNvPr>
+          <p:cNvCxnSpPr>
+            <a:cxnSpLocks noGrp="1" noRot="1" noChangeAspect="1" noMove="1" noResize="1" noEditPoints="1" noAdjustHandles="1" noChangeArrowheads="1" noChangeShapeType="1"/>
+          </p:cNvCxnSpPr>
+          <p:nvPr>
+            <p:extLst>
+              <p:ext uri="{386F3935-93C4-4BCD-93E2-E3B085C9AB24}">
+                <p16:designElem xmlns:p16="http://schemas.microsoft.com/office/powerpoint/2015/main" val="1"/>
+              </p:ext>
+            </p:extLst>
+          </p:nvPr>
+        </p:nvCxnSpPr>
+        <p:spPr>
+          <a:xfrm>
+            <a:off x="3352800" y="3771366"/>
+            <a:ext cx="5486400" cy="0"/>
+          </a:xfrm>
+          <a:prstGeom prst="line">
+            <a:avLst/>
+          </a:prstGeom>
+          <a:ln w="22225">
+            <a:solidFill>
+              <a:schemeClr val="tx1">
+                <a:lumMod val="50000"/>
+                <a:lumOff val="50000"/>
+              </a:schemeClr>
+            </a:solidFill>
+          </a:ln>
+        </p:spPr>
+        <p:style>
+          <a:lnRef idx="1">
+            <a:schemeClr val="accent1"/>
+          </a:lnRef>
+          <a:fillRef idx="0">
+            <a:schemeClr val="accent1"/>
+          </a:fillRef>
+          <a:effectRef idx="0">
+            <a:schemeClr val="accent1"/>
+          </a:effectRef>
+          <a:fontRef idx="minor">
+            <a:schemeClr val="tx1"/>
+          </a:fontRef>
+        </p:style>
+      </p:cxnSp>
+    </p:spTree>
+    <p:extLst>
+      <p:ext uri="{BB962C8B-B14F-4D97-AF65-F5344CB8AC3E}">
+        <p14:creationId xmlns:p14="http://schemas.microsoft.com/office/powerpoint/2010/main" val="2860050399"/>
+      </p:ext>
+    </p:extLst>
+  </p:cSld>
+  <p:clrMapOvr>
+    <a:overrideClrMapping bg1="lt1" tx1="dk1" bg2="lt2" tx2="dk2" accent1="accent1" accent2="accent2" accent3="accent3" accent4="accent4" accent5="accent5" accent6="accent6" hlink="hlink" folHlink="folHlink"/>
+  </p:clrMapOvr>
+</p:sld>
+</file>
+
 <file path=ppt/slides/slide4.xml><?xml version="1.0" encoding="utf-8"?>
 <p:sld xmlns:a="http://schemas.openxmlformats.org/drawingml/2006/main" xmlns:r="http://schemas.openxmlformats.org/officeDocument/2006/relationships" xmlns:p="http://schemas.openxmlformats.org/presentationml/2006/main">
   <p:cSld>
@@ -16316,7 +16603,7 @@
                   <a:schemeClr val="bg1"/>
                 </a:solidFill>
               </a:rPr>
-              <a:t>Heavily influenced by ML, </a:t>
+              <a:t>Heavily influenced by </a:t>
             </a:r>
             <a:r>
               <a:rPr lang="en-GB" sz="3000" dirty="0" err="1">
@@ -16332,7 +16619,7 @@
                   <a:schemeClr val="bg1"/>
                 </a:solidFill>
               </a:rPr>
-              <a:t>, Haskell, C# &amp; others</a:t>
+              <a:t>, Haskell &amp; C#</a:t>
             </a:r>
           </a:p>
           <a:p>
@@ -16352,7 +16639,7 @@
                   <a:schemeClr val="bg1"/>
                 </a:solidFill>
               </a:rPr>
-              <a:t>Fully supported by .NET &amp; Mono. Also compiles to JavaScript</a:t>
+              <a:t>Fully supported by .NET. Compiles to JavaScript</a:t>
             </a:r>
           </a:p>
         </p:txBody>
@@ -16651,379 +16938,6 @@
 <file path=ppt/slides/slide40.xml><?xml version="1.0" encoding="utf-8"?>
 <p:sld xmlns:a="http://schemas.openxmlformats.org/drawingml/2006/main" xmlns:r="http://schemas.openxmlformats.org/officeDocument/2006/relationships" xmlns:p="http://schemas.openxmlformats.org/presentationml/2006/main">
   <p:cSld>
-    <p:bg>
-      <p:bgPr>
-        <a:solidFill>
-          <a:schemeClr val="bg1"/>
-        </a:solidFill>
-        <a:effectLst/>
-      </p:bgPr>
-    </p:bg>
-    <p:spTree>
-      <p:nvGrpSpPr>
-        <p:cNvPr id="1" name="">
-          <a:extLst>
-            <a:ext uri="{FF2B5EF4-FFF2-40B4-BE49-F238E27FC236}">
-              <a16:creationId xmlns:a16="http://schemas.microsoft.com/office/drawing/2014/main" id="{83BB7EBB-36FE-DC80-FB47-0649996DEF49}"/>
-            </a:ext>
-          </a:extLst>
-        </p:cNvPr>
-        <p:cNvGrpSpPr/>
-        <p:nvPr/>
-      </p:nvGrpSpPr>
-      <p:grpSpPr>
-        <a:xfrm>
-          <a:off x="0" y="0"/>
-          <a:ext cx="0" cy="0"/>
-          <a:chOff x="0" y="0"/>
-          <a:chExt cx="0" cy="0"/>
-        </a:xfrm>
-      </p:grpSpPr>
-      <p:sp>
-        <p:nvSpPr>
-          <p:cNvPr id="22" name="Rectangle 11">
-            <a:extLst>
-              <a:ext uri="{FF2B5EF4-FFF2-40B4-BE49-F238E27FC236}">
-                <a16:creationId xmlns:a16="http://schemas.microsoft.com/office/drawing/2014/main" id="{A1D5B6BD-0D0F-3053-6951-529A13B10D26}"/>
-              </a:ext>
-              <a:ext uri="{C183D7F6-B498-43B3-948B-1728B52AA6E4}">
-                <adec:decorative xmlns:adec="http://schemas.microsoft.com/office/drawing/2017/decorative" val="1"/>
-              </a:ext>
-            </a:extLst>
-          </p:cNvPr>
-          <p:cNvSpPr>
-            <a:spLocks noGrp="1" noRot="1" noChangeAspect="1" noMove="1" noResize="1" noEditPoints="1" noAdjustHandles="1" noChangeArrowheads="1" noChangeShapeType="1" noTextEdit="1"/>
-          </p:cNvSpPr>
-          <p:nvPr>
-            <p:extLst>
-              <p:ext uri="{386F3935-93C4-4BCD-93E2-E3B085C9AB24}">
-                <p16:designElem xmlns:p16="http://schemas.microsoft.com/office/powerpoint/2015/main" val="1"/>
-              </p:ext>
-            </p:extLst>
-          </p:nvPr>
-        </p:nvSpPr>
-        <p:spPr>
-          <a:xfrm>
-            <a:off x="0" y="-3324"/>
-            <a:ext cx="12192000" cy="6861324"/>
-          </a:xfrm>
-          <a:prstGeom prst="rect">
-            <a:avLst/>
-          </a:prstGeom>
-          <a:solidFill>
-            <a:schemeClr val="tx1">
-              <a:lumMod val="75000"/>
-              <a:lumOff val="25000"/>
-            </a:schemeClr>
-          </a:solidFill>
-          <a:ln>
-            <a:noFill/>
-          </a:ln>
-        </p:spPr>
-        <p:style>
-          <a:lnRef idx="2">
-            <a:schemeClr val="accent1">
-              <a:shade val="50000"/>
-            </a:schemeClr>
-          </a:lnRef>
-          <a:fillRef idx="1">
-            <a:schemeClr val="accent1"/>
-          </a:fillRef>
-          <a:effectRef idx="0">
-            <a:schemeClr val="accent1"/>
-          </a:effectRef>
-          <a:fontRef idx="minor">
-            <a:schemeClr val="lt1"/>
-          </a:fontRef>
-        </p:style>
-        <p:txBody>
-          <a:bodyPr rtlCol="0" anchor="ctr"/>
-          <a:lstStyle/>
-          <a:p>
-            <a:pPr marL="0" marR="0" lvl="0" indent="0" algn="ctr" defTabSz="914400" rtl="0" eaLnBrk="1" fontAlgn="auto" latinLnBrk="0" hangingPunct="1">
-              <a:lnSpc>
-                <a:spcPct val="100000"/>
-              </a:lnSpc>
-              <a:spcBef>
-                <a:spcPts val="0"/>
-              </a:spcBef>
-              <a:spcAft>
-                <a:spcPts val="0"/>
-              </a:spcAft>
-              <a:buClrTx/>
-              <a:buSzTx/>
-              <a:buFontTx/>
-              <a:buNone/>
-              <a:tabLst/>
-              <a:defRPr/>
-            </a:pPr>
-            <a:endParaRPr kumimoji="0" lang="en-US" sz="1800" b="0" i="0" u="none" strike="noStrike" kern="1200" cap="none" spc="0" normalizeH="0" baseline="0" noProof="0">
-              <a:ln>
-                <a:noFill/>
-              </a:ln>
-              <a:solidFill>
-                <a:prstClr val="white"/>
-              </a:solidFill>
-              <a:effectLst/>
-              <a:uLnTx/>
-              <a:uFillTx/>
-              <a:latin typeface="Calibri" panose="020F0502020204030204"/>
-              <a:ea typeface="+mn-ea"/>
-              <a:cs typeface="+mn-cs"/>
-            </a:endParaRPr>
-          </a:p>
-        </p:txBody>
-      </p:sp>
-      <p:sp>
-        <p:nvSpPr>
-          <p:cNvPr id="23" name="Rectangle 13">
-            <a:extLst>
-              <a:ext uri="{FF2B5EF4-FFF2-40B4-BE49-F238E27FC236}">
-                <a16:creationId xmlns:a16="http://schemas.microsoft.com/office/drawing/2014/main" id="{C0504A8D-6967-C73D-C144-2C2A8B8E11CC}"/>
-              </a:ext>
-              <a:ext uri="{C183D7F6-B498-43B3-948B-1728B52AA6E4}">
-                <adec:decorative xmlns:adec="http://schemas.microsoft.com/office/drawing/2017/decorative" val="1"/>
-              </a:ext>
-            </a:extLst>
-          </p:cNvPr>
-          <p:cNvSpPr>
-            <a:spLocks noGrp="1" noRot="1" noChangeAspect="1" noMove="1" noResize="1" noEditPoints="1" noAdjustHandles="1" noChangeArrowheads="1" noChangeShapeType="1" noTextEdit="1"/>
-          </p:cNvSpPr>
-          <p:nvPr>
-            <p:extLst>
-              <p:ext uri="{386F3935-93C4-4BCD-93E2-E3B085C9AB24}">
-                <p16:designElem xmlns:p16="http://schemas.microsoft.com/office/powerpoint/2015/main" val="1"/>
-              </p:ext>
-            </p:extLst>
-          </p:nvPr>
-        </p:nvSpPr>
-        <p:spPr bwMode="ltGray">
-          <a:xfrm>
-            <a:off x="795338" y="981075"/>
-            <a:ext cx="10601325" cy="4552949"/>
-          </a:xfrm>
-          <a:prstGeom prst="rect">
-            <a:avLst/>
-          </a:prstGeom>
-          <a:solidFill>
-            <a:schemeClr val="bg1"/>
-          </a:solidFill>
-          <a:ln w="127000" cap="sq" cmpd="thinThick">
-            <a:solidFill>
-              <a:schemeClr val="bg1"/>
-            </a:solidFill>
-          </a:ln>
-        </p:spPr>
-        <p:style>
-          <a:lnRef idx="2">
-            <a:schemeClr val="accent1">
-              <a:shade val="50000"/>
-            </a:schemeClr>
-          </a:lnRef>
-          <a:fillRef idx="1">
-            <a:schemeClr val="accent1"/>
-          </a:fillRef>
-          <a:effectRef idx="0">
-            <a:schemeClr val="accent1"/>
-          </a:effectRef>
-          <a:fontRef idx="minor">
-            <a:schemeClr val="lt1"/>
-          </a:fontRef>
-        </p:style>
-        <p:txBody>
-          <a:bodyPr rtlCol="0" anchor="ctr"/>
-          <a:lstStyle/>
-          <a:p>
-            <a:pPr marL="0" marR="0" lvl="0" indent="0" algn="ctr" defTabSz="914400" rtl="0" eaLnBrk="1" fontAlgn="auto" latinLnBrk="0" hangingPunct="1">
-              <a:lnSpc>
-                <a:spcPct val="100000"/>
-              </a:lnSpc>
-              <a:spcBef>
-                <a:spcPts val="0"/>
-              </a:spcBef>
-              <a:spcAft>
-                <a:spcPts val="0"/>
-              </a:spcAft>
-              <a:buClrTx/>
-              <a:buSzTx/>
-              <a:buFontTx/>
-              <a:buNone/>
-              <a:tabLst/>
-              <a:defRPr/>
-            </a:pPr>
-            <a:endParaRPr kumimoji="0" lang="en-US" sz="1800" b="0" i="0" u="none" strike="noStrike" kern="1200" cap="none" spc="0" normalizeH="0" baseline="0" noProof="0" dirty="0">
-              <a:ln>
-                <a:noFill/>
-              </a:ln>
-              <a:solidFill>
-                <a:prstClr val="white"/>
-              </a:solidFill>
-              <a:effectLst/>
-              <a:uLnTx/>
-              <a:uFillTx/>
-              <a:latin typeface="Calibri" panose="020F0502020204030204"/>
-              <a:ea typeface="+mn-ea"/>
-              <a:cs typeface="+mn-cs"/>
-            </a:endParaRPr>
-          </a:p>
-        </p:txBody>
-      </p:sp>
-      <p:sp>
-        <p:nvSpPr>
-          <p:cNvPr id="2" name="Title 1">
-            <a:extLst>
-              <a:ext uri="{FF2B5EF4-FFF2-40B4-BE49-F238E27FC236}">
-                <a16:creationId xmlns:a16="http://schemas.microsoft.com/office/drawing/2014/main" id="{035F2B61-9A62-6CDE-DA18-DBE796ABC33E}"/>
-              </a:ext>
-            </a:extLst>
-          </p:cNvPr>
-          <p:cNvSpPr>
-            <a:spLocks noGrp="1"/>
-          </p:cNvSpPr>
-          <p:nvPr>
-            <p:ph type="title"/>
-          </p:nvPr>
-        </p:nvSpPr>
-        <p:spPr>
-          <a:xfrm>
-            <a:off x="1537097" y="1428750"/>
-            <a:ext cx="9117807" cy="2105026"/>
-          </a:xfrm>
-        </p:spPr>
-        <p:txBody>
-          <a:bodyPr vert="horz" lIns="91440" tIns="45720" rIns="91440" bIns="45720" rtlCol="0" anchor="b">
-            <a:normAutofit/>
-          </a:bodyPr>
-          <a:lstStyle/>
-          <a:p>
-            <a:pPr algn="ctr"/>
-            <a:r>
-              <a:rPr lang="en-US" kern="1200" dirty="0">
-                <a:solidFill>
-                  <a:schemeClr val="tx1"/>
-                </a:solidFill>
-                <a:latin typeface="+mj-lt"/>
-                <a:ea typeface="+mj-ea"/>
-                <a:cs typeface="+mj-cs"/>
-              </a:rPr>
-              <a:t>F# Workshop !</a:t>
-            </a:r>
-          </a:p>
-        </p:txBody>
-      </p:sp>
-      <p:sp>
-        <p:nvSpPr>
-          <p:cNvPr id="7" name="Text Placeholder 6">
-            <a:extLst>
-              <a:ext uri="{FF2B5EF4-FFF2-40B4-BE49-F238E27FC236}">
-                <a16:creationId xmlns:a16="http://schemas.microsoft.com/office/drawing/2014/main" id="{CF784627-2A18-8D20-4A08-AD0CE4F3F272}"/>
-              </a:ext>
-            </a:extLst>
-          </p:cNvPr>
-          <p:cNvSpPr>
-            <a:spLocks noGrp="1"/>
-          </p:cNvSpPr>
-          <p:nvPr>
-            <p:ph type="body" idx="1"/>
-          </p:nvPr>
-        </p:nvSpPr>
-        <p:spPr>
-          <a:xfrm>
-            <a:off x="1537097" y="3960557"/>
-            <a:ext cx="9117807" cy="1097215"/>
-          </a:xfrm>
-        </p:spPr>
-        <p:txBody>
-          <a:bodyPr vert="horz" lIns="91440" tIns="45720" rIns="91440" bIns="45720" rtlCol="0">
-            <a:normAutofit/>
-          </a:bodyPr>
-          <a:lstStyle/>
-          <a:p>
-            <a:pPr algn="ctr"/>
-            <a:r>
-              <a:rPr lang="en-US" sz="2200" i="1" dirty="0">
-                <a:solidFill>
-                  <a:schemeClr val="bg2">
-                    <a:lumMod val="75000"/>
-                  </a:schemeClr>
-                </a:solidFill>
-              </a:rPr>
-              <a:t>Let’s code something simple in a realistic production ready software architecture</a:t>
-            </a:r>
-          </a:p>
-        </p:txBody>
-      </p:sp>
-      <p:cxnSp>
-        <p:nvCxnSpPr>
-          <p:cNvPr id="24" name="Straight Connector 15">
-            <a:extLst>
-              <a:ext uri="{FF2B5EF4-FFF2-40B4-BE49-F238E27FC236}">
-                <a16:creationId xmlns:a16="http://schemas.microsoft.com/office/drawing/2014/main" id="{E7BA51F8-D7A6-13C6-D49E-9530A2911C4D}"/>
-              </a:ext>
-              <a:ext uri="{C183D7F6-B498-43B3-948B-1728B52AA6E4}">
-                <adec:decorative xmlns:adec="http://schemas.microsoft.com/office/drawing/2017/decorative" val="1"/>
-              </a:ext>
-            </a:extLst>
-          </p:cNvPr>
-          <p:cNvCxnSpPr>
-            <a:cxnSpLocks noGrp="1" noRot="1" noChangeAspect="1" noMove="1" noResize="1" noEditPoints="1" noAdjustHandles="1" noChangeArrowheads="1" noChangeShapeType="1"/>
-          </p:cNvCxnSpPr>
-          <p:nvPr>
-            <p:extLst>
-              <p:ext uri="{386F3935-93C4-4BCD-93E2-E3B085C9AB24}">
-                <p16:designElem xmlns:p16="http://schemas.microsoft.com/office/powerpoint/2015/main" val="1"/>
-              </p:ext>
-            </p:extLst>
-          </p:nvPr>
-        </p:nvCxnSpPr>
-        <p:spPr>
-          <a:xfrm>
-            <a:off x="3352800" y="3771366"/>
-            <a:ext cx="5486400" cy="0"/>
-          </a:xfrm>
-          <a:prstGeom prst="line">
-            <a:avLst/>
-          </a:prstGeom>
-          <a:ln w="22225">
-            <a:solidFill>
-              <a:schemeClr val="tx1">
-                <a:lumMod val="50000"/>
-                <a:lumOff val="50000"/>
-              </a:schemeClr>
-            </a:solidFill>
-          </a:ln>
-        </p:spPr>
-        <p:style>
-          <a:lnRef idx="1">
-            <a:schemeClr val="accent1"/>
-          </a:lnRef>
-          <a:fillRef idx="0">
-            <a:schemeClr val="accent1"/>
-          </a:fillRef>
-          <a:effectRef idx="0">
-            <a:schemeClr val="accent1"/>
-          </a:effectRef>
-          <a:fontRef idx="minor">
-            <a:schemeClr val="tx1"/>
-          </a:fontRef>
-        </p:style>
-      </p:cxnSp>
-    </p:spTree>
-    <p:extLst>
-      <p:ext uri="{BB962C8B-B14F-4D97-AF65-F5344CB8AC3E}">
-        <p14:creationId xmlns:p14="http://schemas.microsoft.com/office/powerpoint/2010/main" val="2860050399"/>
-      </p:ext>
-    </p:extLst>
-  </p:cSld>
-  <p:clrMapOvr>
-    <a:overrideClrMapping bg1="lt1" tx1="dk1" bg2="lt2" tx2="dk2" accent1="accent1" accent2="accent2" accent3="accent3" accent4="accent4" accent5="accent5" accent6="accent6" hlink="hlink" folHlink="folHlink"/>
-  </p:clrMapOvr>
-</p:sld>
-</file>
-
-<file path=ppt/slides/slide41.xml><?xml version="1.0" encoding="utf-8"?>
-<p:sld xmlns:a="http://schemas.openxmlformats.org/drawingml/2006/main" xmlns:r="http://schemas.openxmlformats.org/officeDocument/2006/relationships" xmlns:p="http://schemas.openxmlformats.org/presentationml/2006/main">
-  <p:cSld>
     <p:spTree>
       <p:nvGrpSpPr>
         <p:cNvPr id="1" name="">
@@ -17117,7 +17031,7 @@
         </p:nvSpPr>
         <p:spPr>
           <a:xfrm>
-            <a:off x="5403062" y="1487272"/>
+            <a:off x="5403062" y="1515021"/>
             <a:ext cx="6094428" cy="707886"/>
           </a:xfrm>
           <a:prstGeom prst="rect">
@@ -17180,21 +17094,33 @@
             </a:r>
           </a:p>
           <a:p>
+            <a:pPr marL="342900" indent="-342900">
+              <a:buFont typeface="Arial" panose="020B0604020202020204" pitchFamily="34" charset="0"/>
+              <a:buChar char="•"/>
+            </a:pPr>
             <a:r>
               <a:rPr lang="en-US" sz="2000" dirty="0"/>
-              <a:t>- to show a software architecture which take full advantage of the functional paradigm</a:t>
-            </a:r>
-          </a:p>
-          <a:p>
+              <a:t>to show a software architecture which take full advantage of the functional paradigm</a:t>
+            </a:r>
+          </a:p>
+          <a:p>
+            <a:pPr marL="342900" indent="-342900">
+              <a:buFont typeface="Arial" panose="020B0604020202020204" pitchFamily="34" charset="0"/>
+              <a:buChar char="•"/>
+            </a:pPr>
             <a:r>
               <a:rPr lang="en-US" sz="2000" dirty="0"/>
-              <a:t>- to show what it’s like to write C# code in a real life (like) scenario</a:t>
-            </a:r>
-          </a:p>
-          <a:p>
+              <a:t> to show what it’s like to write C# code in a real life (like) scenario</a:t>
+            </a:r>
+          </a:p>
+          <a:p>
+            <a:pPr marL="342900" indent="-342900">
+              <a:buFont typeface="Arial" panose="020B0604020202020204" pitchFamily="34" charset="0"/>
+              <a:buChar char="•"/>
+            </a:pPr>
             <a:r>
               <a:rPr lang="en-US" sz="2000" dirty="0"/>
-              <a:t>- to show how to work alongside C#</a:t>
+              <a:t>to show how to work alongside C#</a:t>
             </a:r>
           </a:p>
         </p:txBody>
@@ -17209,10 +17135,327 @@
   <p:clrMapOvr>
     <a:masterClrMapping/>
   </p:clrMapOvr>
+  <p:timing>
+    <p:tnLst>
+      <p:par>
+        <p:cTn id="1" dur="indefinite" restart="never" nodeType="tmRoot">
+          <p:childTnLst>
+            <p:seq concurrent="1" nextAc="seek">
+              <p:cTn id="2" dur="indefinite" nodeType="mainSeq">
+                <p:childTnLst>
+                  <p:par>
+                    <p:cTn id="3" fill="hold">
+                      <p:stCondLst>
+                        <p:cond delay="indefinite"/>
+                      </p:stCondLst>
+                      <p:childTnLst>
+                        <p:par>
+                          <p:cTn id="4" fill="hold">
+                            <p:stCondLst>
+                              <p:cond delay="0"/>
+                            </p:stCondLst>
+                            <p:childTnLst>
+                              <p:par>
+                                <p:cTn id="5" presetID="3" presetClass="entr" presetSubtype="10" fill="hold" nodeType="clickEffect">
+                                  <p:stCondLst>
+                                    <p:cond delay="0"/>
+                                  </p:stCondLst>
+                                  <p:childTnLst>
+                                    <p:set>
+                                      <p:cBhvr>
+                                        <p:cTn id="6" dur="1" fill="hold">
+                                          <p:stCondLst>
+                                            <p:cond delay="0"/>
+                                          </p:stCondLst>
+                                        </p:cTn>
+                                        <p:tgtEl>
+                                          <p:spTgt spid="8">
+                                            <p:txEl>
+                                              <p:pRg st="0" end="0"/>
+                                            </p:txEl>
+                                          </p:spTgt>
+                                        </p:tgtEl>
+                                        <p:attrNameLst>
+                                          <p:attrName>style.visibility</p:attrName>
+                                        </p:attrNameLst>
+                                      </p:cBhvr>
+                                      <p:to>
+                                        <p:strVal val="visible"/>
+                                      </p:to>
+                                    </p:set>
+                                    <p:animEffect transition="in" filter="blinds(horizontal)">
+                                      <p:cBhvr>
+                                        <p:cTn id="7" dur="500"/>
+                                        <p:tgtEl>
+                                          <p:spTgt spid="8">
+                                            <p:txEl>
+                                              <p:pRg st="0" end="0"/>
+                                            </p:txEl>
+                                          </p:spTgt>
+                                        </p:tgtEl>
+                                      </p:cBhvr>
+                                    </p:animEffect>
+                                  </p:childTnLst>
+                                </p:cTn>
+                              </p:par>
+                            </p:childTnLst>
+                          </p:cTn>
+                        </p:par>
+                      </p:childTnLst>
+                    </p:cTn>
+                  </p:par>
+                  <p:par>
+                    <p:cTn id="8" fill="hold">
+                      <p:stCondLst>
+                        <p:cond delay="indefinite"/>
+                      </p:stCondLst>
+                      <p:childTnLst>
+                        <p:par>
+                          <p:cTn id="9" fill="hold">
+                            <p:stCondLst>
+                              <p:cond delay="0"/>
+                            </p:stCondLst>
+                            <p:childTnLst>
+                              <p:par>
+                                <p:cTn id="10" presetID="3" presetClass="entr" presetSubtype="10" fill="hold" nodeType="clickEffect">
+                                  <p:stCondLst>
+                                    <p:cond delay="0"/>
+                                  </p:stCondLst>
+                                  <p:childTnLst>
+                                    <p:set>
+                                      <p:cBhvr>
+                                        <p:cTn id="11" dur="1" fill="hold">
+                                          <p:stCondLst>
+                                            <p:cond delay="0"/>
+                                          </p:stCondLst>
+                                        </p:cTn>
+                                        <p:tgtEl>
+                                          <p:spTgt spid="6">
+                                            <p:txEl>
+                                              <p:pRg st="0" end="0"/>
+                                            </p:txEl>
+                                          </p:spTgt>
+                                        </p:tgtEl>
+                                        <p:attrNameLst>
+                                          <p:attrName>style.visibility</p:attrName>
+                                        </p:attrNameLst>
+                                      </p:cBhvr>
+                                      <p:to>
+                                        <p:strVal val="visible"/>
+                                      </p:to>
+                                    </p:set>
+                                    <p:animEffect transition="in" filter="blinds(horizontal)">
+                                      <p:cBhvr>
+                                        <p:cTn id="12" dur="500"/>
+                                        <p:tgtEl>
+                                          <p:spTgt spid="6">
+                                            <p:txEl>
+                                              <p:pRg st="0" end="0"/>
+                                            </p:txEl>
+                                          </p:spTgt>
+                                        </p:tgtEl>
+                                      </p:cBhvr>
+                                    </p:animEffect>
+                                  </p:childTnLst>
+                                </p:cTn>
+                              </p:par>
+                              <p:par>
+                                <p:cTn id="13" presetID="3" presetClass="entr" presetSubtype="10" fill="hold" nodeType="withEffect">
+                                  <p:stCondLst>
+                                    <p:cond delay="0"/>
+                                  </p:stCondLst>
+                                  <p:childTnLst>
+                                    <p:set>
+                                      <p:cBhvr>
+                                        <p:cTn id="14" dur="1" fill="hold">
+                                          <p:stCondLst>
+                                            <p:cond delay="0"/>
+                                          </p:stCondLst>
+                                        </p:cTn>
+                                        <p:tgtEl>
+                                          <p:spTgt spid="6">
+                                            <p:txEl>
+                                              <p:pRg st="1" end="1"/>
+                                            </p:txEl>
+                                          </p:spTgt>
+                                        </p:tgtEl>
+                                        <p:attrNameLst>
+                                          <p:attrName>style.visibility</p:attrName>
+                                        </p:attrNameLst>
+                                      </p:cBhvr>
+                                      <p:to>
+                                        <p:strVal val="visible"/>
+                                      </p:to>
+                                    </p:set>
+                                    <p:animEffect transition="in" filter="blinds(horizontal)">
+                                      <p:cBhvr>
+                                        <p:cTn id="15" dur="500"/>
+                                        <p:tgtEl>
+                                          <p:spTgt spid="6">
+                                            <p:txEl>
+                                              <p:pRg st="1" end="1"/>
+                                            </p:txEl>
+                                          </p:spTgt>
+                                        </p:tgtEl>
+                                      </p:cBhvr>
+                                    </p:animEffect>
+                                  </p:childTnLst>
+                                </p:cTn>
+                              </p:par>
+                            </p:childTnLst>
+                          </p:cTn>
+                        </p:par>
+                      </p:childTnLst>
+                    </p:cTn>
+                  </p:par>
+                  <p:par>
+                    <p:cTn id="16" fill="hold">
+                      <p:stCondLst>
+                        <p:cond delay="indefinite"/>
+                      </p:stCondLst>
+                      <p:childTnLst>
+                        <p:par>
+                          <p:cTn id="17" fill="hold">
+                            <p:stCondLst>
+                              <p:cond delay="0"/>
+                            </p:stCondLst>
+                            <p:childTnLst>
+                              <p:par>
+                                <p:cTn id="18" presetID="3" presetClass="entr" presetSubtype="10" fill="hold" nodeType="clickEffect">
+                                  <p:stCondLst>
+                                    <p:cond delay="0"/>
+                                  </p:stCondLst>
+                                  <p:childTnLst>
+                                    <p:set>
+                                      <p:cBhvr>
+                                        <p:cTn id="19" dur="1" fill="hold">
+                                          <p:stCondLst>
+                                            <p:cond delay="0"/>
+                                          </p:stCondLst>
+                                        </p:cTn>
+                                        <p:tgtEl>
+                                          <p:spTgt spid="6">
+                                            <p:txEl>
+                                              <p:pRg st="2" end="2"/>
+                                            </p:txEl>
+                                          </p:spTgt>
+                                        </p:tgtEl>
+                                        <p:attrNameLst>
+                                          <p:attrName>style.visibility</p:attrName>
+                                        </p:attrNameLst>
+                                      </p:cBhvr>
+                                      <p:to>
+                                        <p:strVal val="visible"/>
+                                      </p:to>
+                                    </p:set>
+                                    <p:animEffect transition="in" filter="blinds(horizontal)">
+                                      <p:cBhvr>
+                                        <p:cTn id="20" dur="500"/>
+                                        <p:tgtEl>
+                                          <p:spTgt spid="6">
+                                            <p:txEl>
+                                              <p:pRg st="2" end="2"/>
+                                            </p:txEl>
+                                          </p:spTgt>
+                                        </p:tgtEl>
+                                      </p:cBhvr>
+                                    </p:animEffect>
+                                  </p:childTnLst>
+                                </p:cTn>
+                              </p:par>
+                            </p:childTnLst>
+                          </p:cTn>
+                        </p:par>
+                      </p:childTnLst>
+                    </p:cTn>
+                  </p:par>
+                  <p:par>
+                    <p:cTn id="21" fill="hold">
+                      <p:stCondLst>
+                        <p:cond delay="indefinite"/>
+                      </p:stCondLst>
+                      <p:childTnLst>
+                        <p:par>
+                          <p:cTn id="22" fill="hold">
+                            <p:stCondLst>
+                              <p:cond delay="0"/>
+                            </p:stCondLst>
+                            <p:childTnLst>
+                              <p:par>
+                                <p:cTn id="23" presetID="3" presetClass="entr" presetSubtype="10" fill="hold" nodeType="clickEffect">
+                                  <p:stCondLst>
+                                    <p:cond delay="0"/>
+                                  </p:stCondLst>
+                                  <p:childTnLst>
+                                    <p:set>
+                                      <p:cBhvr>
+                                        <p:cTn id="24" dur="1" fill="hold">
+                                          <p:stCondLst>
+                                            <p:cond delay="0"/>
+                                          </p:stCondLst>
+                                        </p:cTn>
+                                        <p:tgtEl>
+                                          <p:spTgt spid="6">
+                                            <p:txEl>
+                                              <p:pRg st="3" end="3"/>
+                                            </p:txEl>
+                                          </p:spTgt>
+                                        </p:tgtEl>
+                                        <p:attrNameLst>
+                                          <p:attrName>style.visibility</p:attrName>
+                                        </p:attrNameLst>
+                                      </p:cBhvr>
+                                      <p:to>
+                                        <p:strVal val="visible"/>
+                                      </p:to>
+                                    </p:set>
+                                    <p:animEffect transition="in" filter="blinds(horizontal)">
+                                      <p:cBhvr>
+                                        <p:cTn id="25" dur="500"/>
+                                        <p:tgtEl>
+                                          <p:spTgt spid="6">
+                                            <p:txEl>
+                                              <p:pRg st="3" end="3"/>
+                                            </p:txEl>
+                                          </p:spTgt>
+                                        </p:tgtEl>
+                                      </p:cBhvr>
+                                    </p:animEffect>
+                                  </p:childTnLst>
+                                </p:cTn>
+                              </p:par>
+                            </p:childTnLst>
+                          </p:cTn>
+                        </p:par>
+                      </p:childTnLst>
+                    </p:cTn>
+                  </p:par>
+                </p:childTnLst>
+              </p:cTn>
+              <p:prevCondLst>
+                <p:cond evt="onPrev" delay="0">
+                  <p:tgtEl>
+                    <p:sldTgt/>
+                  </p:tgtEl>
+                </p:cond>
+              </p:prevCondLst>
+              <p:nextCondLst>
+                <p:cond evt="onNext" delay="0">
+                  <p:tgtEl>
+                    <p:sldTgt/>
+                  </p:tgtEl>
+                </p:cond>
+              </p:nextCondLst>
+            </p:seq>
+          </p:childTnLst>
+        </p:cTn>
+      </p:par>
+    </p:tnLst>
+  </p:timing>
 </p:sld>
 </file>
 
-<file path=ppt/slides/slide42.xml><?xml version="1.0" encoding="utf-8"?>
+<file path=ppt/slides/slide41.xml><?xml version="1.0" encoding="utf-8"?>
 <p:sld xmlns:a="http://schemas.openxmlformats.org/drawingml/2006/main" xmlns:r="http://schemas.openxmlformats.org/officeDocument/2006/relationships" xmlns:p="http://schemas.openxmlformats.org/presentationml/2006/main">
   <p:cSld>
     <p:spTree>
@@ -17445,10 +17688,327 @@
   <p:clrMapOvr>
     <a:masterClrMapping/>
   </p:clrMapOvr>
+  <p:timing>
+    <p:tnLst>
+      <p:par>
+        <p:cTn id="1" dur="indefinite" restart="never" nodeType="tmRoot">
+          <p:childTnLst>
+            <p:seq concurrent="1" nextAc="seek">
+              <p:cTn id="2" dur="indefinite" nodeType="mainSeq">
+                <p:childTnLst>
+                  <p:par>
+                    <p:cTn id="3" fill="hold">
+                      <p:stCondLst>
+                        <p:cond delay="indefinite"/>
+                      </p:stCondLst>
+                      <p:childTnLst>
+                        <p:par>
+                          <p:cTn id="4" fill="hold">
+                            <p:stCondLst>
+                              <p:cond delay="0"/>
+                            </p:stCondLst>
+                            <p:childTnLst>
+                              <p:par>
+                                <p:cTn id="5" presetID="3" presetClass="entr" presetSubtype="10" fill="hold" nodeType="clickEffect">
+                                  <p:stCondLst>
+                                    <p:cond delay="0"/>
+                                  </p:stCondLst>
+                                  <p:childTnLst>
+                                    <p:set>
+                                      <p:cBhvr>
+                                        <p:cTn id="6" dur="1" fill="hold">
+                                          <p:stCondLst>
+                                            <p:cond delay="0"/>
+                                          </p:stCondLst>
+                                        </p:cTn>
+                                        <p:tgtEl>
+                                          <p:spTgt spid="8">
+                                            <p:txEl>
+                                              <p:pRg st="0" end="0"/>
+                                            </p:txEl>
+                                          </p:spTgt>
+                                        </p:tgtEl>
+                                        <p:attrNameLst>
+                                          <p:attrName>style.visibility</p:attrName>
+                                        </p:attrNameLst>
+                                      </p:cBhvr>
+                                      <p:to>
+                                        <p:strVal val="visible"/>
+                                      </p:to>
+                                    </p:set>
+                                    <p:animEffect transition="in" filter="blinds(horizontal)">
+                                      <p:cBhvr>
+                                        <p:cTn id="7" dur="500"/>
+                                        <p:tgtEl>
+                                          <p:spTgt spid="8">
+                                            <p:txEl>
+                                              <p:pRg st="0" end="0"/>
+                                            </p:txEl>
+                                          </p:spTgt>
+                                        </p:tgtEl>
+                                      </p:cBhvr>
+                                    </p:animEffect>
+                                  </p:childTnLst>
+                                </p:cTn>
+                              </p:par>
+                            </p:childTnLst>
+                          </p:cTn>
+                        </p:par>
+                      </p:childTnLst>
+                    </p:cTn>
+                  </p:par>
+                  <p:par>
+                    <p:cTn id="8" fill="hold">
+                      <p:stCondLst>
+                        <p:cond delay="indefinite"/>
+                      </p:stCondLst>
+                      <p:childTnLst>
+                        <p:par>
+                          <p:cTn id="9" fill="hold">
+                            <p:stCondLst>
+                              <p:cond delay="0"/>
+                            </p:stCondLst>
+                            <p:childTnLst>
+                              <p:par>
+                                <p:cTn id="10" presetID="3" presetClass="entr" presetSubtype="10" fill="hold" nodeType="clickEffect">
+                                  <p:stCondLst>
+                                    <p:cond delay="0"/>
+                                  </p:stCondLst>
+                                  <p:childTnLst>
+                                    <p:set>
+                                      <p:cBhvr>
+                                        <p:cTn id="11" dur="1" fill="hold">
+                                          <p:stCondLst>
+                                            <p:cond delay="0"/>
+                                          </p:stCondLst>
+                                        </p:cTn>
+                                        <p:tgtEl>
+                                          <p:spTgt spid="3">
+                                            <p:txEl>
+                                              <p:pRg st="0" end="0"/>
+                                            </p:txEl>
+                                          </p:spTgt>
+                                        </p:tgtEl>
+                                        <p:attrNameLst>
+                                          <p:attrName>style.visibility</p:attrName>
+                                        </p:attrNameLst>
+                                      </p:cBhvr>
+                                      <p:to>
+                                        <p:strVal val="visible"/>
+                                      </p:to>
+                                    </p:set>
+                                    <p:animEffect transition="in" filter="blinds(horizontal)">
+                                      <p:cBhvr>
+                                        <p:cTn id="12" dur="500"/>
+                                        <p:tgtEl>
+                                          <p:spTgt spid="3">
+                                            <p:txEl>
+                                              <p:pRg st="0" end="0"/>
+                                            </p:txEl>
+                                          </p:spTgt>
+                                        </p:tgtEl>
+                                      </p:cBhvr>
+                                    </p:animEffect>
+                                  </p:childTnLst>
+                                </p:cTn>
+                              </p:par>
+                              <p:par>
+                                <p:cTn id="13" presetID="3" presetClass="entr" presetSubtype="10" fill="hold" nodeType="withEffect">
+                                  <p:stCondLst>
+                                    <p:cond delay="0"/>
+                                  </p:stCondLst>
+                                  <p:childTnLst>
+                                    <p:set>
+                                      <p:cBhvr>
+                                        <p:cTn id="14" dur="1" fill="hold">
+                                          <p:stCondLst>
+                                            <p:cond delay="0"/>
+                                          </p:stCondLst>
+                                        </p:cTn>
+                                        <p:tgtEl>
+                                          <p:spTgt spid="3">
+                                            <p:txEl>
+                                              <p:pRg st="1" end="1"/>
+                                            </p:txEl>
+                                          </p:spTgt>
+                                        </p:tgtEl>
+                                        <p:attrNameLst>
+                                          <p:attrName>style.visibility</p:attrName>
+                                        </p:attrNameLst>
+                                      </p:cBhvr>
+                                      <p:to>
+                                        <p:strVal val="visible"/>
+                                      </p:to>
+                                    </p:set>
+                                    <p:animEffect transition="in" filter="blinds(horizontal)">
+                                      <p:cBhvr>
+                                        <p:cTn id="15" dur="500"/>
+                                        <p:tgtEl>
+                                          <p:spTgt spid="3">
+                                            <p:txEl>
+                                              <p:pRg st="1" end="1"/>
+                                            </p:txEl>
+                                          </p:spTgt>
+                                        </p:tgtEl>
+                                      </p:cBhvr>
+                                    </p:animEffect>
+                                  </p:childTnLst>
+                                </p:cTn>
+                              </p:par>
+                            </p:childTnLst>
+                          </p:cTn>
+                        </p:par>
+                      </p:childTnLst>
+                    </p:cTn>
+                  </p:par>
+                  <p:par>
+                    <p:cTn id="16" fill="hold">
+                      <p:stCondLst>
+                        <p:cond delay="indefinite"/>
+                      </p:stCondLst>
+                      <p:childTnLst>
+                        <p:par>
+                          <p:cTn id="17" fill="hold">
+                            <p:stCondLst>
+                              <p:cond delay="0"/>
+                            </p:stCondLst>
+                            <p:childTnLst>
+                              <p:par>
+                                <p:cTn id="18" presetID="3" presetClass="entr" presetSubtype="10" fill="hold" nodeType="clickEffect">
+                                  <p:stCondLst>
+                                    <p:cond delay="0"/>
+                                  </p:stCondLst>
+                                  <p:childTnLst>
+                                    <p:set>
+                                      <p:cBhvr>
+                                        <p:cTn id="19" dur="1" fill="hold">
+                                          <p:stCondLst>
+                                            <p:cond delay="0"/>
+                                          </p:stCondLst>
+                                        </p:cTn>
+                                        <p:tgtEl>
+                                          <p:spTgt spid="3">
+                                            <p:txEl>
+                                              <p:pRg st="2" end="2"/>
+                                            </p:txEl>
+                                          </p:spTgt>
+                                        </p:tgtEl>
+                                        <p:attrNameLst>
+                                          <p:attrName>style.visibility</p:attrName>
+                                        </p:attrNameLst>
+                                      </p:cBhvr>
+                                      <p:to>
+                                        <p:strVal val="visible"/>
+                                      </p:to>
+                                    </p:set>
+                                    <p:animEffect transition="in" filter="blinds(horizontal)">
+                                      <p:cBhvr>
+                                        <p:cTn id="20" dur="500"/>
+                                        <p:tgtEl>
+                                          <p:spTgt spid="3">
+                                            <p:txEl>
+                                              <p:pRg st="2" end="2"/>
+                                            </p:txEl>
+                                          </p:spTgt>
+                                        </p:tgtEl>
+                                      </p:cBhvr>
+                                    </p:animEffect>
+                                  </p:childTnLst>
+                                </p:cTn>
+                              </p:par>
+                            </p:childTnLst>
+                          </p:cTn>
+                        </p:par>
+                      </p:childTnLst>
+                    </p:cTn>
+                  </p:par>
+                  <p:par>
+                    <p:cTn id="21" fill="hold">
+                      <p:stCondLst>
+                        <p:cond delay="indefinite"/>
+                      </p:stCondLst>
+                      <p:childTnLst>
+                        <p:par>
+                          <p:cTn id="22" fill="hold">
+                            <p:stCondLst>
+                              <p:cond delay="0"/>
+                            </p:stCondLst>
+                            <p:childTnLst>
+                              <p:par>
+                                <p:cTn id="23" presetID="3" presetClass="entr" presetSubtype="10" fill="hold" nodeType="clickEffect">
+                                  <p:stCondLst>
+                                    <p:cond delay="0"/>
+                                  </p:stCondLst>
+                                  <p:childTnLst>
+                                    <p:set>
+                                      <p:cBhvr>
+                                        <p:cTn id="24" dur="1" fill="hold">
+                                          <p:stCondLst>
+                                            <p:cond delay="0"/>
+                                          </p:stCondLst>
+                                        </p:cTn>
+                                        <p:tgtEl>
+                                          <p:spTgt spid="4">
+                                            <p:txEl>
+                                              <p:pRg st="0" end="0"/>
+                                            </p:txEl>
+                                          </p:spTgt>
+                                        </p:tgtEl>
+                                        <p:attrNameLst>
+                                          <p:attrName>style.visibility</p:attrName>
+                                        </p:attrNameLst>
+                                      </p:cBhvr>
+                                      <p:to>
+                                        <p:strVal val="visible"/>
+                                      </p:to>
+                                    </p:set>
+                                    <p:animEffect transition="in" filter="blinds(horizontal)">
+                                      <p:cBhvr>
+                                        <p:cTn id="25" dur="500"/>
+                                        <p:tgtEl>
+                                          <p:spTgt spid="4">
+                                            <p:txEl>
+                                              <p:pRg st="0" end="0"/>
+                                            </p:txEl>
+                                          </p:spTgt>
+                                        </p:tgtEl>
+                                      </p:cBhvr>
+                                    </p:animEffect>
+                                  </p:childTnLst>
+                                </p:cTn>
+                              </p:par>
+                            </p:childTnLst>
+                          </p:cTn>
+                        </p:par>
+                      </p:childTnLst>
+                    </p:cTn>
+                  </p:par>
+                </p:childTnLst>
+              </p:cTn>
+              <p:prevCondLst>
+                <p:cond evt="onPrev" delay="0">
+                  <p:tgtEl>
+                    <p:sldTgt/>
+                  </p:tgtEl>
+                </p:cond>
+              </p:prevCondLst>
+              <p:nextCondLst>
+                <p:cond evt="onNext" delay="0">
+                  <p:tgtEl>
+                    <p:sldTgt/>
+                  </p:tgtEl>
+                </p:cond>
+              </p:nextCondLst>
+            </p:seq>
+          </p:childTnLst>
+        </p:cTn>
+      </p:par>
+    </p:tnLst>
+  </p:timing>
 </p:sld>
 </file>
 
-<file path=ppt/slides/slide43.xml><?xml version="1.0" encoding="utf-8"?>
+<file path=ppt/slides/slide42.xml><?xml version="1.0" encoding="utf-8"?>
 <p:sld xmlns:a="http://schemas.openxmlformats.org/drawingml/2006/main" xmlns:r="http://schemas.openxmlformats.org/officeDocument/2006/relationships" xmlns:p="http://schemas.openxmlformats.org/presentationml/2006/main">
   <p:cSld>
     <p:bg>
@@ -17636,7 +18196,7 @@
 </p:sld>
 </file>
 
-<file path=ppt/slides/slide44.xml><?xml version="1.0" encoding="utf-8"?>
+<file path=ppt/slides/slide43.xml><?xml version="1.0" encoding="utf-8"?>
 <p:sld xmlns:a="http://schemas.openxmlformats.org/drawingml/2006/main" xmlns:r="http://schemas.openxmlformats.org/officeDocument/2006/relationships" xmlns:p="http://schemas.openxmlformats.org/presentationml/2006/main">
   <p:cSld>
     <p:bg>
@@ -18703,7 +19263,7 @@
                 <a:ea typeface="+mj-ea"/>
                 <a:cs typeface="+mj-cs"/>
               </a:rPr>
-              <a:t>Functional vs Object is a myth</a:t>
+              <a:t>Functional vs Object is irrelevant</a:t>
             </a:r>
           </a:p>
         </p:txBody>
@@ -19112,7 +19672,7 @@
                   </a:schemeClr>
                 </a:solidFill>
               </a:rPr>
-              <a:t>Theory around since the 30’s and first language appeared in the 50’s.</a:t>
+              <a:t>Theory around since the 30’s and first functional language in the 50’s.</a:t>
             </a:r>
           </a:p>
         </p:txBody>
@@ -19852,7 +20412,7 @@
                   </a:schemeClr>
                 </a:solidFill>
               </a:rPr>
-              <a:t>…while Object Oriented paradigm focus on structure</a:t>
+              <a:t>…while Object Oriented paradigm focus on structuring links between data and methods</a:t>
             </a:r>
           </a:p>
         </p:txBody>

</xml_diff>